<commit_message>
Added methodology and schedule to the slides
</commit_message>
<xml_diff>
--- a/doc/initial-plan.pptx
+++ b/doc/initial-plan.pptx
@@ -5,19 +5,21 @@
     <p:sldMasterId id="2147483658" r:id="rId1"/>
   </p:sldMasterIdLst>
   <p:notesMasterIdLst>
-    <p:notesMasterId r:id="rId12"/>
+    <p:notesMasterId r:id="rId14"/>
   </p:notesMasterIdLst>
   <p:sldIdLst>
     <p:sldId id="256" r:id="rId2"/>
     <p:sldId id="259" r:id="rId3"/>
     <p:sldId id="261" r:id="rId4"/>
     <p:sldId id="265" r:id="rId5"/>
-    <p:sldId id="266" r:id="rId6"/>
-    <p:sldId id="283" r:id="rId7"/>
-    <p:sldId id="272" r:id="rId8"/>
-    <p:sldId id="263" r:id="rId9"/>
-    <p:sldId id="274" r:id="rId10"/>
-    <p:sldId id="279" r:id="rId11"/>
+    <p:sldId id="263" r:id="rId6"/>
+    <p:sldId id="266" r:id="rId7"/>
+    <p:sldId id="286" r:id="rId8"/>
+    <p:sldId id="285" r:id="rId9"/>
+    <p:sldId id="287" r:id="rId10"/>
+    <p:sldId id="272" r:id="rId11"/>
+    <p:sldId id="274" r:id="rId12"/>
+    <p:sldId id="279" r:id="rId13"/>
   </p:sldIdLst>
   <p:sldSz cx="9144000" cy="6858000" type="screen4x3"/>
   <p:notesSz cx="6858000" cy="9144000"/>
@@ -589,107 +591,6 @@
 </p:notes>
 </file>
 
-<file path=ppt/notesSlides/notesSlide10.xml><?xml version="1.0" encoding="utf-8"?>
-<p:notes xmlns:a="http://schemas.openxmlformats.org/drawingml/2006/main" xmlns:r="http://schemas.openxmlformats.org/officeDocument/2006/relationships" xmlns:p="http://schemas.openxmlformats.org/presentationml/2006/main" showMasterSp="0" showMasterPhAnim="0">
-  <p:cSld>
-    <p:spTree>
-      <p:nvGrpSpPr>
-        <p:cNvPr id="1" name="Shape 284"/>
-        <p:cNvGrpSpPr/>
-        <p:nvPr/>
-      </p:nvGrpSpPr>
-      <p:grpSpPr>
-        <a:xfrm>
-          <a:off x="0" y="0"/>
-          <a:ext cx="0" cy="0"/>
-          <a:chOff x="0" y="0"/>
-          <a:chExt cx="0" cy="0"/>
-        </a:xfrm>
-      </p:grpSpPr>
-      <p:sp>
-        <p:nvSpPr>
-          <p:cNvPr id="285" name="Shape 285"/>
-          <p:cNvSpPr>
-            <a:spLocks noGrp="1" noRot="1" noChangeAspect="1"/>
-          </p:cNvSpPr>
-          <p:nvPr>
-            <p:ph type="sldImg" idx="2"/>
-          </p:nvPr>
-        </p:nvSpPr>
-        <p:spPr>
-          <a:xfrm>
-            <a:off x="1143000" y="685800"/>
-            <a:ext cx="4572000" cy="3429000"/>
-          </a:xfrm>
-          <a:custGeom>
-            <a:avLst/>
-            <a:gdLst/>
-            <a:ahLst/>
-            <a:cxnLst/>
-            <a:rect l="0" t="0" r="0" b="0"/>
-            <a:pathLst>
-              <a:path w="120000" h="120000" extrusionOk="0">
-                <a:moveTo>
-                  <a:pt x="0" y="0"/>
-                </a:moveTo>
-                <a:lnTo>
-                  <a:pt x="120000" y="0"/>
-                </a:lnTo>
-                <a:lnTo>
-                  <a:pt x="120000" y="120000"/>
-                </a:lnTo>
-                <a:lnTo>
-                  <a:pt x="0" y="120000"/>
-                </a:lnTo>
-                <a:close/>
-              </a:path>
-            </a:pathLst>
-          </a:custGeom>
-        </p:spPr>
-      </p:sp>
-      <p:sp>
-        <p:nvSpPr>
-          <p:cNvPr id="286" name="Shape 286"/>
-          <p:cNvSpPr txBox="1">
-            <a:spLocks noGrp="1"/>
-          </p:cNvSpPr>
-          <p:nvPr>
-            <p:ph type="body" idx="1"/>
-          </p:nvPr>
-        </p:nvSpPr>
-        <p:spPr>
-          <a:xfrm>
-            <a:off x="685800" y="4343400"/>
-            <a:ext cx="5486399" cy="4114800"/>
-          </a:xfrm>
-          <a:prstGeom prst="rect">
-            <a:avLst/>
-          </a:prstGeom>
-        </p:spPr>
-        <p:txBody>
-          <a:bodyPr lIns="91425" tIns="91425" rIns="91425" bIns="91425" anchor="t" anchorCtr="0">
-            <a:noAutofit/>
-          </a:bodyPr>
-          <a:lstStyle/>
-          <a:p>
-            <a:pPr lvl="0">
-              <a:spcBef>
-                <a:spcPts val="0"/>
-              </a:spcBef>
-              <a:buNone/>
-            </a:pPr>
-            <a:endParaRPr/>
-          </a:p>
-        </p:txBody>
-      </p:sp>
-    </p:spTree>
-  </p:cSld>
-  <p:clrMapOvr>
-    <a:masterClrMapping/>
-  </p:clrMapOvr>
-</p:notes>
-</file>
-
 <file path=ppt/notesSlides/notesSlide2.xml><?xml version="1.0" encoding="utf-8"?>
 <p:notes xmlns:a="http://schemas.openxmlformats.org/drawingml/2006/main" xmlns:r="http://schemas.openxmlformats.org/officeDocument/2006/relationships" xmlns:p="http://schemas.openxmlformats.org/presentationml/2006/main" showMasterSp="0" showMasterPhAnim="0">
   <p:cSld>
@@ -998,6 +899,107 @@
   <p:cSld>
     <p:spTree>
       <p:nvGrpSpPr>
+        <p:cNvPr id="1" name="Shape 109"/>
+        <p:cNvGrpSpPr/>
+        <p:nvPr/>
+      </p:nvGrpSpPr>
+      <p:grpSpPr>
+        <a:xfrm>
+          <a:off x="0" y="0"/>
+          <a:ext cx="0" cy="0"/>
+          <a:chOff x="0" y="0"/>
+          <a:chExt cx="0" cy="0"/>
+        </a:xfrm>
+      </p:grpSpPr>
+      <p:sp>
+        <p:nvSpPr>
+          <p:cNvPr id="110" name="Shape 110"/>
+          <p:cNvSpPr>
+            <a:spLocks noGrp="1" noRot="1" noChangeAspect="1"/>
+          </p:cNvSpPr>
+          <p:nvPr>
+            <p:ph type="sldImg" idx="2"/>
+          </p:nvPr>
+        </p:nvSpPr>
+        <p:spPr>
+          <a:xfrm>
+            <a:off x="1143000" y="685800"/>
+            <a:ext cx="4572000" cy="3429000"/>
+          </a:xfrm>
+          <a:custGeom>
+            <a:avLst/>
+            <a:gdLst/>
+            <a:ahLst/>
+            <a:cxnLst/>
+            <a:rect l="0" t="0" r="0" b="0"/>
+            <a:pathLst>
+              <a:path w="120000" h="120000" extrusionOk="0">
+                <a:moveTo>
+                  <a:pt x="0" y="0"/>
+                </a:moveTo>
+                <a:lnTo>
+                  <a:pt x="120000" y="0"/>
+                </a:lnTo>
+                <a:lnTo>
+                  <a:pt x="120000" y="120000"/>
+                </a:lnTo>
+                <a:lnTo>
+                  <a:pt x="0" y="120000"/>
+                </a:lnTo>
+                <a:close/>
+              </a:path>
+            </a:pathLst>
+          </a:custGeom>
+        </p:spPr>
+      </p:sp>
+      <p:sp>
+        <p:nvSpPr>
+          <p:cNvPr id="111" name="Shape 111"/>
+          <p:cNvSpPr txBox="1">
+            <a:spLocks noGrp="1"/>
+          </p:cNvSpPr>
+          <p:nvPr>
+            <p:ph type="body" idx="1"/>
+          </p:nvPr>
+        </p:nvSpPr>
+        <p:spPr>
+          <a:xfrm>
+            <a:off x="685800" y="4343400"/>
+            <a:ext cx="5486399" cy="4114800"/>
+          </a:xfrm>
+          <a:prstGeom prst="rect">
+            <a:avLst/>
+          </a:prstGeom>
+        </p:spPr>
+        <p:txBody>
+          <a:bodyPr lIns="91425" tIns="91425" rIns="91425" bIns="91425" anchor="t" anchorCtr="0">
+            <a:noAutofit/>
+          </a:bodyPr>
+          <a:lstStyle/>
+          <a:p>
+            <a:pPr lvl="0">
+              <a:spcBef>
+                <a:spcPts val="0"/>
+              </a:spcBef>
+              <a:buNone/>
+            </a:pPr>
+            <a:endParaRPr/>
+          </a:p>
+        </p:txBody>
+      </p:sp>
+    </p:spTree>
+  </p:cSld>
+  <p:clrMapOvr>
+    <a:masterClrMapping/>
+  </p:clrMapOvr>
+</p:notes>
+</file>
+
+<file path=ppt/notesSlides/notesSlide6.xml><?xml version="1.0" encoding="utf-8"?>
+<p:notes xmlns:a="http://schemas.openxmlformats.org/drawingml/2006/main" xmlns:r="http://schemas.openxmlformats.org/officeDocument/2006/relationships" xmlns:p="http://schemas.openxmlformats.org/presentationml/2006/main" showMasterSp="0" showMasterPhAnim="0">
+  <p:cSld>
+    <p:spTree>
+      <p:nvGrpSpPr>
         <p:cNvPr id="1" name="Shape 131"/>
         <p:cNvGrpSpPr/>
         <p:nvPr/>
@@ -1054,107 +1056,6 @@
       <p:sp>
         <p:nvSpPr>
           <p:cNvPr id="133" name="Shape 133"/>
-          <p:cNvSpPr txBox="1">
-            <a:spLocks noGrp="1"/>
-          </p:cNvSpPr>
-          <p:nvPr>
-            <p:ph type="body" idx="1"/>
-          </p:nvPr>
-        </p:nvSpPr>
-        <p:spPr>
-          <a:xfrm>
-            <a:off x="685800" y="4343400"/>
-            <a:ext cx="5486399" cy="4114800"/>
-          </a:xfrm>
-          <a:prstGeom prst="rect">
-            <a:avLst/>
-          </a:prstGeom>
-        </p:spPr>
-        <p:txBody>
-          <a:bodyPr lIns="91425" tIns="91425" rIns="91425" bIns="91425" anchor="t" anchorCtr="0">
-            <a:noAutofit/>
-          </a:bodyPr>
-          <a:lstStyle/>
-          <a:p>
-            <a:pPr lvl="0">
-              <a:spcBef>
-                <a:spcPts val="0"/>
-              </a:spcBef>
-              <a:buNone/>
-            </a:pPr>
-            <a:endParaRPr/>
-          </a:p>
-        </p:txBody>
-      </p:sp>
-    </p:spTree>
-  </p:cSld>
-  <p:clrMapOvr>
-    <a:masterClrMapping/>
-  </p:clrMapOvr>
-</p:notes>
-</file>
-
-<file path=ppt/notesSlides/notesSlide6.xml><?xml version="1.0" encoding="utf-8"?>
-<p:notes xmlns:a="http://schemas.openxmlformats.org/drawingml/2006/main" xmlns:r="http://schemas.openxmlformats.org/officeDocument/2006/relationships" xmlns:p="http://schemas.openxmlformats.org/presentationml/2006/main" showMasterSp="0" showMasterPhAnim="0">
-  <p:cSld>
-    <p:spTree>
-      <p:nvGrpSpPr>
-        <p:cNvPr id="1" name="Shape 91"/>
-        <p:cNvGrpSpPr/>
-        <p:nvPr/>
-      </p:nvGrpSpPr>
-      <p:grpSpPr>
-        <a:xfrm>
-          <a:off x="0" y="0"/>
-          <a:ext cx="0" cy="0"/>
-          <a:chOff x="0" y="0"/>
-          <a:chExt cx="0" cy="0"/>
-        </a:xfrm>
-      </p:grpSpPr>
-      <p:sp>
-        <p:nvSpPr>
-          <p:cNvPr id="92" name="Shape 92"/>
-          <p:cNvSpPr>
-            <a:spLocks noGrp="1" noRot="1" noChangeAspect="1"/>
-          </p:cNvSpPr>
-          <p:nvPr>
-            <p:ph type="sldImg" idx="2"/>
-          </p:nvPr>
-        </p:nvSpPr>
-        <p:spPr>
-          <a:xfrm>
-            <a:off x="1143000" y="685800"/>
-            <a:ext cx="4572000" cy="3429000"/>
-          </a:xfrm>
-          <a:custGeom>
-            <a:avLst/>
-            <a:gdLst/>
-            <a:ahLst/>
-            <a:cxnLst/>
-            <a:rect l="0" t="0" r="0" b="0"/>
-            <a:pathLst>
-              <a:path w="120000" h="120000" extrusionOk="0">
-                <a:moveTo>
-                  <a:pt x="0" y="0"/>
-                </a:moveTo>
-                <a:lnTo>
-                  <a:pt x="120000" y="0"/>
-                </a:lnTo>
-                <a:lnTo>
-                  <a:pt x="120000" y="120000"/>
-                </a:lnTo>
-                <a:lnTo>
-                  <a:pt x="0" y="120000"/>
-                </a:lnTo>
-                <a:close/>
-              </a:path>
-            </a:pathLst>
-          </a:custGeom>
-        </p:spPr>
-      </p:sp>
-      <p:sp>
-        <p:nvSpPr>
-          <p:cNvPr id="93" name="Shape 93"/>
           <p:cNvSpPr txBox="1">
             <a:spLocks noGrp="1"/>
           </p:cNvSpPr>
@@ -1301,7 +1202,7 @@
   <p:cSld>
     <p:spTree>
       <p:nvGrpSpPr>
-        <p:cNvPr id="1" name="Shape 109"/>
+        <p:cNvPr id="1" name="Shape 250"/>
         <p:cNvGrpSpPr/>
         <p:nvPr/>
       </p:nvGrpSpPr>
@@ -1315,7 +1216,7 @@
       </p:grpSpPr>
       <p:sp>
         <p:nvSpPr>
-          <p:cNvPr id="110" name="Shape 110"/>
+          <p:cNvPr id="251" name="Shape 251"/>
           <p:cNvSpPr>
             <a:spLocks noGrp="1" noRot="1" noChangeAspect="1"/>
           </p:cNvSpPr>
@@ -1356,7 +1257,7 @@
       </p:sp>
       <p:sp>
         <p:nvSpPr>
-          <p:cNvPr id="111" name="Shape 111"/>
+          <p:cNvPr id="252" name="Shape 252"/>
           <p:cNvSpPr txBox="1">
             <a:spLocks noGrp="1"/>
           </p:cNvSpPr>
@@ -1402,7 +1303,7 @@
   <p:cSld>
     <p:spTree>
       <p:nvGrpSpPr>
-        <p:cNvPr id="1" name="Shape 250"/>
+        <p:cNvPr id="1" name="Shape 284"/>
         <p:cNvGrpSpPr/>
         <p:nvPr/>
       </p:nvGrpSpPr>
@@ -1416,7 +1317,7 @@
       </p:grpSpPr>
       <p:sp>
         <p:nvSpPr>
-          <p:cNvPr id="251" name="Shape 251"/>
+          <p:cNvPr id="285" name="Shape 285"/>
           <p:cNvSpPr>
             <a:spLocks noGrp="1" noRot="1" noChangeAspect="1"/>
           </p:cNvSpPr>
@@ -1457,7 +1358,7 @@
       </p:sp>
       <p:sp>
         <p:nvSpPr>
-          <p:cNvPr id="252" name="Shape 252"/>
+          <p:cNvPr id="286" name="Shape 286"/>
           <p:cNvSpPr txBox="1">
             <a:spLocks noGrp="1"/>
           </p:cNvSpPr>
@@ -4401,6 +4302,953 @@
   <p:cSld>
     <p:spTree>
       <p:nvGrpSpPr>
+        <p:cNvPr id="1" name="Shape 201"/>
+        <p:cNvGrpSpPr/>
+        <p:nvPr/>
+      </p:nvGrpSpPr>
+      <p:grpSpPr>
+        <a:xfrm>
+          <a:off x="0" y="0"/>
+          <a:ext cx="0" cy="0"/>
+          <a:chOff x="0" y="0"/>
+          <a:chExt cx="0" cy="0"/>
+        </a:xfrm>
+      </p:grpSpPr>
+      <p:sp>
+        <p:nvSpPr>
+          <p:cNvPr id="202" name="Shape 202"/>
+          <p:cNvSpPr txBox="1">
+            <a:spLocks noGrp="1"/>
+          </p:cNvSpPr>
+          <p:nvPr>
+            <p:ph type="title"/>
+          </p:nvPr>
+        </p:nvSpPr>
+        <p:spPr>
+          <a:xfrm>
+            <a:off x="1165475" y="665975"/>
+            <a:ext cx="6858000" cy="459900"/>
+          </a:xfrm>
+          <a:prstGeom prst="rect">
+            <a:avLst/>
+          </a:prstGeom>
+        </p:spPr>
+        <p:txBody>
+          <a:bodyPr lIns="91425" tIns="91425" rIns="91425" bIns="91425" anchor="b" anchorCtr="0">
+            <a:noAutofit/>
+          </a:bodyPr>
+          <a:lstStyle/>
+          <a:p>
+            <a:pPr lvl="0" rtl="0">
+              <a:spcBef>
+                <a:spcPts val="0"/>
+              </a:spcBef>
+              <a:buNone/>
+            </a:pPr>
+            <a:r>
+              <a:rPr lang="de-CH" sz="2800" dirty="0" smtClean="0"/>
+              <a:t>Task </a:t>
+            </a:r>
+            <a:r>
+              <a:rPr lang="de-CH" sz="2800" dirty="0" smtClean="0"/>
+              <a:t>Outline (Sprint 1)</a:t>
+            </a:r>
+            <a:endParaRPr lang="en" sz="2800" dirty="0"/>
+          </a:p>
+        </p:txBody>
+      </p:sp>
+      <p:cxnSp>
+        <p:nvCxnSpPr>
+          <p:cNvPr id="204" name="Shape 204"/>
+          <p:cNvCxnSpPr/>
+          <p:nvPr/>
+        </p:nvCxnSpPr>
+        <p:spPr>
+          <a:xfrm flipV="1">
+            <a:off x="1482252" y="1607183"/>
+            <a:ext cx="1" cy="693893"/>
+          </a:xfrm>
+          <a:prstGeom prst="straightConnector1">
+            <a:avLst/>
+          </a:prstGeom>
+          <a:noFill/>
+          <a:ln w="9525" cap="flat" cmpd="sng">
+            <a:solidFill>
+              <a:srgbClr val="999FA9"/>
+            </a:solidFill>
+            <a:prstDash val="solid"/>
+            <a:round/>
+            <a:headEnd type="none" w="lg" len="lg"/>
+            <a:tailEnd type="oval" w="lg" len="lg"/>
+          </a:ln>
+        </p:spPr>
+      </p:cxnSp>
+      <p:sp>
+        <p:nvSpPr>
+          <p:cNvPr id="207" name="Shape 207"/>
+          <p:cNvSpPr txBox="1"/>
+          <p:nvPr/>
+        </p:nvSpPr>
+        <p:spPr>
+          <a:xfrm>
+            <a:off x="2215652" y="1729575"/>
+            <a:ext cx="5807823" cy="381000"/>
+          </a:xfrm>
+          <a:prstGeom prst="rect">
+            <a:avLst/>
+          </a:prstGeom>
+          <a:noFill/>
+          <a:ln>
+            <a:noFill/>
+          </a:ln>
+        </p:spPr>
+        <p:txBody>
+          <a:bodyPr lIns="91425" tIns="91425" rIns="91425" bIns="91425" anchor="t" anchorCtr="0">
+            <a:noAutofit/>
+          </a:bodyPr>
+          <a:lstStyle/>
+          <a:p>
+            <a:pPr lvl="0" rtl="0">
+              <a:spcBef>
+                <a:spcPts val="0"/>
+              </a:spcBef>
+              <a:buNone/>
+            </a:pPr>
+            <a:r>
+              <a:rPr lang="de-CH" sz="2000" dirty="0" smtClean="0">
+                <a:solidFill>
+                  <a:srgbClr val="F3F3F3"/>
+                </a:solidFill>
+                <a:latin typeface="Quicksand"/>
+                <a:ea typeface="Quicksand"/>
+                <a:cs typeface="Quicksand"/>
+                <a:sym typeface="Quicksand"/>
+              </a:rPr>
+              <a:t>1. </a:t>
+            </a:r>
+            <a:r>
+              <a:rPr lang="de-CH" sz="2000" dirty="0" err="1" smtClean="0">
+                <a:solidFill>
+                  <a:srgbClr val="F3F3F3"/>
+                </a:solidFill>
+                <a:latin typeface="Quicksand"/>
+                <a:ea typeface="Quicksand"/>
+                <a:cs typeface="Quicksand"/>
+                <a:sym typeface="Quicksand"/>
+              </a:rPr>
+              <a:t>Loading</a:t>
+            </a:r>
+            <a:r>
+              <a:rPr lang="de-CH" sz="2000" dirty="0" smtClean="0">
+                <a:solidFill>
+                  <a:srgbClr val="F3F3F3"/>
+                </a:solidFill>
+                <a:latin typeface="Quicksand"/>
+                <a:ea typeface="Quicksand"/>
+                <a:cs typeface="Quicksand"/>
+                <a:sym typeface="Quicksand"/>
+              </a:rPr>
+              <a:t> </a:t>
+            </a:r>
+            <a:r>
+              <a:rPr lang="de-CH" sz="2000" dirty="0" err="1" smtClean="0">
+                <a:solidFill>
+                  <a:srgbClr val="F3F3F3"/>
+                </a:solidFill>
+                <a:latin typeface="Quicksand"/>
+                <a:ea typeface="Quicksand"/>
+                <a:cs typeface="Quicksand"/>
+                <a:sym typeface="Quicksand"/>
+              </a:rPr>
+              <a:t>and</a:t>
+            </a:r>
+            <a:r>
+              <a:rPr lang="de-CH" sz="2000" dirty="0" smtClean="0">
+                <a:solidFill>
+                  <a:srgbClr val="F3F3F3"/>
+                </a:solidFill>
+                <a:latin typeface="Quicksand"/>
+                <a:ea typeface="Quicksand"/>
+                <a:cs typeface="Quicksand"/>
+                <a:sym typeface="Quicksand"/>
+              </a:rPr>
+              <a:t> </a:t>
+            </a:r>
+            <a:r>
+              <a:rPr lang="de-CH" sz="2000" dirty="0" err="1" smtClean="0">
+                <a:solidFill>
+                  <a:srgbClr val="F3F3F3"/>
+                </a:solidFill>
+                <a:latin typeface="Quicksand"/>
+                <a:ea typeface="Quicksand"/>
+                <a:cs typeface="Quicksand"/>
+                <a:sym typeface="Quicksand"/>
+              </a:rPr>
+              <a:t>extraction</a:t>
+            </a:r>
+            <a:r>
+              <a:rPr lang="de-CH" sz="2000" dirty="0" smtClean="0">
+                <a:solidFill>
+                  <a:srgbClr val="F3F3F3"/>
+                </a:solidFill>
+                <a:latin typeface="Quicksand"/>
+                <a:ea typeface="Quicksand"/>
+                <a:cs typeface="Quicksand"/>
+                <a:sym typeface="Quicksand"/>
+              </a:rPr>
+              <a:t> </a:t>
+            </a:r>
+            <a:r>
+              <a:rPr lang="de-CH" sz="2000" dirty="0" err="1" smtClean="0">
+                <a:solidFill>
+                  <a:srgbClr val="F3F3F3"/>
+                </a:solidFill>
+                <a:latin typeface="Quicksand"/>
+                <a:ea typeface="Quicksand"/>
+                <a:cs typeface="Quicksand"/>
+                <a:sym typeface="Quicksand"/>
+              </a:rPr>
+              <a:t>of</a:t>
+            </a:r>
+            <a:r>
+              <a:rPr lang="de-CH" sz="2000" dirty="0" smtClean="0">
+                <a:solidFill>
+                  <a:srgbClr val="F3F3F3"/>
+                </a:solidFill>
+                <a:latin typeface="Quicksand"/>
+                <a:ea typeface="Quicksand"/>
+                <a:cs typeface="Quicksand"/>
+                <a:sym typeface="Quicksand"/>
+              </a:rPr>
+              <a:t> </a:t>
+            </a:r>
+            <a:r>
+              <a:rPr lang="de-CH" sz="2000" dirty="0" err="1" smtClean="0">
+                <a:solidFill>
+                  <a:srgbClr val="F3F3F3"/>
+                </a:solidFill>
+                <a:latin typeface="Quicksand"/>
+                <a:ea typeface="Quicksand"/>
+                <a:cs typeface="Quicksand"/>
+                <a:sym typeface="Quicksand"/>
+              </a:rPr>
+              <a:t>video</a:t>
+            </a:r>
+            <a:r>
+              <a:rPr lang="de-CH" sz="2000" dirty="0" smtClean="0">
+                <a:solidFill>
+                  <a:srgbClr val="F3F3F3"/>
+                </a:solidFill>
+                <a:latin typeface="Quicksand"/>
+                <a:ea typeface="Quicksand"/>
+                <a:cs typeface="Quicksand"/>
+                <a:sym typeface="Quicksand"/>
+              </a:rPr>
+              <a:t> </a:t>
+            </a:r>
+            <a:r>
+              <a:rPr lang="de-CH" sz="2000" dirty="0" err="1" smtClean="0">
+                <a:solidFill>
+                  <a:srgbClr val="F3F3F3"/>
+                </a:solidFill>
+                <a:latin typeface="Quicksand"/>
+                <a:ea typeface="Quicksand"/>
+                <a:cs typeface="Quicksand"/>
+                <a:sym typeface="Quicksand"/>
+              </a:rPr>
+              <a:t>data</a:t>
+            </a:r>
+            <a:endParaRPr lang="en" sz="2000" dirty="0">
+              <a:solidFill>
+                <a:srgbClr val="F3F3F3"/>
+              </a:solidFill>
+              <a:latin typeface="Quicksand"/>
+              <a:ea typeface="Quicksand"/>
+              <a:cs typeface="Quicksand"/>
+              <a:sym typeface="Quicksand"/>
+            </a:endParaRPr>
+          </a:p>
+        </p:txBody>
+      </p:sp>
+      <p:cxnSp>
+        <p:nvCxnSpPr>
+          <p:cNvPr id="13" name="Shape 204"/>
+          <p:cNvCxnSpPr/>
+          <p:nvPr/>
+        </p:nvCxnSpPr>
+        <p:spPr>
+          <a:xfrm flipV="1">
+            <a:off x="1482253" y="2863072"/>
+            <a:ext cx="1" cy="693893"/>
+          </a:xfrm>
+          <a:prstGeom prst="straightConnector1">
+            <a:avLst/>
+          </a:prstGeom>
+          <a:noFill/>
+          <a:ln w="9525" cap="flat" cmpd="sng">
+            <a:solidFill>
+              <a:srgbClr val="999FA9"/>
+            </a:solidFill>
+            <a:prstDash val="solid"/>
+            <a:round/>
+            <a:headEnd type="none" w="lg" len="lg"/>
+            <a:tailEnd type="oval" w="lg" len="lg"/>
+          </a:ln>
+        </p:spPr>
+      </p:cxnSp>
+      <p:sp>
+        <p:nvSpPr>
+          <p:cNvPr id="14" name="Shape 207"/>
+          <p:cNvSpPr txBox="1"/>
+          <p:nvPr/>
+        </p:nvSpPr>
+        <p:spPr>
+          <a:xfrm>
+            <a:off x="2215653" y="2985464"/>
+            <a:ext cx="5807822" cy="381000"/>
+          </a:xfrm>
+          <a:prstGeom prst="rect">
+            <a:avLst/>
+          </a:prstGeom>
+          <a:noFill/>
+          <a:ln>
+            <a:noFill/>
+          </a:ln>
+        </p:spPr>
+        <p:txBody>
+          <a:bodyPr lIns="91425" tIns="91425" rIns="91425" bIns="91425" anchor="t" anchorCtr="0">
+            <a:noAutofit/>
+          </a:bodyPr>
+          <a:lstStyle/>
+          <a:p>
+            <a:pPr lvl="0"/>
+            <a:r>
+              <a:rPr lang="de-CH" sz="2000" dirty="0" smtClean="0">
+                <a:solidFill>
+                  <a:srgbClr val="F3F3F3"/>
+                </a:solidFill>
+                <a:latin typeface="Quicksand"/>
+                <a:ea typeface="Quicksand"/>
+                <a:cs typeface="Quicksand"/>
+                <a:sym typeface="Quicksand"/>
+              </a:rPr>
+              <a:t>2</a:t>
+            </a:r>
+            <a:r>
+              <a:rPr lang="de-CH" sz="2000" dirty="0">
+                <a:solidFill>
+                  <a:srgbClr val="F3F3F3"/>
+                </a:solidFill>
+                <a:latin typeface="Quicksand"/>
+                <a:ea typeface="Quicksand"/>
+                <a:cs typeface="Quicksand"/>
+                <a:sym typeface="Quicksand"/>
+              </a:rPr>
+              <a:t>. </a:t>
+            </a:r>
+            <a:r>
+              <a:rPr lang="de-CH" sz="2000" dirty="0" err="1">
+                <a:solidFill>
+                  <a:srgbClr val="F3F3F3"/>
+                </a:solidFill>
+                <a:latin typeface="Quicksand"/>
+                <a:ea typeface="Quicksand"/>
+                <a:cs typeface="Quicksand"/>
+                <a:sym typeface="Quicksand"/>
+              </a:rPr>
+              <a:t>Frequency</a:t>
+            </a:r>
+            <a:r>
+              <a:rPr lang="de-CH" sz="2000" dirty="0">
+                <a:solidFill>
+                  <a:srgbClr val="F3F3F3"/>
+                </a:solidFill>
+                <a:latin typeface="Quicksand"/>
+                <a:ea typeface="Quicksand"/>
+                <a:cs typeface="Quicksand"/>
+                <a:sym typeface="Quicksand"/>
+              </a:rPr>
+              <a:t> </a:t>
+            </a:r>
+            <a:r>
+              <a:rPr lang="de-CH" sz="2000" dirty="0" err="1">
+                <a:solidFill>
+                  <a:srgbClr val="F3F3F3"/>
+                </a:solidFill>
+                <a:latin typeface="Quicksand"/>
+                <a:ea typeface="Quicksand"/>
+                <a:cs typeface="Quicksand"/>
+                <a:sym typeface="Quicksand"/>
+              </a:rPr>
+              <a:t>analysis</a:t>
+            </a:r>
+            <a:r>
+              <a:rPr lang="de-CH" sz="2000" dirty="0">
+                <a:solidFill>
+                  <a:srgbClr val="F3F3F3"/>
+                </a:solidFill>
+                <a:latin typeface="Quicksand"/>
+                <a:ea typeface="Quicksand"/>
+                <a:cs typeface="Quicksand"/>
+                <a:sym typeface="Quicksand"/>
+              </a:rPr>
+              <a:t> per ROI </a:t>
+            </a:r>
+            <a:r>
+              <a:rPr lang="de-CH" sz="2000" dirty="0" err="1">
+                <a:solidFill>
+                  <a:srgbClr val="F3F3F3"/>
+                </a:solidFill>
+                <a:latin typeface="Quicksand"/>
+                <a:ea typeface="Quicksand"/>
+                <a:cs typeface="Quicksand"/>
+                <a:sym typeface="Quicksand"/>
+              </a:rPr>
+              <a:t>using</a:t>
+            </a:r>
+            <a:r>
+              <a:rPr lang="de-CH" sz="2000" dirty="0">
+                <a:solidFill>
+                  <a:srgbClr val="F3F3F3"/>
+                </a:solidFill>
+                <a:latin typeface="Quicksand"/>
+                <a:ea typeface="Quicksand"/>
+                <a:cs typeface="Quicksand"/>
+                <a:sym typeface="Quicksand"/>
+              </a:rPr>
+              <a:t> FFT</a:t>
+            </a:r>
+            <a:endParaRPr lang="en" sz="2000" dirty="0">
+              <a:solidFill>
+                <a:srgbClr val="F3F3F3"/>
+              </a:solidFill>
+              <a:latin typeface="Quicksand"/>
+              <a:ea typeface="Quicksand"/>
+              <a:cs typeface="Quicksand"/>
+              <a:sym typeface="Quicksand"/>
+            </a:endParaRPr>
+          </a:p>
+        </p:txBody>
+      </p:sp>
+      <p:cxnSp>
+        <p:nvCxnSpPr>
+          <p:cNvPr id="15" name="Shape 204"/>
+          <p:cNvCxnSpPr/>
+          <p:nvPr/>
+        </p:nvCxnSpPr>
+        <p:spPr>
+          <a:xfrm flipV="1">
+            <a:off x="1482254" y="4118960"/>
+            <a:ext cx="1" cy="693893"/>
+          </a:xfrm>
+          <a:prstGeom prst="straightConnector1">
+            <a:avLst/>
+          </a:prstGeom>
+          <a:noFill/>
+          <a:ln w="9525" cap="flat" cmpd="sng">
+            <a:solidFill>
+              <a:srgbClr val="999FA9"/>
+            </a:solidFill>
+            <a:prstDash val="solid"/>
+            <a:round/>
+            <a:headEnd type="none" w="lg" len="lg"/>
+            <a:tailEnd type="oval" w="lg" len="lg"/>
+          </a:ln>
+        </p:spPr>
+      </p:cxnSp>
+      <p:sp>
+        <p:nvSpPr>
+          <p:cNvPr id="16" name="Shape 207"/>
+          <p:cNvSpPr txBox="1"/>
+          <p:nvPr/>
+        </p:nvSpPr>
+        <p:spPr>
+          <a:xfrm>
+            <a:off x="2215654" y="4241353"/>
+            <a:ext cx="5807821" cy="381000"/>
+          </a:xfrm>
+          <a:prstGeom prst="rect">
+            <a:avLst/>
+          </a:prstGeom>
+          <a:noFill/>
+          <a:ln>
+            <a:noFill/>
+          </a:ln>
+        </p:spPr>
+        <p:txBody>
+          <a:bodyPr lIns="91425" tIns="91425" rIns="91425" bIns="91425" anchor="t" anchorCtr="0">
+            <a:noAutofit/>
+          </a:bodyPr>
+          <a:lstStyle/>
+          <a:p>
+            <a:pPr lvl="0"/>
+            <a:r>
+              <a:rPr lang="de-CH" sz="2000" dirty="0" smtClean="0">
+                <a:solidFill>
+                  <a:srgbClr val="F3F3F3"/>
+                </a:solidFill>
+                <a:latin typeface="Quicksand"/>
+                <a:ea typeface="Quicksand"/>
+                <a:cs typeface="Quicksand"/>
+                <a:sym typeface="Quicksand"/>
+              </a:rPr>
+              <a:t>3. Scoring </a:t>
+            </a:r>
+            <a:r>
+              <a:rPr lang="de-CH" sz="2000" dirty="0" err="1">
+                <a:solidFill>
+                  <a:srgbClr val="F3F3F3"/>
+                </a:solidFill>
+                <a:latin typeface="Quicksand"/>
+                <a:ea typeface="Quicksand"/>
+                <a:cs typeface="Quicksand"/>
+                <a:sym typeface="Quicksand"/>
+              </a:rPr>
+              <a:t>tissue</a:t>
+            </a:r>
+            <a:r>
+              <a:rPr lang="de-CH" sz="2000" dirty="0">
+                <a:solidFill>
+                  <a:srgbClr val="F3F3F3"/>
+                </a:solidFill>
+                <a:latin typeface="Quicksand"/>
+                <a:ea typeface="Quicksand"/>
+                <a:cs typeface="Quicksand"/>
+                <a:sym typeface="Quicksand"/>
+              </a:rPr>
+              <a:t> </a:t>
+            </a:r>
+            <a:r>
+              <a:rPr lang="de-CH" sz="2000" dirty="0" err="1">
+                <a:solidFill>
+                  <a:srgbClr val="F3F3F3"/>
+                </a:solidFill>
+                <a:latin typeface="Quicksand"/>
+                <a:ea typeface="Quicksand"/>
+                <a:cs typeface="Quicksand"/>
+                <a:sym typeface="Quicksand"/>
+              </a:rPr>
+              <a:t>surface</a:t>
+            </a:r>
+            <a:r>
+              <a:rPr lang="de-CH" sz="2000" dirty="0">
+                <a:solidFill>
+                  <a:srgbClr val="F3F3F3"/>
+                </a:solidFill>
+                <a:latin typeface="Quicksand"/>
+                <a:ea typeface="Quicksand"/>
+                <a:cs typeface="Quicksand"/>
+                <a:sym typeface="Quicksand"/>
+              </a:rPr>
+              <a:t> </a:t>
+            </a:r>
+            <a:r>
+              <a:rPr lang="de-CH" sz="2000" dirty="0" err="1">
+                <a:solidFill>
+                  <a:srgbClr val="F3F3F3"/>
+                </a:solidFill>
+                <a:latin typeface="Quicksand"/>
+                <a:ea typeface="Quicksand"/>
+                <a:cs typeface="Quicksand"/>
+                <a:sym typeface="Quicksand"/>
+              </a:rPr>
+              <a:t>activity</a:t>
+            </a:r>
+            <a:endParaRPr lang="en" sz="2000" dirty="0">
+              <a:solidFill>
+                <a:srgbClr val="F3F3F3"/>
+              </a:solidFill>
+              <a:latin typeface="Quicksand"/>
+              <a:ea typeface="Quicksand"/>
+              <a:cs typeface="Quicksand"/>
+              <a:sym typeface="Quicksand"/>
+            </a:endParaRPr>
+          </a:p>
+        </p:txBody>
+      </p:sp>
+      <p:cxnSp>
+        <p:nvCxnSpPr>
+          <p:cNvPr id="17" name="Shape 204"/>
+          <p:cNvCxnSpPr/>
+          <p:nvPr/>
+        </p:nvCxnSpPr>
+        <p:spPr>
+          <a:xfrm flipV="1">
+            <a:off x="1482251" y="5318406"/>
+            <a:ext cx="1" cy="693893"/>
+          </a:xfrm>
+          <a:prstGeom prst="straightConnector1">
+            <a:avLst/>
+          </a:prstGeom>
+          <a:noFill/>
+          <a:ln w="9525" cap="flat" cmpd="sng">
+            <a:solidFill>
+              <a:srgbClr val="999FA9"/>
+            </a:solidFill>
+            <a:prstDash val="solid"/>
+            <a:round/>
+            <a:headEnd type="none" w="lg" len="lg"/>
+            <a:tailEnd type="oval" w="lg" len="lg"/>
+          </a:ln>
+        </p:spPr>
+      </p:cxnSp>
+      <p:sp>
+        <p:nvSpPr>
+          <p:cNvPr id="18" name="Shape 207"/>
+          <p:cNvSpPr txBox="1"/>
+          <p:nvPr/>
+        </p:nvSpPr>
+        <p:spPr>
+          <a:xfrm>
+            <a:off x="2215651" y="5440799"/>
+            <a:ext cx="5807824" cy="381000"/>
+          </a:xfrm>
+          <a:prstGeom prst="rect">
+            <a:avLst/>
+          </a:prstGeom>
+          <a:noFill/>
+          <a:ln>
+            <a:noFill/>
+          </a:ln>
+        </p:spPr>
+        <p:txBody>
+          <a:bodyPr lIns="91425" tIns="91425" rIns="91425" bIns="91425" anchor="t" anchorCtr="0">
+            <a:noAutofit/>
+          </a:bodyPr>
+          <a:lstStyle/>
+          <a:p>
+            <a:pPr lvl="0" rtl="0">
+              <a:spcBef>
+                <a:spcPts val="0"/>
+              </a:spcBef>
+              <a:buNone/>
+            </a:pPr>
+            <a:r>
+              <a:rPr lang="de-CH" sz="2000" dirty="0" smtClean="0">
+                <a:solidFill>
+                  <a:srgbClr val="F3F3F3"/>
+                </a:solidFill>
+                <a:latin typeface="Quicksand"/>
+                <a:ea typeface="Quicksand"/>
+                <a:cs typeface="Quicksand"/>
+                <a:sym typeface="Quicksand"/>
+              </a:rPr>
+              <a:t>4. </a:t>
+            </a:r>
+            <a:r>
+              <a:rPr lang="de-CH" sz="2000" dirty="0" err="1" smtClean="0">
+                <a:solidFill>
+                  <a:srgbClr val="F3F3F3"/>
+                </a:solidFill>
+                <a:latin typeface="Quicksand"/>
+                <a:ea typeface="Quicksand"/>
+                <a:cs typeface="Quicksand"/>
+                <a:sym typeface="Quicksand"/>
+              </a:rPr>
+              <a:t>Synthetic</a:t>
+            </a:r>
+            <a:r>
+              <a:rPr lang="de-CH" sz="2000" dirty="0" smtClean="0">
+                <a:solidFill>
+                  <a:srgbClr val="F3F3F3"/>
+                </a:solidFill>
+                <a:latin typeface="Quicksand"/>
+                <a:ea typeface="Quicksand"/>
+                <a:cs typeface="Quicksand"/>
+                <a:sym typeface="Quicksand"/>
+              </a:rPr>
+              <a:t> test-</a:t>
+            </a:r>
+            <a:r>
+              <a:rPr lang="de-CH" sz="2000" dirty="0" err="1" smtClean="0">
+                <a:solidFill>
+                  <a:srgbClr val="F3F3F3"/>
+                </a:solidFill>
+                <a:latin typeface="Quicksand"/>
+                <a:ea typeface="Quicksand"/>
+                <a:cs typeface="Quicksand"/>
+                <a:sym typeface="Quicksand"/>
+              </a:rPr>
+              <a:t>data</a:t>
+            </a:r>
+            <a:r>
+              <a:rPr lang="de-CH" sz="2000" dirty="0" smtClean="0">
+                <a:solidFill>
+                  <a:srgbClr val="F3F3F3"/>
+                </a:solidFill>
+                <a:latin typeface="Quicksand"/>
+                <a:ea typeface="Quicksand"/>
+                <a:cs typeface="Quicksand"/>
+                <a:sym typeface="Quicksand"/>
+              </a:rPr>
+              <a:t> </a:t>
+            </a:r>
+            <a:r>
+              <a:rPr lang="de-CH" sz="2000" dirty="0" err="1" smtClean="0">
+                <a:solidFill>
+                  <a:srgbClr val="F3F3F3"/>
+                </a:solidFill>
+                <a:latin typeface="Quicksand"/>
+                <a:ea typeface="Quicksand"/>
+                <a:cs typeface="Quicksand"/>
+                <a:sym typeface="Quicksand"/>
+              </a:rPr>
+              <a:t>generation</a:t>
+            </a:r>
+            <a:r>
+              <a:rPr lang="de-CH" sz="2000" dirty="0" smtClean="0">
+                <a:solidFill>
+                  <a:srgbClr val="F3F3F3"/>
+                </a:solidFill>
+                <a:latin typeface="Quicksand"/>
+                <a:ea typeface="Quicksand"/>
+                <a:cs typeface="Quicksand"/>
+                <a:sym typeface="Quicksand"/>
+              </a:rPr>
+              <a:t> (optional)</a:t>
+            </a:r>
+            <a:endParaRPr lang="en" sz="2000" dirty="0">
+              <a:solidFill>
+                <a:srgbClr val="F3F3F3"/>
+              </a:solidFill>
+              <a:latin typeface="Quicksand"/>
+              <a:ea typeface="Quicksand"/>
+              <a:cs typeface="Quicksand"/>
+              <a:sym typeface="Quicksand"/>
+            </a:endParaRPr>
+          </a:p>
+        </p:txBody>
+      </p:sp>
+    </p:spTree>
+  </p:cSld>
+  <p:clrMapOvr>
+    <a:masterClrMapping/>
+  </p:clrMapOvr>
+  <p:transition xmlns:p14="http://schemas.microsoft.com/office/powerpoint/2010/main" spd="slow">
+    <p:cut/>
+  </p:transition>
+  <p:timing>
+    <p:tnLst>
+      <p:par>
+        <p:cTn xmlns:p14="http://schemas.microsoft.com/office/powerpoint/2010/main" id="1" dur="indefinite" restart="never" nodeType="tmRoot"/>
+      </p:par>
+    </p:tnLst>
+  </p:timing>
+</p:sld>
+</file>
+
+<file path=ppt/slides/slide11.xml><?xml version="1.0" encoding="utf-8"?>
+<p:sld xmlns:a="http://schemas.openxmlformats.org/drawingml/2006/main" xmlns:r="http://schemas.openxmlformats.org/officeDocument/2006/relationships" xmlns:p="http://schemas.openxmlformats.org/presentationml/2006/main">
+  <p:cSld>
+    <p:spTree>
+      <p:nvGrpSpPr>
+        <p:cNvPr id="1" name="Shape 253"/>
+        <p:cNvGrpSpPr/>
+        <p:nvPr/>
+      </p:nvGrpSpPr>
+      <p:grpSpPr>
+        <a:xfrm>
+          <a:off x="0" y="0"/>
+          <a:ext cx="0" cy="0"/>
+          <a:chOff x="0" y="0"/>
+          <a:chExt cx="0" cy="0"/>
+        </a:xfrm>
+      </p:grpSpPr>
+      <p:sp>
+        <p:nvSpPr>
+          <p:cNvPr id="254" name="Shape 254"/>
+          <p:cNvSpPr txBox="1">
+            <a:spLocks noGrp="1"/>
+          </p:cNvSpPr>
+          <p:nvPr>
+            <p:ph type="body" idx="1"/>
+          </p:nvPr>
+        </p:nvSpPr>
+        <p:spPr>
+          <a:xfrm>
+            <a:off x="1165475" y="5775090"/>
+            <a:ext cx="7521300" cy="578700"/>
+          </a:xfrm>
+          <a:prstGeom prst="rect">
+            <a:avLst/>
+          </a:prstGeom>
+        </p:spPr>
+        <p:txBody>
+          <a:bodyPr lIns="91425" tIns="91425" rIns="91425" bIns="91425" anchor="t" anchorCtr="0">
+            <a:noAutofit/>
+          </a:bodyPr>
+          <a:lstStyle/>
+          <a:p>
+            <a:pPr lvl="0">
+              <a:spcBef>
+                <a:spcPts val="0"/>
+              </a:spcBef>
+              <a:buNone/>
+            </a:pPr>
+            <a:r>
+              <a:rPr lang="de-CH" dirty="0" err="1" smtClean="0">
+                <a:solidFill>
+                  <a:srgbClr val="F3F3F3"/>
+                </a:solidFill>
+              </a:rPr>
+              <a:t>Mayb</a:t>
+            </a:r>
+            <a:r>
+              <a:rPr lang="de-CH" dirty="0" err="1" smtClean="0"/>
+              <a:t>e</a:t>
+            </a:r>
+            <a:r>
+              <a:rPr lang="de-CH" dirty="0" smtClean="0"/>
+              <a:t> a </a:t>
+            </a:r>
+            <a:r>
+              <a:rPr lang="de-CH" dirty="0" err="1" smtClean="0"/>
+              <a:t>graph</a:t>
+            </a:r>
+            <a:r>
+              <a:rPr lang="de-CH" dirty="0" smtClean="0"/>
+              <a:t> </a:t>
+            </a:r>
+            <a:r>
+              <a:rPr lang="de-CH" dirty="0" err="1" smtClean="0"/>
+              <a:t>to</a:t>
+            </a:r>
+            <a:r>
+              <a:rPr lang="de-CH" dirty="0" smtClean="0"/>
+              <a:t> </a:t>
+            </a:r>
+            <a:r>
+              <a:rPr lang="de-CH" dirty="0" err="1" smtClean="0"/>
+              <a:t>show</a:t>
+            </a:r>
+            <a:r>
+              <a:rPr lang="de-CH" dirty="0" smtClean="0"/>
+              <a:t> </a:t>
+            </a:r>
+            <a:r>
+              <a:rPr lang="de-CH" dirty="0" err="1" smtClean="0"/>
+              <a:t>estimated</a:t>
+            </a:r>
+            <a:r>
+              <a:rPr lang="de-CH" dirty="0" smtClean="0"/>
+              <a:t> </a:t>
+            </a:r>
+            <a:r>
+              <a:rPr lang="de-CH" dirty="0" err="1" smtClean="0"/>
+              <a:t>distribution</a:t>
+            </a:r>
+            <a:r>
+              <a:rPr lang="de-CH" dirty="0" smtClean="0"/>
+              <a:t> </a:t>
+            </a:r>
+            <a:r>
+              <a:rPr lang="de-CH" dirty="0" err="1" smtClean="0"/>
+              <a:t>of</a:t>
+            </a:r>
+            <a:r>
+              <a:rPr lang="de-CH" dirty="0" smtClean="0"/>
+              <a:t> time on </a:t>
+            </a:r>
+            <a:r>
+              <a:rPr lang="de-CH" dirty="0" err="1" smtClean="0"/>
+              <a:t>tasks</a:t>
+            </a:r>
+            <a:r>
+              <a:rPr lang="de-CH" dirty="0" smtClean="0"/>
+              <a:t>?</a:t>
+            </a:r>
+            <a:endParaRPr lang="de-CH" dirty="0" smtClean="0">
+              <a:solidFill>
+                <a:srgbClr val="F3F3F3"/>
+              </a:solidFill>
+            </a:endParaRPr>
+          </a:p>
+          <a:p>
+            <a:pPr lvl="0">
+              <a:spcBef>
+                <a:spcPts val="0"/>
+              </a:spcBef>
+              <a:buNone/>
+            </a:pPr>
+            <a:r>
+              <a:rPr lang="en" dirty="0" smtClean="0">
+                <a:solidFill>
+                  <a:srgbClr val="F3F3F3"/>
+                </a:solidFill>
+              </a:rPr>
+              <a:t>You </a:t>
+            </a:r>
+            <a:r>
+              <a:rPr lang="en" dirty="0">
+                <a:solidFill>
+                  <a:srgbClr val="F3F3F3"/>
+                </a:solidFill>
+              </a:rPr>
+              <a:t>can copy&amp;paste graphs from </a:t>
+            </a:r>
+            <a:r>
+              <a:rPr lang="en" u="sng" dirty="0">
+                <a:solidFill>
+                  <a:srgbClr val="F3F3F3"/>
+                </a:solidFill>
+                <a:hlinkClick r:id="rId3"/>
+              </a:rPr>
+              <a:t>Google Sheets</a:t>
+            </a:r>
+          </a:p>
+        </p:txBody>
+      </p:sp>
+      <p:pic>
+        <p:nvPicPr>
+          <p:cNvPr id="255" name="Shape 255"/>
+          <p:cNvPicPr preferRelativeResize="0"/>
+          <p:nvPr/>
+        </p:nvPicPr>
+        <p:blipFill>
+          <a:blip r:embed="rId4">
+            <a:alphaModFix/>
+          </a:blip>
+          <a:stretch>
+            <a:fillRect/>
+          </a:stretch>
+        </p:blipFill>
+        <p:spPr>
+          <a:xfrm>
+            <a:off x="1138239" y="152401"/>
+            <a:ext cx="6867525" cy="5695951"/>
+          </a:xfrm>
+          <a:prstGeom prst="rect">
+            <a:avLst/>
+          </a:prstGeom>
+          <a:noFill/>
+          <a:ln>
+            <a:noFill/>
+          </a:ln>
+        </p:spPr>
+      </p:pic>
+    </p:spTree>
+  </p:cSld>
+  <p:clrMapOvr>
+    <a:masterClrMapping/>
+  </p:clrMapOvr>
+  <p:transition xmlns:p14="http://schemas.microsoft.com/office/powerpoint/2010/main" spd="slow">
+    <p:cut/>
+  </p:transition>
+  <p:timing>
+    <p:tnLst>
+      <p:par>
+        <p:cTn xmlns:p14="http://schemas.microsoft.com/office/powerpoint/2010/main" id="1" dur="indefinite" restart="never" nodeType="tmRoot"/>
+      </p:par>
+    </p:tnLst>
+  </p:timing>
+</p:sld>
+</file>
+
+<file path=ppt/slides/slide12.xml><?xml version="1.0" encoding="utf-8"?>
+<p:sld xmlns:a="http://schemas.openxmlformats.org/drawingml/2006/main" xmlns:r="http://schemas.openxmlformats.org/officeDocument/2006/relationships" xmlns:p="http://schemas.openxmlformats.org/presentationml/2006/main">
+  <p:cSld>
+    <p:spTree>
+      <p:nvGrpSpPr>
         <p:cNvPr id="1" name="Shape 287"/>
         <p:cNvGrpSpPr/>
         <p:nvPr/>
@@ -4739,14 +5587,22 @@
               <a:buNone/>
             </a:pPr>
             <a:r>
-              <a:rPr lang="en" sz="3000" smtClean="0">
+              <a:rPr lang="de-CH" sz="2800" dirty="0" smtClean="0">
                 <a:solidFill>
                   <a:srgbClr val="39C0BA"/>
                 </a:solidFill>
               </a:rPr>
-              <a:t>The Problem</a:t>
-            </a:r>
-            <a:endParaRPr lang="en" sz="3000">
+              <a:t>Problem, Motivation &amp; </a:t>
+            </a:r>
+            <a:r>
+              <a:rPr lang="de-CH" sz="2800" dirty="0" err="1" smtClean="0">
+                <a:solidFill>
+                  <a:srgbClr val="39C0BA"/>
+                </a:solidFill>
+              </a:rPr>
+              <a:t>Context</a:t>
+            </a:r>
+            <a:endParaRPr lang="en" sz="2800" dirty="0">
               <a:solidFill>
                 <a:srgbClr val="39C0BA"/>
               </a:solidFill>
@@ -4786,7 +5642,7 @@
               <a:buNone/>
             </a:pPr>
             <a:r>
-              <a:rPr lang="en" smtClean="0"/>
+              <a:rPr lang="en" dirty="0" smtClean="0"/>
               <a:t>Problem description:</a:t>
             </a:r>
           </a:p>
@@ -4797,7 +5653,7 @@
               </a:spcBef>
             </a:pPr>
             <a:r>
-              <a:rPr lang="en" smtClean="0"/>
+              <a:rPr lang="en" dirty="0" smtClean="0"/>
               <a:t>Introduce client</a:t>
             </a:r>
           </a:p>
@@ -4808,7 +5664,7 @@
               </a:spcBef>
             </a:pPr>
             <a:r>
-              <a:rPr lang="en" smtClean="0"/>
+              <a:rPr lang="en" dirty="0" smtClean="0"/>
               <a:t>Put project in context</a:t>
             </a:r>
           </a:p>
@@ -4819,7 +5675,7 @@
               </a:spcBef>
             </a:pPr>
             <a:r>
-              <a:rPr lang="en" smtClean="0"/>
+              <a:rPr lang="en" dirty="0" smtClean="0"/>
               <a:t>Motivation</a:t>
             </a:r>
           </a:p>
@@ -4830,7 +5686,7 @@
               </a:spcBef>
             </a:pPr>
             <a:r>
-              <a:rPr lang="en" smtClean="0"/>
+              <a:rPr lang="en" dirty="0" smtClean="0"/>
               <a:t>Goals &amp; objectives</a:t>
             </a:r>
           </a:p>
@@ -4846,7 +5702,7 @@
               <a:buFont typeface="Arial"/>
               <a:buNone/>
             </a:pPr>
-            <a:endParaRPr lang="en" smtClean="0"/>
+            <a:endParaRPr lang="en" dirty="0" smtClean="0"/>
           </a:p>
         </p:txBody>
       </p:sp>
@@ -4893,7 +5749,11 @@
         </p:nvPicPr>
         <p:blipFill>
           <a:blip r:embed="rId3">
-            <a:alphaModFix/>
+            <a:extLst>
+              <a:ext uri="{28A0092B-C50C-407E-A947-70E740481C1C}">
+                <a14:useLocalDpi xmlns:a14="http://schemas.microsoft.com/office/drawing/2010/main" val="0"/>
+              </a:ext>
+            </a:extLst>
           </a:blip>
           <a:stretch>
             <a:fillRect/>
@@ -4901,8 +5761,8 @@
         </p:blipFill>
         <p:spPr>
           <a:xfrm>
-            <a:off x="-1656250" y="1402401"/>
-            <a:ext cx="5123400" cy="5123100"/>
+            <a:off x="-1656250" y="1366769"/>
+            <a:ext cx="5123400" cy="4818202"/>
           </a:xfrm>
           <a:prstGeom prst="ellipse">
             <a:avLst/>
@@ -4951,14 +5811,22 @@
               <a:buNone/>
             </a:pPr>
             <a:r>
-              <a:rPr lang="en" sz="3000" smtClean="0">
+              <a:rPr lang="de-CH" sz="2800" dirty="0" smtClean="0">
                 <a:solidFill>
                   <a:srgbClr val="39C0BA"/>
                 </a:solidFill>
               </a:rPr>
-              <a:t>Problem</a:t>
-            </a:r>
-            <a:endParaRPr lang="en" sz="3000">
+              <a:t>Goals &amp; </a:t>
+            </a:r>
+            <a:r>
+              <a:rPr lang="de-CH" sz="2800" dirty="0" err="1" smtClean="0">
+                <a:solidFill>
+                  <a:srgbClr val="39C0BA"/>
+                </a:solidFill>
+              </a:rPr>
+              <a:t>Objectives</a:t>
+            </a:r>
+            <a:endParaRPr lang="en" sz="2800" dirty="0">
               <a:solidFill>
                 <a:srgbClr val="39C0BA"/>
               </a:solidFill>
@@ -5003,7 +5871,7 @@
               <a:buNone/>
             </a:pPr>
             <a:r>
-              <a:rPr lang="en" smtClean="0"/>
+              <a:rPr lang="en" dirty="0" smtClean="0"/>
               <a:t>Add some images to explain the problem and approach</a:t>
             </a:r>
           </a:p>
@@ -5014,7 +5882,7 @@
               </a:spcBef>
               <a:buNone/>
             </a:pPr>
-            <a:endParaRPr lang="en"/>
+            <a:endParaRPr lang="en" dirty="0"/>
           </a:p>
         </p:txBody>
       </p:sp>
@@ -5037,6 +5905,191 @@
 </file>
 
 <file path=ppt/slides/slide5.xml><?xml version="1.0" encoding="utf-8"?>
+<p:sld xmlns:a="http://schemas.openxmlformats.org/drawingml/2006/main" xmlns:r="http://schemas.openxmlformats.org/officeDocument/2006/relationships" xmlns:p="http://schemas.openxmlformats.org/presentationml/2006/main">
+  <p:cSld>
+    <p:spTree>
+      <p:nvGrpSpPr>
+        <p:cNvPr id="1" name="Shape 112"/>
+        <p:cNvGrpSpPr/>
+        <p:nvPr/>
+      </p:nvGrpSpPr>
+      <p:grpSpPr>
+        <a:xfrm>
+          <a:off x="0" y="0"/>
+          <a:ext cx="0" cy="0"/>
+          <a:chOff x="0" y="0"/>
+          <a:chExt cx="0" cy="0"/>
+        </a:xfrm>
+      </p:grpSpPr>
+      <p:sp>
+        <p:nvSpPr>
+          <p:cNvPr id="113" name="Shape 113"/>
+          <p:cNvSpPr txBox="1">
+            <a:spLocks noGrp="1"/>
+          </p:cNvSpPr>
+          <p:nvPr>
+            <p:ph type="body" idx="1"/>
+          </p:nvPr>
+        </p:nvSpPr>
+        <p:spPr>
+          <a:xfrm>
+            <a:off x="1165474" y="1600201"/>
+            <a:ext cx="3306900" cy="4967700"/>
+          </a:xfrm>
+          <a:prstGeom prst="rect">
+            <a:avLst/>
+          </a:prstGeom>
+        </p:spPr>
+        <p:txBody>
+          <a:bodyPr lIns="91425" tIns="91425" rIns="91425" bIns="91425" anchor="t" anchorCtr="0">
+            <a:noAutofit/>
+          </a:bodyPr>
+          <a:lstStyle/>
+          <a:p>
+            <a:pPr lvl="0" rtl="0">
+              <a:spcBef>
+                <a:spcPts val="0"/>
+              </a:spcBef>
+              <a:buNone/>
+            </a:pPr>
+            <a:r>
+              <a:rPr lang="de-CH" b="1" dirty="0" smtClean="0"/>
+              <a:t>Simon</a:t>
+            </a:r>
+          </a:p>
+          <a:p>
+            <a:pPr lvl="0">
+              <a:spcBef>
+                <a:spcPts val="0"/>
+              </a:spcBef>
+              <a:buNone/>
+            </a:pPr>
+            <a:r>
+              <a:rPr lang="de-CH" dirty="0" smtClean="0"/>
+              <a:t>- Simons </a:t>
+            </a:r>
+            <a:r>
+              <a:rPr lang="de-CH" dirty="0" err="1" smtClean="0"/>
+              <a:t>tasks</a:t>
+            </a:r>
+            <a:endParaRPr lang="en" dirty="0"/>
+          </a:p>
+        </p:txBody>
+      </p:sp>
+      <p:sp>
+        <p:nvSpPr>
+          <p:cNvPr id="114" name="Shape 114"/>
+          <p:cNvSpPr txBox="1">
+            <a:spLocks noGrp="1"/>
+          </p:cNvSpPr>
+          <p:nvPr>
+            <p:ph type="title"/>
+          </p:nvPr>
+        </p:nvSpPr>
+        <p:spPr>
+          <a:xfrm>
+            <a:off x="1165475" y="665975"/>
+            <a:ext cx="6858000" cy="459900"/>
+          </a:xfrm>
+          <a:prstGeom prst="rect">
+            <a:avLst/>
+          </a:prstGeom>
+        </p:spPr>
+        <p:txBody>
+          <a:bodyPr lIns="91425" tIns="91425" rIns="91425" bIns="91425" anchor="b" anchorCtr="0">
+            <a:noAutofit/>
+          </a:bodyPr>
+          <a:lstStyle/>
+          <a:p>
+            <a:pPr lvl="0">
+              <a:spcBef>
+                <a:spcPts val="0"/>
+              </a:spcBef>
+              <a:buNone/>
+            </a:pPr>
+            <a:r>
+              <a:rPr lang="de-CH" sz="2800" dirty="0" smtClean="0"/>
+              <a:t>Organisation</a:t>
+            </a:r>
+            <a:endParaRPr lang="en" sz="2800" dirty="0"/>
+          </a:p>
+        </p:txBody>
+      </p:sp>
+      <p:sp>
+        <p:nvSpPr>
+          <p:cNvPr id="115" name="Shape 115"/>
+          <p:cNvSpPr txBox="1">
+            <a:spLocks noGrp="1"/>
+          </p:cNvSpPr>
+          <p:nvPr>
+            <p:ph type="body" idx="2"/>
+          </p:nvPr>
+        </p:nvSpPr>
+        <p:spPr>
+          <a:xfrm>
+            <a:off x="4671569" y="1600201"/>
+            <a:ext cx="3306900" cy="4967700"/>
+          </a:xfrm>
+          <a:prstGeom prst="rect">
+            <a:avLst/>
+          </a:prstGeom>
+        </p:spPr>
+        <p:txBody>
+          <a:bodyPr lIns="91425" tIns="91425" rIns="91425" bIns="91425" anchor="t" anchorCtr="0">
+            <a:noAutofit/>
+          </a:bodyPr>
+          <a:lstStyle/>
+          <a:p>
+            <a:pPr lvl="0" rtl="0">
+              <a:spcBef>
+                <a:spcPts val="0"/>
+              </a:spcBef>
+              <a:buNone/>
+            </a:pPr>
+            <a:r>
+              <a:rPr lang="de-CH" b="1" dirty="0" smtClean="0"/>
+              <a:t>Laurent</a:t>
+            </a:r>
+            <a:endParaRPr lang="en" b="1" dirty="0"/>
+          </a:p>
+          <a:p>
+            <a:pPr lvl="0">
+              <a:spcBef>
+                <a:spcPts val="0"/>
+              </a:spcBef>
+              <a:buNone/>
+            </a:pPr>
+            <a:r>
+              <a:rPr lang="de-CH" dirty="0" smtClean="0"/>
+              <a:t>- Laurents </a:t>
+            </a:r>
+            <a:r>
+              <a:rPr lang="de-CH" dirty="0" err="1" smtClean="0"/>
+              <a:t>tasks</a:t>
+            </a:r>
+            <a:endParaRPr lang="en" dirty="0"/>
+          </a:p>
+        </p:txBody>
+      </p:sp>
+    </p:spTree>
+  </p:cSld>
+  <p:clrMapOvr>
+    <a:masterClrMapping/>
+  </p:clrMapOvr>
+  <p:transition xmlns:p14="http://schemas.microsoft.com/office/powerpoint/2010/main" spd="slow">
+    <p:cut/>
+  </p:transition>
+  <p:timing>
+    <p:tnLst>
+      <p:par>
+        <p:cTn xmlns:p14="http://schemas.microsoft.com/office/powerpoint/2010/main" id="1" dur="indefinite" restart="never" nodeType="tmRoot"/>
+      </p:par>
+    </p:tnLst>
+  </p:timing>
+</p:sld>
+</file>
+
+<file path=ppt/slides/slide6.xml><?xml version="1.0" encoding="utf-8"?>
 <p:sld xmlns:a="http://schemas.openxmlformats.org/drawingml/2006/main" xmlns:r="http://schemas.openxmlformats.org/officeDocument/2006/relationships" xmlns:p="http://schemas.openxmlformats.org/presentationml/2006/main">
   <p:cSld>
     <p:spTree>
@@ -5331,12 +6384,12 @@
 </p:sld>
 </file>
 
-<file path=ppt/slides/slide6.xml><?xml version="1.0" encoding="utf-8"?>
+<file path=ppt/slides/slide7.xml><?xml version="1.0" encoding="utf-8"?>
 <p:sld xmlns:a="http://schemas.openxmlformats.org/drawingml/2006/main" xmlns:r="http://schemas.openxmlformats.org/officeDocument/2006/relationships" xmlns:p="http://schemas.openxmlformats.org/presentationml/2006/main">
   <p:cSld>
     <p:spTree>
       <p:nvGrpSpPr>
-        <p:cNvPr id="1" name="Shape 94"/>
+        <p:cNvPr id="1" name=""/>
         <p:cNvGrpSpPr/>
         <p:nvPr/>
       </p:nvGrpSpPr>
@@ -5350,165 +6403,176 @@
       </p:grpSpPr>
       <p:sp>
         <p:nvSpPr>
-          <p:cNvPr id="95" name="Shape 95"/>
-          <p:cNvSpPr txBox="1">
+          <p:cNvPr id="2" name="Title 1"/>
+          <p:cNvSpPr>
             <a:spLocks noGrp="1"/>
           </p:cNvSpPr>
           <p:nvPr>
             <p:ph type="title"/>
           </p:nvPr>
         </p:nvSpPr>
-        <p:spPr>
-          <a:xfrm>
-            <a:off x="1165475" y="665975"/>
-            <a:ext cx="6858000" cy="459900"/>
-          </a:xfrm>
-          <a:prstGeom prst="rect">
-            <a:avLst/>
-          </a:prstGeom>
-        </p:spPr>
+        <p:spPr/>
         <p:txBody>
-          <a:bodyPr lIns="91425" tIns="91425" rIns="91425" bIns="91425" anchor="b" anchorCtr="0">
-            <a:noAutofit/>
-          </a:bodyPr>
+          <a:bodyPr/>
           <a:lstStyle/>
           <a:p>
-            <a:pPr lvl="0">
-              <a:spcBef>
-                <a:spcPts val="0"/>
-              </a:spcBef>
-              <a:buNone/>
-            </a:pPr>
-            <a:r>
-              <a:rPr lang="en" sz="3000" smtClean="0">
-                <a:solidFill>
-                  <a:srgbClr val="39C0BA"/>
-                </a:solidFill>
-              </a:rPr>
+            <a:r>
+              <a:rPr lang="en" sz="2800" dirty="0"/>
               <a:t>Methodology</a:t>
             </a:r>
-            <a:endParaRPr lang="en" sz="3000">
-              <a:solidFill>
-                <a:srgbClr val="39C0BA"/>
-              </a:solidFill>
-            </a:endParaRPr>
+            <a:r>
+              <a:rPr lang="de-CH" sz="2800" dirty="0"/>
+              <a:t> </a:t>
+            </a:r>
+            <a:r>
+              <a:rPr lang="de-CH" sz="2800" dirty="0" smtClean="0"/>
+              <a:t>&amp;Tools</a:t>
+            </a:r>
+            <a:endParaRPr lang="en" sz="2800" dirty="0"/>
           </a:p>
         </p:txBody>
       </p:sp>
       <p:sp>
         <p:nvSpPr>
-          <p:cNvPr id="96" name="Shape 96"/>
-          <p:cNvSpPr txBox="1">
+          <p:cNvPr id="3" name="Text Placeholder 2"/>
+          <p:cNvSpPr>
             <a:spLocks noGrp="1"/>
           </p:cNvSpPr>
           <p:nvPr>
             <p:ph type="body" idx="1"/>
           </p:nvPr>
         </p:nvSpPr>
-        <p:spPr>
-          <a:xfrm>
-            <a:off x="1165497" y="1600201"/>
-            <a:ext cx="6858000" cy="4967700"/>
-          </a:xfrm>
-          <a:prstGeom prst="rect">
-            <a:avLst/>
-          </a:prstGeom>
-        </p:spPr>
+        <p:spPr/>
         <p:txBody>
-          <a:bodyPr lIns="91425" tIns="91425" rIns="91425" bIns="91425" anchor="t" anchorCtr="0">
-            <a:noAutofit/>
-          </a:bodyPr>
+          <a:bodyPr/>
           <a:lstStyle/>
           <a:p>
-            <a:pPr lvl="0" rtl="0">
-              <a:spcBef>
-                <a:spcPts val="0"/>
-              </a:spcBef>
+            <a:pPr>
               <a:buNone/>
             </a:pPr>
             <a:r>
-              <a:rPr lang="en" smtClean="0"/>
-              <a:t>Describe our approach:</a:t>
-            </a:r>
-          </a:p>
-          <a:p>
-            <a:pPr marL="457200" lvl="0" indent="-228600" rtl="0">
-              <a:spcBef>
-                <a:spcPts val="0"/>
-              </a:spcBef>
-            </a:pPr>
-            <a:r>
-              <a:rPr lang="en" smtClean="0"/>
-              <a:t>Techniques</a:t>
-            </a:r>
-          </a:p>
-          <a:p>
-            <a:pPr marL="457200" indent="-228600">
-              <a:spcBef>
-                <a:spcPts val="0"/>
-              </a:spcBef>
-            </a:pPr>
-            <a:r>
-              <a:rPr lang="en" smtClean="0"/>
-              <a:t>Tools</a:t>
-            </a:r>
-          </a:p>
-          <a:p>
-            <a:pPr marL="457200" lvl="0" indent="-228600" rtl="0">
-              <a:spcBef>
-                <a:spcPts val="0"/>
-              </a:spcBef>
-            </a:pPr>
-            <a:r>
-              <a:rPr lang="en" smtClean="0"/>
-              <a:t>...</a:t>
-            </a:r>
-          </a:p>
-          <a:p>
-            <a:pPr lvl="0" rtl="0">
-              <a:spcBef>
-                <a:spcPts val="0"/>
-              </a:spcBef>
-              <a:buClr>
-                <a:schemeClr val="dk1"/>
-              </a:buClr>
-              <a:buSzPct val="36666"/>
-              <a:buFont typeface="Arial"/>
+              <a:rPr lang="de-CH" dirty="0" err="1" smtClean="0"/>
+              <a:t>Methodology</a:t>
+            </a:r>
+            <a:r>
+              <a:rPr lang="de-CH" dirty="0" smtClean="0"/>
+              <a:t>:</a:t>
+            </a:r>
+          </a:p>
+          <a:p>
+            <a:pPr marL="457200" indent="-457200"/>
+            <a:r>
+              <a:rPr lang="de-CH" dirty="0" smtClean="0"/>
+              <a:t>Iterative &amp; </a:t>
+            </a:r>
+            <a:r>
+              <a:rPr lang="de-CH" dirty="0" err="1" smtClean="0"/>
+              <a:t>Incremental</a:t>
+            </a:r>
+            <a:r>
+              <a:rPr lang="de-CH" dirty="0" smtClean="0"/>
+              <a:t> </a:t>
+            </a:r>
+            <a:r>
+              <a:rPr lang="de-CH" dirty="0" err="1" smtClean="0"/>
+              <a:t>Devolopement</a:t>
+            </a:r>
+            <a:endParaRPr lang="de-CH" dirty="0" smtClean="0"/>
+          </a:p>
+          <a:p>
+            <a:pPr marL="457200" indent="-457200"/>
+            <a:r>
+              <a:rPr lang="de-CH" dirty="0" err="1" smtClean="0"/>
+              <a:t>Scrum</a:t>
+            </a:r>
+            <a:endParaRPr lang="de-CH" dirty="0" smtClean="0"/>
+          </a:p>
+          <a:p>
+            <a:pPr marL="457200" indent="-457200"/>
+            <a:r>
+              <a:rPr lang="de-CH" dirty="0" err="1" smtClean="0"/>
+              <a:t>Testing</a:t>
+            </a:r>
+            <a:endParaRPr lang="de-CH" dirty="0" smtClean="0"/>
+          </a:p>
+          <a:p>
+            <a:pPr marL="457200" indent="-457200"/>
+            <a:r>
+              <a:rPr lang="de-CH" dirty="0" smtClean="0"/>
+              <a:t>Code Reviews</a:t>
+            </a:r>
+            <a:endParaRPr lang="en" dirty="0"/>
+          </a:p>
+        </p:txBody>
+      </p:sp>
+      <p:sp>
+        <p:nvSpPr>
+          <p:cNvPr id="4" name="Text Placeholder 3"/>
+          <p:cNvSpPr>
+            <a:spLocks noGrp="1"/>
+          </p:cNvSpPr>
+          <p:nvPr>
+            <p:ph type="body" idx="2"/>
+          </p:nvPr>
+        </p:nvSpPr>
+        <p:spPr/>
+        <p:txBody>
+          <a:bodyPr/>
+          <a:lstStyle/>
+          <a:p>
+            <a:pPr>
               <a:buNone/>
             </a:pPr>
-            <a:endParaRPr lang="en" smtClean="0"/>
+            <a:r>
+              <a:rPr lang="de-CH" dirty="0" smtClean="0"/>
+              <a:t>Tools:</a:t>
+            </a:r>
+          </a:p>
+          <a:p>
+            <a:pPr marL="457200" indent="-457200"/>
+            <a:r>
+              <a:rPr lang="de-CH" dirty="0" err="1" smtClean="0"/>
+              <a:t>Matlab</a:t>
+            </a:r>
+            <a:endParaRPr lang="de-CH" dirty="0" smtClean="0"/>
+          </a:p>
+          <a:p>
+            <a:pPr marL="457200" indent="-457200"/>
+            <a:r>
+              <a:rPr lang="de-CH" dirty="0" err="1" smtClean="0"/>
+              <a:t>Git</a:t>
+            </a:r>
+            <a:endParaRPr lang="de-CH" dirty="0" smtClean="0"/>
+          </a:p>
+          <a:p>
+            <a:pPr marL="457200" indent="-457200"/>
+            <a:r>
+              <a:rPr lang="de-CH" dirty="0" smtClean="0"/>
+              <a:t>Taiga</a:t>
+            </a:r>
+            <a:endParaRPr lang="en" dirty="0"/>
           </a:p>
         </p:txBody>
       </p:sp>
     </p:spTree>
     <p:extLst>
       <p:ext uri="{BB962C8B-B14F-4D97-AF65-F5344CB8AC3E}">
-        <p14:creationId xmlns:p14="http://schemas.microsoft.com/office/powerpoint/2010/main" val="908054575"/>
+        <p14:creationId xmlns:p14="http://schemas.microsoft.com/office/powerpoint/2010/main" val="999126706"/>
       </p:ext>
     </p:extLst>
   </p:cSld>
   <p:clrMapOvr>
     <a:masterClrMapping/>
   </p:clrMapOvr>
-  <p:transition xmlns:p14="http://schemas.microsoft.com/office/powerpoint/2010/main" spd="slow">
-    <p:cut/>
-  </p:transition>
-  <p:timing>
-    <p:tnLst>
-      <p:par>
-        <p:cTn xmlns:p14="http://schemas.microsoft.com/office/powerpoint/2010/main" id="1" dur="indefinite" restart="never" nodeType="tmRoot"/>
-      </p:par>
-    </p:tnLst>
-  </p:timing>
 </p:sld>
 </file>
 
-<file path=ppt/slides/slide7.xml><?xml version="1.0" encoding="utf-8"?>
+<file path=ppt/slides/slide8.xml><?xml version="1.0" encoding="utf-8"?>
 <p:sld xmlns:a="http://schemas.openxmlformats.org/drawingml/2006/main" xmlns:r="http://schemas.openxmlformats.org/officeDocument/2006/relationships" xmlns:p="http://schemas.openxmlformats.org/presentationml/2006/main">
   <p:cSld>
     <p:spTree>
       <p:nvGrpSpPr>
-        <p:cNvPr id="1" name="Shape 201"/>
+        <p:cNvPr id="1" name=""/>
         <p:cNvGrpSpPr/>
         <p:nvPr/>
       </p:nvGrpSpPr>
@@ -5522,390 +6586,80 @@
       </p:grpSpPr>
       <p:sp>
         <p:nvSpPr>
-          <p:cNvPr id="202" name="Shape 202"/>
-          <p:cNvSpPr txBox="1">
+          <p:cNvPr id="2" name="Title 1"/>
+          <p:cNvSpPr>
             <a:spLocks noGrp="1"/>
           </p:cNvSpPr>
           <p:nvPr>
             <p:ph type="title"/>
           </p:nvPr>
         </p:nvSpPr>
-        <p:spPr>
-          <a:xfrm>
-            <a:off x="1165475" y="665975"/>
-            <a:ext cx="6858000" cy="459900"/>
-          </a:xfrm>
-          <a:prstGeom prst="rect">
-            <a:avLst/>
-          </a:prstGeom>
-        </p:spPr>
+        <p:spPr/>
         <p:txBody>
-          <a:bodyPr lIns="91425" tIns="91425" rIns="91425" bIns="91425" anchor="b" anchorCtr="0">
-            <a:noAutofit/>
-          </a:bodyPr>
+          <a:bodyPr/>
           <a:lstStyle/>
           <a:p>
-            <a:pPr lvl="0" rtl="0">
-              <a:spcBef>
-                <a:spcPts val="0"/>
-              </a:spcBef>
-              <a:buNone/>
-            </a:pPr>
-            <a:r>
-              <a:rPr lang="de-CH" sz="3000" dirty="0" smtClean="0"/>
-              <a:t>Task </a:t>
-            </a:r>
-            <a:r>
-              <a:rPr lang="de-CH" sz="3000" dirty="0"/>
-              <a:t>O</a:t>
-            </a:r>
-            <a:r>
-              <a:rPr lang="de-CH" sz="3000" dirty="0" smtClean="0"/>
-              <a:t>utline</a:t>
-            </a:r>
-            <a:endParaRPr lang="en" sz="3000" dirty="0"/>
+            <a:r>
+              <a:rPr lang="de-CH" sz="2800" dirty="0" err="1" smtClean="0"/>
+              <a:t>Methodology</a:t>
+            </a:r>
+            <a:r>
+              <a:rPr lang="de-CH" sz="2800" dirty="0" smtClean="0"/>
+              <a:t> &amp;Tools</a:t>
+            </a:r>
+            <a:endParaRPr lang="en" sz="2800" dirty="0"/>
           </a:p>
         </p:txBody>
       </p:sp>
-      <p:cxnSp>
-        <p:nvCxnSpPr>
-          <p:cNvPr id="204" name="Shape 204"/>
-          <p:cNvCxnSpPr/>
+      <p:pic>
+        <p:nvPicPr>
+          <p:cNvPr id="3" name="Picture 2" descr="Taiga.png"/>
+          <p:cNvPicPr>
+            <a:picLocks noChangeAspect="1"/>
+          </p:cNvPicPr>
           <p:nvPr/>
-        </p:nvCxnSpPr>
-        <p:spPr>
-          <a:xfrm flipV="1">
-            <a:off x="1482252" y="1607183"/>
-            <a:ext cx="1" cy="693893"/>
-          </a:xfrm>
-          <a:prstGeom prst="straightConnector1">
+        </p:nvPicPr>
+        <p:blipFill>
+          <a:blip r:embed="rId2">
+            <a:extLst>
+              <a:ext uri="{28A0092B-C50C-407E-A947-70E740481C1C}">
+                <a14:useLocalDpi xmlns:a14="http://schemas.microsoft.com/office/drawing/2010/main" val="0"/>
+              </a:ext>
+            </a:extLst>
+          </a:blip>
+          <a:stretch>
+            <a:fillRect/>
+          </a:stretch>
+        </p:blipFill>
+        <p:spPr>
+          <a:xfrm>
+            <a:off x="924926" y="1535580"/>
+            <a:ext cx="7979214" cy="4600516"/>
+          </a:xfrm>
+          <a:prstGeom prst="rect">
             <a:avLst/>
           </a:prstGeom>
-          <a:noFill/>
-          <a:ln w="9525" cap="flat" cmpd="sng">
-            <a:solidFill>
-              <a:srgbClr val="999FA9"/>
-            </a:solidFill>
-            <a:prstDash val="solid"/>
-            <a:round/>
-            <a:headEnd type="none" w="lg" len="lg"/>
-            <a:tailEnd type="oval" w="lg" len="lg"/>
-          </a:ln>
-        </p:spPr>
-      </p:cxnSp>
-      <p:sp>
-        <p:nvSpPr>
-          <p:cNvPr id="207" name="Shape 207"/>
-          <p:cNvSpPr txBox="1"/>
-          <p:nvPr/>
-        </p:nvSpPr>
-        <p:spPr>
-          <a:xfrm>
-            <a:off x="2215652" y="1729575"/>
-            <a:ext cx="2310299" cy="381000"/>
-          </a:xfrm>
-          <a:prstGeom prst="rect">
-            <a:avLst/>
-          </a:prstGeom>
-          <a:noFill/>
-          <a:ln>
-            <a:noFill/>
-          </a:ln>
-        </p:spPr>
-        <p:txBody>
-          <a:bodyPr lIns="91425" tIns="91425" rIns="91425" bIns="91425" anchor="t" anchorCtr="0">
-            <a:noAutofit/>
-          </a:bodyPr>
-          <a:lstStyle/>
-          <a:p>
-            <a:pPr lvl="0" rtl="0">
-              <a:spcBef>
-                <a:spcPts val="0"/>
-              </a:spcBef>
-              <a:buNone/>
-            </a:pPr>
-            <a:r>
-              <a:rPr lang="en" sz="1800" dirty="0">
-                <a:solidFill>
-                  <a:srgbClr val="F3F3F3"/>
-                </a:solidFill>
-                <a:latin typeface="Quicksand"/>
-                <a:ea typeface="Quicksand"/>
-                <a:cs typeface="Quicksand"/>
-                <a:sym typeface="Quicksand"/>
-              </a:rPr>
-              <a:t>First</a:t>
-            </a:r>
-          </a:p>
-        </p:txBody>
-      </p:sp>
-      <p:cxnSp>
-        <p:nvCxnSpPr>
-          <p:cNvPr id="13" name="Shape 204"/>
-          <p:cNvCxnSpPr/>
-          <p:nvPr/>
-        </p:nvCxnSpPr>
-        <p:spPr>
-          <a:xfrm flipV="1">
-            <a:off x="1482253" y="2863072"/>
-            <a:ext cx="1" cy="693893"/>
-          </a:xfrm>
-          <a:prstGeom prst="straightConnector1">
-            <a:avLst/>
-          </a:prstGeom>
-          <a:noFill/>
-          <a:ln w="9525" cap="flat" cmpd="sng">
-            <a:solidFill>
-              <a:srgbClr val="999FA9"/>
-            </a:solidFill>
-            <a:prstDash val="solid"/>
-            <a:round/>
-            <a:headEnd type="none" w="lg" len="lg"/>
-            <a:tailEnd type="oval" w="lg" len="lg"/>
-          </a:ln>
-        </p:spPr>
-      </p:cxnSp>
-      <p:sp>
-        <p:nvSpPr>
-          <p:cNvPr id="14" name="Shape 207"/>
-          <p:cNvSpPr txBox="1"/>
-          <p:nvPr/>
-        </p:nvSpPr>
-        <p:spPr>
-          <a:xfrm>
-            <a:off x="2215653" y="2985464"/>
-            <a:ext cx="2310299" cy="381000"/>
-          </a:xfrm>
-          <a:prstGeom prst="rect">
-            <a:avLst/>
-          </a:prstGeom>
-          <a:noFill/>
-          <a:ln>
-            <a:noFill/>
-          </a:ln>
-        </p:spPr>
-        <p:txBody>
-          <a:bodyPr lIns="91425" tIns="91425" rIns="91425" bIns="91425" anchor="t" anchorCtr="0">
-            <a:noAutofit/>
-          </a:bodyPr>
-          <a:lstStyle/>
-          <a:p>
-            <a:pPr lvl="0" rtl="0">
-              <a:spcBef>
-                <a:spcPts val="0"/>
-              </a:spcBef>
-              <a:buNone/>
-            </a:pPr>
-            <a:r>
-              <a:rPr lang="de-CH" sz="1800" dirty="0" smtClean="0">
-                <a:solidFill>
-                  <a:srgbClr val="F3F3F3"/>
-                </a:solidFill>
-                <a:latin typeface="Quicksand"/>
-                <a:ea typeface="Quicksand"/>
-                <a:cs typeface="Quicksand"/>
-                <a:sym typeface="Quicksand"/>
-              </a:rPr>
-              <a:t>Second</a:t>
-            </a:r>
-            <a:endParaRPr lang="en" sz="1800" dirty="0">
-              <a:solidFill>
-                <a:srgbClr val="F3F3F3"/>
-              </a:solidFill>
-              <a:latin typeface="Quicksand"/>
-              <a:ea typeface="Quicksand"/>
-              <a:cs typeface="Quicksand"/>
-              <a:sym typeface="Quicksand"/>
-            </a:endParaRPr>
-          </a:p>
-        </p:txBody>
-      </p:sp>
-      <p:cxnSp>
-        <p:nvCxnSpPr>
-          <p:cNvPr id="15" name="Shape 204"/>
-          <p:cNvCxnSpPr/>
-          <p:nvPr/>
-        </p:nvCxnSpPr>
-        <p:spPr>
-          <a:xfrm flipV="1">
-            <a:off x="1482254" y="4118960"/>
-            <a:ext cx="1" cy="693893"/>
-          </a:xfrm>
-          <a:prstGeom prst="straightConnector1">
-            <a:avLst/>
-          </a:prstGeom>
-          <a:noFill/>
-          <a:ln w="9525" cap="flat" cmpd="sng">
-            <a:solidFill>
-              <a:srgbClr val="999FA9"/>
-            </a:solidFill>
-            <a:prstDash val="solid"/>
-            <a:round/>
-            <a:headEnd type="none" w="lg" len="lg"/>
-            <a:tailEnd type="oval" w="lg" len="lg"/>
-          </a:ln>
-        </p:spPr>
-      </p:cxnSp>
-      <p:sp>
-        <p:nvSpPr>
-          <p:cNvPr id="16" name="Shape 207"/>
-          <p:cNvSpPr txBox="1"/>
-          <p:nvPr/>
-        </p:nvSpPr>
-        <p:spPr>
-          <a:xfrm>
-            <a:off x="2215654" y="4241353"/>
-            <a:ext cx="2310299" cy="381000"/>
-          </a:xfrm>
-          <a:prstGeom prst="rect">
-            <a:avLst/>
-          </a:prstGeom>
-          <a:noFill/>
-          <a:ln>
-            <a:noFill/>
-          </a:ln>
-        </p:spPr>
-        <p:txBody>
-          <a:bodyPr lIns="91425" tIns="91425" rIns="91425" bIns="91425" anchor="t" anchorCtr="0">
-            <a:noAutofit/>
-          </a:bodyPr>
-          <a:lstStyle/>
-          <a:p>
-            <a:pPr lvl="0" rtl="0">
-              <a:spcBef>
-                <a:spcPts val="0"/>
-              </a:spcBef>
-              <a:buNone/>
-            </a:pPr>
-            <a:r>
-              <a:rPr lang="de-CH" sz="1800" dirty="0" smtClean="0">
-                <a:solidFill>
-                  <a:srgbClr val="F3F3F3"/>
-                </a:solidFill>
-                <a:latin typeface="Quicksand"/>
-                <a:ea typeface="Quicksand"/>
-                <a:cs typeface="Quicksand"/>
-                <a:sym typeface="Quicksand"/>
-              </a:rPr>
-              <a:t>Third</a:t>
-            </a:r>
-            <a:endParaRPr lang="en" sz="1800" dirty="0">
-              <a:solidFill>
-                <a:srgbClr val="F3F3F3"/>
-              </a:solidFill>
-              <a:latin typeface="Quicksand"/>
-              <a:ea typeface="Quicksand"/>
-              <a:cs typeface="Quicksand"/>
-              <a:sym typeface="Quicksand"/>
-            </a:endParaRPr>
-          </a:p>
-        </p:txBody>
-      </p:sp>
-      <p:cxnSp>
-        <p:nvCxnSpPr>
-          <p:cNvPr id="17" name="Shape 204"/>
-          <p:cNvCxnSpPr/>
-          <p:nvPr/>
-        </p:nvCxnSpPr>
-        <p:spPr>
-          <a:xfrm flipV="1">
-            <a:off x="1482251" y="5318406"/>
-            <a:ext cx="1" cy="693893"/>
-          </a:xfrm>
-          <a:prstGeom prst="straightConnector1">
-            <a:avLst/>
-          </a:prstGeom>
-          <a:noFill/>
-          <a:ln w="9525" cap="flat" cmpd="sng">
-            <a:solidFill>
-              <a:srgbClr val="999FA9"/>
-            </a:solidFill>
-            <a:prstDash val="solid"/>
-            <a:round/>
-            <a:headEnd type="none" w="lg" len="lg"/>
-            <a:tailEnd type="oval" w="lg" len="lg"/>
-          </a:ln>
-        </p:spPr>
-      </p:cxnSp>
-      <p:sp>
-        <p:nvSpPr>
-          <p:cNvPr id="18" name="Shape 207"/>
-          <p:cNvSpPr txBox="1"/>
-          <p:nvPr/>
-        </p:nvSpPr>
-        <p:spPr>
-          <a:xfrm>
-            <a:off x="2215651" y="5440799"/>
-            <a:ext cx="2310299" cy="381000"/>
-          </a:xfrm>
-          <a:prstGeom prst="rect">
-            <a:avLst/>
-          </a:prstGeom>
-          <a:noFill/>
-          <a:ln>
-            <a:noFill/>
-          </a:ln>
-        </p:spPr>
-        <p:txBody>
-          <a:bodyPr lIns="91425" tIns="91425" rIns="91425" bIns="91425" anchor="t" anchorCtr="0">
-            <a:noAutofit/>
-          </a:bodyPr>
-          <a:lstStyle/>
-          <a:p>
-            <a:pPr lvl="0" rtl="0">
-              <a:spcBef>
-                <a:spcPts val="0"/>
-              </a:spcBef>
-              <a:buNone/>
-            </a:pPr>
-            <a:r>
-              <a:rPr lang="de-CH" sz="1800" dirty="0" err="1" smtClean="0">
-                <a:solidFill>
-                  <a:srgbClr val="F3F3F3"/>
-                </a:solidFill>
-                <a:latin typeface="Quicksand"/>
-                <a:ea typeface="Quicksand"/>
-                <a:cs typeface="Quicksand"/>
-                <a:sym typeface="Quicksand"/>
-              </a:rPr>
-              <a:t>Fourth</a:t>
-            </a:r>
-            <a:endParaRPr lang="en" sz="1800" dirty="0">
-              <a:solidFill>
-                <a:srgbClr val="F3F3F3"/>
-              </a:solidFill>
-              <a:latin typeface="Quicksand"/>
-              <a:ea typeface="Quicksand"/>
-              <a:cs typeface="Quicksand"/>
-              <a:sym typeface="Quicksand"/>
-            </a:endParaRPr>
-          </a:p>
-        </p:txBody>
-      </p:sp>
+        </p:spPr>
+      </p:pic>
     </p:spTree>
+    <p:extLst>
+      <p:ext uri="{BB962C8B-B14F-4D97-AF65-F5344CB8AC3E}">
+        <p14:creationId xmlns:p14="http://schemas.microsoft.com/office/powerpoint/2010/main" val="3674938669"/>
+      </p:ext>
+    </p:extLst>
   </p:cSld>
   <p:clrMapOvr>
     <a:masterClrMapping/>
   </p:clrMapOvr>
-  <p:transition xmlns:p14="http://schemas.microsoft.com/office/powerpoint/2010/main" spd="slow">
-    <p:cut/>
-  </p:transition>
-  <p:timing>
-    <p:tnLst>
-      <p:par>
-        <p:cTn xmlns:p14="http://schemas.microsoft.com/office/powerpoint/2010/main" id="1" dur="indefinite" restart="never" nodeType="tmRoot"/>
-      </p:par>
-    </p:tnLst>
-  </p:timing>
 </p:sld>
 </file>
 
-<file path=ppt/slides/slide8.xml><?xml version="1.0" encoding="utf-8"?>
+<file path=ppt/slides/slide9.xml><?xml version="1.0" encoding="utf-8"?>
 <p:sld xmlns:a="http://schemas.openxmlformats.org/drawingml/2006/main" xmlns:r="http://schemas.openxmlformats.org/officeDocument/2006/relationships" xmlns:p="http://schemas.openxmlformats.org/presentationml/2006/main">
   <p:cSld>
     <p:spTree>
       <p:nvGrpSpPr>
-        <p:cNvPr id="1" name="Shape 112"/>
+        <p:cNvPr id="1" name=""/>
         <p:cNvGrpSpPr/>
         <p:nvPr/>
       </p:nvGrpSpPr>
@@ -5919,376 +6673,237 @@
       </p:grpSpPr>
       <p:sp>
         <p:nvSpPr>
-          <p:cNvPr id="113" name="Shape 113"/>
-          <p:cNvSpPr txBox="1">
+          <p:cNvPr id="2" name="Title 1"/>
+          <p:cNvSpPr>
+            <a:spLocks noGrp="1"/>
+          </p:cNvSpPr>
+          <p:nvPr>
+            <p:ph type="title"/>
+          </p:nvPr>
+        </p:nvSpPr>
+        <p:spPr/>
+        <p:txBody>
+          <a:bodyPr/>
+          <a:lstStyle/>
+          <a:p>
+            <a:r>
+              <a:rPr lang="de-CH" sz="2800" dirty="0" smtClean="0"/>
+              <a:t>Schedule</a:t>
+            </a:r>
+            <a:endParaRPr lang="en" sz="2800" dirty="0"/>
+          </a:p>
+        </p:txBody>
+      </p:sp>
+      <p:sp>
+        <p:nvSpPr>
+          <p:cNvPr id="3" name="Text Placeholder 2"/>
+          <p:cNvSpPr>
             <a:spLocks noGrp="1"/>
           </p:cNvSpPr>
           <p:nvPr>
             <p:ph type="body" idx="1"/>
           </p:nvPr>
         </p:nvSpPr>
-        <p:spPr>
-          <a:xfrm>
-            <a:off x="1165474" y="1600201"/>
-            <a:ext cx="3306900" cy="4967700"/>
-          </a:xfrm>
-          <a:prstGeom prst="rect">
-            <a:avLst/>
-          </a:prstGeom>
-        </p:spPr>
+        <p:spPr/>
         <p:txBody>
-          <a:bodyPr lIns="91425" tIns="91425" rIns="91425" bIns="91425" anchor="t" anchorCtr="0">
-            <a:noAutofit/>
-          </a:bodyPr>
+          <a:bodyPr/>
           <a:lstStyle/>
           <a:p>
-            <a:pPr lvl="0" rtl="0">
-              <a:spcBef>
-                <a:spcPts val="0"/>
-              </a:spcBef>
-              <a:buNone/>
-            </a:pPr>
-            <a:r>
-              <a:rPr lang="de-CH" b="1" dirty="0" smtClean="0"/>
-              <a:t>Simon</a:t>
-            </a:r>
-          </a:p>
-          <a:p>
-            <a:pPr lvl="0">
-              <a:spcBef>
-                <a:spcPts val="0"/>
-              </a:spcBef>
-              <a:buNone/>
-            </a:pPr>
+            <a:r>
+              <a:rPr lang="de-CH" dirty="0"/>
+              <a:t> </a:t>
+            </a:r>
             <a:r>
               <a:rPr lang="de-CH" dirty="0" smtClean="0"/>
-              <a:t>- Simons </a:t>
+              <a:t>6 Sprints, 2 </a:t>
             </a:r>
             <a:r>
               <a:rPr lang="de-CH" dirty="0" err="1" smtClean="0"/>
-              <a:t>tasks</a:t>
-            </a:r>
-            <a:endParaRPr lang="en" dirty="0"/>
-          </a:p>
-        </p:txBody>
-      </p:sp>
-      <p:sp>
-        <p:nvSpPr>
-          <p:cNvPr id="114" name="Shape 114"/>
-          <p:cNvSpPr txBox="1">
-            <a:spLocks noGrp="1"/>
-          </p:cNvSpPr>
-          <p:nvPr>
-            <p:ph type="title"/>
-          </p:nvPr>
-        </p:nvSpPr>
-        <p:spPr>
-          <a:xfrm>
-            <a:off x="1165475" y="665975"/>
-            <a:ext cx="6858000" cy="459900"/>
-          </a:xfrm>
-          <a:prstGeom prst="rect">
-            <a:avLst/>
-          </a:prstGeom>
-        </p:spPr>
-        <p:txBody>
-          <a:bodyPr lIns="91425" tIns="91425" rIns="91425" bIns="91425" anchor="b" anchorCtr="0">
-            <a:noAutofit/>
-          </a:bodyPr>
-          <a:lstStyle/>
-          <a:p>
-            <a:pPr lvl="0">
-              <a:spcBef>
-                <a:spcPts val="0"/>
-              </a:spcBef>
-              <a:buNone/>
-            </a:pPr>
-            <a:r>
-              <a:rPr lang="de-CH" sz="3000" dirty="0" smtClean="0"/>
-              <a:t>Organisation</a:t>
-            </a:r>
-            <a:endParaRPr lang="en" sz="3000" dirty="0"/>
-          </a:p>
-        </p:txBody>
-      </p:sp>
-      <p:sp>
-        <p:nvSpPr>
-          <p:cNvPr id="115" name="Shape 115"/>
-          <p:cNvSpPr txBox="1">
-            <a:spLocks noGrp="1"/>
-          </p:cNvSpPr>
-          <p:nvPr>
-            <p:ph type="body" idx="2"/>
-          </p:nvPr>
-        </p:nvSpPr>
-        <p:spPr>
-          <a:xfrm>
-            <a:off x="4671569" y="1600201"/>
-            <a:ext cx="3306900" cy="4967700"/>
-          </a:xfrm>
-          <a:prstGeom prst="rect">
-            <a:avLst/>
-          </a:prstGeom>
-        </p:spPr>
-        <p:txBody>
-          <a:bodyPr lIns="91425" tIns="91425" rIns="91425" bIns="91425" anchor="t" anchorCtr="0">
-            <a:noAutofit/>
-          </a:bodyPr>
-          <a:lstStyle/>
-          <a:p>
-            <a:pPr lvl="0" rtl="0">
-              <a:spcBef>
-                <a:spcPts val="0"/>
-              </a:spcBef>
-              <a:buNone/>
-            </a:pPr>
-            <a:r>
-              <a:rPr lang="de-CH" b="1" dirty="0" smtClean="0"/>
-              <a:t>Laurent</a:t>
-            </a:r>
-            <a:endParaRPr lang="en" b="1" dirty="0"/>
-          </a:p>
-          <a:p>
-            <a:pPr lvl="0">
-              <a:spcBef>
-                <a:spcPts val="0"/>
-              </a:spcBef>
-              <a:buNone/>
-            </a:pPr>
+              <a:t>weeks</a:t>
+            </a:r>
             <a:r>
               <a:rPr lang="de-CH" dirty="0" smtClean="0"/>
-              <a:t>- Laurents </a:t>
+              <a:t> </a:t>
             </a:r>
             <a:r>
               <a:rPr lang="de-CH" dirty="0" err="1" smtClean="0"/>
-              <a:t>tasks</a:t>
-            </a:r>
-            <a:endParaRPr lang="en" dirty="0"/>
+              <a:t>each</a:t>
+            </a:r>
+            <a:endParaRPr lang="de-CH" dirty="0" smtClean="0"/>
+          </a:p>
+          <a:p>
+            <a:r>
+              <a:rPr lang="de-CH" dirty="0"/>
+              <a:t> </a:t>
+            </a:r>
+            <a:r>
+              <a:rPr lang="de-CH" dirty="0" smtClean="0"/>
+              <a:t>Goal: </a:t>
+            </a:r>
+            <a:br>
+              <a:rPr lang="de-CH" dirty="0" smtClean="0"/>
+            </a:br>
+            <a:r>
+              <a:rPr lang="de-CH" dirty="0" smtClean="0"/>
+              <a:t>	</a:t>
+            </a:r>
+            <a:r>
+              <a:rPr lang="de-CH" i="1" dirty="0" err="1" smtClean="0"/>
+              <a:t>Deliverable</a:t>
+            </a:r>
+            <a:r>
+              <a:rPr lang="de-CH" i="1" dirty="0" smtClean="0"/>
+              <a:t> </a:t>
+            </a:r>
+            <a:r>
+              <a:rPr lang="de-CH" i="1" dirty="0" err="1" smtClean="0"/>
+              <a:t>tool</a:t>
+            </a:r>
+            <a:r>
+              <a:rPr lang="de-CH" i="1" dirty="0" smtClean="0"/>
+              <a:t> </a:t>
+            </a:r>
+            <a:r>
+              <a:rPr lang="de-CH" i="1" dirty="0" err="1" smtClean="0"/>
+              <a:t>at</a:t>
+            </a:r>
+            <a:r>
+              <a:rPr lang="de-CH" i="1" dirty="0" smtClean="0"/>
+              <a:t> </a:t>
+            </a:r>
+            <a:r>
+              <a:rPr lang="de-CH" i="1" dirty="0" err="1" smtClean="0"/>
+              <a:t>the</a:t>
+            </a:r>
+            <a:r>
+              <a:rPr lang="de-CH" i="1" dirty="0" smtClean="0"/>
+              <a:t> end </a:t>
+            </a:r>
+            <a:r>
+              <a:rPr lang="de-CH" i="1" dirty="0" err="1" smtClean="0"/>
+              <a:t>of</a:t>
+            </a:r>
+            <a:r>
+              <a:rPr lang="de-CH" i="1" dirty="0" smtClean="0"/>
+              <a:t> 	</a:t>
+            </a:r>
+            <a:r>
+              <a:rPr lang="de-CH" i="1" dirty="0" err="1" smtClean="0"/>
+              <a:t>each</a:t>
+            </a:r>
+            <a:r>
+              <a:rPr lang="de-CH" i="1" dirty="0" smtClean="0"/>
+              <a:t> </a:t>
+            </a:r>
+            <a:r>
+              <a:rPr lang="de-CH" i="1" dirty="0" err="1" smtClean="0"/>
+              <a:t>sprint</a:t>
+            </a:r>
+            <a:r>
+              <a:rPr lang="de-CH" i="1" dirty="0" smtClean="0"/>
+              <a:t>!</a:t>
+            </a:r>
+          </a:p>
+          <a:p>
+            <a:r>
+              <a:rPr lang="de-CH" dirty="0"/>
+              <a:t> </a:t>
+            </a:r>
+            <a:r>
+              <a:rPr lang="de-CH" dirty="0" smtClean="0"/>
+              <a:t>Sprint 1: Minimum </a:t>
+            </a:r>
+            <a:r>
+              <a:rPr lang="de-CH" dirty="0" err="1" smtClean="0"/>
+              <a:t>Requirements</a:t>
+            </a:r>
+            <a:endParaRPr lang="de-CH" dirty="0" smtClean="0"/>
+          </a:p>
+          <a:p>
+            <a:r>
+              <a:rPr lang="de-CH" dirty="0"/>
+              <a:t> </a:t>
+            </a:r>
+            <a:r>
+              <a:rPr lang="de-CH" dirty="0" smtClean="0"/>
+              <a:t>Subsequent </a:t>
+            </a:r>
+            <a:r>
+              <a:rPr lang="de-CH" dirty="0" err="1" smtClean="0"/>
+              <a:t>sprints</a:t>
+            </a:r>
+            <a:r>
+              <a:rPr lang="de-CH" dirty="0" smtClean="0"/>
+              <a:t>:</a:t>
+            </a:r>
+          </a:p>
+          <a:p>
+            <a:pPr marL="342900" lvl="1" indent="-342900"/>
+            <a:r>
+              <a:rPr lang="de-CH" dirty="0"/>
+              <a:t> </a:t>
+            </a:r>
+            <a:r>
+              <a:rPr lang="de-CH" dirty="0" smtClean="0"/>
+              <a:t>Add </a:t>
+            </a:r>
+            <a:r>
+              <a:rPr lang="de-CH" dirty="0" err="1" smtClean="0"/>
+              <a:t>new</a:t>
+            </a:r>
+            <a:r>
+              <a:rPr lang="de-CH" dirty="0" smtClean="0"/>
+              <a:t> </a:t>
+            </a:r>
+            <a:r>
+              <a:rPr lang="de-CH" dirty="0" err="1" smtClean="0"/>
+              <a:t>features</a:t>
+            </a:r>
+            <a:endParaRPr lang="de-CH" dirty="0" smtClean="0"/>
+          </a:p>
+          <a:p>
+            <a:pPr marL="342900" lvl="1" indent="-342900"/>
+            <a:r>
+              <a:rPr lang="de-CH" dirty="0"/>
+              <a:t> </a:t>
+            </a:r>
+            <a:r>
+              <a:rPr lang="de-CH" dirty="0" smtClean="0"/>
+              <a:t>Test alternative </a:t>
+            </a:r>
+            <a:r>
+              <a:rPr lang="de-CH" dirty="0" err="1" smtClean="0"/>
+              <a:t>methods</a:t>
+            </a:r>
+            <a:endParaRPr lang="de-CH" dirty="0"/>
+          </a:p>
+          <a:p>
+            <a:pPr marL="342900" lvl="1" indent="-342900"/>
+            <a:r>
+              <a:rPr lang="de-CH" dirty="0" smtClean="0"/>
+              <a:t> </a:t>
+            </a:r>
+            <a:r>
+              <a:rPr lang="de-CH" dirty="0" err="1" smtClean="0"/>
+              <a:t>etc</a:t>
+            </a:r>
+            <a:r>
+              <a:rPr lang="de-CH" dirty="0" smtClean="0"/>
+              <a:t> ...</a:t>
+            </a:r>
           </a:p>
         </p:txBody>
       </p:sp>
     </p:spTree>
+    <p:extLst>
+      <p:ext uri="{BB962C8B-B14F-4D97-AF65-F5344CB8AC3E}">
+        <p14:creationId xmlns:p14="http://schemas.microsoft.com/office/powerpoint/2010/main" val="3177910965"/>
+      </p:ext>
+    </p:extLst>
   </p:cSld>
   <p:clrMapOvr>
     <a:masterClrMapping/>
   </p:clrMapOvr>
-  <p:transition xmlns:p14="http://schemas.microsoft.com/office/powerpoint/2010/main" spd="slow">
-    <p:cut/>
-  </p:transition>
-  <p:timing>
-    <p:tnLst>
-      <p:par>
-        <p:cTn xmlns:p14="http://schemas.microsoft.com/office/powerpoint/2010/main" id="1" dur="indefinite" restart="never" nodeType="tmRoot"/>
-      </p:par>
-    </p:tnLst>
-  </p:timing>
-</p:sld>
-</file>
-
-<file path=ppt/slides/slide9.xml><?xml version="1.0" encoding="utf-8"?>
-<p:sld xmlns:a="http://schemas.openxmlformats.org/drawingml/2006/main" xmlns:r="http://schemas.openxmlformats.org/officeDocument/2006/relationships" xmlns:p="http://schemas.openxmlformats.org/presentationml/2006/main">
-  <p:cSld>
-    <p:spTree>
-      <p:nvGrpSpPr>
-        <p:cNvPr id="1" name="Shape 253"/>
-        <p:cNvGrpSpPr/>
-        <p:nvPr/>
-      </p:nvGrpSpPr>
-      <p:grpSpPr>
-        <a:xfrm>
-          <a:off x="0" y="0"/>
-          <a:ext cx="0" cy="0"/>
-          <a:chOff x="0" y="0"/>
-          <a:chExt cx="0" cy="0"/>
-        </a:xfrm>
-      </p:grpSpPr>
-      <p:sp>
-        <p:nvSpPr>
-          <p:cNvPr id="254" name="Shape 254"/>
-          <p:cNvSpPr txBox="1">
-            <a:spLocks noGrp="1"/>
-          </p:cNvSpPr>
-          <p:nvPr>
-            <p:ph type="body" idx="1"/>
-          </p:nvPr>
-        </p:nvSpPr>
-        <p:spPr>
-          <a:xfrm>
-            <a:off x="1165475" y="5775090"/>
-            <a:ext cx="7521300" cy="578700"/>
-          </a:xfrm>
-          <a:prstGeom prst="rect">
-            <a:avLst/>
-          </a:prstGeom>
-        </p:spPr>
-        <p:txBody>
-          <a:bodyPr lIns="91425" tIns="91425" rIns="91425" bIns="91425" anchor="t" anchorCtr="0">
-            <a:noAutofit/>
-          </a:bodyPr>
-          <a:lstStyle/>
-          <a:p>
-            <a:pPr lvl="0">
-              <a:spcBef>
-                <a:spcPts val="0"/>
-              </a:spcBef>
-              <a:buNone/>
-            </a:pPr>
-            <a:r>
-              <a:rPr lang="de-CH" dirty="0" err="1" smtClean="0">
-                <a:solidFill>
-                  <a:srgbClr val="F3F3F3"/>
-                </a:solidFill>
-              </a:rPr>
-              <a:t>Mayb</a:t>
-            </a:r>
-            <a:r>
-              <a:rPr lang="de-CH" dirty="0" err="1" smtClean="0"/>
-              <a:t>e</a:t>
-            </a:r>
-            <a:r>
-              <a:rPr lang="de-CH" dirty="0" smtClean="0"/>
-              <a:t> a </a:t>
-            </a:r>
-            <a:r>
-              <a:rPr lang="de-CH" dirty="0" err="1" smtClean="0"/>
-              <a:t>graph</a:t>
-            </a:r>
-            <a:r>
-              <a:rPr lang="de-CH" dirty="0" smtClean="0"/>
-              <a:t> </a:t>
-            </a:r>
-            <a:r>
-              <a:rPr lang="de-CH" dirty="0" err="1" smtClean="0"/>
-              <a:t>to</a:t>
-            </a:r>
-            <a:r>
-              <a:rPr lang="de-CH" dirty="0" smtClean="0"/>
-              <a:t> </a:t>
-            </a:r>
-            <a:r>
-              <a:rPr lang="de-CH" dirty="0" err="1" smtClean="0"/>
-              <a:t>show</a:t>
-            </a:r>
-            <a:r>
-              <a:rPr lang="de-CH" dirty="0" smtClean="0"/>
-              <a:t> </a:t>
-            </a:r>
-            <a:r>
-              <a:rPr lang="de-CH" dirty="0" err="1" smtClean="0"/>
-              <a:t>estimated</a:t>
-            </a:r>
-            <a:r>
-              <a:rPr lang="de-CH" dirty="0" smtClean="0"/>
-              <a:t> </a:t>
-            </a:r>
-            <a:r>
-              <a:rPr lang="de-CH" dirty="0" err="1" smtClean="0"/>
-              <a:t>distribution</a:t>
-            </a:r>
-            <a:r>
-              <a:rPr lang="de-CH" dirty="0" smtClean="0"/>
-              <a:t> </a:t>
-            </a:r>
-            <a:r>
-              <a:rPr lang="de-CH" dirty="0" err="1" smtClean="0"/>
-              <a:t>of</a:t>
-            </a:r>
-            <a:r>
-              <a:rPr lang="de-CH" dirty="0" smtClean="0"/>
-              <a:t> time on </a:t>
-            </a:r>
-            <a:r>
-              <a:rPr lang="de-CH" dirty="0" err="1" smtClean="0"/>
-              <a:t>tasks</a:t>
-            </a:r>
-            <a:r>
-              <a:rPr lang="de-CH" dirty="0" smtClean="0"/>
-              <a:t>?</a:t>
-            </a:r>
-            <a:endParaRPr lang="de-CH" dirty="0" smtClean="0">
-              <a:solidFill>
-                <a:srgbClr val="F3F3F3"/>
-              </a:solidFill>
-            </a:endParaRPr>
-          </a:p>
-          <a:p>
-            <a:pPr lvl="0">
-              <a:spcBef>
-                <a:spcPts val="0"/>
-              </a:spcBef>
-              <a:buNone/>
-            </a:pPr>
-            <a:r>
-              <a:rPr lang="en" dirty="0" smtClean="0">
-                <a:solidFill>
-                  <a:srgbClr val="F3F3F3"/>
-                </a:solidFill>
-              </a:rPr>
-              <a:t>You </a:t>
-            </a:r>
-            <a:r>
-              <a:rPr lang="en" dirty="0">
-                <a:solidFill>
-                  <a:srgbClr val="F3F3F3"/>
-                </a:solidFill>
-              </a:rPr>
-              <a:t>can copy&amp;paste graphs from </a:t>
-            </a:r>
-            <a:r>
-              <a:rPr lang="en" u="sng" dirty="0">
-                <a:solidFill>
-                  <a:srgbClr val="F3F3F3"/>
-                </a:solidFill>
-                <a:hlinkClick r:id="rId3"/>
-              </a:rPr>
-              <a:t>Google Sheets</a:t>
-            </a:r>
-          </a:p>
-        </p:txBody>
-      </p:sp>
-      <p:pic>
-        <p:nvPicPr>
-          <p:cNvPr id="255" name="Shape 255"/>
-          <p:cNvPicPr preferRelativeResize="0"/>
-          <p:nvPr/>
-        </p:nvPicPr>
-        <p:blipFill>
-          <a:blip r:embed="rId4">
-            <a:alphaModFix/>
-          </a:blip>
-          <a:stretch>
-            <a:fillRect/>
-          </a:stretch>
-        </p:blipFill>
-        <p:spPr>
-          <a:xfrm>
-            <a:off x="1138239" y="152401"/>
-            <a:ext cx="6867525" cy="5695951"/>
-          </a:xfrm>
-          <a:prstGeom prst="rect">
-            <a:avLst/>
-          </a:prstGeom>
-          <a:noFill/>
-          <a:ln>
-            <a:noFill/>
-          </a:ln>
-        </p:spPr>
-      </p:pic>
-    </p:spTree>
-  </p:cSld>
-  <p:clrMapOvr>
-    <a:masterClrMapping/>
-  </p:clrMapOvr>
-  <p:transition xmlns:p14="http://schemas.microsoft.com/office/powerpoint/2010/main" spd="slow">
-    <p:cut/>
-  </p:transition>
-  <p:timing>
-    <p:tnLst>
-      <p:par>
-        <p:cTn xmlns:p14="http://schemas.microsoft.com/office/powerpoint/2010/main" id="1" dur="indefinite" restart="never" nodeType="tmRoot"/>
-      </p:par>
-    </p:tnLst>
-  </p:timing>
 </p:sld>
 </file>
 

</xml_diff>

<commit_message>
Added problem statement and objectives to slides
</commit_message>
<xml_diff>
--- a/doc/initial-plan.pptx
+++ b/doc/initial-plan.pptx
@@ -12,8 +12,8 @@
     <p:sldId id="259" r:id="rId3"/>
     <p:sldId id="261" r:id="rId4"/>
     <p:sldId id="265" r:id="rId5"/>
-    <p:sldId id="263" r:id="rId6"/>
-    <p:sldId id="266" r:id="rId7"/>
+    <p:sldId id="266" r:id="rId6"/>
+    <p:sldId id="263" r:id="rId7"/>
     <p:sldId id="286" r:id="rId8"/>
     <p:sldId id="285" r:id="rId9"/>
     <p:sldId id="287" r:id="rId10"/>
@@ -899,6 +899,107 @@
   <p:cSld>
     <p:spTree>
       <p:nvGrpSpPr>
+        <p:cNvPr id="1" name="Shape 131"/>
+        <p:cNvGrpSpPr/>
+        <p:nvPr/>
+      </p:nvGrpSpPr>
+      <p:grpSpPr>
+        <a:xfrm>
+          <a:off x="0" y="0"/>
+          <a:ext cx="0" cy="0"/>
+          <a:chOff x="0" y="0"/>
+          <a:chExt cx="0" cy="0"/>
+        </a:xfrm>
+      </p:grpSpPr>
+      <p:sp>
+        <p:nvSpPr>
+          <p:cNvPr id="132" name="Shape 132"/>
+          <p:cNvSpPr>
+            <a:spLocks noGrp="1" noRot="1" noChangeAspect="1"/>
+          </p:cNvSpPr>
+          <p:nvPr>
+            <p:ph type="sldImg" idx="2"/>
+          </p:nvPr>
+        </p:nvSpPr>
+        <p:spPr>
+          <a:xfrm>
+            <a:off x="1143000" y="685800"/>
+            <a:ext cx="4572000" cy="3429000"/>
+          </a:xfrm>
+          <a:custGeom>
+            <a:avLst/>
+            <a:gdLst/>
+            <a:ahLst/>
+            <a:cxnLst/>
+            <a:rect l="0" t="0" r="0" b="0"/>
+            <a:pathLst>
+              <a:path w="120000" h="120000" extrusionOk="0">
+                <a:moveTo>
+                  <a:pt x="0" y="0"/>
+                </a:moveTo>
+                <a:lnTo>
+                  <a:pt x="120000" y="0"/>
+                </a:lnTo>
+                <a:lnTo>
+                  <a:pt x="120000" y="120000"/>
+                </a:lnTo>
+                <a:lnTo>
+                  <a:pt x="0" y="120000"/>
+                </a:lnTo>
+                <a:close/>
+              </a:path>
+            </a:pathLst>
+          </a:custGeom>
+        </p:spPr>
+      </p:sp>
+      <p:sp>
+        <p:nvSpPr>
+          <p:cNvPr id="133" name="Shape 133"/>
+          <p:cNvSpPr txBox="1">
+            <a:spLocks noGrp="1"/>
+          </p:cNvSpPr>
+          <p:nvPr>
+            <p:ph type="body" idx="1"/>
+          </p:nvPr>
+        </p:nvSpPr>
+        <p:spPr>
+          <a:xfrm>
+            <a:off x="685800" y="4343400"/>
+            <a:ext cx="5486399" cy="4114800"/>
+          </a:xfrm>
+          <a:prstGeom prst="rect">
+            <a:avLst/>
+          </a:prstGeom>
+        </p:spPr>
+        <p:txBody>
+          <a:bodyPr lIns="91425" tIns="91425" rIns="91425" bIns="91425" anchor="t" anchorCtr="0">
+            <a:noAutofit/>
+          </a:bodyPr>
+          <a:lstStyle/>
+          <a:p>
+            <a:pPr lvl="0">
+              <a:spcBef>
+                <a:spcPts val="0"/>
+              </a:spcBef>
+              <a:buNone/>
+            </a:pPr>
+            <a:endParaRPr/>
+          </a:p>
+        </p:txBody>
+      </p:sp>
+    </p:spTree>
+  </p:cSld>
+  <p:clrMapOvr>
+    <a:masterClrMapping/>
+  </p:clrMapOvr>
+</p:notes>
+</file>
+
+<file path=ppt/notesSlides/notesSlide6.xml><?xml version="1.0" encoding="utf-8"?>
+<p:notes xmlns:a="http://schemas.openxmlformats.org/drawingml/2006/main" xmlns:r="http://schemas.openxmlformats.org/officeDocument/2006/relationships" xmlns:p="http://schemas.openxmlformats.org/presentationml/2006/main" showMasterSp="0" showMasterPhAnim="0">
+  <p:cSld>
+    <p:spTree>
+      <p:nvGrpSpPr>
         <p:cNvPr id="1" name="Shape 109"/>
         <p:cNvGrpSpPr/>
         <p:nvPr/>
@@ -955,107 +1056,6 @@
       <p:sp>
         <p:nvSpPr>
           <p:cNvPr id="111" name="Shape 111"/>
-          <p:cNvSpPr txBox="1">
-            <a:spLocks noGrp="1"/>
-          </p:cNvSpPr>
-          <p:nvPr>
-            <p:ph type="body" idx="1"/>
-          </p:nvPr>
-        </p:nvSpPr>
-        <p:spPr>
-          <a:xfrm>
-            <a:off x="685800" y="4343400"/>
-            <a:ext cx="5486399" cy="4114800"/>
-          </a:xfrm>
-          <a:prstGeom prst="rect">
-            <a:avLst/>
-          </a:prstGeom>
-        </p:spPr>
-        <p:txBody>
-          <a:bodyPr lIns="91425" tIns="91425" rIns="91425" bIns="91425" anchor="t" anchorCtr="0">
-            <a:noAutofit/>
-          </a:bodyPr>
-          <a:lstStyle/>
-          <a:p>
-            <a:pPr lvl="0">
-              <a:spcBef>
-                <a:spcPts val="0"/>
-              </a:spcBef>
-              <a:buNone/>
-            </a:pPr>
-            <a:endParaRPr/>
-          </a:p>
-        </p:txBody>
-      </p:sp>
-    </p:spTree>
-  </p:cSld>
-  <p:clrMapOvr>
-    <a:masterClrMapping/>
-  </p:clrMapOvr>
-</p:notes>
-</file>
-
-<file path=ppt/notesSlides/notesSlide6.xml><?xml version="1.0" encoding="utf-8"?>
-<p:notes xmlns:a="http://schemas.openxmlformats.org/drawingml/2006/main" xmlns:r="http://schemas.openxmlformats.org/officeDocument/2006/relationships" xmlns:p="http://schemas.openxmlformats.org/presentationml/2006/main" showMasterSp="0" showMasterPhAnim="0">
-  <p:cSld>
-    <p:spTree>
-      <p:nvGrpSpPr>
-        <p:cNvPr id="1" name="Shape 131"/>
-        <p:cNvGrpSpPr/>
-        <p:nvPr/>
-      </p:nvGrpSpPr>
-      <p:grpSpPr>
-        <a:xfrm>
-          <a:off x="0" y="0"/>
-          <a:ext cx="0" cy="0"/>
-          <a:chOff x="0" y="0"/>
-          <a:chExt cx="0" cy="0"/>
-        </a:xfrm>
-      </p:grpSpPr>
-      <p:sp>
-        <p:nvSpPr>
-          <p:cNvPr id="132" name="Shape 132"/>
-          <p:cNvSpPr>
-            <a:spLocks noGrp="1" noRot="1" noChangeAspect="1"/>
-          </p:cNvSpPr>
-          <p:nvPr>
-            <p:ph type="sldImg" idx="2"/>
-          </p:nvPr>
-        </p:nvSpPr>
-        <p:spPr>
-          <a:xfrm>
-            <a:off x="1143000" y="685800"/>
-            <a:ext cx="4572000" cy="3429000"/>
-          </a:xfrm>
-          <a:custGeom>
-            <a:avLst/>
-            <a:gdLst/>
-            <a:ahLst/>
-            <a:cxnLst/>
-            <a:rect l="0" t="0" r="0" b="0"/>
-            <a:pathLst>
-              <a:path w="120000" h="120000" extrusionOk="0">
-                <a:moveTo>
-                  <a:pt x="0" y="0"/>
-                </a:moveTo>
-                <a:lnTo>
-                  <a:pt x="120000" y="0"/>
-                </a:lnTo>
-                <a:lnTo>
-                  <a:pt x="120000" y="120000"/>
-                </a:lnTo>
-                <a:lnTo>
-                  <a:pt x="0" y="120000"/>
-                </a:lnTo>
-                <a:close/>
-              </a:path>
-            </a:pathLst>
-          </a:custGeom>
-        </p:spPr>
-      </p:sp>
-      <p:sp>
-        <p:nvSpPr>
-          <p:cNvPr id="133" name="Shape 133"/>
           <p:cNvSpPr txBox="1">
             <a:spLocks noGrp="1"/>
           </p:cNvSpPr>
@@ -4346,14 +4346,10 @@
               <a:buNone/>
             </a:pPr>
             <a:r>
-              <a:rPr lang="de-CH" sz="2800" dirty="0" smtClean="0"/>
-              <a:t>Task </a:t>
-            </a:r>
-            <a:r>
-              <a:rPr lang="de-CH" sz="2800" dirty="0" smtClean="0"/>
-              <a:t>Outline (Sprint 1)</a:t>
-            </a:r>
-            <a:endParaRPr lang="en" sz="2800" dirty="0"/>
+              <a:rPr lang="en" sz="2800" smtClean="0"/>
+              <a:t>Task Outline (Sprint 1)</a:t>
+            </a:r>
+            <a:endParaRPr lang="en" sz="2800"/>
           </a:p>
         </p:txBody>
       </p:sp>
@@ -4415,7 +4411,7 @@
               <a:buNone/>
             </a:pPr>
             <a:r>
-              <a:rPr lang="de-CH" sz="2000" dirty="0" smtClean="0">
+              <a:rPr lang="en" sz="2000" smtClean="0">
                 <a:solidFill>
                   <a:srgbClr val="F3F3F3"/>
                 </a:solidFill>
@@ -4424,141 +4420,9 @@
                 <a:cs typeface="Quicksand"/>
                 <a:sym typeface="Quicksand"/>
               </a:rPr>
-              <a:t>1. </a:t>
-            </a:r>
-            <a:r>
-              <a:rPr lang="de-CH" sz="2000" dirty="0" err="1" smtClean="0">
-                <a:solidFill>
-                  <a:srgbClr val="F3F3F3"/>
-                </a:solidFill>
-                <a:latin typeface="Quicksand"/>
-                <a:ea typeface="Quicksand"/>
-                <a:cs typeface="Quicksand"/>
-                <a:sym typeface="Quicksand"/>
-              </a:rPr>
-              <a:t>Loading</a:t>
-            </a:r>
-            <a:r>
-              <a:rPr lang="de-CH" sz="2000" dirty="0" smtClean="0">
-                <a:solidFill>
-                  <a:srgbClr val="F3F3F3"/>
-                </a:solidFill>
-                <a:latin typeface="Quicksand"/>
-                <a:ea typeface="Quicksand"/>
-                <a:cs typeface="Quicksand"/>
-                <a:sym typeface="Quicksand"/>
-              </a:rPr>
-              <a:t> </a:t>
-            </a:r>
-            <a:r>
-              <a:rPr lang="de-CH" sz="2000" dirty="0" err="1" smtClean="0">
-                <a:solidFill>
-                  <a:srgbClr val="F3F3F3"/>
-                </a:solidFill>
-                <a:latin typeface="Quicksand"/>
-                <a:ea typeface="Quicksand"/>
-                <a:cs typeface="Quicksand"/>
-                <a:sym typeface="Quicksand"/>
-              </a:rPr>
-              <a:t>and</a:t>
-            </a:r>
-            <a:r>
-              <a:rPr lang="de-CH" sz="2000" dirty="0" smtClean="0">
-                <a:solidFill>
-                  <a:srgbClr val="F3F3F3"/>
-                </a:solidFill>
-                <a:latin typeface="Quicksand"/>
-                <a:ea typeface="Quicksand"/>
-                <a:cs typeface="Quicksand"/>
-                <a:sym typeface="Quicksand"/>
-              </a:rPr>
-              <a:t> </a:t>
-            </a:r>
-            <a:r>
-              <a:rPr lang="de-CH" sz="2000" dirty="0" err="1" smtClean="0">
-                <a:solidFill>
-                  <a:srgbClr val="F3F3F3"/>
-                </a:solidFill>
-                <a:latin typeface="Quicksand"/>
-                <a:ea typeface="Quicksand"/>
-                <a:cs typeface="Quicksand"/>
-                <a:sym typeface="Quicksand"/>
-              </a:rPr>
-              <a:t>extraction</a:t>
-            </a:r>
-            <a:r>
-              <a:rPr lang="de-CH" sz="2000" dirty="0" smtClean="0">
-                <a:solidFill>
-                  <a:srgbClr val="F3F3F3"/>
-                </a:solidFill>
-                <a:latin typeface="Quicksand"/>
-                <a:ea typeface="Quicksand"/>
-                <a:cs typeface="Quicksand"/>
-                <a:sym typeface="Quicksand"/>
-              </a:rPr>
-              <a:t> </a:t>
-            </a:r>
-            <a:r>
-              <a:rPr lang="de-CH" sz="2000" dirty="0" err="1" smtClean="0">
-                <a:solidFill>
-                  <a:srgbClr val="F3F3F3"/>
-                </a:solidFill>
-                <a:latin typeface="Quicksand"/>
-                <a:ea typeface="Quicksand"/>
-                <a:cs typeface="Quicksand"/>
-                <a:sym typeface="Quicksand"/>
-              </a:rPr>
-              <a:t>of</a:t>
-            </a:r>
-            <a:r>
-              <a:rPr lang="de-CH" sz="2000" dirty="0" smtClean="0">
-                <a:solidFill>
-                  <a:srgbClr val="F3F3F3"/>
-                </a:solidFill>
-                <a:latin typeface="Quicksand"/>
-                <a:ea typeface="Quicksand"/>
-                <a:cs typeface="Quicksand"/>
-                <a:sym typeface="Quicksand"/>
-              </a:rPr>
-              <a:t> </a:t>
-            </a:r>
-            <a:r>
-              <a:rPr lang="de-CH" sz="2000" dirty="0" err="1" smtClean="0">
-                <a:solidFill>
-                  <a:srgbClr val="F3F3F3"/>
-                </a:solidFill>
-                <a:latin typeface="Quicksand"/>
-                <a:ea typeface="Quicksand"/>
-                <a:cs typeface="Quicksand"/>
-                <a:sym typeface="Quicksand"/>
-              </a:rPr>
-              <a:t>video</a:t>
-            </a:r>
-            <a:r>
-              <a:rPr lang="de-CH" sz="2000" dirty="0" smtClean="0">
-                <a:solidFill>
-                  <a:srgbClr val="F3F3F3"/>
-                </a:solidFill>
-                <a:latin typeface="Quicksand"/>
-                <a:ea typeface="Quicksand"/>
-                <a:cs typeface="Quicksand"/>
-                <a:sym typeface="Quicksand"/>
-              </a:rPr>
-              <a:t> </a:t>
-            </a:r>
-            <a:r>
-              <a:rPr lang="de-CH" sz="2000" dirty="0" err="1" smtClean="0">
-                <a:solidFill>
-                  <a:srgbClr val="F3F3F3"/>
-                </a:solidFill>
-                <a:latin typeface="Quicksand"/>
-                <a:ea typeface="Quicksand"/>
-                <a:cs typeface="Quicksand"/>
-                <a:sym typeface="Quicksand"/>
-              </a:rPr>
-              <a:t>data</a:t>
-            </a:r>
-            <a:endParaRPr lang="en" sz="2000" dirty="0">
+              <a:t>1. Loading and extraction of video data</a:t>
+            </a:r>
+            <a:endParaRPr lang="en" sz="2000">
               <a:solidFill>
                 <a:srgbClr val="F3F3F3"/>
               </a:solidFill>
@@ -4623,7 +4487,7 @@
           <a:p>
             <a:pPr lvl="0"/>
             <a:r>
-              <a:rPr lang="de-CH" sz="2000" dirty="0" smtClean="0">
+              <a:rPr lang="en" sz="2000" smtClean="0">
                 <a:solidFill>
                   <a:srgbClr val="F3F3F3"/>
                 </a:solidFill>
@@ -4632,93 +4496,9 @@
                 <a:cs typeface="Quicksand"/>
                 <a:sym typeface="Quicksand"/>
               </a:rPr>
-              <a:t>2</a:t>
-            </a:r>
-            <a:r>
-              <a:rPr lang="de-CH" sz="2000" dirty="0">
-                <a:solidFill>
-                  <a:srgbClr val="F3F3F3"/>
-                </a:solidFill>
-                <a:latin typeface="Quicksand"/>
-                <a:ea typeface="Quicksand"/>
-                <a:cs typeface="Quicksand"/>
-                <a:sym typeface="Quicksand"/>
-              </a:rPr>
-              <a:t>. </a:t>
-            </a:r>
-            <a:r>
-              <a:rPr lang="de-CH" sz="2000" dirty="0" err="1">
-                <a:solidFill>
-                  <a:srgbClr val="F3F3F3"/>
-                </a:solidFill>
-                <a:latin typeface="Quicksand"/>
-                <a:ea typeface="Quicksand"/>
-                <a:cs typeface="Quicksand"/>
-                <a:sym typeface="Quicksand"/>
-              </a:rPr>
-              <a:t>Frequency</a:t>
-            </a:r>
-            <a:r>
-              <a:rPr lang="de-CH" sz="2000" dirty="0">
-                <a:solidFill>
-                  <a:srgbClr val="F3F3F3"/>
-                </a:solidFill>
-                <a:latin typeface="Quicksand"/>
-                <a:ea typeface="Quicksand"/>
-                <a:cs typeface="Quicksand"/>
-                <a:sym typeface="Quicksand"/>
-              </a:rPr>
-              <a:t> </a:t>
-            </a:r>
-            <a:r>
-              <a:rPr lang="de-CH" sz="2000" dirty="0" err="1">
-                <a:solidFill>
-                  <a:srgbClr val="F3F3F3"/>
-                </a:solidFill>
-                <a:latin typeface="Quicksand"/>
-                <a:ea typeface="Quicksand"/>
-                <a:cs typeface="Quicksand"/>
-                <a:sym typeface="Quicksand"/>
-              </a:rPr>
-              <a:t>analysis</a:t>
-            </a:r>
-            <a:r>
-              <a:rPr lang="de-CH" sz="2000" dirty="0">
-                <a:solidFill>
-                  <a:srgbClr val="F3F3F3"/>
-                </a:solidFill>
-                <a:latin typeface="Quicksand"/>
-                <a:ea typeface="Quicksand"/>
-                <a:cs typeface="Quicksand"/>
-                <a:sym typeface="Quicksand"/>
-              </a:rPr>
-              <a:t> per ROI </a:t>
-            </a:r>
-            <a:r>
-              <a:rPr lang="de-CH" sz="2000" dirty="0" err="1">
-                <a:solidFill>
-                  <a:srgbClr val="F3F3F3"/>
-                </a:solidFill>
-                <a:latin typeface="Quicksand"/>
-                <a:ea typeface="Quicksand"/>
-                <a:cs typeface="Quicksand"/>
-                <a:sym typeface="Quicksand"/>
-              </a:rPr>
-              <a:t>using</a:t>
-            </a:r>
-            <a:r>
-              <a:rPr lang="de-CH" sz="2000" dirty="0">
-                <a:solidFill>
-                  <a:srgbClr val="F3F3F3"/>
-                </a:solidFill>
-                <a:latin typeface="Quicksand"/>
-                <a:ea typeface="Quicksand"/>
-                <a:cs typeface="Quicksand"/>
-                <a:sym typeface="Quicksand"/>
-              </a:rPr>
-              <a:t> FFT</a:t>
-            </a:r>
-            <a:endParaRPr lang="en" sz="2000" dirty="0">
+              <a:t>2. Frequency analysis per ROI using FFT</a:t>
+            </a:r>
+            <a:endParaRPr lang="en" sz="2000">
               <a:solidFill>
                 <a:srgbClr val="F3F3F3"/>
               </a:solidFill>
@@ -4783,7 +4563,7 @@
           <a:p>
             <a:pPr lvl="0"/>
             <a:r>
-              <a:rPr lang="de-CH" sz="2000" dirty="0" smtClean="0">
+              <a:rPr lang="en" sz="2000" smtClean="0">
                 <a:solidFill>
                   <a:srgbClr val="F3F3F3"/>
                 </a:solidFill>
@@ -4792,69 +4572,9 @@
                 <a:cs typeface="Quicksand"/>
                 <a:sym typeface="Quicksand"/>
               </a:rPr>
-              <a:t>3. Scoring </a:t>
-            </a:r>
-            <a:r>
-              <a:rPr lang="de-CH" sz="2000" dirty="0" err="1">
-                <a:solidFill>
-                  <a:srgbClr val="F3F3F3"/>
-                </a:solidFill>
-                <a:latin typeface="Quicksand"/>
-                <a:ea typeface="Quicksand"/>
-                <a:cs typeface="Quicksand"/>
-                <a:sym typeface="Quicksand"/>
-              </a:rPr>
-              <a:t>tissue</a:t>
-            </a:r>
-            <a:r>
-              <a:rPr lang="de-CH" sz="2000" dirty="0">
-                <a:solidFill>
-                  <a:srgbClr val="F3F3F3"/>
-                </a:solidFill>
-                <a:latin typeface="Quicksand"/>
-                <a:ea typeface="Quicksand"/>
-                <a:cs typeface="Quicksand"/>
-                <a:sym typeface="Quicksand"/>
-              </a:rPr>
-              <a:t> </a:t>
-            </a:r>
-            <a:r>
-              <a:rPr lang="de-CH" sz="2000" dirty="0" err="1">
-                <a:solidFill>
-                  <a:srgbClr val="F3F3F3"/>
-                </a:solidFill>
-                <a:latin typeface="Quicksand"/>
-                <a:ea typeface="Quicksand"/>
-                <a:cs typeface="Quicksand"/>
-                <a:sym typeface="Quicksand"/>
-              </a:rPr>
-              <a:t>surface</a:t>
-            </a:r>
-            <a:r>
-              <a:rPr lang="de-CH" sz="2000" dirty="0">
-                <a:solidFill>
-                  <a:srgbClr val="F3F3F3"/>
-                </a:solidFill>
-                <a:latin typeface="Quicksand"/>
-                <a:ea typeface="Quicksand"/>
-                <a:cs typeface="Quicksand"/>
-                <a:sym typeface="Quicksand"/>
-              </a:rPr>
-              <a:t> </a:t>
-            </a:r>
-            <a:r>
-              <a:rPr lang="de-CH" sz="2000" dirty="0" err="1">
-                <a:solidFill>
-                  <a:srgbClr val="F3F3F3"/>
-                </a:solidFill>
-                <a:latin typeface="Quicksand"/>
-                <a:ea typeface="Quicksand"/>
-                <a:cs typeface="Quicksand"/>
-                <a:sym typeface="Quicksand"/>
-              </a:rPr>
-              <a:t>activity</a:t>
-            </a:r>
-            <a:endParaRPr lang="en" sz="2000" dirty="0">
+              <a:t>3. Scoring tissue surface activity</a:t>
+            </a:r>
+            <a:endParaRPr lang="en" sz="2000">
               <a:solidFill>
                 <a:srgbClr val="F3F3F3"/>
               </a:solidFill>
@@ -4924,7 +4644,7 @@
               <a:buNone/>
             </a:pPr>
             <a:r>
-              <a:rPr lang="de-CH" sz="2000" dirty="0" smtClean="0">
+              <a:rPr lang="en" sz="2000" smtClean="0">
                 <a:solidFill>
                   <a:srgbClr val="F3F3F3"/>
                 </a:solidFill>
@@ -4933,81 +4653,9 @@
                 <a:cs typeface="Quicksand"/>
                 <a:sym typeface="Quicksand"/>
               </a:rPr>
-              <a:t>4. </a:t>
-            </a:r>
-            <a:r>
-              <a:rPr lang="de-CH" sz="2000" dirty="0" err="1" smtClean="0">
-                <a:solidFill>
-                  <a:srgbClr val="F3F3F3"/>
-                </a:solidFill>
-                <a:latin typeface="Quicksand"/>
-                <a:ea typeface="Quicksand"/>
-                <a:cs typeface="Quicksand"/>
-                <a:sym typeface="Quicksand"/>
-              </a:rPr>
-              <a:t>Synthetic</a:t>
-            </a:r>
-            <a:r>
-              <a:rPr lang="de-CH" sz="2000" dirty="0" smtClean="0">
-                <a:solidFill>
-                  <a:srgbClr val="F3F3F3"/>
-                </a:solidFill>
-                <a:latin typeface="Quicksand"/>
-                <a:ea typeface="Quicksand"/>
-                <a:cs typeface="Quicksand"/>
-                <a:sym typeface="Quicksand"/>
-              </a:rPr>
-              <a:t> test-</a:t>
-            </a:r>
-            <a:r>
-              <a:rPr lang="de-CH" sz="2000" dirty="0" err="1" smtClean="0">
-                <a:solidFill>
-                  <a:srgbClr val="F3F3F3"/>
-                </a:solidFill>
-                <a:latin typeface="Quicksand"/>
-                <a:ea typeface="Quicksand"/>
-                <a:cs typeface="Quicksand"/>
-                <a:sym typeface="Quicksand"/>
-              </a:rPr>
-              <a:t>data</a:t>
-            </a:r>
-            <a:r>
-              <a:rPr lang="de-CH" sz="2000" dirty="0" smtClean="0">
-                <a:solidFill>
-                  <a:srgbClr val="F3F3F3"/>
-                </a:solidFill>
-                <a:latin typeface="Quicksand"/>
-                <a:ea typeface="Quicksand"/>
-                <a:cs typeface="Quicksand"/>
-                <a:sym typeface="Quicksand"/>
-              </a:rPr>
-              <a:t> </a:t>
-            </a:r>
-            <a:r>
-              <a:rPr lang="de-CH" sz="2000" dirty="0" err="1" smtClean="0">
-                <a:solidFill>
-                  <a:srgbClr val="F3F3F3"/>
-                </a:solidFill>
-                <a:latin typeface="Quicksand"/>
-                <a:ea typeface="Quicksand"/>
-                <a:cs typeface="Quicksand"/>
-                <a:sym typeface="Quicksand"/>
-              </a:rPr>
-              <a:t>generation</a:t>
-            </a:r>
-            <a:r>
-              <a:rPr lang="de-CH" sz="2000" dirty="0" smtClean="0">
-                <a:solidFill>
-                  <a:srgbClr val="F3F3F3"/>
-                </a:solidFill>
-                <a:latin typeface="Quicksand"/>
-                <a:ea typeface="Quicksand"/>
-                <a:cs typeface="Quicksand"/>
-                <a:sym typeface="Quicksand"/>
-              </a:rPr>
-              <a:t> (optional)</a:t>
-            </a:r>
-            <a:endParaRPr lang="en" sz="2000" dirty="0">
+              <a:t>4. Synthetic test-data generation (optional)</a:t>
+            </a:r>
+            <a:endParaRPr lang="en" sz="2000">
               <a:solidFill>
                 <a:srgbClr val="F3F3F3"/>
               </a:solidFill>
@@ -5587,20 +5235,12 @@
               <a:buNone/>
             </a:pPr>
             <a:r>
-              <a:rPr lang="de-CH" sz="2800" dirty="0" smtClean="0">
+              <a:rPr lang="en" sz="2800" dirty="0" smtClean="0">
                 <a:solidFill>
                   <a:srgbClr val="39C0BA"/>
                 </a:solidFill>
               </a:rPr>
-              <a:t>Problem, Motivation &amp; </a:t>
-            </a:r>
-            <a:r>
-              <a:rPr lang="de-CH" sz="2800" dirty="0" err="1" smtClean="0">
-                <a:solidFill>
-                  <a:srgbClr val="39C0BA"/>
-                </a:solidFill>
-              </a:rPr>
-              <a:t>Context</a:t>
+              <a:t>Problem, Motivation &amp; Context</a:t>
             </a:r>
             <a:endParaRPr lang="en" sz="2800" dirty="0">
               <a:solidFill>
@@ -5635,6 +5275,17 @@
           </a:bodyPr>
           <a:lstStyle/>
           <a:p>
+            <a:pPr marL="457200" indent="-457200">
+              <a:spcBef>
+                <a:spcPts val="0"/>
+              </a:spcBef>
+            </a:pPr>
+            <a:r>
+              <a:rPr lang="en" dirty="0" smtClean="0"/>
+              <a:t>PMI Research &amp; Developement:</a:t>
+            </a:r>
+          </a:p>
+          <a:p>
             <a:pPr lvl="0" rtl="0">
               <a:spcBef>
                 <a:spcPts val="0"/>
@@ -5642,67 +5293,83 @@
               <a:buNone/>
             </a:pPr>
             <a:r>
+              <a:rPr lang="en" sz="2400" i="1" dirty="0" smtClean="0"/>
+              <a:t>	Develope products which potentially 	reduce risk of tobacco consumption</a:t>
+            </a:r>
+            <a:endParaRPr lang="en" sz="2400" i="1" dirty="0" smtClean="0"/>
+          </a:p>
+          <a:p>
+            <a:pPr lvl="0" rtl="0">
+              <a:spcBef>
+                <a:spcPts val="0"/>
+              </a:spcBef>
+              <a:buNone/>
+            </a:pPr>
+            <a:endParaRPr lang="en" sz="2400" i="1" dirty="0" smtClean="0"/>
+          </a:p>
+          <a:p>
+            <a:pPr marL="457200" indent="-457200">
+              <a:spcBef>
+                <a:spcPts val="0"/>
+              </a:spcBef>
+            </a:pPr>
+            <a:r>
               <a:rPr lang="en" dirty="0" smtClean="0"/>
-              <a:t>Problem description:</a:t>
-            </a:r>
-          </a:p>
-          <a:p>
-            <a:pPr marL="457200" lvl="0" indent="-228600" rtl="0">
+              <a:t>New products need to be tested against ordinary cigarettes!</a:t>
+            </a:r>
+          </a:p>
+          <a:p>
+            <a:pPr marL="457200" indent="-457200">
               <a:spcBef>
                 <a:spcPts val="0"/>
               </a:spcBef>
             </a:pPr>
             <a:r>
               <a:rPr lang="en" dirty="0" smtClean="0"/>
-              <a:t>Introduce client</a:t>
-            </a:r>
-          </a:p>
-          <a:p>
-            <a:pPr marL="457200" indent="-228600">
-              <a:spcBef>
-                <a:spcPts val="0"/>
-              </a:spcBef>
-            </a:pPr>
-            <a:r>
-              <a:rPr lang="en" dirty="0" smtClean="0"/>
-              <a:t>Put project in context</a:t>
-            </a:r>
-          </a:p>
-          <a:p>
-            <a:pPr marL="457200" lvl="0" indent="-228600" rtl="0">
-              <a:spcBef>
-                <a:spcPts val="0"/>
-              </a:spcBef>
-            </a:pPr>
-            <a:r>
-              <a:rPr lang="en" dirty="0" smtClean="0"/>
-              <a:t>Motivation</a:t>
-            </a:r>
-          </a:p>
-          <a:p>
-            <a:pPr marL="457200" lvl="0" indent="-228600" rtl="0">
-              <a:spcBef>
-                <a:spcPts val="0"/>
-              </a:spcBef>
-            </a:pPr>
-            <a:r>
-              <a:rPr lang="en" dirty="0" smtClean="0"/>
-              <a:t>Goals &amp; objectives</a:t>
-            </a:r>
-          </a:p>
-          <a:p>
-            <a:pPr lvl="0" rtl="0">
-              <a:spcBef>
-                <a:spcPts val="0"/>
-              </a:spcBef>
-              <a:buClr>
-                <a:schemeClr val="dk1"/>
-              </a:buClr>
-              <a:buSzPct val="36666"/>
-              <a:buFont typeface="Arial"/>
+              <a:t>One way: Analyse ciliary beating</a:t>
+            </a:r>
+          </a:p>
+          <a:p>
+            <a:pPr>
+              <a:spcBef>
+                <a:spcPts val="0"/>
+              </a:spcBef>
               <a:buNone/>
             </a:pPr>
             <a:endParaRPr lang="en" dirty="0" smtClean="0"/>
+          </a:p>
+          <a:p>
+            <a:pPr marL="457200" indent="-457200">
+              <a:spcBef>
+                <a:spcPts val="0"/>
+              </a:spcBef>
+              <a:buFont typeface="Symbol" charset="0"/>
+              <a:buChar char=""/>
+            </a:pPr>
+            <a:r>
+              <a:rPr lang="en" dirty="0" smtClean="0"/>
+              <a:t>Goal: </a:t>
+            </a:r>
+          </a:p>
+          <a:p>
+            <a:pPr>
+              <a:spcBef>
+                <a:spcPts val="0"/>
+              </a:spcBef>
+              <a:buNone/>
+            </a:pPr>
+            <a:r>
+              <a:rPr lang="en" b="1" dirty="0" smtClean="0"/>
+              <a:t>Tool for automatic analyis of</a:t>
+            </a:r>
+            <a:r>
+              <a:rPr lang="en" b="1" dirty="0" smtClean="0"/>
+              <a:t> </a:t>
+            </a:r>
+            <a:r>
+              <a:rPr lang="en" b="1" dirty="0" smtClean="0"/>
+              <a:t>ciliary beating movies</a:t>
+            </a:r>
           </a:p>
         </p:txBody>
       </p:sp>
@@ -5811,20 +5478,12 @@
               <a:buNone/>
             </a:pPr>
             <a:r>
-              <a:rPr lang="de-CH" sz="2800" dirty="0" smtClean="0">
+              <a:rPr lang="en" sz="2800" dirty="0" smtClean="0">
                 <a:solidFill>
                   <a:srgbClr val="39C0BA"/>
                 </a:solidFill>
               </a:rPr>
-              <a:t>Goals &amp; </a:t>
-            </a:r>
-            <a:r>
-              <a:rPr lang="de-CH" sz="2800" dirty="0" err="1" smtClean="0">
-                <a:solidFill>
-                  <a:srgbClr val="39C0BA"/>
-                </a:solidFill>
-              </a:rPr>
-              <a:t>Objectives</a:t>
+              <a:t>Goals &amp; Objectives</a:t>
             </a:r>
             <a:endParaRPr lang="en" sz="2800" dirty="0">
               <a:solidFill>
@@ -5836,7 +5495,7 @@
       </p:sp>
       <p:sp>
         <p:nvSpPr>
-          <p:cNvPr id="130" name="Shape 130"/>
+          <p:cNvPr id="7" name="Shape 96"/>
           <p:cNvSpPr txBox="1">
             <a:spLocks noGrp="1"/>
           </p:cNvSpPr>
@@ -5846,18 +5505,85 @@
         </p:nvSpPr>
         <p:spPr>
           <a:xfrm>
-            <a:off x="3801900" y="2885877"/>
-            <a:ext cx="4221599" cy="2401799"/>
+            <a:off x="3467150" y="1366769"/>
+            <a:ext cx="4556326" cy="5201132"/>
           </a:xfrm>
           <a:prstGeom prst="rect">
             <a:avLst/>
           </a:prstGeom>
         </p:spPr>
         <p:txBody>
-          <a:bodyPr lIns="91425" tIns="91425" rIns="91425" bIns="91425" anchor="ctr" anchorCtr="0">
+          <a:bodyPr lIns="91425" tIns="91425" rIns="91425" bIns="91425" anchor="t" anchorCtr="0">
             <a:noAutofit/>
           </a:bodyPr>
           <a:lstStyle/>
+          <a:p>
+            <a:pPr marL="457200" lvl="0" indent="-228600" rtl="0">
+              <a:spcBef>
+                <a:spcPts val="0"/>
+              </a:spcBef>
+            </a:pPr>
+            <a:r>
+              <a:rPr lang="en" sz="2800" dirty="0" smtClean="0"/>
+              <a:t>Batch processing of video data in folder</a:t>
+            </a:r>
+          </a:p>
+          <a:p>
+            <a:pPr marL="457200" indent="-228600">
+              <a:spcBef>
+                <a:spcPts val="0"/>
+              </a:spcBef>
+            </a:pPr>
+            <a:r>
+              <a:rPr lang="en" sz="2800" dirty="0" smtClean="0"/>
+              <a:t>Pre-processing (noise-removal)</a:t>
+            </a:r>
+          </a:p>
+          <a:p>
+            <a:pPr marL="457200" lvl="0" indent="-228600" rtl="0">
+              <a:spcBef>
+                <a:spcPts val="0"/>
+              </a:spcBef>
+            </a:pPr>
+            <a:r>
+              <a:rPr lang="en" sz="2800" dirty="0" smtClean="0"/>
+              <a:t>Surface activity image</a:t>
+            </a:r>
+            <a:endParaRPr lang="en" sz="2800" dirty="0" smtClean="0"/>
+          </a:p>
+          <a:p>
+            <a:pPr marL="457200" lvl="0" indent="-228600" rtl="0">
+              <a:spcBef>
+                <a:spcPts val="0"/>
+              </a:spcBef>
+            </a:pPr>
+            <a:r>
+              <a:rPr lang="en" sz="2800" dirty="0" smtClean="0"/>
+              <a:t>Frequency analysis</a:t>
+            </a:r>
+          </a:p>
+          <a:p>
+            <a:pPr marL="457200" lvl="0" indent="-228600" rtl="0">
+              <a:spcBef>
+                <a:spcPts val="0"/>
+              </a:spcBef>
+            </a:pPr>
+            <a:r>
+              <a:rPr lang="en" sz="2800" dirty="0" smtClean="0"/>
+              <a:t>Multiscale processing</a:t>
+            </a:r>
+          </a:p>
+          <a:p>
+            <a:pPr marL="457200" lvl="0" indent="-228600" rtl="0">
+              <a:spcBef>
+                <a:spcPts val="0"/>
+              </a:spcBef>
+            </a:pPr>
+            <a:r>
+              <a:rPr lang="en" sz="2800" dirty="0" smtClean="0"/>
+              <a:t>Illustration of phase for regions of similar frequency</a:t>
+            </a:r>
+          </a:p>
           <a:p>
             <a:pPr lvl="0" rtl="0">
               <a:spcBef>
@@ -5870,19 +5596,7 @@
               <a:buFont typeface="Arial"/>
               <a:buNone/>
             </a:pPr>
-            <a:r>
-              <a:rPr lang="en" dirty="0" smtClean="0"/>
-              <a:t>Add some images to explain the problem and approach</a:t>
-            </a:r>
-          </a:p>
-          <a:p>
-            <a:pPr lvl="0">
-              <a:spcBef>
-                <a:spcPts val="0"/>
-              </a:spcBef>
-              <a:buNone/>
-            </a:pPr>
-            <a:endParaRPr lang="en" dirty="0"/>
+            <a:endParaRPr lang="en" dirty="0" smtClean="0"/>
           </a:p>
         </p:txBody>
       </p:sp>
@@ -5905,191 +5619,6 @@
 </file>
 
 <file path=ppt/slides/slide5.xml><?xml version="1.0" encoding="utf-8"?>
-<p:sld xmlns:a="http://schemas.openxmlformats.org/drawingml/2006/main" xmlns:r="http://schemas.openxmlformats.org/officeDocument/2006/relationships" xmlns:p="http://schemas.openxmlformats.org/presentationml/2006/main">
-  <p:cSld>
-    <p:spTree>
-      <p:nvGrpSpPr>
-        <p:cNvPr id="1" name="Shape 112"/>
-        <p:cNvGrpSpPr/>
-        <p:nvPr/>
-      </p:nvGrpSpPr>
-      <p:grpSpPr>
-        <a:xfrm>
-          <a:off x="0" y="0"/>
-          <a:ext cx="0" cy="0"/>
-          <a:chOff x="0" y="0"/>
-          <a:chExt cx="0" cy="0"/>
-        </a:xfrm>
-      </p:grpSpPr>
-      <p:sp>
-        <p:nvSpPr>
-          <p:cNvPr id="113" name="Shape 113"/>
-          <p:cNvSpPr txBox="1">
-            <a:spLocks noGrp="1"/>
-          </p:cNvSpPr>
-          <p:nvPr>
-            <p:ph type="body" idx="1"/>
-          </p:nvPr>
-        </p:nvSpPr>
-        <p:spPr>
-          <a:xfrm>
-            <a:off x="1165474" y="1600201"/>
-            <a:ext cx="3306900" cy="4967700"/>
-          </a:xfrm>
-          <a:prstGeom prst="rect">
-            <a:avLst/>
-          </a:prstGeom>
-        </p:spPr>
-        <p:txBody>
-          <a:bodyPr lIns="91425" tIns="91425" rIns="91425" bIns="91425" anchor="t" anchorCtr="0">
-            <a:noAutofit/>
-          </a:bodyPr>
-          <a:lstStyle/>
-          <a:p>
-            <a:pPr lvl="0" rtl="0">
-              <a:spcBef>
-                <a:spcPts val="0"/>
-              </a:spcBef>
-              <a:buNone/>
-            </a:pPr>
-            <a:r>
-              <a:rPr lang="de-CH" b="1" dirty="0" smtClean="0"/>
-              <a:t>Simon</a:t>
-            </a:r>
-          </a:p>
-          <a:p>
-            <a:pPr lvl="0">
-              <a:spcBef>
-                <a:spcPts val="0"/>
-              </a:spcBef>
-              <a:buNone/>
-            </a:pPr>
-            <a:r>
-              <a:rPr lang="de-CH" dirty="0" smtClean="0"/>
-              <a:t>- Simons </a:t>
-            </a:r>
-            <a:r>
-              <a:rPr lang="de-CH" dirty="0" err="1" smtClean="0"/>
-              <a:t>tasks</a:t>
-            </a:r>
-            <a:endParaRPr lang="en" dirty="0"/>
-          </a:p>
-        </p:txBody>
-      </p:sp>
-      <p:sp>
-        <p:nvSpPr>
-          <p:cNvPr id="114" name="Shape 114"/>
-          <p:cNvSpPr txBox="1">
-            <a:spLocks noGrp="1"/>
-          </p:cNvSpPr>
-          <p:nvPr>
-            <p:ph type="title"/>
-          </p:nvPr>
-        </p:nvSpPr>
-        <p:spPr>
-          <a:xfrm>
-            <a:off x="1165475" y="665975"/>
-            <a:ext cx="6858000" cy="459900"/>
-          </a:xfrm>
-          <a:prstGeom prst="rect">
-            <a:avLst/>
-          </a:prstGeom>
-        </p:spPr>
-        <p:txBody>
-          <a:bodyPr lIns="91425" tIns="91425" rIns="91425" bIns="91425" anchor="b" anchorCtr="0">
-            <a:noAutofit/>
-          </a:bodyPr>
-          <a:lstStyle/>
-          <a:p>
-            <a:pPr lvl="0">
-              <a:spcBef>
-                <a:spcPts val="0"/>
-              </a:spcBef>
-              <a:buNone/>
-            </a:pPr>
-            <a:r>
-              <a:rPr lang="de-CH" sz="2800" dirty="0" smtClean="0"/>
-              <a:t>Organisation</a:t>
-            </a:r>
-            <a:endParaRPr lang="en" sz="2800" dirty="0"/>
-          </a:p>
-        </p:txBody>
-      </p:sp>
-      <p:sp>
-        <p:nvSpPr>
-          <p:cNvPr id="115" name="Shape 115"/>
-          <p:cNvSpPr txBox="1">
-            <a:spLocks noGrp="1"/>
-          </p:cNvSpPr>
-          <p:nvPr>
-            <p:ph type="body" idx="2"/>
-          </p:nvPr>
-        </p:nvSpPr>
-        <p:spPr>
-          <a:xfrm>
-            <a:off x="4671569" y="1600201"/>
-            <a:ext cx="3306900" cy="4967700"/>
-          </a:xfrm>
-          <a:prstGeom prst="rect">
-            <a:avLst/>
-          </a:prstGeom>
-        </p:spPr>
-        <p:txBody>
-          <a:bodyPr lIns="91425" tIns="91425" rIns="91425" bIns="91425" anchor="t" anchorCtr="0">
-            <a:noAutofit/>
-          </a:bodyPr>
-          <a:lstStyle/>
-          <a:p>
-            <a:pPr lvl="0" rtl="0">
-              <a:spcBef>
-                <a:spcPts val="0"/>
-              </a:spcBef>
-              <a:buNone/>
-            </a:pPr>
-            <a:r>
-              <a:rPr lang="de-CH" b="1" dirty="0" smtClean="0"/>
-              <a:t>Laurent</a:t>
-            </a:r>
-            <a:endParaRPr lang="en" b="1" dirty="0"/>
-          </a:p>
-          <a:p>
-            <a:pPr lvl="0">
-              <a:spcBef>
-                <a:spcPts val="0"/>
-              </a:spcBef>
-              <a:buNone/>
-            </a:pPr>
-            <a:r>
-              <a:rPr lang="de-CH" dirty="0" smtClean="0"/>
-              <a:t>- Laurents </a:t>
-            </a:r>
-            <a:r>
-              <a:rPr lang="de-CH" dirty="0" err="1" smtClean="0"/>
-              <a:t>tasks</a:t>
-            </a:r>
-            <a:endParaRPr lang="en" dirty="0"/>
-          </a:p>
-        </p:txBody>
-      </p:sp>
-    </p:spTree>
-  </p:cSld>
-  <p:clrMapOvr>
-    <a:masterClrMapping/>
-  </p:clrMapOvr>
-  <p:transition xmlns:p14="http://schemas.microsoft.com/office/powerpoint/2010/main" spd="slow">
-    <p:cut/>
-  </p:transition>
-  <p:timing>
-    <p:tnLst>
-      <p:par>
-        <p:cTn xmlns:p14="http://schemas.microsoft.com/office/powerpoint/2010/main" id="1" dur="indefinite" restart="never" nodeType="tmRoot"/>
-      </p:par>
-    </p:tnLst>
-  </p:timing>
-</p:sld>
-</file>
-
-<file path=ppt/slides/slide6.xml><?xml version="1.0" encoding="utf-8"?>
 <p:sld xmlns:a="http://schemas.openxmlformats.org/drawingml/2006/main" xmlns:r="http://schemas.openxmlformats.org/officeDocument/2006/relationships" xmlns:p="http://schemas.openxmlformats.org/presentationml/2006/main">
   <p:cSld>
     <p:spTree>
@@ -6384,6 +5913,191 @@
 </p:sld>
 </file>
 
+<file path=ppt/slides/slide6.xml><?xml version="1.0" encoding="utf-8"?>
+<p:sld xmlns:a="http://schemas.openxmlformats.org/drawingml/2006/main" xmlns:r="http://schemas.openxmlformats.org/officeDocument/2006/relationships" xmlns:p="http://schemas.openxmlformats.org/presentationml/2006/main">
+  <p:cSld>
+    <p:spTree>
+      <p:nvGrpSpPr>
+        <p:cNvPr id="1" name="Shape 112"/>
+        <p:cNvGrpSpPr/>
+        <p:nvPr/>
+      </p:nvGrpSpPr>
+      <p:grpSpPr>
+        <a:xfrm>
+          <a:off x="0" y="0"/>
+          <a:ext cx="0" cy="0"/>
+          <a:chOff x="0" y="0"/>
+          <a:chExt cx="0" cy="0"/>
+        </a:xfrm>
+      </p:grpSpPr>
+      <p:sp>
+        <p:nvSpPr>
+          <p:cNvPr id="113" name="Shape 113"/>
+          <p:cNvSpPr txBox="1">
+            <a:spLocks noGrp="1"/>
+          </p:cNvSpPr>
+          <p:nvPr>
+            <p:ph type="body" idx="1"/>
+          </p:nvPr>
+        </p:nvSpPr>
+        <p:spPr>
+          <a:xfrm>
+            <a:off x="1165474" y="1600201"/>
+            <a:ext cx="3306900" cy="4967700"/>
+          </a:xfrm>
+          <a:prstGeom prst="rect">
+            <a:avLst/>
+          </a:prstGeom>
+        </p:spPr>
+        <p:txBody>
+          <a:bodyPr lIns="91425" tIns="91425" rIns="91425" bIns="91425" anchor="t" anchorCtr="0">
+            <a:noAutofit/>
+          </a:bodyPr>
+          <a:lstStyle/>
+          <a:p>
+            <a:pPr lvl="0" rtl="0">
+              <a:spcBef>
+                <a:spcPts val="0"/>
+              </a:spcBef>
+              <a:buNone/>
+            </a:pPr>
+            <a:r>
+              <a:rPr lang="de-CH" b="1" dirty="0" smtClean="0"/>
+              <a:t>Simon</a:t>
+            </a:r>
+          </a:p>
+          <a:p>
+            <a:pPr lvl="0">
+              <a:spcBef>
+                <a:spcPts val="0"/>
+              </a:spcBef>
+              <a:buNone/>
+            </a:pPr>
+            <a:r>
+              <a:rPr lang="de-CH" dirty="0" smtClean="0"/>
+              <a:t>- Simons </a:t>
+            </a:r>
+            <a:r>
+              <a:rPr lang="de-CH" dirty="0" err="1" smtClean="0"/>
+              <a:t>tasks</a:t>
+            </a:r>
+            <a:endParaRPr lang="en" dirty="0"/>
+          </a:p>
+        </p:txBody>
+      </p:sp>
+      <p:sp>
+        <p:nvSpPr>
+          <p:cNvPr id="114" name="Shape 114"/>
+          <p:cNvSpPr txBox="1">
+            <a:spLocks noGrp="1"/>
+          </p:cNvSpPr>
+          <p:nvPr>
+            <p:ph type="title"/>
+          </p:nvPr>
+        </p:nvSpPr>
+        <p:spPr>
+          <a:xfrm>
+            <a:off x="1165475" y="665975"/>
+            <a:ext cx="6858000" cy="459900"/>
+          </a:xfrm>
+          <a:prstGeom prst="rect">
+            <a:avLst/>
+          </a:prstGeom>
+        </p:spPr>
+        <p:txBody>
+          <a:bodyPr lIns="91425" tIns="91425" rIns="91425" bIns="91425" anchor="b" anchorCtr="0">
+            <a:noAutofit/>
+          </a:bodyPr>
+          <a:lstStyle/>
+          <a:p>
+            <a:pPr lvl="0">
+              <a:spcBef>
+                <a:spcPts val="0"/>
+              </a:spcBef>
+              <a:buNone/>
+            </a:pPr>
+            <a:r>
+              <a:rPr lang="de-CH" sz="2800" dirty="0" smtClean="0"/>
+              <a:t>Organisation</a:t>
+            </a:r>
+            <a:endParaRPr lang="en" sz="2800" dirty="0"/>
+          </a:p>
+        </p:txBody>
+      </p:sp>
+      <p:sp>
+        <p:nvSpPr>
+          <p:cNvPr id="115" name="Shape 115"/>
+          <p:cNvSpPr txBox="1">
+            <a:spLocks noGrp="1"/>
+          </p:cNvSpPr>
+          <p:nvPr>
+            <p:ph type="body" idx="2"/>
+          </p:nvPr>
+        </p:nvSpPr>
+        <p:spPr>
+          <a:xfrm>
+            <a:off x="4671569" y="1600201"/>
+            <a:ext cx="3306900" cy="4967700"/>
+          </a:xfrm>
+          <a:prstGeom prst="rect">
+            <a:avLst/>
+          </a:prstGeom>
+        </p:spPr>
+        <p:txBody>
+          <a:bodyPr lIns="91425" tIns="91425" rIns="91425" bIns="91425" anchor="t" anchorCtr="0">
+            <a:noAutofit/>
+          </a:bodyPr>
+          <a:lstStyle/>
+          <a:p>
+            <a:pPr lvl="0" rtl="0">
+              <a:spcBef>
+                <a:spcPts val="0"/>
+              </a:spcBef>
+              <a:buNone/>
+            </a:pPr>
+            <a:r>
+              <a:rPr lang="de-CH" b="1" dirty="0" smtClean="0"/>
+              <a:t>Laurent</a:t>
+            </a:r>
+            <a:endParaRPr lang="en" b="1" dirty="0"/>
+          </a:p>
+          <a:p>
+            <a:pPr lvl="0">
+              <a:spcBef>
+                <a:spcPts val="0"/>
+              </a:spcBef>
+              <a:buNone/>
+            </a:pPr>
+            <a:r>
+              <a:rPr lang="de-CH" dirty="0" smtClean="0"/>
+              <a:t>- Laurents </a:t>
+            </a:r>
+            <a:r>
+              <a:rPr lang="de-CH" dirty="0" err="1" smtClean="0"/>
+              <a:t>tasks</a:t>
+            </a:r>
+            <a:endParaRPr lang="en" dirty="0"/>
+          </a:p>
+        </p:txBody>
+      </p:sp>
+    </p:spTree>
+  </p:cSld>
+  <p:clrMapOvr>
+    <a:masterClrMapping/>
+  </p:clrMapOvr>
+  <p:transition xmlns:p14="http://schemas.microsoft.com/office/powerpoint/2010/main" spd="slow">
+    <p:cut/>
+  </p:transition>
+  <p:timing>
+    <p:tnLst>
+      <p:par>
+        <p:cTn xmlns:p14="http://schemas.microsoft.com/office/powerpoint/2010/main" id="1" dur="indefinite" restart="never" nodeType="tmRoot"/>
+      </p:par>
+    </p:tnLst>
+  </p:timing>
+</p:sld>
+</file>
+
 <file path=ppt/slides/slide7.xml><?xml version="1.0" encoding="utf-8"?>
 <p:sld xmlns:a="http://schemas.openxmlformats.org/drawingml/2006/main" xmlns:r="http://schemas.openxmlformats.org/officeDocument/2006/relationships" xmlns:p="http://schemas.openxmlformats.org/presentationml/2006/main">
   <p:cSld>
@@ -6417,18 +6131,10 @@
           <a:lstStyle/>
           <a:p>
             <a:r>
-              <a:rPr lang="en" sz="2800" dirty="0"/>
-              <a:t>Methodology</a:t>
-            </a:r>
-            <a:r>
-              <a:rPr lang="de-CH" sz="2800" dirty="0"/>
-              <a:t> </a:t>
-            </a:r>
-            <a:r>
-              <a:rPr lang="de-CH" sz="2800" dirty="0" smtClean="0"/>
-              <a:t>&amp;Tools</a:t>
-            </a:r>
-            <a:endParaRPr lang="en" sz="2800" dirty="0"/>
+              <a:rPr lang="en" sz="2800" smtClean="0"/>
+              <a:t>Methodology &amp;Tools</a:t>
+            </a:r>
+            <a:endParaRPr lang="en" sz="2800"/>
           </a:p>
         </p:txBody>
       </p:sp>
@@ -6451,57 +6157,38 @@
               <a:buNone/>
             </a:pPr>
             <a:r>
-              <a:rPr lang="de-CH" dirty="0" err="1" smtClean="0"/>
-              <a:t>Methodology</a:t>
-            </a:r>
-            <a:r>
-              <a:rPr lang="de-CH" dirty="0" smtClean="0"/>
-              <a:t>:</a:t>
+              <a:rPr lang="en" smtClean="0"/>
+              <a:t>Methodology:</a:t>
             </a:r>
           </a:p>
           <a:p>
             <a:pPr marL="457200" indent="-457200"/>
             <a:r>
-              <a:rPr lang="de-CH" dirty="0" smtClean="0"/>
-              <a:t>Iterative &amp; </a:t>
-            </a:r>
-            <a:r>
-              <a:rPr lang="de-CH" dirty="0" err="1" smtClean="0"/>
-              <a:t>Incremental</a:t>
-            </a:r>
-            <a:r>
-              <a:rPr lang="de-CH" dirty="0" smtClean="0"/>
-              <a:t> </a:t>
-            </a:r>
-            <a:r>
-              <a:rPr lang="de-CH" dirty="0" err="1" smtClean="0"/>
-              <a:t>Devolopement</a:t>
-            </a:r>
-            <a:endParaRPr lang="de-CH" dirty="0" smtClean="0"/>
+              <a:rPr lang="en" smtClean="0"/>
+              <a:t>Iterative &amp; Incremental Devolopement</a:t>
+            </a:r>
           </a:p>
           <a:p>
             <a:pPr marL="457200" indent="-457200"/>
             <a:r>
-              <a:rPr lang="de-CH" dirty="0" err="1" smtClean="0"/>
+              <a:rPr lang="en" smtClean="0"/>
               <a:t>Scrum</a:t>
             </a:r>
-            <a:endParaRPr lang="de-CH" dirty="0" smtClean="0"/>
           </a:p>
           <a:p>
             <a:pPr marL="457200" indent="-457200"/>
             <a:r>
-              <a:rPr lang="de-CH" dirty="0" err="1" smtClean="0"/>
+              <a:rPr lang="en" smtClean="0"/>
               <a:t>Testing</a:t>
             </a:r>
-            <a:endParaRPr lang="de-CH" dirty="0" smtClean="0"/>
           </a:p>
           <a:p>
             <a:pPr marL="457200" indent="-457200"/>
             <a:r>
-              <a:rPr lang="de-CH" dirty="0" smtClean="0"/>
+              <a:rPr lang="en" smtClean="0"/>
               <a:t>Code Reviews</a:t>
             </a:r>
-            <a:endParaRPr lang="en" dirty="0"/>
+            <a:endParaRPr lang="en"/>
           </a:p>
         </p:txBody>
       </p:sp>
@@ -6524,33 +6211,31 @@
               <a:buNone/>
             </a:pPr>
             <a:r>
-              <a:rPr lang="de-CH" dirty="0" smtClean="0"/>
+              <a:rPr lang="en" smtClean="0"/>
               <a:t>Tools:</a:t>
             </a:r>
           </a:p>
           <a:p>
             <a:pPr marL="457200" indent="-457200"/>
             <a:r>
-              <a:rPr lang="de-CH" dirty="0" err="1" smtClean="0"/>
+              <a:rPr lang="en" smtClean="0"/>
               <a:t>Matlab</a:t>
             </a:r>
-            <a:endParaRPr lang="de-CH" dirty="0" smtClean="0"/>
           </a:p>
           <a:p>
             <a:pPr marL="457200" indent="-457200"/>
             <a:r>
-              <a:rPr lang="de-CH" dirty="0" err="1" smtClean="0"/>
+              <a:rPr lang="en" smtClean="0"/>
               <a:t>Git</a:t>
             </a:r>
-            <a:endParaRPr lang="de-CH" dirty="0" smtClean="0"/>
           </a:p>
           <a:p>
             <a:pPr marL="457200" indent="-457200"/>
             <a:r>
-              <a:rPr lang="de-CH" dirty="0" smtClean="0"/>
+              <a:rPr lang="en" smtClean="0"/>
               <a:t>Taiga</a:t>
             </a:r>
-            <a:endParaRPr lang="en" dirty="0"/>
+            <a:endParaRPr lang="en"/>
           </a:p>
         </p:txBody>
       </p:sp>
@@ -6564,6 +6249,13 @@
   <p:clrMapOvr>
     <a:masterClrMapping/>
   </p:clrMapOvr>
+  <p:timing>
+    <p:tnLst>
+      <p:par>
+        <p:cTn xmlns:p14="http://schemas.microsoft.com/office/powerpoint/2010/main" id="1" dur="indefinite" restart="never" nodeType="tmRoot"/>
+      </p:par>
+    </p:tnLst>
+  </p:timing>
 </p:sld>
 </file>
 
@@ -6600,12 +6292,8 @@
           <a:lstStyle/>
           <a:p>
             <a:r>
-              <a:rPr lang="de-CH" sz="2800" dirty="0" err="1" smtClean="0"/>
-              <a:t>Methodology</a:t>
-            </a:r>
-            <a:r>
-              <a:rPr lang="de-CH" sz="2800" dirty="0" smtClean="0"/>
-              <a:t> &amp;Tools</a:t>
+              <a:rPr lang="en" sz="2800" dirty="0" smtClean="0"/>
+              <a:t>Methodology &amp;Tools</a:t>
             </a:r>
             <a:endParaRPr lang="en" sz="2800" dirty="0"/>
           </a:p>
@@ -6634,7 +6322,7 @@
         <p:spPr>
           <a:xfrm>
             <a:off x="924926" y="1535580"/>
-            <a:ext cx="7979214" cy="4600516"/>
+            <a:ext cx="8219074" cy="4738810"/>
           </a:xfrm>
           <a:prstGeom prst="rect">
             <a:avLst/>
@@ -6651,6 +6339,13 @@
   <p:clrMapOvr>
     <a:masterClrMapping/>
   </p:clrMapOvr>
+  <p:timing>
+    <p:tnLst>
+      <p:par>
+        <p:cTn xmlns:p14="http://schemas.microsoft.com/office/powerpoint/2010/main" id="1" dur="indefinite" restart="never" nodeType="tmRoot"/>
+      </p:par>
+    </p:tnLst>
+  </p:timing>
 </p:sld>
 </file>
 
@@ -6710,187 +6405,60 @@
           <a:lstStyle/>
           <a:p>
             <a:r>
-              <a:rPr lang="de-CH" dirty="0"/>
-              <a:t> </a:t>
-            </a:r>
-            <a:r>
-              <a:rPr lang="de-CH" dirty="0" smtClean="0"/>
-              <a:t>6 Sprints, 2 </a:t>
-            </a:r>
-            <a:r>
-              <a:rPr lang="de-CH" dirty="0" err="1" smtClean="0"/>
-              <a:t>weeks</a:t>
-            </a:r>
-            <a:r>
-              <a:rPr lang="de-CH" dirty="0" smtClean="0"/>
-              <a:t> </a:t>
-            </a:r>
-            <a:r>
-              <a:rPr lang="de-CH" dirty="0" err="1" smtClean="0"/>
-              <a:t>each</a:t>
-            </a:r>
-            <a:endParaRPr lang="de-CH" dirty="0" smtClean="0"/>
-          </a:p>
-          <a:p>
-            <a:r>
-              <a:rPr lang="de-CH" dirty="0"/>
-              <a:t> </a:t>
-            </a:r>
-            <a:r>
-              <a:rPr lang="de-CH" dirty="0" smtClean="0"/>
-              <a:t>Goal: </a:t>
+              <a:rPr lang="en" dirty="0" smtClean="0"/>
+              <a:t> 6 Sprints, 2 weeks each</a:t>
+            </a:r>
+          </a:p>
+          <a:p>
+            <a:r>
+              <a:rPr lang="en" dirty="0" smtClean="0"/>
+              <a:t> Goal: </a:t>
             </a:r>
             <a:br>
-              <a:rPr lang="de-CH" dirty="0" smtClean="0"/>
+              <a:rPr lang="en" dirty="0" smtClean="0"/>
             </a:br>
             <a:r>
-              <a:rPr lang="de-CH" dirty="0" smtClean="0"/>
+              <a:rPr lang="en" dirty="0" smtClean="0"/>
               <a:t>	</a:t>
             </a:r>
             <a:r>
-              <a:rPr lang="de-CH" i="1" dirty="0" err="1" smtClean="0"/>
-              <a:t>Deliverable</a:t>
-            </a:r>
-            <a:r>
-              <a:rPr lang="de-CH" i="1" dirty="0" smtClean="0"/>
-              <a:t> </a:t>
-            </a:r>
-            <a:r>
-              <a:rPr lang="de-CH" i="1" dirty="0" err="1" smtClean="0"/>
-              <a:t>tool</a:t>
-            </a:r>
-            <a:r>
-              <a:rPr lang="de-CH" i="1" dirty="0" smtClean="0"/>
-              <a:t> </a:t>
-            </a:r>
-            <a:r>
-              <a:rPr lang="de-CH" i="1" dirty="0" err="1" smtClean="0"/>
-              <a:t>at</a:t>
-            </a:r>
-            <a:r>
-              <a:rPr lang="de-CH" i="1" dirty="0" smtClean="0"/>
-              <a:t> </a:t>
-            </a:r>
-            <a:r>
-              <a:rPr lang="de-CH" i="1" dirty="0" err="1" smtClean="0"/>
-              <a:t>the</a:t>
-            </a:r>
-            <a:r>
-              <a:rPr lang="de-CH" i="1" dirty="0" smtClean="0"/>
-              <a:t> end </a:t>
-            </a:r>
-            <a:r>
-              <a:rPr lang="de-CH" i="1" dirty="0" err="1" smtClean="0"/>
-              <a:t>of</a:t>
-            </a:r>
-            <a:r>
-              <a:rPr lang="de-CH" i="1" dirty="0" smtClean="0"/>
-              <a:t> 	</a:t>
-            </a:r>
-            <a:r>
-              <a:rPr lang="de-CH" i="1" dirty="0" err="1" smtClean="0"/>
-              <a:t>each</a:t>
-            </a:r>
-            <a:r>
-              <a:rPr lang="de-CH" i="1" dirty="0" smtClean="0"/>
-              <a:t> </a:t>
-            </a:r>
-            <a:r>
-              <a:rPr lang="de-CH" i="1" dirty="0" err="1" smtClean="0"/>
-              <a:t>sprint</a:t>
-            </a:r>
-            <a:r>
-              <a:rPr lang="de-CH" i="1" dirty="0" smtClean="0"/>
-              <a:t>!</a:t>
-            </a:r>
-          </a:p>
-          <a:p>
-            <a:r>
-              <a:rPr lang="de-CH" dirty="0"/>
-              <a:t> </a:t>
-            </a:r>
-            <a:r>
-              <a:rPr lang="de-CH" dirty="0" smtClean="0"/>
-              <a:t>Sprint 1: Minimum </a:t>
-            </a:r>
-            <a:r>
-              <a:rPr lang="de-CH" dirty="0" err="1" smtClean="0"/>
-              <a:t>Requirements</a:t>
-            </a:r>
-            <a:endParaRPr lang="de-CH" dirty="0" smtClean="0"/>
-          </a:p>
-          <a:p>
-            <a:r>
-              <a:rPr lang="de-CH" dirty="0"/>
-              <a:t> </a:t>
-            </a:r>
-            <a:r>
-              <a:rPr lang="de-CH" dirty="0" smtClean="0"/>
-              <a:t>Subsequent </a:t>
-            </a:r>
-            <a:r>
-              <a:rPr lang="de-CH" dirty="0" err="1" smtClean="0"/>
-              <a:t>sprints</a:t>
-            </a:r>
-            <a:r>
-              <a:rPr lang="de-CH" dirty="0" smtClean="0"/>
-              <a:t>:</a:t>
+              <a:rPr lang="en" i="1" dirty="0" smtClean="0"/>
+              <a:t>Deliverable tool at the end of 	each sprint!</a:t>
+            </a:r>
+          </a:p>
+          <a:p>
+            <a:r>
+              <a:rPr lang="en" dirty="0" smtClean="0"/>
+              <a:t> Sprint 1: Minimum Requirements</a:t>
+            </a:r>
+          </a:p>
+          <a:p>
+            <a:r>
+              <a:rPr lang="en" dirty="0" smtClean="0"/>
+              <a:t> Subsequent sprints:</a:t>
             </a:r>
           </a:p>
           <a:p>
             <a:pPr marL="342900" lvl="1" indent="-342900"/>
             <a:r>
-              <a:rPr lang="de-CH" dirty="0"/>
-              <a:t> </a:t>
-            </a:r>
-            <a:r>
-              <a:rPr lang="de-CH" dirty="0" smtClean="0"/>
-              <a:t>Add </a:t>
-            </a:r>
-            <a:r>
-              <a:rPr lang="de-CH" dirty="0" err="1" smtClean="0"/>
-              <a:t>new</a:t>
-            </a:r>
-            <a:r>
-              <a:rPr lang="de-CH" dirty="0" smtClean="0"/>
-              <a:t> </a:t>
-            </a:r>
-            <a:r>
-              <a:rPr lang="de-CH" dirty="0" err="1" smtClean="0"/>
-              <a:t>features</a:t>
-            </a:r>
-            <a:endParaRPr lang="de-CH" dirty="0" smtClean="0"/>
+              <a:rPr lang="en" dirty="0" smtClean="0"/>
+              <a:t> Add new features</a:t>
+            </a:r>
           </a:p>
           <a:p>
             <a:pPr marL="342900" lvl="1" indent="-342900"/>
             <a:r>
-              <a:rPr lang="de-CH" dirty="0"/>
-              <a:t> </a:t>
-            </a:r>
-            <a:r>
-              <a:rPr lang="de-CH" dirty="0" smtClean="0"/>
-              <a:t>Test alternative </a:t>
-            </a:r>
-            <a:r>
-              <a:rPr lang="de-CH" dirty="0" err="1" smtClean="0"/>
-              <a:t>methods</a:t>
-            </a:r>
-            <a:endParaRPr lang="de-CH" dirty="0"/>
+              <a:rPr lang="en" dirty="0" smtClean="0"/>
+              <a:t> Test alternative methods</a:t>
+            </a:r>
           </a:p>
           <a:p>
             <a:pPr marL="342900" lvl="1" indent="-342900"/>
             <a:r>
-              <a:rPr lang="de-CH" dirty="0" smtClean="0"/>
-              <a:t> </a:t>
-            </a:r>
-            <a:r>
-              <a:rPr lang="de-CH" dirty="0" err="1" smtClean="0"/>
-              <a:t>etc</a:t>
-            </a:r>
-            <a:r>
-              <a:rPr lang="de-CH" dirty="0" smtClean="0"/>
-              <a:t> ...</a:t>
-            </a:r>
+              <a:rPr lang="en" dirty="0" smtClean="0"/>
+              <a:t> etc ...</a:t>
+            </a:r>
+            <a:endParaRPr lang="en" dirty="0" smtClean="0"/>
           </a:p>
         </p:txBody>
       </p:sp>
@@ -6904,6 +6472,13 @@
   <p:clrMapOvr>
     <a:masterClrMapping/>
   </p:clrMapOvr>
+  <p:timing>
+    <p:tnLst>
+      <p:par>
+        <p:cTn xmlns:p14="http://schemas.microsoft.com/office/powerpoint/2010/main" id="1" dur="indefinite" restart="never" nodeType="tmRoot"/>
+      </p:par>
+    </p:tnLst>
+  </p:timing>
 </p:sld>
 </file>
 

</xml_diff>

<commit_message>
Added constraints and elems of risks + team members names
</commit_message>
<xml_diff>
--- a/doc/initial-plan.pptx
+++ b/doc/initial-plan.pptx
@@ -5,21 +5,24 @@
     <p:sldMasterId id="2147483658" r:id="rId1"/>
   </p:sldMasterIdLst>
   <p:notesMasterIdLst>
-    <p:notesMasterId r:id="rId14"/>
+    <p:notesMasterId r:id="rId17"/>
   </p:notesMasterIdLst>
   <p:sldIdLst>
     <p:sldId id="256" r:id="rId2"/>
     <p:sldId id="259" r:id="rId3"/>
-    <p:sldId id="261" r:id="rId4"/>
-    <p:sldId id="265" r:id="rId5"/>
-    <p:sldId id="266" r:id="rId6"/>
-    <p:sldId id="263" r:id="rId7"/>
-    <p:sldId id="286" r:id="rId8"/>
-    <p:sldId id="285" r:id="rId9"/>
-    <p:sldId id="287" r:id="rId10"/>
-    <p:sldId id="272" r:id="rId11"/>
-    <p:sldId id="274" r:id="rId12"/>
-    <p:sldId id="279" r:id="rId13"/>
+    <p:sldId id="290" r:id="rId4"/>
+    <p:sldId id="261" r:id="rId5"/>
+    <p:sldId id="265" r:id="rId6"/>
+    <p:sldId id="266" r:id="rId7"/>
+    <p:sldId id="263" r:id="rId8"/>
+    <p:sldId id="286" r:id="rId9"/>
+    <p:sldId id="285" r:id="rId10"/>
+    <p:sldId id="288" r:id="rId11"/>
+    <p:sldId id="287" r:id="rId12"/>
+    <p:sldId id="272" r:id="rId13"/>
+    <p:sldId id="289" r:id="rId14"/>
+    <p:sldId id="274" r:id="rId15"/>
+    <p:sldId id="279" r:id="rId16"/>
   </p:sldIdLst>
   <p:sldSz cx="9144000" cy="6858000" type="screen4x3"/>
   <p:notesSz cx="6858000" cy="9144000"/>
@@ -4302,6 +4305,254 @@
   <p:cSld>
     <p:spTree>
       <p:nvGrpSpPr>
+        <p:cNvPr id="1" name=""/>
+        <p:cNvGrpSpPr/>
+        <p:nvPr/>
+      </p:nvGrpSpPr>
+      <p:grpSpPr>
+        <a:xfrm>
+          <a:off x="0" y="0"/>
+          <a:ext cx="0" cy="0"/>
+          <a:chOff x="0" y="0"/>
+          <a:chExt cx="0" cy="0"/>
+        </a:xfrm>
+      </p:grpSpPr>
+      <p:sp>
+        <p:nvSpPr>
+          <p:cNvPr id="2" name="Titre 1"/>
+          <p:cNvSpPr>
+            <a:spLocks noGrp="1"/>
+          </p:cNvSpPr>
+          <p:nvPr>
+            <p:ph type="title"/>
+          </p:nvPr>
+        </p:nvSpPr>
+        <p:spPr>
+          <a:noFill/>
+          <a:ln>
+            <a:noFill/>
+          </a:ln>
+        </p:spPr>
+        <p:txBody>
+          <a:bodyPr lIns="91425" tIns="91425" rIns="91425" bIns="91425" anchor="b" anchorCtr="0"/>
+          <a:lstStyle/>
+          <a:p>
+            <a:r>
+              <a:rPr lang="en-US" sz="2800" dirty="0" smtClean="0"/>
+              <a:t>Constraints and elements of risk</a:t>
+            </a:r>
+            <a:endParaRPr lang="en-US" sz="2800" dirty="0"/>
+          </a:p>
+        </p:txBody>
+      </p:sp>
+      <p:sp>
+        <p:nvSpPr>
+          <p:cNvPr id="3" name="Espace réservé du texte 2"/>
+          <p:cNvSpPr>
+            <a:spLocks noGrp="1"/>
+          </p:cNvSpPr>
+          <p:nvPr>
+            <p:ph type="body" idx="1"/>
+          </p:nvPr>
+        </p:nvSpPr>
+        <p:spPr/>
+        <p:txBody>
+          <a:bodyPr/>
+          <a:lstStyle/>
+          <a:p>
+            <a:r>
+              <a:rPr lang="en-US" dirty="0" smtClean="0"/>
+              <a:t> </a:t>
+            </a:r>
+            <a:r>
+              <a:rPr lang="en-US" dirty="0" err="1" smtClean="0"/>
+              <a:t>Matlab</a:t>
+            </a:r>
+            <a:r>
+              <a:rPr lang="en-US" dirty="0" smtClean="0"/>
+              <a:t> license</a:t>
+            </a:r>
+          </a:p>
+          <a:p>
+            <a:r>
+              <a:rPr lang="en-US" dirty="0" smtClean="0"/>
+              <a:t> Learning about video processing</a:t>
+            </a:r>
+          </a:p>
+          <a:p>
+            <a:r>
+              <a:rPr lang="en-US" dirty="0" smtClean="0"/>
+              <a:t> Time consumption of the FFT and WT</a:t>
+            </a:r>
+          </a:p>
+          <a:p>
+            <a:r>
+              <a:rPr lang="en-US" dirty="0"/>
+              <a:t> </a:t>
+            </a:r>
+            <a:r>
+              <a:rPr lang="en-US" dirty="0" smtClean="0"/>
+              <a:t>(Encoding?)</a:t>
+            </a:r>
+          </a:p>
+          <a:p>
+            <a:pPr>
+              <a:buNone/>
+            </a:pPr>
+            <a:endParaRPr lang="en-US" dirty="0"/>
+          </a:p>
+        </p:txBody>
+      </p:sp>
+    </p:spTree>
+    <p:extLst>
+      <p:ext uri="{BB962C8B-B14F-4D97-AF65-F5344CB8AC3E}">
+        <p14:creationId xmlns:p14="http://schemas.microsoft.com/office/powerpoint/2010/main" val="4245892774"/>
+      </p:ext>
+    </p:extLst>
+  </p:cSld>
+  <p:clrMapOvr>
+    <a:masterClrMapping/>
+  </p:clrMapOvr>
+</p:sld>
+</file>
+
+<file path=ppt/slides/slide11.xml><?xml version="1.0" encoding="utf-8"?>
+<p:sld xmlns:a="http://schemas.openxmlformats.org/drawingml/2006/main" xmlns:r="http://schemas.openxmlformats.org/officeDocument/2006/relationships" xmlns:p="http://schemas.openxmlformats.org/presentationml/2006/main">
+  <p:cSld>
+    <p:spTree>
+      <p:nvGrpSpPr>
+        <p:cNvPr id="1" name=""/>
+        <p:cNvGrpSpPr/>
+        <p:nvPr/>
+      </p:nvGrpSpPr>
+      <p:grpSpPr>
+        <a:xfrm>
+          <a:off x="0" y="0"/>
+          <a:ext cx="0" cy="0"/>
+          <a:chOff x="0" y="0"/>
+          <a:chExt cx="0" cy="0"/>
+        </a:xfrm>
+      </p:grpSpPr>
+      <p:sp>
+        <p:nvSpPr>
+          <p:cNvPr id="2" name="Title 1"/>
+          <p:cNvSpPr>
+            <a:spLocks noGrp="1"/>
+          </p:cNvSpPr>
+          <p:nvPr>
+            <p:ph type="title"/>
+          </p:nvPr>
+        </p:nvSpPr>
+        <p:spPr/>
+        <p:txBody>
+          <a:bodyPr/>
+          <a:lstStyle/>
+          <a:p>
+            <a:r>
+              <a:rPr lang="de-CH" sz="2800" dirty="0" smtClean="0"/>
+              <a:t>Schedule</a:t>
+            </a:r>
+            <a:endParaRPr lang="en" sz="2800" dirty="0"/>
+          </a:p>
+        </p:txBody>
+      </p:sp>
+      <p:sp>
+        <p:nvSpPr>
+          <p:cNvPr id="3" name="Text Placeholder 2"/>
+          <p:cNvSpPr>
+            <a:spLocks noGrp="1"/>
+          </p:cNvSpPr>
+          <p:nvPr>
+            <p:ph type="body" idx="1"/>
+          </p:nvPr>
+        </p:nvSpPr>
+        <p:spPr/>
+        <p:txBody>
+          <a:bodyPr/>
+          <a:lstStyle/>
+          <a:p>
+            <a:r>
+              <a:rPr lang="en" dirty="0" smtClean="0"/>
+              <a:t> 6 Sprints, 2 weeks each</a:t>
+            </a:r>
+          </a:p>
+          <a:p>
+            <a:r>
+              <a:rPr lang="en" dirty="0" smtClean="0"/>
+              <a:t> Goal: </a:t>
+            </a:r>
+            <a:br>
+              <a:rPr lang="en" dirty="0" smtClean="0"/>
+            </a:br>
+            <a:r>
+              <a:rPr lang="en" dirty="0" smtClean="0"/>
+              <a:t>	</a:t>
+            </a:r>
+            <a:r>
+              <a:rPr lang="en" i="1" dirty="0" smtClean="0"/>
+              <a:t>Deliverable tool at the end of 	each sprint!</a:t>
+            </a:r>
+          </a:p>
+          <a:p>
+            <a:r>
+              <a:rPr lang="en" dirty="0" smtClean="0"/>
+              <a:t> Sprint 1: Minimum Requirements</a:t>
+            </a:r>
+          </a:p>
+          <a:p>
+            <a:r>
+              <a:rPr lang="en" dirty="0" smtClean="0"/>
+              <a:t> Subsequent sprints:</a:t>
+            </a:r>
+          </a:p>
+          <a:p>
+            <a:pPr marL="342900" lvl="1" indent="-342900"/>
+            <a:r>
+              <a:rPr lang="en" dirty="0" smtClean="0"/>
+              <a:t> Add new features</a:t>
+            </a:r>
+          </a:p>
+          <a:p>
+            <a:pPr marL="342900" lvl="1" indent="-342900"/>
+            <a:r>
+              <a:rPr lang="en" dirty="0" smtClean="0"/>
+              <a:t> Test alternative methods</a:t>
+            </a:r>
+          </a:p>
+          <a:p>
+            <a:pPr marL="342900" lvl="1" indent="-342900"/>
+            <a:r>
+              <a:rPr lang="en" dirty="0" smtClean="0"/>
+              <a:t> etc ...</a:t>
+            </a:r>
+          </a:p>
+        </p:txBody>
+      </p:sp>
+    </p:spTree>
+    <p:extLst>
+      <p:ext uri="{BB962C8B-B14F-4D97-AF65-F5344CB8AC3E}">
+        <p14:creationId xmlns:p14="http://schemas.microsoft.com/office/powerpoint/2010/main" val="3177910965"/>
+      </p:ext>
+    </p:extLst>
+  </p:cSld>
+  <p:clrMapOvr>
+    <a:masterClrMapping/>
+  </p:clrMapOvr>
+  <p:timing>
+    <p:tnLst>
+      <p:par>
+        <p:cTn xmlns:p14="http://schemas.microsoft.com/office/powerpoint/2010/main" id="1" dur="indefinite" restart="never" nodeType="tmRoot"/>
+      </p:par>
+    </p:tnLst>
+  </p:timing>
+</p:sld>
+</file>
+
+<file path=ppt/slides/slide12.xml><?xml version="1.0" encoding="utf-8"?>
+<p:sld xmlns:a="http://schemas.openxmlformats.org/drawingml/2006/main" xmlns:r="http://schemas.openxmlformats.org/officeDocument/2006/relationships" xmlns:p="http://schemas.openxmlformats.org/presentationml/2006/main">
+  <p:cSld>
+    <p:spTree>
+      <p:nvGrpSpPr>
         <p:cNvPr id="1" name="Shape 201"/>
         <p:cNvGrpSpPr/>
         <p:nvPr/>
@@ -4346,10 +4597,10 @@
               <a:buNone/>
             </a:pPr>
             <a:r>
-              <a:rPr lang="en" sz="2800" smtClean="0"/>
+              <a:rPr lang="en" sz="2800" dirty="0" smtClean="0"/>
               <a:t>Task Outline (Sprint 1)</a:t>
             </a:r>
-            <a:endParaRPr lang="en" sz="2800"/>
+            <a:endParaRPr lang="en" sz="2800" dirty="0"/>
           </a:p>
         </p:txBody>
       </p:sp>
@@ -4685,7 +4936,155 @@
 </p:sld>
 </file>
 
-<file path=ppt/slides/slide11.xml><?xml version="1.0" encoding="utf-8"?>
+<file path=ppt/slides/slide13.xml><?xml version="1.0" encoding="utf-8"?>
+<p:sld xmlns:a="http://schemas.openxmlformats.org/drawingml/2006/main" xmlns:r="http://schemas.openxmlformats.org/officeDocument/2006/relationships" xmlns:p="http://schemas.openxmlformats.org/presentationml/2006/main">
+  <p:cSld>
+    <p:spTree>
+      <p:nvGrpSpPr>
+        <p:cNvPr id="1" name=""/>
+        <p:cNvGrpSpPr/>
+        <p:nvPr/>
+      </p:nvGrpSpPr>
+      <p:grpSpPr>
+        <a:xfrm>
+          <a:off x="0" y="0"/>
+          <a:ext cx="0" cy="0"/>
+          <a:chOff x="0" y="0"/>
+          <a:chExt cx="0" cy="0"/>
+        </a:xfrm>
+      </p:grpSpPr>
+      <p:sp>
+        <p:nvSpPr>
+          <p:cNvPr id="2" name="Titre 1"/>
+          <p:cNvSpPr>
+            <a:spLocks noGrp="1"/>
+          </p:cNvSpPr>
+          <p:nvPr>
+            <p:ph type="title"/>
+          </p:nvPr>
+        </p:nvSpPr>
+        <p:spPr/>
+        <p:txBody>
+          <a:bodyPr/>
+          <a:lstStyle/>
+          <a:p>
+            <a:r>
+              <a:rPr lang="fr-FR" sz="2800" dirty="0" err="1" smtClean="0"/>
+              <a:t>Research</a:t>
+            </a:r>
+            <a:endParaRPr lang="fr-FR" sz="2800" dirty="0"/>
+          </a:p>
+        </p:txBody>
+      </p:sp>
+      <p:sp>
+        <p:nvSpPr>
+          <p:cNvPr id="3" name="Espace réservé du texte 2"/>
+          <p:cNvSpPr>
+            <a:spLocks noGrp="1"/>
+          </p:cNvSpPr>
+          <p:nvPr>
+            <p:ph type="body" idx="1"/>
+          </p:nvPr>
+        </p:nvSpPr>
+        <p:spPr/>
+        <p:txBody>
+          <a:bodyPr/>
+          <a:lstStyle/>
+          <a:p>
+            <a:r>
+              <a:rPr lang="fr-FR" dirty="0" smtClean="0"/>
+              <a:t> </a:t>
+            </a:r>
+            <a:r>
+              <a:rPr lang="fr-FR" dirty="0" err="1" smtClean="0"/>
+              <a:t>Should</a:t>
+            </a:r>
+            <a:r>
+              <a:rPr lang="fr-FR" dirty="0" smtClean="0"/>
+              <a:t> </a:t>
+            </a:r>
+            <a:r>
+              <a:rPr lang="fr-FR" dirty="0" err="1" smtClean="0"/>
+              <a:t>we</a:t>
+            </a:r>
+            <a:r>
+              <a:rPr lang="fr-FR" dirty="0" smtClean="0"/>
+              <a:t> </a:t>
+            </a:r>
+            <a:r>
+              <a:rPr lang="fr-FR" dirty="0" err="1" smtClean="0"/>
+              <a:t>already</a:t>
+            </a:r>
+            <a:r>
+              <a:rPr lang="fr-FR" dirty="0" smtClean="0"/>
+              <a:t> </a:t>
+            </a:r>
+            <a:r>
+              <a:rPr lang="fr-FR" dirty="0" err="1" smtClean="0"/>
+              <a:t>add</a:t>
+            </a:r>
+            <a:r>
+              <a:rPr lang="fr-FR" dirty="0" smtClean="0"/>
+              <a:t> a </a:t>
+            </a:r>
+            <a:r>
+              <a:rPr lang="fr-FR" dirty="0" err="1" smtClean="0"/>
+              <a:t>slide</a:t>
+            </a:r>
+            <a:r>
+              <a:rPr lang="fr-FR" dirty="0" smtClean="0"/>
+              <a:t> on </a:t>
+            </a:r>
+            <a:r>
+              <a:rPr lang="fr-FR" dirty="0" err="1" smtClean="0"/>
+              <a:t>what</a:t>
+            </a:r>
+            <a:r>
+              <a:rPr lang="fr-FR" dirty="0" smtClean="0"/>
+              <a:t> </a:t>
+            </a:r>
+            <a:r>
+              <a:rPr lang="fr-FR" dirty="0" err="1" smtClean="0"/>
+              <a:t>we</a:t>
+            </a:r>
+            <a:r>
+              <a:rPr lang="fr-FR" dirty="0" smtClean="0"/>
+              <a:t> </a:t>
+            </a:r>
+            <a:r>
+              <a:rPr lang="fr-FR" dirty="0" err="1" smtClean="0"/>
+              <a:t>should</a:t>
+            </a:r>
+            <a:r>
+              <a:rPr lang="fr-FR" dirty="0" smtClean="0"/>
+              <a:t> do for the </a:t>
+            </a:r>
+            <a:r>
+              <a:rPr lang="fr-FR" dirty="0" err="1" smtClean="0"/>
+              <a:t>research</a:t>
+            </a:r>
+            <a:r>
+              <a:rPr lang="fr-FR" dirty="0" smtClean="0"/>
+              <a:t> part?</a:t>
+            </a:r>
+            <a:endParaRPr lang="fr-FR" dirty="0"/>
+          </a:p>
+        </p:txBody>
+      </p:sp>
+    </p:spTree>
+    <p:extLst>
+      <p:ext uri="{BB962C8B-B14F-4D97-AF65-F5344CB8AC3E}">
+        <p14:creationId xmlns:p14="http://schemas.microsoft.com/office/powerpoint/2010/main" val="1063554166"/>
+      </p:ext>
+    </p:extLst>
+  </p:cSld>
+  <p:clrMapOvr>
+    <a:masterClrMapping/>
+  </p:clrMapOvr>
+</p:sld>
+</file>
+
+<file path=ppt/slides/slide14.xml><?xml version="1.0" encoding="utf-8"?>
 <p:sld xmlns:a="http://schemas.openxmlformats.org/drawingml/2006/main" xmlns:r="http://schemas.openxmlformats.org/officeDocument/2006/relationships" xmlns:p="http://schemas.openxmlformats.org/presentationml/2006/main">
   <p:cSld>
     <p:spTree>
@@ -4892,7 +5291,7 @@
 </p:sld>
 </file>
 
-<file path=ppt/slides/slide12.xml><?xml version="1.0" encoding="utf-8"?>
+<file path=ppt/slides/slide15.xml><?xml version="1.0" encoding="utf-8"?>
 <p:sld xmlns:a="http://schemas.openxmlformats.org/drawingml/2006/main" xmlns:r="http://schemas.openxmlformats.org/officeDocument/2006/relationships" xmlns:p="http://schemas.openxmlformats.org/presentationml/2006/main">
   <p:cSld>
     <p:spTree>
@@ -5191,6 +5590,122 @@
   <p:cSld>
     <p:spTree>
       <p:nvGrpSpPr>
+        <p:cNvPr id="1" name=""/>
+        <p:cNvGrpSpPr/>
+        <p:nvPr/>
+      </p:nvGrpSpPr>
+      <p:grpSpPr>
+        <a:xfrm>
+          <a:off x="0" y="0"/>
+          <a:ext cx="0" cy="0"/>
+          <a:chOff x="0" y="0"/>
+          <a:chExt cx="0" cy="0"/>
+        </a:xfrm>
+      </p:grpSpPr>
+      <p:sp>
+        <p:nvSpPr>
+          <p:cNvPr id="2" name="Titre 1"/>
+          <p:cNvSpPr>
+            <a:spLocks noGrp="1"/>
+          </p:cNvSpPr>
+          <p:nvPr>
+            <p:ph type="title"/>
+          </p:nvPr>
+        </p:nvSpPr>
+        <p:spPr/>
+        <p:txBody>
+          <a:bodyPr/>
+          <a:lstStyle/>
+          <a:p>
+            <a:r>
+              <a:rPr lang="en-US" sz="2800" dirty="0" smtClean="0"/>
+              <a:t>People involved in the project</a:t>
+            </a:r>
+            <a:endParaRPr lang="en-US" sz="2800" dirty="0"/>
+          </a:p>
+        </p:txBody>
+      </p:sp>
+      <p:sp>
+        <p:nvSpPr>
+          <p:cNvPr id="3" name="Espace réservé du texte 2"/>
+          <p:cNvSpPr>
+            <a:spLocks noGrp="1"/>
+          </p:cNvSpPr>
+          <p:nvPr>
+            <p:ph type="body" idx="1"/>
+          </p:nvPr>
+        </p:nvSpPr>
+        <p:spPr/>
+        <p:txBody>
+          <a:bodyPr/>
+          <a:lstStyle/>
+          <a:p>
+            <a:r>
+              <a:rPr lang="fr-FR" dirty="0" smtClean="0"/>
+              <a:t> Patrice Leroy</a:t>
+            </a:r>
+          </a:p>
+          <a:p>
+            <a:r>
+              <a:rPr lang="fr-FR" dirty="0"/>
+              <a:t> </a:t>
+            </a:r>
+            <a:r>
+              <a:rPr lang="fr-FR" dirty="0" smtClean="0"/>
+              <a:t>Simon Jenni</a:t>
+            </a:r>
+          </a:p>
+          <a:p>
+            <a:r>
+              <a:rPr lang="fr-FR" dirty="0"/>
+              <a:t> </a:t>
+            </a:r>
+            <a:r>
+              <a:rPr lang="fr-FR" dirty="0" smtClean="0"/>
+              <a:t>Laurent </a:t>
+            </a:r>
+            <a:r>
+              <a:rPr lang="fr-FR" dirty="0" err="1" smtClean="0"/>
+              <a:t>Hayez</a:t>
+            </a:r>
+            <a:endParaRPr lang="fr-FR" dirty="0" smtClean="0"/>
+          </a:p>
+          <a:p>
+            <a:r>
+              <a:rPr lang="fr-FR" dirty="0"/>
+              <a:t> </a:t>
+            </a:r>
+            <a:r>
+              <a:rPr lang="fr-FR" dirty="0" smtClean="0"/>
+              <a:t>(profs?)</a:t>
+            </a:r>
+          </a:p>
+          <a:p>
+            <a:pPr>
+              <a:buNone/>
+            </a:pPr>
+            <a:endParaRPr lang="fr-FR" dirty="0"/>
+          </a:p>
+        </p:txBody>
+      </p:sp>
+    </p:spTree>
+    <p:extLst>
+      <p:ext uri="{BB962C8B-B14F-4D97-AF65-F5344CB8AC3E}">
+        <p14:creationId xmlns:p14="http://schemas.microsoft.com/office/powerpoint/2010/main" val="3851845111"/>
+      </p:ext>
+    </p:extLst>
+  </p:cSld>
+  <p:clrMapOvr>
+    <a:masterClrMapping/>
+  </p:clrMapOvr>
+</p:sld>
+</file>
+
+<file path=ppt/slides/slide4.xml><?xml version="1.0" encoding="utf-8"?>
+<p:sld xmlns:a="http://schemas.openxmlformats.org/drawingml/2006/main" xmlns:r="http://schemas.openxmlformats.org/officeDocument/2006/relationships" xmlns:p="http://schemas.openxmlformats.org/presentationml/2006/main">
+  <p:cSld>
+    <p:spTree>
+      <p:nvGrpSpPr>
         <p:cNvPr id="1" name="Shape 94"/>
         <p:cNvGrpSpPr/>
         <p:nvPr/>
@@ -5296,7 +5811,6 @@
               <a:rPr lang="en" sz="2400" i="1" dirty="0" smtClean="0"/>
               <a:t>	Develope products which potentially 	reduce risk of tobacco consumption</a:t>
             </a:r>
-            <a:endParaRPr lang="en" sz="2400" i="1" dirty="0" smtClean="0"/>
           </a:p>
           <a:p>
             <a:pPr lvl="0" rtl="0">
@@ -5360,15 +5874,7 @@
             </a:pPr>
             <a:r>
               <a:rPr lang="en" b="1" dirty="0" smtClean="0"/>
-              <a:t>Tool for automatic analyis of</a:t>
-            </a:r>
-            <a:r>
-              <a:rPr lang="en" b="1" dirty="0" smtClean="0"/>
-              <a:t> </a:t>
-            </a:r>
-            <a:r>
-              <a:rPr lang="en" b="1" dirty="0" smtClean="0"/>
-              <a:t>ciliary beating movies</a:t>
+              <a:t>Tool for automatic analyis of ciliary beating movies</a:t>
             </a:r>
           </a:p>
         </p:txBody>
@@ -5391,7 +5897,7 @@
 </p:sld>
 </file>
 
-<file path=ppt/slides/slide4.xml><?xml version="1.0" encoding="utf-8"?>
+<file path=ppt/slides/slide5.xml><?xml version="1.0" encoding="utf-8"?>
 <p:sld xmlns:a="http://schemas.openxmlformats.org/drawingml/2006/main" xmlns:r="http://schemas.openxmlformats.org/officeDocument/2006/relationships" xmlns:p="http://schemas.openxmlformats.org/presentationml/2006/main">
   <p:cSld>
     <p:spTree>
@@ -5549,7 +6055,6 @@
               <a:rPr lang="en" sz="2800" dirty="0" smtClean="0"/>
               <a:t>Surface activity image</a:t>
             </a:r>
-            <a:endParaRPr lang="en" sz="2800" dirty="0" smtClean="0"/>
           </a:p>
           <a:p>
             <a:pPr marL="457200" lvl="0" indent="-228600" rtl="0">
@@ -5618,7 +6123,7 @@
 </p:sld>
 </file>
 
-<file path=ppt/slides/slide5.xml><?xml version="1.0" encoding="utf-8"?>
+<file path=ppt/slides/slide6.xml><?xml version="1.0" encoding="utf-8"?>
 <p:sld xmlns:a="http://schemas.openxmlformats.org/drawingml/2006/main" xmlns:r="http://schemas.openxmlformats.org/officeDocument/2006/relationships" xmlns:p="http://schemas.openxmlformats.org/presentationml/2006/main">
   <p:cSld>
     <p:spTree>
@@ -5773,7 +6278,7 @@
               </a:rPr>
               <a:t>?</a:t>
             </a:r>
-            <a:endParaRPr lang="en" sz="1800" dirty="0">
+            <a:endParaRPr lang="fr-CH" sz="1800" dirty="0" smtClean="0">
               <a:solidFill>
                 <a:srgbClr val="F3F3F3"/>
               </a:solidFill>
@@ -5913,7 +6418,7 @@
 </p:sld>
 </file>
 
-<file path=ppt/slides/slide6.xml><?xml version="1.0" encoding="utf-8"?>
+<file path=ppt/slides/slide7.xml><?xml version="1.0" encoding="utf-8"?>
 <p:sld xmlns:a="http://schemas.openxmlformats.org/drawingml/2006/main" xmlns:r="http://schemas.openxmlformats.org/officeDocument/2006/relationships" xmlns:p="http://schemas.openxmlformats.org/presentationml/2006/main">
   <p:cSld>
     <p:spTree>
@@ -6088,167 +6593,6 @@
   <p:transition xmlns:p14="http://schemas.microsoft.com/office/powerpoint/2010/main" spd="slow">
     <p:cut/>
   </p:transition>
-  <p:timing>
-    <p:tnLst>
-      <p:par>
-        <p:cTn xmlns:p14="http://schemas.microsoft.com/office/powerpoint/2010/main" id="1" dur="indefinite" restart="never" nodeType="tmRoot"/>
-      </p:par>
-    </p:tnLst>
-  </p:timing>
-</p:sld>
-</file>
-
-<file path=ppt/slides/slide7.xml><?xml version="1.0" encoding="utf-8"?>
-<p:sld xmlns:a="http://schemas.openxmlformats.org/drawingml/2006/main" xmlns:r="http://schemas.openxmlformats.org/officeDocument/2006/relationships" xmlns:p="http://schemas.openxmlformats.org/presentationml/2006/main">
-  <p:cSld>
-    <p:spTree>
-      <p:nvGrpSpPr>
-        <p:cNvPr id="1" name=""/>
-        <p:cNvGrpSpPr/>
-        <p:nvPr/>
-      </p:nvGrpSpPr>
-      <p:grpSpPr>
-        <a:xfrm>
-          <a:off x="0" y="0"/>
-          <a:ext cx="0" cy="0"/>
-          <a:chOff x="0" y="0"/>
-          <a:chExt cx="0" cy="0"/>
-        </a:xfrm>
-      </p:grpSpPr>
-      <p:sp>
-        <p:nvSpPr>
-          <p:cNvPr id="2" name="Title 1"/>
-          <p:cNvSpPr>
-            <a:spLocks noGrp="1"/>
-          </p:cNvSpPr>
-          <p:nvPr>
-            <p:ph type="title"/>
-          </p:nvPr>
-        </p:nvSpPr>
-        <p:spPr/>
-        <p:txBody>
-          <a:bodyPr/>
-          <a:lstStyle/>
-          <a:p>
-            <a:r>
-              <a:rPr lang="en" sz="2800" smtClean="0"/>
-              <a:t>Methodology &amp;Tools</a:t>
-            </a:r>
-            <a:endParaRPr lang="en" sz="2800"/>
-          </a:p>
-        </p:txBody>
-      </p:sp>
-      <p:sp>
-        <p:nvSpPr>
-          <p:cNvPr id="3" name="Text Placeholder 2"/>
-          <p:cNvSpPr>
-            <a:spLocks noGrp="1"/>
-          </p:cNvSpPr>
-          <p:nvPr>
-            <p:ph type="body" idx="1"/>
-          </p:nvPr>
-        </p:nvSpPr>
-        <p:spPr/>
-        <p:txBody>
-          <a:bodyPr/>
-          <a:lstStyle/>
-          <a:p>
-            <a:pPr>
-              <a:buNone/>
-            </a:pPr>
-            <a:r>
-              <a:rPr lang="en" smtClean="0"/>
-              <a:t>Methodology:</a:t>
-            </a:r>
-          </a:p>
-          <a:p>
-            <a:pPr marL="457200" indent="-457200"/>
-            <a:r>
-              <a:rPr lang="en" smtClean="0"/>
-              <a:t>Iterative &amp; Incremental Devolopement</a:t>
-            </a:r>
-          </a:p>
-          <a:p>
-            <a:pPr marL="457200" indent="-457200"/>
-            <a:r>
-              <a:rPr lang="en" smtClean="0"/>
-              <a:t>Scrum</a:t>
-            </a:r>
-          </a:p>
-          <a:p>
-            <a:pPr marL="457200" indent="-457200"/>
-            <a:r>
-              <a:rPr lang="en" smtClean="0"/>
-              <a:t>Testing</a:t>
-            </a:r>
-          </a:p>
-          <a:p>
-            <a:pPr marL="457200" indent="-457200"/>
-            <a:r>
-              <a:rPr lang="en" smtClean="0"/>
-              <a:t>Code Reviews</a:t>
-            </a:r>
-            <a:endParaRPr lang="en"/>
-          </a:p>
-        </p:txBody>
-      </p:sp>
-      <p:sp>
-        <p:nvSpPr>
-          <p:cNvPr id="4" name="Text Placeholder 3"/>
-          <p:cNvSpPr>
-            <a:spLocks noGrp="1"/>
-          </p:cNvSpPr>
-          <p:nvPr>
-            <p:ph type="body" idx="2"/>
-          </p:nvPr>
-        </p:nvSpPr>
-        <p:spPr/>
-        <p:txBody>
-          <a:bodyPr/>
-          <a:lstStyle/>
-          <a:p>
-            <a:pPr>
-              <a:buNone/>
-            </a:pPr>
-            <a:r>
-              <a:rPr lang="en" smtClean="0"/>
-              <a:t>Tools:</a:t>
-            </a:r>
-          </a:p>
-          <a:p>
-            <a:pPr marL="457200" indent="-457200"/>
-            <a:r>
-              <a:rPr lang="en" smtClean="0"/>
-              <a:t>Matlab</a:t>
-            </a:r>
-          </a:p>
-          <a:p>
-            <a:pPr marL="457200" indent="-457200"/>
-            <a:r>
-              <a:rPr lang="en" smtClean="0"/>
-              <a:t>Git</a:t>
-            </a:r>
-          </a:p>
-          <a:p>
-            <a:pPr marL="457200" indent="-457200"/>
-            <a:r>
-              <a:rPr lang="en" smtClean="0"/>
-              <a:t>Taiga</a:t>
-            </a:r>
-            <a:endParaRPr lang="en"/>
-          </a:p>
-        </p:txBody>
-      </p:sp>
-    </p:spTree>
-    <p:extLst>
-      <p:ext uri="{BB962C8B-B14F-4D97-AF65-F5344CB8AC3E}">
-        <p14:creationId xmlns:p14="http://schemas.microsoft.com/office/powerpoint/2010/main" val="999126706"/>
-      </p:ext>
-    </p:extLst>
-  </p:cSld>
-  <p:clrMapOvr>
-    <a:masterClrMapping/>
-  </p:clrMapOvr>
   <p:timing>
     <p:tnLst>
       <p:par>
@@ -6293,46 +6637,129 @@
           <a:p>
             <a:r>
               <a:rPr lang="en" sz="2800" dirty="0" smtClean="0"/>
-              <a:t>Methodology &amp;Tools</a:t>
+              <a:t>Methodology </a:t>
+            </a:r>
+            <a:r>
+              <a:rPr lang="en" sz="2800" dirty="0" smtClean="0"/>
+              <a:t>&amp;</a:t>
+            </a:r>
+            <a:r>
+              <a:rPr lang="fr-CH" sz="2800" dirty="0" smtClean="0"/>
+              <a:t> </a:t>
+            </a:r>
+            <a:r>
+              <a:rPr lang="en" sz="2800" dirty="0" smtClean="0"/>
+              <a:t>Tools</a:t>
             </a:r>
             <a:endParaRPr lang="en" sz="2800" dirty="0"/>
           </a:p>
         </p:txBody>
       </p:sp>
-      <p:pic>
-        <p:nvPicPr>
-          <p:cNvPr id="3" name="Picture 2" descr="Taiga.png"/>
-          <p:cNvPicPr>
-            <a:picLocks noChangeAspect="1"/>
-          </p:cNvPicPr>
-          <p:nvPr/>
-        </p:nvPicPr>
-        <p:blipFill>
-          <a:blip r:embed="rId2">
-            <a:extLst>
-              <a:ext uri="{28A0092B-C50C-407E-A947-70E740481C1C}">
-                <a14:useLocalDpi xmlns:a14="http://schemas.microsoft.com/office/drawing/2010/main" val="0"/>
-              </a:ext>
-            </a:extLst>
-          </a:blip>
-          <a:stretch>
-            <a:fillRect/>
-          </a:stretch>
-        </p:blipFill>
-        <p:spPr>
-          <a:xfrm>
-            <a:off x="924926" y="1535580"/>
-            <a:ext cx="8219074" cy="4738810"/>
-          </a:xfrm>
-          <a:prstGeom prst="rect">
-            <a:avLst/>
-          </a:prstGeom>
-        </p:spPr>
-      </p:pic>
+      <p:sp>
+        <p:nvSpPr>
+          <p:cNvPr id="3" name="Text Placeholder 2"/>
+          <p:cNvSpPr>
+            <a:spLocks noGrp="1"/>
+          </p:cNvSpPr>
+          <p:nvPr>
+            <p:ph type="body" idx="1"/>
+          </p:nvPr>
+        </p:nvSpPr>
+        <p:spPr/>
+        <p:txBody>
+          <a:bodyPr/>
+          <a:lstStyle/>
+          <a:p>
+            <a:pPr>
+              <a:buNone/>
+            </a:pPr>
+            <a:r>
+              <a:rPr lang="en" smtClean="0"/>
+              <a:t>Methodology:</a:t>
+            </a:r>
+          </a:p>
+          <a:p>
+            <a:pPr marL="457200" indent="-457200"/>
+            <a:r>
+              <a:rPr lang="en" smtClean="0"/>
+              <a:t>Iterative &amp; Incremental Devolopement</a:t>
+            </a:r>
+          </a:p>
+          <a:p>
+            <a:pPr marL="457200" indent="-457200"/>
+            <a:r>
+              <a:rPr lang="en" smtClean="0"/>
+              <a:t>Scrum</a:t>
+            </a:r>
+          </a:p>
+          <a:p>
+            <a:pPr marL="457200" indent="-457200"/>
+            <a:r>
+              <a:rPr lang="en" smtClean="0"/>
+              <a:t>Testing</a:t>
+            </a:r>
+          </a:p>
+          <a:p>
+            <a:pPr marL="457200" indent="-457200"/>
+            <a:r>
+              <a:rPr lang="en" smtClean="0"/>
+              <a:t>Code Reviews</a:t>
+            </a:r>
+            <a:endParaRPr lang="en"/>
+          </a:p>
+        </p:txBody>
+      </p:sp>
+      <p:sp>
+        <p:nvSpPr>
+          <p:cNvPr id="4" name="Text Placeholder 3"/>
+          <p:cNvSpPr>
+            <a:spLocks noGrp="1"/>
+          </p:cNvSpPr>
+          <p:nvPr>
+            <p:ph type="body" idx="2"/>
+          </p:nvPr>
+        </p:nvSpPr>
+        <p:spPr/>
+        <p:txBody>
+          <a:bodyPr/>
+          <a:lstStyle/>
+          <a:p>
+            <a:pPr>
+              <a:buNone/>
+            </a:pPr>
+            <a:r>
+              <a:rPr lang="en" dirty="0" smtClean="0"/>
+              <a:t>Tools:</a:t>
+            </a:r>
+          </a:p>
+          <a:p>
+            <a:pPr marL="457200" indent="-457200"/>
+            <a:r>
+              <a:rPr lang="en" dirty="0" smtClean="0"/>
+              <a:t>Matlab</a:t>
+            </a:r>
+          </a:p>
+          <a:p>
+            <a:pPr marL="457200" indent="-457200"/>
+            <a:r>
+              <a:rPr lang="en" dirty="0" smtClean="0"/>
+              <a:t>Git</a:t>
+            </a:r>
+          </a:p>
+          <a:p>
+            <a:pPr marL="457200" indent="-457200"/>
+            <a:r>
+              <a:rPr lang="en" dirty="0" smtClean="0"/>
+              <a:t>Taiga</a:t>
+            </a:r>
+            <a:endParaRPr lang="en" dirty="0"/>
+          </a:p>
+        </p:txBody>
+      </p:sp>
     </p:spTree>
     <p:extLst>
       <p:ext uri="{BB962C8B-B14F-4D97-AF65-F5344CB8AC3E}">
-        <p14:creationId xmlns:p14="http://schemas.microsoft.com/office/powerpoint/2010/main" val="3674938669"/>
+        <p14:creationId xmlns:p14="http://schemas.microsoft.com/office/powerpoint/2010/main" val="999126706"/>
       </p:ext>
     </p:extLst>
   </p:cSld>
@@ -6382,90 +6809,47 @@
           <a:lstStyle/>
           <a:p>
             <a:r>
-              <a:rPr lang="de-CH" sz="2800" dirty="0" smtClean="0"/>
-              <a:t>Schedule</a:t>
+              <a:rPr lang="en" sz="2800" dirty="0" smtClean="0"/>
+              <a:t>Methodology &amp;Tools</a:t>
             </a:r>
             <a:endParaRPr lang="en" sz="2800" dirty="0"/>
           </a:p>
         </p:txBody>
       </p:sp>
-      <p:sp>
-        <p:nvSpPr>
-          <p:cNvPr id="3" name="Text Placeholder 2"/>
-          <p:cNvSpPr>
-            <a:spLocks noGrp="1"/>
-          </p:cNvSpPr>
-          <p:nvPr>
-            <p:ph type="body" idx="1"/>
-          </p:nvPr>
-        </p:nvSpPr>
-        <p:spPr/>
-        <p:txBody>
-          <a:bodyPr/>
-          <a:lstStyle/>
-          <a:p>
-            <a:r>
-              <a:rPr lang="en" dirty="0" smtClean="0"/>
-              <a:t> 6 Sprints, 2 weeks each</a:t>
-            </a:r>
-          </a:p>
-          <a:p>
-            <a:r>
-              <a:rPr lang="en" dirty="0" smtClean="0"/>
-              <a:t> Goal: </a:t>
-            </a:r>
-            <a:br>
-              <a:rPr lang="en" dirty="0" smtClean="0"/>
-            </a:br>
-            <a:r>
-              <a:rPr lang="en" dirty="0" smtClean="0"/>
-              <a:t>	</a:t>
-            </a:r>
-            <a:r>
-              <a:rPr lang="en" i="1" dirty="0" smtClean="0"/>
-              <a:t>Deliverable tool at the end of 	each sprint!</a:t>
-            </a:r>
-          </a:p>
-          <a:p>
-            <a:r>
-              <a:rPr lang="en" dirty="0" smtClean="0"/>
-              <a:t> Sprint 1: Minimum Requirements</a:t>
-            </a:r>
-          </a:p>
-          <a:p>
-            <a:r>
-              <a:rPr lang="en" dirty="0" smtClean="0"/>
-              <a:t> Subsequent sprints:</a:t>
-            </a:r>
-          </a:p>
-          <a:p>
-            <a:pPr marL="342900" lvl="1" indent="-342900"/>
-            <a:r>
-              <a:rPr lang="en" dirty="0" smtClean="0"/>
-              <a:t> Add new features</a:t>
-            </a:r>
-          </a:p>
-          <a:p>
-            <a:pPr marL="342900" lvl="1" indent="-342900"/>
-            <a:r>
-              <a:rPr lang="en" dirty="0" smtClean="0"/>
-              <a:t> Test alternative methods</a:t>
-            </a:r>
-          </a:p>
-          <a:p>
-            <a:pPr marL="342900" lvl="1" indent="-342900"/>
-            <a:r>
-              <a:rPr lang="en" dirty="0" smtClean="0"/>
-              <a:t> etc ...</a:t>
-            </a:r>
-            <a:endParaRPr lang="en" dirty="0" smtClean="0"/>
-          </a:p>
-        </p:txBody>
-      </p:sp>
+      <p:pic>
+        <p:nvPicPr>
+          <p:cNvPr id="3" name="Picture 2" descr="Taiga.png"/>
+          <p:cNvPicPr>
+            <a:picLocks noChangeAspect="1"/>
+          </p:cNvPicPr>
+          <p:nvPr/>
+        </p:nvPicPr>
+        <p:blipFill>
+          <a:blip r:embed="rId2">
+            <a:extLst>
+              <a:ext uri="{28A0092B-C50C-407E-A947-70E740481C1C}">
+                <a14:useLocalDpi xmlns:a14="http://schemas.microsoft.com/office/drawing/2010/main" val="0"/>
+              </a:ext>
+            </a:extLst>
+          </a:blip>
+          <a:stretch>
+            <a:fillRect/>
+          </a:stretch>
+        </p:blipFill>
+        <p:spPr>
+          <a:xfrm>
+            <a:off x="924926" y="1535580"/>
+            <a:ext cx="8219074" cy="4738810"/>
+          </a:xfrm>
+          <a:prstGeom prst="rect">
+            <a:avLst/>
+          </a:prstGeom>
+        </p:spPr>
+      </p:pic>
     </p:spTree>
     <p:extLst>
       <p:ext uri="{BB962C8B-B14F-4D97-AF65-F5344CB8AC3E}">
-        <p14:creationId xmlns:p14="http://schemas.microsoft.com/office/powerpoint/2010/main" val="3177910965"/>
+        <p14:creationId xmlns:p14="http://schemas.microsoft.com/office/powerpoint/2010/main" val="3674938669"/>
       </p:ext>
     </p:extLst>
   </p:cSld>

</xml_diff>

<commit_message>
Modified constraints + elem of risks, added tasks example for both of us, modified order of slides
</commit_message>
<xml_diff>
--- a/doc/initial-plan.pptx
+++ b/doc/initial-plan.pptx
@@ -5,7 +5,7 @@
     <p:sldMasterId id="2147483658" r:id="rId1"/>
   </p:sldMasterIdLst>
   <p:notesMasterIdLst>
-    <p:notesMasterId r:id="rId17"/>
+    <p:notesMasterId r:id="rId16"/>
   </p:notesMasterIdLst>
   <p:sldIdLst>
     <p:sldId id="256" r:id="rId2"/>
@@ -13,16 +13,15 @@
     <p:sldId id="290" r:id="rId4"/>
     <p:sldId id="261" r:id="rId5"/>
     <p:sldId id="265" r:id="rId6"/>
-    <p:sldId id="266" r:id="rId7"/>
-    <p:sldId id="263" r:id="rId8"/>
-    <p:sldId id="286" r:id="rId9"/>
-    <p:sldId id="285" r:id="rId10"/>
-    <p:sldId id="288" r:id="rId11"/>
-    <p:sldId id="287" r:id="rId12"/>
-    <p:sldId id="272" r:id="rId13"/>
-    <p:sldId id="289" r:id="rId14"/>
-    <p:sldId id="274" r:id="rId15"/>
-    <p:sldId id="279" r:id="rId16"/>
+    <p:sldId id="291" r:id="rId7"/>
+    <p:sldId id="286" r:id="rId8"/>
+    <p:sldId id="285" r:id="rId9"/>
+    <p:sldId id="287" r:id="rId10"/>
+    <p:sldId id="272" r:id="rId11"/>
+    <p:sldId id="263" r:id="rId12"/>
+    <p:sldId id="274" r:id="rId13"/>
+    <p:sldId id="288" r:id="rId14"/>
+    <p:sldId id="279" r:id="rId15"/>
   </p:sldIdLst>
   <p:sldSz cx="9144000" cy="6858000" type="screen4x3"/>
   <p:notesSz cx="6858000" cy="9144000"/>
@@ -902,7 +901,7 @@
   <p:cSld>
     <p:spTree>
       <p:nvGrpSpPr>
-        <p:cNvPr id="1" name="Shape 131"/>
+        <p:cNvPr id="1" name="Shape 124"/>
         <p:cNvGrpSpPr/>
         <p:nvPr/>
       </p:nvGrpSpPr>
@@ -916,7 +915,7 @@
       </p:grpSpPr>
       <p:sp>
         <p:nvSpPr>
-          <p:cNvPr id="132" name="Shape 132"/>
+          <p:cNvPr id="125" name="Shape 125"/>
           <p:cNvSpPr>
             <a:spLocks noGrp="1" noRot="1" noChangeAspect="1"/>
           </p:cNvSpPr>
@@ -957,7 +956,7 @@
       </p:sp>
       <p:sp>
         <p:nvSpPr>
-          <p:cNvPr id="133" name="Shape 133"/>
+          <p:cNvPr id="126" name="Shape 126"/>
           <p:cNvSpPr txBox="1">
             <a:spLocks noGrp="1"/>
           </p:cNvSpPr>
@@ -999,6 +998,107 @@
 </file>
 
 <file path=ppt/notesSlides/notesSlide6.xml><?xml version="1.0" encoding="utf-8"?>
+<p:notes xmlns:a="http://schemas.openxmlformats.org/drawingml/2006/main" xmlns:r="http://schemas.openxmlformats.org/officeDocument/2006/relationships" xmlns:p="http://schemas.openxmlformats.org/presentationml/2006/main" showMasterSp="0" showMasterPhAnim="0">
+  <p:cSld>
+    <p:spTree>
+      <p:nvGrpSpPr>
+        <p:cNvPr id="1" name="Shape 198"/>
+        <p:cNvGrpSpPr/>
+        <p:nvPr/>
+      </p:nvGrpSpPr>
+      <p:grpSpPr>
+        <a:xfrm>
+          <a:off x="0" y="0"/>
+          <a:ext cx="0" cy="0"/>
+          <a:chOff x="0" y="0"/>
+          <a:chExt cx="0" cy="0"/>
+        </a:xfrm>
+      </p:grpSpPr>
+      <p:sp>
+        <p:nvSpPr>
+          <p:cNvPr id="199" name="Shape 199"/>
+          <p:cNvSpPr>
+            <a:spLocks noGrp="1" noRot="1" noChangeAspect="1"/>
+          </p:cNvSpPr>
+          <p:nvPr>
+            <p:ph type="sldImg" idx="2"/>
+          </p:nvPr>
+        </p:nvSpPr>
+        <p:spPr>
+          <a:xfrm>
+            <a:off x="1143000" y="685800"/>
+            <a:ext cx="4572000" cy="3429000"/>
+          </a:xfrm>
+          <a:custGeom>
+            <a:avLst/>
+            <a:gdLst/>
+            <a:ahLst/>
+            <a:cxnLst/>
+            <a:rect l="0" t="0" r="0" b="0"/>
+            <a:pathLst>
+              <a:path w="120000" h="120000" extrusionOk="0">
+                <a:moveTo>
+                  <a:pt x="0" y="0"/>
+                </a:moveTo>
+                <a:lnTo>
+                  <a:pt x="120000" y="0"/>
+                </a:lnTo>
+                <a:lnTo>
+                  <a:pt x="120000" y="120000"/>
+                </a:lnTo>
+                <a:lnTo>
+                  <a:pt x="0" y="120000"/>
+                </a:lnTo>
+                <a:close/>
+              </a:path>
+            </a:pathLst>
+          </a:custGeom>
+        </p:spPr>
+      </p:sp>
+      <p:sp>
+        <p:nvSpPr>
+          <p:cNvPr id="200" name="Shape 200"/>
+          <p:cNvSpPr txBox="1">
+            <a:spLocks noGrp="1"/>
+          </p:cNvSpPr>
+          <p:nvPr>
+            <p:ph type="body" idx="1"/>
+          </p:nvPr>
+        </p:nvSpPr>
+        <p:spPr>
+          <a:xfrm>
+            <a:off x="685800" y="4343400"/>
+            <a:ext cx="5486399" cy="4114800"/>
+          </a:xfrm>
+          <a:prstGeom prst="rect">
+            <a:avLst/>
+          </a:prstGeom>
+        </p:spPr>
+        <p:txBody>
+          <a:bodyPr lIns="91425" tIns="91425" rIns="91425" bIns="91425" anchor="t" anchorCtr="0">
+            <a:noAutofit/>
+          </a:bodyPr>
+          <a:lstStyle/>
+          <a:p>
+            <a:pPr lvl="0">
+              <a:spcBef>
+                <a:spcPts val="0"/>
+              </a:spcBef>
+              <a:buNone/>
+            </a:pPr>
+            <a:endParaRPr/>
+          </a:p>
+        </p:txBody>
+      </p:sp>
+    </p:spTree>
+  </p:cSld>
+  <p:clrMapOvr>
+    <a:masterClrMapping/>
+  </p:clrMapOvr>
+</p:notes>
+</file>
+
+<file path=ppt/notesSlides/notesSlide7.xml><?xml version="1.0" encoding="utf-8"?>
 <p:notes xmlns:a="http://schemas.openxmlformats.org/drawingml/2006/main" xmlns:r="http://schemas.openxmlformats.org/officeDocument/2006/relationships" xmlns:p="http://schemas.openxmlformats.org/presentationml/2006/main" showMasterSp="0" showMasterPhAnim="0">
   <p:cSld>
     <p:spTree>
@@ -1059,107 +1159,6 @@
       <p:sp>
         <p:nvSpPr>
           <p:cNvPr id="111" name="Shape 111"/>
-          <p:cNvSpPr txBox="1">
-            <a:spLocks noGrp="1"/>
-          </p:cNvSpPr>
-          <p:nvPr>
-            <p:ph type="body" idx="1"/>
-          </p:nvPr>
-        </p:nvSpPr>
-        <p:spPr>
-          <a:xfrm>
-            <a:off x="685800" y="4343400"/>
-            <a:ext cx="5486399" cy="4114800"/>
-          </a:xfrm>
-          <a:prstGeom prst="rect">
-            <a:avLst/>
-          </a:prstGeom>
-        </p:spPr>
-        <p:txBody>
-          <a:bodyPr lIns="91425" tIns="91425" rIns="91425" bIns="91425" anchor="t" anchorCtr="0">
-            <a:noAutofit/>
-          </a:bodyPr>
-          <a:lstStyle/>
-          <a:p>
-            <a:pPr lvl="0">
-              <a:spcBef>
-                <a:spcPts val="0"/>
-              </a:spcBef>
-              <a:buNone/>
-            </a:pPr>
-            <a:endParaRPr/>
-          </a:p>
-        </p:txBody>
-      </p:sp>
-    </p:spTree>
-  </p:cSld>
-  <p:clrMapOvr>
-    <a:masterClrMapping/>
-  </p:clrMapOvr>
-</p:notes>
-</file>
-
-<file path=ppt/notesSlides/notesSlide7.xml><?xml version="1.0" encoding="utf-8"?>
-<p:notes xmlns:a="http://schemas.openxmlformats.org/drawingml/2006/main" xmlns:r="http://schemas.openxmlformats.org/officeDocument/2006/relationships" xmlns:p="http://schemas.openxmlformats.org/presentationml/2006/main" showMasterSp="0" showMasterPhAnim="0">
-  <p:cSld>
-    <p:spTree>
-      <p:nvGrpSpPr>
-        <p:cNvPr id="1" name="Shape 198"/>
-        <p:cNvGrpSpPr/>
-        <p:nvPr/>
-      </p:nvGrpSpPr>
-      <p:grpSpPr>
-        <a:xfrm>
-          <a:off x="0" y="0"/>
-          <a:ext cx="0" cy="0"/>
-          <a:chOff x="0" y="0"/>
-          <a:chExt cx="0" cy="0"/>
-        </a:xfrm>
-      </p:grpSpPr>
-      <p:sp>
-        <p:nvSpPr>
-          <p:cNvPr id="199" name="Shape 199"/>
-          <p:cNvSpPr>
-            <a:spLocks noGrp="1" noRot="1" noChangeAspect="1"/>
-          </p:cNvSpPr>
-          <p:nvPr>
-            <p:ph type="sldImg" idx="2"/>
-          </p:nvPr>
-        </p:nvSpPr>
-        <p:spPr>
-          <a:xfrm>
-            <a:off x="1143000" y="685800"/>
-            <a:ext cx="4572000" cy="3429000"/>
-          </a:xfrm>
-          <a:custGeom>
-            <a:avLst/>
-            <a:gdLst/>
-            <a:ahLst/>
-            <a:cxnLst/>
-            <a:rect l="0" t="0" r="0" b="0"/>
-            <a:pathLst>
-              <a:path w="120000" h="120000" extrusionOk="0">
-                <a:moveTo>
-                  <a:pt x="0" y="0"/>
-                </a:moveTo>
-                <a:lnTo>
-                  <a:pt x="120000" y="0"/>
-                </a:lnTo>
-                <a:lnTo>
-                  <a:pt x="120000" y="120000"/>
-                </a:lnTo>
-                <a:lnTo>
-                  <a:pt x="0" y="120000"/>
-                </a:lnTo>
-                <a:close/>
-              </a:path>
-            </a:pathLst>
-          </a:custGeom>
-        </p:spPr>
-      </p:sp>
-      <p:sp>
-        <p:nvSpPr>
-          <p:cNvPr id="200" name="Shape 200"/>
           <p:cNvSpPr txBox="1">
             <a:spLocks noGrp="1"/>
           </p:cNvSpPr>
@@ -3122,100 +3121,6 @@
 </file>
 
 <file path=ppt/slideLayouts/slideLayout7.xml><?xml version="1.0" encoding="utf-8"?>
-<p:sldLayout xmlns:a="http://schemas.openxmlformats.org/drawingml/2006/main" xmlns:r="http://schemas.openxmlformats.org/officeDocument/2006/relationships" xmlns:p="http://schemas.openxmlformats.org/presentationml/2006/main" type="blank">
-  <p:cSld name="Blank">
-    <p:spTree>
-      <p:nvGrpSpPr>
-        <p:cNvPr id="1" name="Shape 51"/>
-        <p:cNvGrpSpPr/>
-        <p:nvPr/>
-      </p:nvGrpSpPr>
-      <p:grpSpPr>
-        <a:xfrm>
-          <a:off x="0" y="0"/>
-          <a:ext cx="0" cy="0"/>
-          <a:chOff x="0" y="0"/>
-          <a:chExt cx="0" cy="0"/>
-        </a:xfrm>
-      </p:grpSpPr>
-      <p:cxnSp>
-        <p:nvCxnSpPr>
-          <p:cNvPr id="52" name="Shape 52"/>
-          <p:cNvCxnSpPr/>
-          <p:nvPr/>
-        </p:nvCxnSpPr>
-        <p:spPr>
-          <a:xfrm>
-            <a:off x="903825" y="-7925"/>
-            <a:ext cx="0" cy="6866100"/>
-          </a:xfrm>
-          <a:prstGeom prst="straightConnector1">
-            <a:avLst/>
-          </a:prstGeom>
-          <a:noFill/>
-          <a:ln w="9525" cap="flat" cmpd="sng">
-            <a:solidFill>
-              <a:srgbClr val="999FA9"/>
-            </a:solidFill>
-            <a:prstDash val="solid"/>
-            <a:round/>
-            <a:headEnd type="none" w="lg" len="lg"/>
-            <a:tailEnd type="none" w="lg" len="lg"/>
-          </a:ln>
-        </p:spPr>
-      </p:cxnSp>
-      <p:sp>
-        <p:nvSpPr>
-          <p:cNvPr id="53" name="Shape 53"/>
-          <p:cNvSpPr/>
-          <p:nvPr/>
-        </p:nvSpPr>
-        <p:spPr>
-          <a:xfrm>
-            <a:off x="808650" y="3333900"/>
-            <a:ext cx="190200" cy="190200"/>
-          </a:xfrm>
-          <a:prstGeom prst="ellipse">
-            <a:avLst/>
-          </a:prstGeom>
-          <a:solidFill>
-            <a:srgbClr val="2E3037"/>
-          </a:solidFill>
-          <a:ln w="9525" cap="flat" cmpd="sng">
-            <a:solidFill>
-              <a:srgbClr val="999FA9"/>
-            </a:solidFill>
-            <a:prstDash val="solid"/>
-            <a:round/>
-            <a:headEnd type="none" w="med" len="med"/>
-            <a:tailEnd type="none" w="med" len="med"/>
-          </a:ln>
-        </p:spPr>
-        <p:txBody>
-          <a:bodyPr lIns="91425" tIns="91425" rIns="91425" bIns="91425" anchor="ctr" anchorCtr="0">
-            <a:noAutofit/>
-          </a:bodyPr>
-          <a:lstStyle/>
-          <a:p>
-            <a:pPr lvl="0">
-              <a:spcBef>
-                <a:spcPts val="0"/>
-              </a:spcBef>
-              <a:buNone/>
-            </a:pPr>
-            <a:endParaRPr/>
-          </a:p>
-        </p:txBody>
-      </p:sp>
-    </p:spTree>
-  </p:cSld>
-  <p:clrMapOvr>
-    <a:masterClrMapping/>
-  </p:clrMapOvr>
-</p:sldLayout>
-</file>
-
-<file path=ppt/slideLayouts/slideLayout8.xml><?xml version="1.0" encoding="utf-8"?>
 <p:sldLayout xmlns:a="http://schemas.openxmlformats.org/drawingml/2006/main" xmlns:r="http://schemas.openxmlformats.org/officeDocument/2006/relationships" xmlns:p="http://schemas.openxmlformats.org/presentationml/2006/main">
   <p:cSld name="Blank key color">
     <p:bg>
@@ -3769,8 +3674,7 @@
     <p:sldLayoutId id="2147483652" r:id="rId4"/>
     <p:sldLayoutId id="2147483654" r:id="rId5"/>
     <p:sldLayoutId id="2147483655" r:id="rId6"/>
-    <p:sldLayoutId id="2147483656" r:id="rId7"/>
-    <p:sldLayoutId id="2147483657" r:id="rId8"/>
+    <p:sldLayoutId id="2147483657" r:id="rId7"/>
   </p:sldLayoutIdLst>
   <p:hf sldNum="0" hdr="0" ftr="0" dt="0"/>
   <p:txStyles>
@@ -4305,254 +4209,6 @@
   <p:cSld>
     <p:spTree>
       <p:nvGrpSpPr>
-        <p:cNvPr id="1" name=""/>
-        <p:cNvGrpSpPr/>
-        <p:nvPr/>
-      </p:nvGrpSpPr>
-      <p:grpSpPr>
-        <a:xfrm>
-          <a:off x="0" y="0"/>
-          <a:ext cx="0" cy="0"/>
-          <a:chOff x="0" y="0"/>
-          <a:chExt cx="0" cy="0"/>
-        </a:xfrm>
-      </p:grpSpPr>
-      <p:sp>
-        <p:nvSpPr>
-          <p:cNvPr id="2" name="Titre 1"/>
-          <p:cNvSpPr>
-            <a:spLocks noGrp="1"/>
-          </p:cNvSpPr>
-          <p:nvPr>
-            <p:ph type="title"/>
-          </p:nvPr>
-        </p:nvSpPr>
-        <p:spPr>
-          <a:noFill/>
-          <a:ln>
-            <a:noFill/>
-          </a:ln>
-        </p:spPr>
-        <p:txBody>
-          <a:bodyPr lIns="91425" tIns="91425" rIns="91425" bIns="91425" anchor="b" anchorCtr="0"/>
-          <a:lstStyle/>
-          <a:p>
-            <a:r>
-              <a:rPr lang="en-US" sz="2800" dirty="0" smtClean="0"/>
-              <a:t>Constraints and elements of risk</a:t>
-            </a:r>
-            <a:endParaRPr lang="en-US" sz="2800" dirty="0"/>
-          </a:p>
-        </p:txBody>
-      </p:sp>
-      <p:sp>
-        <p:nvSpPr>
-          <p:cNvPr id="3" name="Espace réservé du texte 2"/>
-          <p:cNvSpPr>
-            <a:spLocks noGrp="1"/>
-          </p:cNvSpPr>
-          <p:nvPr>
-            <p:ph type="body" idx="1"/>
-          </p:nvPr>
-        </p:nvSpPr>
-        <p:spPr/>
-        <p:txBody>
-          <a:bodyPr/>
-          <a:lstStyle/>
-          <a:p>
-            <a:r>
-              <a:rPr lang="en-US" dirty="0" smtClean="0"/>
-              <a:t> </a:t>
-            </a:r>
-            <a:r>
-              <a:rPr lang="en-US" dirty="0" err="1" smtClean="0"/>
-              <a:t>Matlab</a:t>
-            </a:r>
-            <a:r>
-              <a:rPr lang="en-US" dirty="0" smtClean="0"/>
-              <a:t> license</a:t>
-            </a:r>
-          </a:p>
-          <a:p>
-            <a:r>
-              <a:rPr lang="en-US" dirty="0" smtClean="0"/>
-              <a:t> Learning about video processing</a:t>
-            </a:r>
-          </a:p>
-          <a:p>
-            <a:r>
-              <a:rPr lang="en-US" dirty="0" smtClean="0"/>
-              <a:t> Time consumption of the FFT and WT</a:t>
-            </a:r>
-          </a:p>
-          <a:p>
-            <a:r>
-              <a:rPr lang="en-US" dirty="0"/>
-              <a:t> </a:t>
-            </a:r>
-            <a:r>
-              <a:rPr lang="en-US" dirty="0" smtClean="0"/>
-              <a:t>(Encoding?)</a:t>
-            </a:r>
-          </a:p>
-          <a:p>
-            <a:pPr>
-              <a:buNone/>
-            </a:pPr>
-            <a:endParaRPr lang="en-US" dirty="0"/>
-          </a:p>
-        </p:txBody>
-      </p:sp>
-    </p:spTree>
-    <p:extLst>
-      <p:ext uri="{BB962C8B-B14F-4D97-AF65-F5344CB8AC3E}">
-        <p14:creationId xmlns:p14="http://schemas.microsoft.com/office/powerpoint/2010/main" val="4245892774"/>
-      </p:ext>
-    </p:extLst>
-  </p:cSld>
-  <p:clrMapOvr>
-    <a:masterClrMapping/>
-  </p:clrMapOvr>
-</p:sld>
-</file>
-
-<file path=ppt/slides/slide11.xml><?xml version="1.0" encoding="utf-8"?>
-<p:sld xmlns:a="http://schemas.openxmlformats.org/drawingml/2006/main" xmlns:r="http://schemas.openxmlformats.org/officeDocument/2006/relationships" xmlns:p="http://schemas.openxmlformats.org/presentationml/2006/main">
-  <p:cSld>
-    <p:spTree>
-      <p:nvGrpSpPr>
-        <p:cNvPr id="1" name=""/>
-        <p:cNvGrpSpPr/>
-        <p:nvPr/>
-      </p:nvGrpSpPr>
-      <p:grpSpPr>
-        <a:xfrm>
-          <a:off x="0" y="0"/>
-          <a:ext cx="0" cy="0"/>
-          <a:chOff x="0" y="0"/>
-          <a:chExt cx="0" cy="0"/>
-        </a:xfrm>
-      </p:grpSpPr>
-      <p:sp>
-        <p:nvSpPr>
-          <p:cNvPr id="2" name="Title 1"/>
-          <p:cNvSpPr>
-            <a:spLocks noGrp="1"/>
-          </p:cNvSpPr>
-          <p:nvPr>
-            <p:ph type="title"/>
-          </p:nvPr>
-        </p:nvSpPr>
-        <p:spPr/>
-        <p:txBody>
-          <a:bodyPr/>
-          <a:lstStyle/>
-          <a:p>
-            <a:r>
-              <a:rPr lang="de-CH" sz="2800" dirty="0" smtClean="0"/>
-              <a:t>Schedule</a:t>
-            </a:r>
-            <a:endParaRPr lang="en" sz="2800" dirty="0"/>
-          </a:p>
-        </p:txBody>
-      </p:sp>
-      <p:sp>
-        <p:nvSpPr>
-          <p:cNvPr id="3" name="Text Placeholder 2"/>
-          <p:cNvSpPr>
-            <a:spLocks noGrp="1"/>
-          </p:cNvSpPr>
-          <p:nvPr>
-            <p:ph type="body" idx="1"/>
-          </p:nvPr>
-        </p:nvSpPr>
-        <p:spPr/>
-        <p:txBody>
-          <a:bodyPr/>
-          <a:lstStyle/>
-          <a:p>
-            <a:r>
-              <a:rPr lang="en" dirty="0" smtClean="0"/>
-              <a:t> 6 Sprints, 2 weeks each</a:t>
-            </a:r>
-          </a:p>
-          <a:p>
-            <a:r>
-              <a:rPr lang="en" dirty="0" smtClean="0"/>
-              <a:t> Goal: </a:t>
-            </a:r>
-            <a:br>
-              <a:rPr lang="en" dirty="0" smtClean="0"/>
-            </a:br>
-            <a:r>
-              <a:rPr lang="en" dirty="0" smtClean="0"/>
-              <a:t>	</a:t>
-            </a:r>
-            <a:r>
-              <a:rPr lang="en" i="1" dirty="0" smtClean="0"/>
-              <a:t>Deliverable tool at the end of 	each sprint!</a:t>
-            </a:r>
-          </a:p>
-          <a:p>
-            <a:r>
-              <a:rPr lang="en" dirty="0" smtClean="0"/>
-              <a:t> Sprint 1: Minimum Requirements</a:t>
-            </a:r>
-          </a:p>
-          <a:p>
-            <a:r>
-              <a:rPr lang="en" dirty="0" smtClean="0"/>
-              <a:t> Subsequent sprints:</a:t>
-            </a:r>
-          </a:p>
-          <a:p>
-            <a:pPr marL="342900" lvl="1" indent="-342900"/>
-            <a:r>
-              <a:rPr lang="en" dirty="0" smtClean="0"/>
-              <a:t> Add new features</a:t>
-            </a:r>
-          </a:p>
-          <a:p>
-            <a:pPr marL="342900" lvl="1" indent="-342900"/>
-            <a:r>
-              <a:rPr lang="en" dirty="0" smtClean="0"/>
-              <a:t> Test alternative methods</a:t>
-            </a:r>
-          </a:p>
-          <a:p>
-            <a:pPr marL="342900" lvl="1" indent="-342900"/>
-            <a:r>
-              <a:rPr lang="en" dirty="0" smtClean="0"/>
-              <a:t> etc ...</a:t>
-            </a:r>
-          </a:p>
-        </p:txBody>
-      </p:sp>
-    </p:spTree>
-    <p:extLst>
-      <p:ext uri="{BB962C8B-B14F-4D97-AF65-F5344CB8AC3E}">
-        <p14:creationId xmlns:p14="http://schemas.microsoft.com/office/powerpoint/2010/main" val="3177910965"/>
-      </p:ext>
-    </p:extLst>
-  </p:cSld>
-  <p:clrMapOvr>
-    <a:masterClrMapping/>
-  </p:clrMapOvr>
-  <p:timing>
-    <p:tnLst>
-      <p:par>
-        <p:cTn xmlns:p14="http://schemas.microsoft.com/office/powerpoint/2010/main" id="1" dur="indefinite" restart="never" nodeType="tmRoot"/>
-      </p:par>
-    </p:tnLst>
-  </p:timing>
-</p:sld>
-</file>
-
-<file path=ppt/slides/slide12.xml><?xml version="1.0" encoding="utf-8"?>
-<p:sld xmlns:a="http://schemas.openxmlformats.org/drawingml/2006/main" xmlns:r="http://schemas.openxmlformats.org/officeDocument/2006/relationships" xmlns:p="http://schemas.openxmlformats.org/presentationml/2006/main">
-  <p:cSld>
-    <p:spTree>
-      <p:nvGrpSpPr>
         <p:cNvPr id="1" name="Shape 201"/>
         <p:cNvGrpSpPr/>
         <p:nvPr/>
@@ -4738,7 +4394,7 @@
           <a:p>
             <a:pPr lvl="0"/>
             <a:r>
-              <a:rPr lang="en" sz="2000" smtClean="0">
+              <a:rPr lang="en" sz="2000" dirty="0" smtClean="0">
                 <a:solidFill>
                   <a:srgbClr val="F3F3F3"/>
                 </a:solidFill>
@@ -4749,7 +4405,7 @@
               </a:rPr>
               <a:t>2. Frequency analysis per ROI using FFT</a:t>
             </a:r>
-            <a:endParaRPr lang="en" sz="2000">
+            <a:endParaRPr lang="en" sz="2000" dirty="0">
               <a:solidFill>
                 <a:srgbClr val="F3F3F3"/>
               </a:solidFill>
@@ -4918,6 +4574,458 @@
           </a:p>
         </p:txBody>
       </p:sp>
+    </p:spTree>
+  </p:cSld>
+  <p:clrMapOvr>
+    <a:masterClrMapping/>
+  </p:clrMapOvr>
+  <p:transition xmlns:p14="http://schemas.microsoft.com/office/powerpoint/2010/main" spd="slow">
+    <p:cut/>
+  </p:transition>
+  <p:timing>
+    <p:tnLst>
+      <p:par>
+        <p:cTn xmlns:p14="http://schemas.microsoft.com/office/powerpoint/2010/main" id="1" dur="indefinite" restart="never" nodeType="tmRoot"/>
+      </p:par>
+    </p:tnLst>
+  </p:timing>
+</p:sld>
+</file>
+
+<file path=ppt/slides/slide11.xml><?xml version="1.0" encoding="utf-8"?>
+<p:sld xmlns:a="http://schemas.openxmlformats.org/drawingml/2006/main" xmlns:r="http://schemas.openxmlformats.org/officeDocument/2006/relationships" xmlns:p="http://schemas.openxmlformats.org/presentationml/2006/main">
+  <p:cSld>
+    <p:spTree>
+      <p:nvGrpSpPr>
+        <p:cNvPr id="1" name="Shape 112"/>
+        <p:cNvGrpSpPr/>
+        <p:nvPr/>
+      </p:nvGrpSpPr>
+      <p:grpSpPr>
+        <a:xfrm>
+          <a:off x="0" y="0"/>
+          <a:ext cx="0" cy="0"/>
+          <a:chOff x="0" y="0"/>
+          <a:chExt cx="0" cy="0"/>
+        </a:xfrm>
+      </p:grpSpPr>
+      <p:sp>
+        <p:nvSpPr>
+          <p:cNvPr id="113" name="Shape 113"/>
+          <p:cNvSpPr txBox="1">
+            <a:spLocks noGrp="1"/>
+          </p:cNvSpPr>
+          <p:nvPr>
+            <p:ph type="body" idx="1"/>
+          </p:nvPr>
+        </p:nvSpPr>
+        <p:spPr>
+          <a:xfrm>
+            <a:off x="1165474" y="1600201"/>
+            <a:ext cx="3306900" cy="4967700"/>
+          </a:xfrm>
+          <a:prstGeom prst="rect">
+            <a:avLst/>
+          </a:prstGeom>
+        </p:spPr>
+        <p:txBody>
+          <a:bodyPr lIns="91425" tIns="91425" rIns="91425" bIns="91425" anchor="t" anchorCtr="0">
+            <a:noAutofit/>
+          </a:bodyPr>
+          <a:lstStyle/>
+          <a:p>
+            <a:pPr lvl="0" rtl="0">
+              <a:spcBef>
+                <a:spcPts val="0"/>
+              </a:spcBef>
+              <a:buNone/>
+            </a:pPr>
+            <a:r>
+              <a:rPr lang="en" b="1" smtClean="0"/>
+              <a:t>Simon</a:t>
+            </a:r>
+          </a:p>
+          <a:p>
+            <a:pPr marL="457200" lvl="0" indent="-457200">
+              <a:spcBef>
+                <a:spcPts val="0"/>
+              </a:spcBef>
+              <a:buFontTx/>
+              <a:buChar char="-"/>
+            </a:pPr>
+            <a:r>
+              <a:rPr lang="en" smtClean="0"/>
+              <a:t>Load all videos contained in folder and subfolder</a:t>
+            </a:r>
+          </a:p>
+          <a:p>
+            <a:pPr marL="457200" lvl="0" indent="-457200">
+              <a:spcBef>
+                <a:spcPts val="0"/>
+              </a:spcBef>
+              <a:buFontTx/>
+              <a:buChar char="-"/>
+            </a:pPr>
+            <a:r>
+              <a:rPr lang="en" smtClean="0"/>
+              <a:t>Generation of synthetic video data for sanity checks</a:t>
+            </a:r>
+          </a:p>
+          <a:p>
+            <a:pPr marL="457200" lvl="0" indent="-457200">
+              <a:spcBef>
+                <a:spcPts val="0"/>
+              </a:spcBef>
+              <a:buFontTx/>
+              <a:buChar char="-"/>
+            </a:pPr>
+            <a:endParaRPr lang="en" smtClean="0"/>
+          </a:p>
+          <a:p>
+            <a:pPr marL="457200" lvl="0" indent="-457200">
+              <a:spcBef>
+                <a:spcPts val="0"/>
+              </a:spcBef>
+              <a:buFontTx/>
+              <a:buChar char="-"/>
+            </a:pPr>
+            <a:endParaRPr lang="en"/>
+          </a:p>
+        </p:txBody>
+      </p:sp>
+      <p:sp>
+        <p:nvSpPr>
+          <p:cNvPr id="114" name="Shape 114"/>
+          <p:cNvSpPr txBox="1">
+            <a:spLocks noGrp="1"/>
+          </p:cNvSpPr>
+          <p:nvPr>
+            <p:ph type="title"/>
+          </p:nvPr>
+        </p:nvSpPr>
+        <p:spPr>
+          <a:xfrm>
+            <a:off x="1165475" y="665975"/>
+            <a:ext cx="6858000" cy="459900"/>
+          </a:xfrm>
+          <a:prstGeom prst="rect">
+            <a:avLst/>
+          </a:prstGeom>
+        </p:spPr>
+        <p:txBody>
+          <a:bodyPr lIns="91425" tIns="91425" rIns="91425" bIns="91425" anchor="b" anchorCtr="0">
+            <a:noAutofit/>
+          </a:bodyPr>
+          <a:lstStyle/>
+          <a:p>
+            <a:pPr lvl="0">
+              <a:spcBef>
+                <a:spcPts val="0"/>
+              </a:spcBef>
+              <a:buNone/>
+            </a:pPr>
+            <a:r>
+              <a:rPr lang="en" sz="2800" smtClean="0"/>
+              <a:t>Organisation (example)</a:t>
+            </a:r>
+            <a:endParaRPr lang="en" sz="2800"/>
+          </a:p>
+        </p:txBody>
+      </p:sp>
+      <p:sp>
+        <p:nvSpPr>
+          <p:cNvPr id="115" name="Shape 115"/>
+          <p:cNvSpPr txBox="1">
+            <a:spLocks noGrp="1"/>
+          </p:cNvSpPr>
+          <p:nvPr>
+            <p:ph type="body" idx="2"/>
+          </p:nvPr>
+        </p:nvSpPr>
+        <p:spPr>
+          <a:xfrm>
+            <a:off x="4671569" y="1600201"/>
+            <a:ext cx="3306900" cy="4967700"/>
+          </a:xfrm>
+          <a:prstGeom prst="rect">
+            <a:avLst/>
+          </a:prstGeom>
+        </p:spPr>
+        <p:txBody>
+          <a:bodyPr lIns="91425" tIns="91425" rIns="91425" bIns="91425" anchor="t" anchorCtr="0">
+            <a:noAutofit/>
+          </a:bodyPr>
+          <a:lstStyle/>
+          <a:p>
+            <a:pPr lvl="0" rtl="0">
+              <a:spcBef>
+                <a:spcPts val="0"/>
+              </a:spcBef>
+              <a:buNone/>
+            </a:pPr>
+            <a:r>
+              <a:rPr lang="en" b="1" smtClean="0"/>
+              <a:t>Laurent</a:t>
+            </a:r>
+          </a:p>
+          <a:p>
+            <a:pPr marL="457200" lvl="0" indent="-457200">
+              <a:spcBef>
+                <a:spcPts val="0"/>
+              </a:spcBef>
+              <a:buFontTx/>
+              <a:buChar char="-"/>
+            </a:pPr>
+            <a:r>
+              <a:rPr lang="en" smtClean="0"/>
+              <a:t>Extract video data to 3d-array</a:t>
+            </a:r>
+          </a:p>
+          <a:p>
+            <a:pPr marL="457200" lvl="0" indent="-457200">
+              <a:spcBef>
+                <a:spcPts val="0"/>
+              </a:spcBef>
+              <a:buFontTx/>
+              <a:buChar char="-"/>
+            </a:pPr>
+            <a:r>
+              <a:rPr lang="en" smtClean="0"/>
+              <a:t>Save extracted data for later reuse</a:t>
+            </a:r>
+          </a:p>
+          <a:p>
+            <a:pPr marL="457200" lvl="0" indent="-457200">
+              <a:spcBef>
+                <a:spcPts val="0"/>
+              </a:spcBef>
+              <a:buFontTx/>
+              <a:buChar char="-"/>
+            </a:pPr>
+            <a:r>
+              <a:rPr lang="en" smtClean="0"/>
+              <a:t>Add random noise to synthetic generated data</a:t>
+            </a:r>
+          </a:p>
+          <a:p>
+            <a:pPr marL="457200" lvl="0" indent="-457200">
+              <a:spcBef>
+                <a:spcPts val="0"/>
+              </a:spcBef>
+              <a:buFontTx/>
+              <a:buChar char="-"/>
+            </a:pPr>
+            <a:endParaRPr lang="en"/>
+          </a:p>
+        </p:txBody>
+      </p:sp>
+    </p:spTree>
+  </p:cSld>
+  <p:clrMapOvr>
+    <a:masterClrMapping/>
+  </p:clrMapOvr>
+  <p:transition xmlns:p14="http://schemas.microsoft.com/office/powerpoint/2010/main" spd="slow">
+    <p:cut/>
+  </p:transition>
+  <p:timing>
+    <p:tnLst>
+      <p:par>
+        <p:cTn xmlns:p14="http://schemas.microsoft.com/office/powerpoint/2010/main" id="1" dur="indefinite" restart="never" nodeType="tmRoot"/>
+      </p:par>
+    </p:tnLst>
+  </p:timing>
+</p:sld>
+</file>
+
+<file path=ppt/slides/slide12.xml><?xml version="1.0" encoding="utf-8"?>
+<p:sld xmlns:a="http://schemas.openxmlformats.org/drawingml/2006/main" xmlns:r="http://schemas.openxmlformats.org/officeDocument/2006/relationships" xmlns:p="http://schemas.openxmlformats.org/presentationml/2006/main">
+  <p:cSld>
+    <p:spTree>
+      <p:nvGrpSpPr>
+        <p:cNvPr id="1" name="Shape 253"/>
+        <p:cNvGrpSpPr/>
+        <p:nvPr/>
+      </p:nvGrpSpPr>
+      <p:grpSpPr>
+        <a:xfrm>
+          <a:off x="0" y="0"/>
+          <a:ext cx="0" cy="0"/>
+          <a:chOff x="0" y="0"/>
+          <a:chExt cx="0" cy="0"/>
+        </a:xfrm>
+      </p:grpSpPr>
+      <p:sp>
+        <p:nvSpPr>
+          <p:cNvPr id="254" name="Shape 254"/>
+          <p:cNvSpPr txBox="1">
+            <a:spLocks noGrp="1"/>
+          </p:cNvSpPr>
+          <p:nvPr>
+            <p:ph type="body" idx="1"/>
+          </p:nvPr>
+        </p:nvSpPr>
+        <p:spPr>
+          <a:xfrm>
+            <a:off x="1165475" y="5775090"/>
+            <a:ext cx="7521300" cy="578700"/>
+          </a:xfrm>
+          <a:prstGeom prst="rect">
+            <a:avLst/>
+          </a:prstGeom>
+        </p:spPr>
+        <p:txBody>
+          <a:bodyPr lIns="91425" tIns="91425" rIns="91425" bIns="91425" anchor="t" anchorCtr="0">
+            <a:noAutofit/>
+          </a:bodyPr>
+          <a:lstStyle/>
+          <a:p>
+            <a:pPr lvl="0">
+              <a:spcBef>
+                <a:spcPts val="0"/>
+              </a:spcBef>
+              <a:buNone/>
+            </a:pPr>
+            <a:r>
+              <a:rPr lang="de-CH" dirty="0" err="1" smtClean="0">
+                <a:solidFill>
+                  <a:srgbClr val="F3F3F3"/>
+                </a:solidFill>
+              </a:rPr>
+              <a:t>Mayb</a:t>
+            </a:r>
+            <a:r>
+              <a:rPr lang="de-CH" dirty="0" err="1" smtClean="0"/>
+              <a:t>e</a:t>
+            </a:r>
+            <a:r>
+              <a:rPr lang="de-CH" dirty="0" smtClean="0"/>
+              <a:t> a </a:t>
+            </a:r>
+            <a:r>
+              <a:rPr lang="de-CH" dirty="0" err="1" smtClean="0"/>
+              <a:t>graph</a:t>
+            </a:r>
+            <a:r>
+              <a:rPr lang="de-CH" dirty="0" smtClean="0"/>
+              <a:t> </a:t>
+            </a:r>
+            <a:r>
+              <a:rPr lang="de-CH" dirty="0" err="1" smtClean="0"/>
+              <a:t>to</a:t>
+            </a:r>
+            <a:r>
+              <a:rPr lang="de-CH" dirty="0" smtClean="0"/>
+              <a:t> </a:t>
+            </a:r>
+            <a:r>
+              <a:rPr lang="de-CH" dirty="0" err="1" smtClean="0"/>
+              <a:t>show</a:t>
+            </a:r>
+            <a:r>
+              <a:rPr lang="de-CH" dirty="0" smtClean="0"/>
+              <a:t> </a:t>
+            </a:r>
+            <a:r>
+              <a:rPr lang="de-CH" dirty="0" err="1" smtClean="0"/>
+              <a:t>estimated</a:t>
+            </a:r>
+            <a:r>
+              <a:rPr lang="de-CH" dirty="0" smtClean="0"/>
+              <a:t> </a:t>
+            </a:r>
+            <a:r>
+              <a:rPr lang="de-CH" dirty="0" err="1" smtClean="0"/>
+              <a:t>distribution</a:t>
+            </a:r>
+            <a:r>
+              <a:rPr lang="de-CH" dirty="0" smtClean="0"/>
+              <a:t> </a:t>
+            </a:r>
+            <a:r>
+              <a:rPr lang="de-CH" dirty="0" err="1" smtClean="0"/>
+              <a:t>of</a:t>
+            </a:r>
+            <a:r>
+              <a:rPr lang="de-CH" dirty="0" smtClean="0"/>
+              <a:t> time on </a:t>
+            </a:r>
+            <a:r>
+              <a:rPr lang="de-CH" dirty="0" err="1" smtClean="0"/>
+              <a:t>tasks</a:t>
+            </a:r>
+            <a:r>
+              <a:rPr lang="de-CH" dirty="0" smtClean="0"/>
+              <a:t>?</a:t>
+            </a:r>
+            <a:endParaRPr lang="de-CH" dirty="0" smtClean="0">
+              <a:solidFill>
+                <a:srgbClr val="F3F3F3"/>
+              </a:solidFill>
+            </a:endParaRPr>
+          </a:p>
+          <a:p>
+            <a:pPr lvl="0">
+              <a:spcBef>
+                <a:spcPts val="0"/>
+              </a:spcBef>
+              <a:buNone/>
+            </a:pPr>
+            <a:r>
+              <a:rPr lang="en" dirty="0" smtClean="0">
+                <a:solidFill>
+                  <a:srgbClr val="F3F3F3"/>
+                </a:solidFill>
+              </a:rPr>
+              <a:t>You </a:t>
+            </a:r>
+            <a:r>
+              <a:rPr lang="en" dirty="0">
+                <a:solidFill>
+                  <a:srgbClr val="F3F3F3"/>
+                </a:solidFill>
+              </a:rPr>
+              <a:t>can copy&amp;paste graphs from </a:t>
+            </a:r>
+            <a:r>
+              <a:rPr lang="en" u="sng" dirty="0">
+                <a:solidFill>
+                  <a:srgbClr val="F3F3F3"/>
+                </a:solidFill>
+                <a:hlinkClick r:id="rId3"/>
+              </a:rPr>
+              <a:t>Google Sheets</a:t>
+            </a:r>
+          </a:p>
+        </p:txBody>
+      </p:sp>
+      <p:pic>
+        <p:nvPicPr>
+          <p:cNvPr id="255" name="Shape 255"/>
+          <p:cNvPicPr preferRelativeResize="0"/>
+          <p:nvPr/>
+        </p:nvPicPr>
+        <p:blipFill>
+          <a:blip r:embed="rId4">
+            <a:alphaModFix/>
+          </a:blip>
+          <a:stretch>
+            <a:fillRect/>
+          </a:stretch>
+        </p:blipFill>
+        <p:spPr>
+          <a:xfrm>
+            <a:off x="1138239" y="152401"/>
+            <a:ext cx="6867525" cy="5695951"/>
+          </a:xfrm>
+          <a:prstGeom prst="rect">
+            <a:avLst/>
+          </a:prstGeom>
+          <a:noFill/>
+          <a:ln>
+            <a:noFill/>
+          </a:ln>
+        </p:spPr>
+      </p:pic>
     </p:spTree>
   </p:cSld>
   <p:clrMapOvr>
@@ -4963,16 +5071,21 @@
             <p:ph type="title"/>
           </p:nvPr>
         </p:nvSpPr>
-        <p:spPr/>
+        <p:spPr>
+          <a:noFill/>
+          <a:ln>
+            <a:noFill/>
+          </a:ln>
+        </p:spPr>
         <p:txBody>
-          <a:bodyPr/>
+          <a:bodyPr lIns="91425" tIns="91425" rIns="91425" bIns="91425" anchor="b" anchorCtr="0"/>
           <a:lstStyle/>
           <a:p>
             <a:r>
-              <a:rPr lang="fr-FR" sz="2800" dirty="0" err="1" smtClean="0"/>
-              <a:t>Research</a:t>
-            </a:r>
-            <a:endParaRPr lang="fr-FR" sz="2800" dirty="0"/>
+              <a:rPr lang="en-US" sz="2800" dirty="0" smtClean="0"/>
+              <a:t>Constraints and elements of risk</a:t>
+            </a:r>
+            <a:endParaRPr lang="en-US" sz="2800" dirty="0"/>
           </a:p>
         </p:txBody>
       </p:sp>
@@ -4992,295 +5105,79 @@
           <a:lstStyle/>
           <a:p>
             <a:r>
-              <a:rPr lang="fr-FR" dirty="0" smtClean="0"/>
+              <a:rPr lang="en-US" dirty="0" smtClean="0"/>
               <a:t> </a:t>
             </a:r>
             <a:r>
-              <a:rPr lang="fr-FR" dirty="0" err="1" smtClean="0"/>
-              <a:t>Should</a:t>
-            </a:r>
-            <a:r>
-              <a:rPr lang="fr-FR" dirty="0" smtClean="0"/>
+              <a:rPr lang="en-US" dirty="0" smtClean="0"/>
+              <a:t>Learning about video processing</a:t>
+            </a:r>
+          </a:p>
+          <a:p>
+            <a:endParaRPr lang="en-US" dirty="0" smtClean="0"/>
+          </a:p>
+          <a:p>
+            <a:r>
+              <a:rPr lang="en-US" dirty="0"/>
               <a:t> </a:t>
             </a:r>
             <a:r>
-              <a:rPr lang="fr-FR" dirty="0" err="1" smtClean="0"/>
-              <a:t>we</a:t>
-            </a:r>
-            <a:r>
-              <a:rPr lang="fr-FR" dirty="0" smtClean="0"/>
+              <a:rPr lang="en-US" dirty="0" smtClean="0"/>
+              <a:t>Synthetic data </a:t>
+            </a:r>
+            <a:r>
+              <a:rPr lang="en-US" dirty="0" err="1" smtClean="0"/>
+              <a:t>vs</a:t>
+            </a:r>
+            <a:r>
+              <a:rPr lang="en-US" dirty="0" smtClean="0"/>
+              <a:t> real-world data</a:t>
+            </a:r>
+          </a:p>
+          <a:p>
+            <a:endParaRPr lang="en-US" dirty="0" smtClean="0"/>
+          </a:p>
+          <a:p>
+            <a:r>
+              <a:rPr lang="en-US" dirty="0"/>
               <a:t> </a:t>
             </a:r>
             <a:r>
-              <a:rPr lang="fr-FR" dirty="0" err="1" smtClean="0"/>
-              <a:t>already</a:t>
-            </a:r>
-            <a:r>
-              <a:rPr lang="fr-FR" dirty="0" smtClean="0"/>
+              <a:rPr lang="en-US" dirty="0" smtClean="0"/>
+              <a:t>Correctness of the implementations</a:t>
+            </a:r>
+          </a:p>
+          <a:p>
+            <a:endParaRPr lang="en-US" dirty="0" smtClean="0"/>
+          </a:p>
+          <a:p>
+            <a:r>
+              <a:rPr lang="en-US" dirty="0"/>
               <a:t> </a:t>
             </a:r>
             <a:r>
-              <a:rPr lang="fr-FR" dirty="0" err="1" smtClean="0"/>
-              <a:t>add</a:t>
-            </a:r>
-            <a:r>
-              <a:rPr lang="fr-FR" dirty="0" smtClean="0"/>
-              <a:t> a </a:t>
-            </a:r>
-            <a:r>
-              <a:rPr lang="fr-FR" dirty="0" err="1" smtClean="0"/>
-              <a:t>slide</a:t>
-            </a:r>
-            <a:r>
-              <a:rPr lang="fr-FR" dirty="0" smtClean="0"/>
-              <a:t> on </a:t>
-            </a:r>
-            <a:r>
-              <a:rPr lang="fr-FR" dirty="0" err="1" smtClean="0"/>
-              <a:t>what</a:t>
-            </a:r>
-            <a:r>
-              <a:rPr lang="fr-FR" dirty="0" smtClean="0"/>
-              <a:t> </a:t>
-            </a:r>
-            <a:r>
-              <a:rPr lang="fr-FR" dirty="0" err="1" smtClean="0"/>
-              <a:t>we</a:t>
-            </a:r>
-            <a:r>
-              <a:rPr lang="fr-FR" dirty="0" smtClean="0"/>
-              <a:t> </a:t>
-            </a:r>
-            <a:r>
-              <a:rPr lang="fr-FR" dirty="0" err="1" smtClean="0"/>
-              <a:t>should</a:t>
-            </a:r>
-            <a:r>
-              <a:rPr lang="fr-FR" dirty="0" smtClean="0"/>
-              <a:t> do for the </a:t>
-            </a:r>
-            <a:r>
-              <a:rPr lang="fr-FR" dirty="0" err="1" smtClean="0"/>
-              <a:t>research</a:t>
-            </a:r>
-            <a:r>
-              <a:rPr lang="fr-FR" dirty="0" smtClean="0"/>
-              <a:t> part?</a:t>
-            </a:r>
-            <a:endParaRPr lang="fr-FR" dirty="0"/>
+              <a:rPr lang="en-US" dirty="0" smtClean="0"/>
+              <a:t>Evaluation of the performances can be time consuming</a:t>
+            </a:r>
+          </a:p>
+          <a:p>
+            <a:pPr>
+              <a:buNone/>
+            </a:pPr>
+            <a:endParaRPr lang="en-US" dirty="0" smtClean="0"/>
           </a:p>
         </p:txBody>
       </p:sp>
     </p:spTree>
     <p:extLst>
       <p:ext uri="{BB962C8B-B14F-4D97-AF65-F5344CB8AC3E}">
-        <p14:creationId xmlns:p14="http://schemas.microsoft.com/office/powerpoint/2010/main" val="1063554166"/>
+        <p14:creationId xmlns:p14="http://schemas.microsoft.com/office/powerpoint/2010/main" val="4245892774"/>
       </p:ext>
     </p:extLst>
   </p:cSld>
   <p:clrMapOvr>
     <a:masterClrMapping/>
   </p:clrMapOvr>
-</p:sld>
-</file>
-
-<file path=ppt/slides/slide14.xml><?xml version="1.0" encoding="utf-8"?>
-<p:sld xmlns:a="http://schemas.openxmlformats.org/drawingml/2006/main" xmlns:r="http://schemas.openxmlformats.org/officeDocument/2006/relationships" xmlns:p="http://schemas.openxmlformats.org/presentationml/2006/main">
-  <p:cSld>
-    <p:spTree>
-      <p:nvGrpSpPr>
-        <p:cNvPr id="1" name="Shape 253"/>
-        <p:cNvGrpSpPr/>
-        <p:nvPr/>
-      </p:nvGrpSpPr>
-      <p:grpSpPr>
-        <a:xfrm>
-          <a:off x="0" y="0"/>
-          <a:ext cx="0" cy="0"/>
-          <a:chOff x="0" y="0"/>
-          <a:chExt cx="0" cy="0"/>
-        </a:xfrm>
-      </p:grpSpPr>
-      <p:sp>
-        <p:nvSpPr>
-          <p:cNvPr id="254" name="Shape 254"/>
-          <p:cNvSpPr txBox="1">
-            <a:spLocks noGrp="1"/>
-          </p:cNvSpPr>
-          <p:nvPr>
-            <p:ph type="body" idx="1"/>
-          </p:nvPr>
-        </p:nvSpPr>
-        <p:spPr>
-          <a:xfrm>
-            <a:off x="1165475" y="5775090"/>
-            <a:ext cx="7521300" cy="578700"/>
-          </a:xfrm>
-          <a:prstGeom prst="rect">
-            <a:avLst/>
-          </a:prstGeom>
-        </p:spPr>
-        <p:txBody>
-          <a:bodyPr lIns="91425" tIns="91425" rIns="91425" bIns="91425" anchor="t" anchorCtr="0">
-            <a:noAutofit/>
-          </a:bodyPr>
-          <a:lstStyle/>
-          <a:p>
-            <a:pPr lvl="0">
-              <a:spcBef>
-                <a:spcPts val="0"/>
-              </a:spcBef>
-              <a:buNone/>
-            </a:pPr>
-            <a:r>
-              <a:rPr lang="de-CH" dirty="0" err="1" smtClean="0">
-                <a:solidFill>
-                  <a:srgbClr val="F3F3F3"/>
-                </a:solidFill>
-              </a:rPr>
-              <a:t>Mayb</a:t>
-            </a:r>
-            <a:r>
-              <a:rPr lang="de-CH" dirty="0" err="1" smtClean="0"/>
-              <a:t>e</a:t>
-            </a:r>
-            <a:r>
-              <a:rPr lang="de-CH" dirty="0" smtClean="0"/>
-              <a:t> a </a:t>
-            </a:r>
-            <a:r>
-              <a:rPr lang="de-CH" dirty="0" err="1" smtClean="0"/>
-              <a:t>graph</a:t>
-            </a:r>
-            <a:r>
-              <a:rPr lang="de-CH" dirty="0" smtClean="0"/>
-              <a:t> </a:t>
-            </a:r>
-            <a:r>
-              <a:rPr lang="de-CH" dirty="0" err="1" smtClean="0"/>
-              <a:t>to</a:t>
-            </a:r>
-            <a:r>
-              <a:rPr lang="de-CH" dirty="0" smtClean="0"/>
-              <a:t> </a:t>
-            </a:r>
-            <a:r>
-              <a:rPr lang="de-CH" dirty="0" err="1" smtClean="0"/>
-              <a:t>show</a:t>
-            </a:r>
-            <a:r>
-              <a:rPr lang="de-CH" dirty="0" smtClean="0"/>
-              <a:t> </a:t>
-            </a:r>
-            <a:r>
-              <a:rPr lang="de-CH" dirty="0" err="1" smtClean="0"/>
-              <a:t>estimated</a:t>
-            </a:r>
-            <a:r>
-              <a:rPr lang="de-CH" dirty="0" smtClean="0"/>
-              <a:t> </a:t>
-            </a:r>
-            <a:r>
-              <a:rPr lang="de-CH" dirty="0" err="1" smtClean="0"/>
-              <a:t>distribution</a:t>
-            </a:r>
-            <a:r>
-              <a:rPr lang="de-CH" dirty="0" smtClean="0"/>
-              <a:t> </a:t>
-            </a:r>
-            <a:r>
-              <a:rPr lang="de-CH" dirty="0" err="1" smtClean="0"/>
-              <a:t>of</a:t>
-            </a:r>
-            <a:r>
-              <a:rPr lang="de-CH" dirty="0" smtClean="0"/>
-              <a:t> time on </a:t>
-            </a:r>
-            <a:r>
-              <a:rPr lang="de-CH" dirty="0" err="1" smtClean="0"/>
-              <a:t>tasks</a:t>
-            </a:r>
-            <a:r>
-              <a:rPr lang="de-CH" dirty="0" smtClean="0"/>
-              <a:t>?</a:t>
-            </a:r>
-            <a:endParaRPr lang="de-CH" dirty="0" smtClean="0">
-              <a:solidFill>
-                <a:srgbClr val="F3F3F3"/>
-              </a:solidFill>
-            </a:endParaRPr>
-          </a:p>
-          <a:p>
-            <a:pPr lvl="0">
-              <a:spcBef>
-                <a:spcPts val="0"/>
-              </a:spcBef>
-              <a:buNone/>
-            </a:pPr>
-            <a:r>
-              <a:rPr lang="en" dirty="0" smtClean="0">
-                <a:solidFill>
-                  <a:srgbClr val="F3F3F3"/>
-                </a:solidFill>
-              </a:rPr>
-              <a:t>You </a:t>
-            </a:r>
-            <a:r>
-              <a:rPr lang="en" dirty="0">
-                <a:solidFill>
-                  <a:srgbClr val="F3F3F3"/>
-                </a:solidFill>
-              </a:rPr>
-              <a:t>can copy&amp;paste graphs from </a:t>
-            </a:r>
-            <a:r>
-              <a:rPr lang="en" u="sng" dirty="0">
-                <a:solidFill>
-                  <a:srgbClr val="F3F3F3"/>
-                </a:solidFill>
-                <a:hlinkClick r:id="rId3"/>
-              </a:rPr>
-              <a:t>Google Sheets</a:t>
-            </a:r>
-          </a:p>
-        </p:txBody>
-      </p:sp>
-      <p:pic>
-        <p:nvPicPr>
-          <p:cNvPr id="255" name="Shape 255"/>
-          <p:cNvPicPr preferRelativeResize="0"/>
-          <p:nvPr/>
-        </p:nvPicPr>
-        <p:blipFill>
-          <a:blip r:embed="rId4">
-            <a:alphaModFix/>
-          </a:blip>
-          <a:stretch>
-            <a:fillRect/>
-          </a:stretch>
-        </p:blipFill>
-        <p:spPr>
-          <a:xfrm>
-            <a:off x="1138239" y="152401"/>
-            <a:ext cx="6867525" cy="5695951"/>
-          </a:xfrm>
-          <a:prstGeom prst="rect">
-            <a:avLst/>
-          </a:prstGeom>
-          <a:noFill/>
-          <a:ln>
-            <a:noFill/>
-          </a:ln>
-        </p:spPr>
-      </p:pic>
-    </p:spTree>
-  </p:cSld>
-  <p:clrMapOvr>
-    <a:masterClrMapping/>
-  </p:clrMapOvr>
-  <p:transition xmlns:p14="http://schemas.microsoft.com/office/powerpoint/2010/main" spd="slow">
-    <p:cut/>
-  </p:transition>
   <p:timing>
     <p:tnLst>
       <p:par>
@@ -5291,7 +5188,7 @@
 </p:sld>
 </file>
 
-<file path=ppt/slides/slide15.xml><?xml version="1.0" encoding="utf-8"?>
+<file path=ppt/slides/slide14.xml><?xml version="1.0" encoding="utf-8"?>
 <p:sld xmlns:a="http://schemas.openxmlformats.org/drawingml/2006/main" xmlns:r="http://schemas.openxmlformats.org/officeDocument/2006/relationships" xmlns:p="http://schemas.openxmlformats.org/presentationml/2006/main">
   <p:cSld>
     <p:spTree>
@@ -5497,26 +5394,6 @@
               </a:spcBef>
               <a:buNone/>
             </a:pPr>
-            <a:r>
-              <a:rPr lang="de-CH" dirty="0" smtClean="0"/>
-              <a:t>Simon Jenni</a:t>
-            </a:r>
-          </a:p>
-          <a:p>
-            <a:pPr lvl="0" rtl="0">
-              <a:spcBef>
-                <a:spcPts val="0"/>
-              </a:spcBef>
-              <a:buNone/>
-            </a:pPr>
-            <a:r>
-              <a:rPr lang="de-CH" dirty="0" smtClean="0"/>
-              <a:t>Laurent </a:t>
-            </a:r>
-            <a:r>
-              <a:rPr lang="de-CH" dirty="0" err="1" smtClean="0"/>
-              <a:t>Hayez</a:t>
-            </a:r>
             <a:endParaRPr lang="en" dirty="0"/>
           </a:p>
         </p:txBody>
@@ -5619,7 +5496,7 @@
           <a:p>
             <a:r>
               <a:rPr lang="en-US" sz="2800" dirty="0" smtClean="0"/>
-              <a:t>People involved in the project</a:t>
+              <a:t>Team members</a:t>
             </a:r>
             <a:endParaRPr lang="en-US" sz="2800" dirty="0"/>
           </a:p>
@@ -5641,44 +5518,53 @@
           <a:lstStyle/>
           <a:p>
             <a:r>
-              <a:rPr lang="fr-FR" dirty="0" smtClean="0"/>
-              <a:t> Patrice Leroy</a:t>
-            </a:r>
-          </a:p>
-          <a:p>
-            <a:r>
-              <a:rPr lang="fr-FR" dirty="0"/>
-              <a:t> </a:t>
-            </a:r>
-            <a:r>
-              <a:rPr lang="fr-FR" dirty="0" smtClean="0"/>
-              <a:t>Simon Jenni</a:t>
-            </a:r>
-          </a:p>
-          <a:p>
-            <a:r>
-              <a:rPr lang="fr-FR" dirty="0"/>
-              <a:t> </a:t>
-            </a:r>
-            <a:r>
-              <a:rPr lang="fr-FR" dirty="0" smtClean="0"/>
-              <a:t>Laurent </a:t>
-            </a:r>
-            <a:r>
-              <a:rPr lang="fr-FR" dirty="0" err="1" smtClean="0"/>
+              <a:rPr lang="en-US" dirty="0" smtClean="0"/>
+              <a:t> Patrice Leroy (product owner)</a:t>
+            </a:r>
+          </a:p>
+          <a:p>
+            <a:endParaRPr lang="en-US" dirty="0" smtClean="0"/>
+          </a:p>
+          <a:p>
+            <a:r>
+              <a:rPr lang="en-US" dirty="0" smtClean="0"/>
+              <a:t> Simon </a:t>
+            </a:r>
+            <a:r>
+              <a:rPr lang="en-US" dirty="0" err="1" smtClean="0"/>
+              <a:t>Jenni</a:t>
+            </a:r>
+            <a:r>
+              <a:rPr lang="en-US" dirty="0" smtClean="0"/>
+              <a:t> (development</a:t>
+            </a:r>
+            <a:r>
+              <a:rPr lang="en-US" dirty="0" smtClean="0"/>
+              <a:t> team)</a:t>
+            </a:r>
+          </a:p>
+          <a:p>
+            <a:endParaRPr lang="en-US" dirty="0" smtClean="0"/>
+          </a:p>
+          <a:p>
+            <a:r>
+              <a:rPr lang="en-US" dirty="0" smtClean="0"/>
+              <a:t> Laurent </a:t>
+            </a:r>
+            <a:r>
+              <a:rPr lang="en-US" dirty="0" err="1" smtClean="0"/>
               <a:t>Hayez</a:t>
             </a:r>
+            <a:r>
+              <a:rPr lang="en-US" dirty="0" smtClean="0"/>
+              <a:t> (development team)</a:t>
+            </a:r>
+          </a:p>
+          <a:p>
+            <a:pPr>
+              <a:buNone/>
+            </a:pPr>
             <a:endParaRPr lang="fr-FR" dirty="0" smtClean="0"/>
-          </a:p>
-          <a:p>
-            <a:r>
-              <a:rPr lang="fr-FR" dirty="0"/>
-              <a:t> </a:t>
-            </a:r>
-            <a:r>
-              <a:rPr lang="fr-FR" dirty="0" smtClean="0"/>
-              <a:t>(profs?)</a:t>
-            </a:r>
           </a:p>
           <a:p>
             <a:pPr>
@@ -5698,6 +5584,13 @@
   <p:clrMapOvr>
     <a:masterClrMapping/>
   </p:clrMapOvr>
+  <p:timing>
+    <p:tnLst>
+      <p:par>
+        <p:cTn xmlns:p14="http://schemas.microsoft.com/office/powerpoint/2010/main" id="1" dur="indefinite" restart="never" nodeType="tmRoot"/>
+      </p:par>
+    </p:tnLst>
+  </p:timing>
 </p:sld>
 </file>
 
@@ -5989,7 +5882,23 @@
                   <a:srgbClr val="39C0BA"/>
                 </a:solidFill>
               </a:rPr>
-              <a:t>Goals &amp; Objectives</a:t>
+              <a:t>Goals &amp; </a:t>
+            </a:r>
+            <a:r>
+              <a:rPr lang="en" sz="2800" dirty="0" smtClean="0">
+                <a:solidFill>
+                  <a:srgbClr val="39C0BA"/>
+                </a:solidFill>
+              </a:rPr>
+              <a:t>Objectives</a:t>
+            </a:r>
+            <a:r>
+              <a:rPr lang="fr-CH" sz="2800" dirty="0" smtClean="0">
+                <a:solidFill>
+                  <a:srgbClr val="39C0BA"/>
+                </a:solidFill>
+              </a:rPr>
+              <a:t> (implementation)</a:t>
             </a:r>
             <a:endParaRPr lang="en" sz="2800" dirty="0">
               <a:solidFill>
@@ -6128,7 +6037,7 @@
   <p:cSld>
     <p:spTree>
       <p:nvGrpSpPr>
-        <p:cNvPr id="1" name="Shape 134"/>
+        <p:cNvPr id="1" name="Shape 127"/>
         <p:cNvGrpSpPr/>
         <p:nvPr/>
       </p:nvGrpSpPr>
@@ -6142,265 +6051,185 @@
       </p:grpSpPr>
       <p:pic>
         <p:nvPicPr>
-          <p:cNvPr id="135" name="Shape 135"/>
+          <p:cNvPr id="128" name="Shape 128"/>
           <p:cNvPicPr preferRelativeResize="0"/>
           <p:nvPr/>
         </p:nvPicPr>
-        <p:blipFill rotWithShape="1">
+        <p:blipFill>
           <a:blip r:embed="rId3">
-            <a:alphaModFix amt="79000"/>
+            <a:extLst>
+              <a:ext uri="{28A0092B-C50C-407E-A947-70E740481C1C}">
+                <a14:useLocalDpi xmlns:a14="http://schemas.microsoft.com/office/drawing/2010/main" val="0"/>
+              </a:ext>
+            </a:extLst>
           </a:blip>
-          <a:srcRect l="9861" t="20672" b="4320"/>
-          <a:stretch/>
+          <a:stretch>
+            <a:fillRect/>
+          </a:stretch>
         </p:blipFill>
         <p:spPr>
           <a:xfrm>
-            <a:off x="901875" y="0"/>
-            <a:ext cx="8242124" cy="6858000"/>
-          </a:xfrm>
-          <a:prstGeom prst="rect">
+            <a:off x="-1656250" y="1366769"/>
+            <a:ext cx="5123400" cy="4818202"/>
+          </a:xfrm>
+          <a:prstGeom prst="ellipse">
             <a:avLst/>
           </a:prstGeom>
           <a:noFill/>
-          <a:ln>
-            <a:noFill/>
+          <a:ln w="28575" cap="flat" cmpd="sng">
+            <a:solidFill>
+              <a:srgbClr val="2E3037"/>
+            </a:solidFill>
+            <a:prstDash val="solid"/>
+            <a:round/>
+            <a:headEnd type="none" w="med" len="med"/>
+            <a:tailEnd type="none" w="med" len="med"/>
           </a:ln>
         </p:spPr>
       </p:pic>
       <p:sp>
         <p:nvSpPr>
-          <p:cNvPr id="136" name="Shape 136"/>
+          <p:cNvPr id="129" name="Shape 129"/>
           <p:cNvSpPr txBox="1">
             <a:spLocks noGrp="1"/>
           </p:cNvSpPr>
           <p:nvPr>
-            <p:ph type="body" idx="4294967295"/>
+            <p:ph type="title"/>
           </p:nvPr>
         </p:nvSpPr>
         <p:spPr>
           <a:xfrm>
-            <a:off x="1171500" y="2894551"/>
-            <a:ext cx="2653200" cy="1068899"/>
+            <a:off x="1165475" y="665975"/>
+            <a:ext cx="6858000" cy="459900"/>
           </a:xfrm>
           <a:prstGeom prst="rect">
             <a:avLst/>
           </a:prstGeom>
         </p:spPr>
         <p:txBody>
-          <a:bodyPr lIns="91425" tIns="91425" rIns="91425" bIns="91425" anchor="ctr" anchorCtr="0">
+          <a:bodyPr lIns="91425" tIns="91425" rIns="91425" bIns="91425" anchor="b" anchorCtr="0">
             <a:noAutofit/>
           </a:bodyPr>
           <a:lstStyle/>
           <a:p>
-            <a:pPr lvl="0" rtl="0">
+            <a:pPr lvl="0">
               <a:spcBef>
                 <a:spcPts val="0"/>
               </a:spcBef>
               <a:buNone/>
             </a:pPr>
             <a:r>
-              <a:rPr lang="de-CH" sz="1800" dirty="0" err="1" smtClean="0">
+              <a:rPr lang="en" sz="2800" dirty="0" smtClean="0">
                 <a:solidFill>
-                  <a:srgbClr val="F3F3F3"/>
+                  <a:srgbClr val="39C0BA"/>
                 </a:solidFill>
               </a:rPr>
-              <a:t>Maybe</a:t>
-            </a:r>
-            <a:r>
-              <a:rPr lang="de-CH" sz="1800" dirty="0" smtClean="0">
+              <a:t>Goals &amp; </a:t>
+            </a:r>
+            <a:r>
+              <a:rPr lang="en" sz="2800" dirty="0" smtClean="0">
                 <a:solidFill>
-                  <a:srgbClr val="F3F3F3"/>
+                  <a:srgbClr val="39C0BA"/>
                 </a:solidFill>
               </a:rPr>
-              <a:t> </a:t>
-            </a:r>
-            <a:r>
-              <a:rPr lang="de-CH" sz="1800" dirty="0" err="1" smtClean="0">
+              <a:t>Objectives</a:t>
+            </a:r>
+            <a:r>
+              <a:rPr lang="fr-CH" sz="2800" dirty="0" smtClean="0">
                 <a:solidFill>
-                  <a:srgbClr val="F3F3F3"/>
+                  <a:srgbClr val="39C0BA"/>
                 </a:solidFill>
               </a:rPr>
-              <a:t>add</a:t>
-            </a:r>
-            <a:r>
-              <a:rPr lang="de-CH" sz="1800" dirty="0" smtClean="0">
-                <a:solidFill>
-                  <a:srgbClr val="F3F3F3"/>
-                </a:solidFill>
-              </a:rPr>
-              <a:t> </a:t>
-            </a:r>
-            <a:r>
-              <a:rPr lang="de-CH" sz="1800" dirty="0" err="1" smtClean="0">
-                <a:solidFill>
-                  <a:srgbClr val="F3F3F3"/>
-                </a:solidFill>
-              </a:rPr>
-              <a:t>demo</a:t>
-            </a:r>
-            <a:r>
-              <a:rPr lang="de-CH" sz="1800" dirty="0" smtClean="0">
-                <a:solidFill>
-                  <a:srgbClr val="F3F3F3"/>
-                </a:solidFill>
-              </a:rPr>
-              <a:t> </a:t>
-            </a:r>
-            <a:r>
-              <a:rPr lang="de-CH" sz="1800" dirty="0" err="1" smtClean="0">
-                <a:solidFill>
-                  <a:srgbClr val="F3F3F3"/>
-                </a:solidFill>
-              </a:rPr>
-              <a:t>video</a:t>
-            </a:r>
-            <a:r>
-              <a:rPr lang="de-CH" sz="1800" dirty="0"/>
-              <a:t> </a:t>
-            </a:r>
-            <a:r>
-              <a:rPr lang="de-CH" sz="1800" dirty="0" err="1" smtClean="0"/>
-              <a:t>of</a:t>
-            </a:r>
-            <a:r>
-              <a:rPr lang="de-CH" sz="1800" dirty="0" smtClean="0"/>
-              <a:t> </a:t>
-            </a:r>
-            <a:r>
-              <a:rPr lang="de-CH" sz="1800" dirty="0" err="1" smtClean="0"/>
-              <a:t>input</a:t>
-            </a:r>
-            <a:r>
-              <a:rPr lang="en" sz="1800" dirty="0" smtClean="0">
-                <a:solidFill>
-                  <a:srgbClr val="F3F3F3"/>
-                </a:solidFill>
-              </a:rPr>
-              <a:t>?</a:t>
-            </a:r>
-            <a:endParaRPr lang="fr-CH" sz="1800" dirty="0" smtClean="0">
+              <a:t> (research)</a:t>
+            </a:r>
+            <a:endParaRPr lang="en" sz="2800" dirty="0">
               <a:solidFill>
-                <a:srgbClr val="F3F3F3"/>
+                <a:srgbClr val="39C0BA"/>
               </a:solidFill>
             </a:endParaRPr>
           </a:p>
         </p:txBody>
       </p:sp>
-      <p:grpSp>
-        <p:nvGrpSpPr>
-          <p:cNvPr id="137" name="Shape 137"/>
-          <p:cNvGrpSpPr/>
-          <p:nvPr/>
-        </p:nvGrpSpPr>
-        <p:grpSpPr>
+      <p:sp>
+        <p:nvSpPr>
+          <p:cNvPr id="7" name="Shape 96"/>
+          <p:cNvSpPr txBox="1">
+            <a:spLocks noGrp="1"/>
+          </p:cNvSpPr>
+          <p:nvPr>
+            <p:ph type="body" idx="1"/>
+          </p:nvPr>
+        </p:nvSpPr>
+        <p:spPr>
           <a:xfrm>
-            <a:off x="800299" y="-7799"/>
-            <a:ext cx="190200" cy="6857700"/>
-            <a:chOff x="808650" y="-7800"/>
-            <a:chExt cx="190200" cy="6857700"/>
-          </a:xfrm>
-        </p:grpSpPr>
-        <p:sp>
-          <p:nvSpPr>
-            <p:cNvPr id="138" name="Shape 138"/>
-            <p:cNvSpPr/>
-            <p:nvPr/>
-          </p:nvSpPr>
-          <p:spPr>
-            <a:xfrm>
-              <a:off x="808650" y="3333900"/>
-              <a:ext cx="190200" cy="190200"/>
-            </a:xfrm>
-            <a:prstGeom prst="ellipse">
-              <a:avLst/>
-            </a:prstGeom>
-            <a:solidFill>
-              <a:srgbClr val="39C0BA"/>
-            </a:solidFill>
-            <a:ln w="9525" cap="flat" cmpd="sng">
-              <a:solidFill>
-                <a:srgbClr val="FFFFFF"/>
-              </a:solidFill>
-              <a:prstDash val="solid"/>
-              <a:round/>
-              <a:headEnd type="none" w="med" len="med"/>
-              <a:tailEnd type="none" w="med" len="med"/>
-            </a:ln>
-          </p:spPr>
-          <p:txBody>
-            <a:bodyPr lIns="91425" tIns="91425" rIns="91425" bIns="91425" anchor="ctr" anchorCtr="0">
-              <a:noAutofit/>
-            </a:bodyPr>
-            <a:lstStyle/>
-            <a:p>
-              <a:pPr lvl="0">
-                <a:spcBef>
-                  <a:spcPts val="0"/>
-                </a:spcBef>
-                <a:buNone/>
-              </a:pPr>
-              <a:endParaRPr/>
-            </a:p>
-          </p:txBody>
-        </p:sp>
-        <p:cxnSp>
-          <p:nvCxnSpPr>
-            <p:cNvPr id="139" name="Shape 139"/>
-            <p:cNvCxnSpPr>
-              <a:endCxn id="138" idx="0"/>
-            </p:cNvCxnSpPr>
-            <p:nvPr/>
-          </p:nvCxnSpPr>
-          <p:spPr>
-            <a:xfrm>
-              <a:off x="903750" y="-7800"/>
-              <a:ext cx="0" cy="3341700"/>
-            </a:xfrm>
-            <a:prstGeom prst="straightConnector1">
-              <a:avLst/>
-            </a:prstGeom>
-            <a:noFill/>
-            <a:ln w="9525" cap="flat" cmpd="sng">
-              <a:solidFill>
-                <a:srgbClr val="FFFFFF"/>
-              </a:solidFill>
-              <a:prstDash val="solid"/>
-              <a:round/>
-              <a:headEnd type="none" w="lg" len="lg"/>
-              <a:tailEnd type="none" w="lg" len="lg"/>
-            </a:ln>
-          </p:spPr>
-        </p:cxnSp>
-        <p:cxnSp>
-          <p:nvCxnSpPr>
-            <p:cNvPr id="140" name="Shape 140"/>
-            <p:cNvCxnSpPr>
-              <a:stCxn id="138" idx="4"/>
-            </p:cNvCxnSpPr>
-            <p:nvPr/>
-          </p:nvCxnSpPr>
-          <p:spPr>
-            <a:xfrm>
-              <a:off x="903750" y="3524100"/>
-              <a:ext cx="0" cy="3325800"/>
-            </a:xfrm>
-            <a:prstGeom prst="straightConnector1">
-              <a:avLst/>
-            </a:prstGeom>
-            <a:noFill/>
-            <a:ln w="9525" cap="flat" cmpd="sng">
-              <a:solidFill>
-                <a:srgbClr val="FFFFFF"/>
-              </a:solidFill>
-              <a:prstDash val="solid"/>
-              <a:round/>
-              <a:headEnd type="none" w="lg" len="lg"/>
-              <a:tailEnd type="none" w="lg" len="lg"/>
-            </a:ln>
-          </p:spPr>
-        </p:cxnSp>
-      </p:grpSp>
+            <a:off x="3467150" y="1366769"/>
+            <a:ext cx="4556326" cy="5201132"/>
+          </a:xfrm>
+          <a:prstGeom prst="rect">
+            <a:avLst/>
+          </a:prstGeom>
+        </p:spPr>
+        <p:txBody>
+          <a:bodyPr lIns="91425" tIns="91425" rIns="91425" bIns="91425" anchor="t" anchorCtr="0">
+            <a:noAutofit/>
+          </a:bodyPr>
+          <a:lstStyle/>
+          <a:p>
+            <a:pPr marL="685800" indent="-457200">
+              <a:spcBef>
+                <a:spcPts val="0"/>
+              </a:spcBef>
+            </a:pPr>
+            <a:r>
+              <a:rPr lang="fr-CH" sz="2800" dirty="0" smtClean="0"/>
+              <a:t>Evaluate the effect of the ROI size on performance</a:t>
+            </a:r>
+          </a:p>
+          <a:p>
+            <a:pPr marL="685800" indent="-457200">
+              <a:spcBef>
+                <a:spcPts val="0"/>
+              </a:spcBef>
+            </a:pPr>
+            <a:r>
+              <a:rPr lang="fr-CH" sz="2800" dirty="0" smtClean="0"/>
+              <a:t>Evaluate the probable shape of the beating pattern on a « by cilia beating movie » basis</a:t>
+            </a:r>
+          </a:p>
+          <a:p>
+            <a:pPr marL="685800" indent="-457200">
+              <a:spcBef>
+                <a:spcPts val="0"/>
+              </a:spcBef>
+            </a:pPr>
+            <a:r>
+              <a:rPr lang="fr-CH" sz="2800" dirty="0" smtClean="0"/>
+              <a:t>Compare different techniques for the frequency analysis</a:t>
+            </a:r>
+            <a:endParaRPr lang="en" sz="2800" dirty="0" smtClean="0"/>
+          </a:p>
+          <a:p>
+            <a:pPr lvl="0" rtl="0">
+              <a:spcBef>
+                <a:spcPts val="0"/>
+              </a:spcBef>
+              <a:buClr>
+                <a:schemeClr val="dk1"/>
+              </a:buClr>
+              <a:buSzPct val="36666"/>
+              <a:buFont typeface="Arial"/>
+              <a:buNone/>
+            </a:pPr>
+            <a:endParaRPr lang="en" dirty="0" smtClean="0"/>
+          </a:p>
+        </p:txBody>
+      </p:sp>
     </p:spTree>
+    <p:extLst>
+      <p:ext uri="{BB962C8B-B14F-4D97-AF65-F5344CB8AC3E}">
+        <p14:creationId xmlns:p14="http://schemas.microsoft.com/office/powerpoint/2010/main" val="1695164254"/>
+      </p:ext>
+    </p:extLst>
   </p:cSld>
   <p:clrMapOvr>
     <a:masterClrMapping/>
@@ -6423,7 +6252,7 @@
   <p:cSld>
     <p:spTree>
       <p:nvGrpSpPr>
-        <p:cNvPr id="1" name="Shape 112"/>
+        <p:cNvPr id="1" name=""/>
         <p:cNvGrpSpPr/>
         <p:nvPr/>
       </p:nvGrpSpPr>
@@ -6437,162 +6266,146 @@
       </p:grpSpPr>
       <p:sp>
         <p:nvSpPr>
-          <p:cNvPr id="113" name="Shape 113"/>
-          <p:cNvSpPr txBox="1">
+          <p:cNvPr id="2" name="Title 1"/>
+          <p:cNvSpPr>
+            <a:spLocks noGrp="1"/>
+          </p:cNvSpPr>
+          <p:nvPr>
+            <p:ph type="title"/>
+          </p:nvPr>
+        </p:nvSpPr>
+        <p:spPr/>
+        <p:txBody>
+          <a:bodyPr/>
+          <a:lstStyle/>
+          <a:p>
+            <a:r>
+              <a:rPr lang="en" sz="2800" dirty="0" smtClean="0"/>
+              <a:t>Methodology &amp;</a:t>
+            </a:r>
+            <a:r>
+              <a:rPr lang="fr-CH" sz="2800" dirty="0" smtClean="0"/>
+              <a:t> </a:t>
+            </a:r>
+            <a:r>
+              <a:rPr lang="en" sz="2800" dirty="0" smtClean="0"/>
+              <a:t>Tools</a:t>
+            </a:r>
+            <a:endParaRPr lang="en" sz="2800" dirty="0"/>
+          </a:p>
+        </p:txBody>
+      </p:sp>
+      <p:sp>
+        <p:nvSpPr>
+          <p:cNvPr id="3" name="Text Placeholder 2"/>
+          <p:cNvSpPr>
             <a:spLocks noGrp="1"/>
           </p:cNvSpPr>
           <p:nvPr>
             <p:ph type="body" idx="1"/>
           </p:nvPr>
         </p:nvSpPr>
-        <p:spPr>
-          <a:xfrm>
-            <a:off x="1165474" y="1600201"/>
-            <a:ext cx="3306900" cy="4967700"/>
-          </a:xfrm>
-          <a:prstGeom prst="rect">
-            <a:avLst/>
-          </a:prstGeom>
-        </p:spPr>
+        <p:spPr/>
         <p:txBody>
-          <a:bodyPr lIns="91425" tIns="91425" rIns="91425" bIns="91425" anchor="t" anchorCtr="0">
-            <a:noAutofit/>
-          </a:bodyPr>
+          <a:bodyPr/>
           <a:lstStyle/>
           <a:p>
-            <a:pPr lvl="0" rtl="0">
-              <a:spcBef>
-                <a:spcPts val="0"/>
-              </a:spcBef>
+            <a:pPr>
               <a:buNone/>
             </a:pPr>
             <a:r>
-              <a:rPr lang="de-CH" b="1" dirty="0" smtClean="0"/>
-              <a:t>Simon</a:t>
-            </a:r>
-          </a:p>
-          <a:p>
-            <a:pPr lvl="0">
-              <a:spcBef>
-                <a:spcPts val="0"/>
-              </a:spcBef>
-              <a:buNone/>
-            </a:pPr>
-            <a:r>
-              <a:rPr lang="de-CH" dirty="0" smtClean="0"/>
-              <a:t>- Simons </a:t>
-            </a:r>
-            <a:r>
-              <a:rPr lang="de-CH" dirty="0" err="1" smtClean="0"/>
-              <a:t>tasks</a:t>
-            </a:r>
-            <a:endParaRPr lang="en" dirty="0"/>
+              <a:rPr lang="en" smtClean="0"/>
+              <a:t>Methodology:</a:t>
+            </a:r>
+          </a:p>
+          <a:p>
+            <a:pPr marL="457200" indent="-457200"/>
+            <a:r>
+              <a:rPr lang="en" smtClean="0"/>
+              <a:t>Iterative &amp; Incremental Devolopement</a:t>
+            </a:r>
+          </a:p>
+          <a:p>
+            <a:pPr marL="457200" indent="-457200"/>
+            <a:r>
+              <a:rPr lang="en" smtClean="0"/>
+              <a:t>Scrum</a:t>
+            </a:r>
+          </a:p>
+          <a:p>
+            <a:pPr marL="457200" indent="-457200"/>
+            <a:r>
+              <a:rPr lang="en" smtClean="0"/>
+              <a:t>Testing</a:t>
+            </a:r>
+          </a:p>
+          <a:p>
+            <a:pPr marL="457200" indent="-457200"/>
+            <a:r>
+              <a:rPr lang="en" smtClean="0"/>
+              <a:t>Code Reviews</a:t>
+            </a:r>
+            <a:endParaRPr lang="en"/>
           </a:p>
         </p:txBody>
       </p:sp>
       <p:sp>
         <p:nvSpPr>
-          <p:cNvPr id="114" name="Shape 114"/>
-          <p:cNvSpPr txBox="1">
-            <a:spLocks noGrp="1"/>
-          </p:cNvSpPr>
-          <p:nvPr>
-            <p:ph type="title"/>
-          </p:nvPr>
-        </p:nvSpPr>
-        <p:spPr>
-          <a:xfrm>
-            <a:off x="1165475" y="665975"/>
-            <a:ext cx="6858000" cy="459900"/>
-          </a:xfrm>
-          <a:prstGeom prst="rect">
-            <a:avLst/>
-          </a:prstGeom>
-        </p:spPr>
-        <p:txBody>
-          <a:bodyPr lIns="91425" tIns="91425" rIns="91425" bIns="91425" anchor="b" anchorCtr="0">
-            <a:noAutofit/>
-          </a:bodyPr>
-          <a:lstStyle/>
-          <a:p>
-            <a:pPr lvl="0">
-              <a:spcBef>
-                <a:spcPts val="0"/>
-              </a:spcBef>
-              <a:buNone/>
-            </a:pPr>
-            <a:r>
-              <a:rPr lang="de-CH" sz="2800" dirty="0" smtClean="0"/>
-              <a:t>Organisation</a:t>
-            </a:r>
-            <a:endParaRPr lang="en" sz="2800" dirty="0"/>
-          </a:p>
-        </p:txBody>
-      </p:sp>
-      <p:sp>
-        <p:nvSpPr>
-          <p:cNvPr id="115" name="Shape 115"/>
-          <p:cNvSpPr txBox="1">
+          <p:cNvPr id="4" name="Text Placeholder 3"/>
+          <p:cNvSpPr>
             <a:spLocks noGrp="1"/>
           </p:cNvSpPr>
           <p:nvPr>
             <p:ph type="body" idx="2"/>
           </p:nvPr>
         </p:nvSpPr>
-        <p:spPr>
-          <a:xfrm>
-            <a:off x="4671569" y="1600201"/>
-            <a:ext cx="3306900" cy="4967700"/>
-          </a:xfrm>
-          <a:prstGeom prst="rect">
-            <a:avLst/>
-          </a:prstGeom>
-        </p:spPr>
+        <p:spPr/>
         <p:txBody>
-          <a:bodyPr lIns="91425" tIns="91425" rIns="91425" bIns="91425" anchor="t" anchorCtr="0">
-            <a:noAutofit/>
-          </a:bodyPr>
+          <a:bodyPr/>
           <a:lstStyle/>
           <a:p>
-            <a:pPr lvl="0" rtl="0">
-              <a:spcBef>
-                <a:spcPts val="0"/>
-              </a:spcBef>
+            <a:pPr>
               <a:buNone/>
             </a:pPr>
             <a:r>
-              <a:rPr lang="de-CH" b="1" dirty="0" smtClean="0"/>
-              <a:t>Laurent</a:t>
-            </a:r>
-            <a:endParaRPr lang="en" b="1" dirty="0"/>
-          </a:p>
-          <a:p>
-            <a:pPr lvl="0">
-              <a:spcBef>
-                <a:spcPts val="0"/>
-              </a:spcBef>
-              <a:buNone/>
-            </a:pPr>
-            <a:r>
-              <a:rPr lang="de-CH" dirty="0" smtClean="0"/>
-              <a:t>- Laurents </a:t>
-            </a:r>
-            <a:r>
-              <a:rPr lang="de-CH" dirty="0" err="1" smtClean="0"/>
-              <a:t>tasks</a:t>
+              <a:rPr lang="en" dirty="0" smtClean="0"/>
+              <a:t>Tools:</a:t>
+            </a:r>
+          </a:p>
+          <a:p>
+            <a:pPr marL="457200" indent="-457200"/>
+            <a:r>
+              <a:rPr lang="en" dirty="0" smtClean="0"/>
+              <a:t>Matlab</a:t>
+            </a:r>
+          </a:p>
+          <a:p>
+            <a:pPr marL="457200" indent="-457200"/>
+            <a:r>
+              <a:rPr lang="en" dirty="0" smtClean="0"/>
+              <a:t>Git</a:t>
+            </a:r>
+          </a:p>
+          <a:p>
+            <a:pPr marL="457200" indent="-457200"/>
+            <a:r>
+              <a:rPr lang="en" dirty="0" smtClean="0"/>
+              <a:t>Taiga</a:t>
             </a:r>
             <a:endParaRPr lang="en" dirty="0"/>
           </a:p>
         </p:txBody>
       </p:sp>
     </p:spTree>
+    <p:extLst>
+      <p:ext uri="{BB962C8B-B14F-4D97-AF65-F5344CB8AC3E}">
+        <p14:creationId xmlns:p14="http://schemas.microsoft.com/office/powerpoint/2010/main" val="999126706"/>
+      </p:ext>
+    </p:extLst>
   </p:cSld>
   <p:clrMapOvr>
     <a:masterClrMapping/>
   </p:clrMapOvr>
-  <p:transition xmlns:p14="http://schemas.microsoft.com/office/powerpoint/2010/main" spd="slow">
-    <p:cut/>
-  </p:transition>
   <p:timing>
     <p:tnLst>
       <p:par>
@@ -6637,129 +6450,46 @@
           <a:p>
             <a:r>
               <a:rPr lang="en" sz="2800" dirty="0" smtClean="0"/>
-              <a:t>Methodology </a:t>
-            </a:r>
-            <a:r>
-              <a:rPr lang="en" sz="2800" dirty="0" smtClean="0"/>
-              <a:t>&amp;</a:t>
-            </a:r>
-            <a:r>
-              <a:rPr lang="fr-CH" sz="2800" dirty="0" smtClean="0"/>
-              <a:t> </a:t>
-            </a:r>
-            <a:r>
-              <a:rPr lang="en" sz="2800" dirty="0" smtClean="0"/>
-              <a:t>Tools</a:t>
+              <a:t>Methodology &amp;Tools</a:t>
             </a:r>
             <a:endParaRPr lang="en" sz="2800" dirty="0"/>
           </a:p>
         </p:txBody>
       </p:sp>
-      <p:sp>
-        <p:nvSpPr>
-          <p:cNvPr id="3" name="Text Placeholder 2"/>
-          <p:cNvSpPr>
-            <a:spLocks noGrp="1"/>
-          </p:cNvSpPr>
-          <p:nvPr>
-            <p:ph type="body" idx="1"/>
-          </p:nvPr>
-        </p:nvSpPr>
-        <p:spPr/>
-        <p:txBody>
-          <a:bodyPr/>
-          <a:lstStyle/>
-          <a:p>
-            <a:pPr>
-              <a:buNone/>
-            </a:pPr>
-            <a:r>
-              <a:rPr lang="en" smtClean="0"/>
-              <a:t>Methodology:</a:t>
-            </a:r>
-          </a:p>
-          <a:p>
-            <a:pPr marL="457200" indent="-457200"/>
-            <a:r>
-              <a:rPr lang="en" smtClean="0"/>
-              <a:t>Iterative &amp; Incremental Devolopement</a:t>
-            </a:r>
-          </a:p>
-          <a:p>
-            <a:pPr marL="457200" indent="-457200"/>
-            <a:r>
-              <a:rPr lang="en" smtClean="0"/>
-              <a:t>Scrum</a:t>
-            </a:r>
-          </a:p>
-          <a:p>
-            <a:pPr marL="457200" indent="-457200"/>
-            <a:r>
-              <a:rPr lang="en" smtClean="0"/>
-              <a:t>Testing</a:t>
-            </a:r>
-          </a:p>
-          <a:p>
-            <a:pPr marL="457200" indent="-457200"/>
-            <a:r>
-              <a:rPr lang="en" smtClean="0"/>
-              <a:t>Code Reviews</a:t>
-            </a:r>
-            <a:endParaRPr lang="en"/>
-          </a:p>
-        </p:txBody>
-      </p:sp>
-      <p:sp>
-        <p:nvSpPr>
-          <p:cNvPr id="4" name="Text Placeholder 3"/>
-          <p:cNvSpPr>
-            <a:spLocks noGrp="1"/>
-          </p:cNvSpPr>
-          <p:nvPr>
-            <p:ph type="body" idx="2"/>
-          </p:nvPr>
-        </p:nvSpPr>
-        <p:spPr/>
-        <p:txBody>
-          <a:bodyPr/>
-          <a:lstStyle/>
-          <a:p>
-            <a:pPr>
-              <a:buNone/>
-            </a:pPr>
-            <a:r>
-              <a:rPr lang="en" dirty="0" smtClean="0"/>
-              <a:t>Tools:</a:t>
-            </a:r>
-          </a:p>
-          <a:p>
-            <a:pPr marL="457200" indent="-457200"/>
-            <a:r>
-              <a:rPr lang="en" dirty="0" smtClean="0"/>
-              <a:t>Matlab</a:t>
-            </a:r>
-          </a:p>
-          <a:p>
-            <a:pPr marL="457200" indent="-457200"/>
-            <a:r>
-              <a:rPr lang="en" dirty="0" smtClean="0"/>
-              <a:t>Git</a:t>
-            </a:r>
-          </a:p>
-          <a:p>
-            <a:pPr marL="457200" indent="-457200"/>
-            <a:r>
-              <a:rPr lang="en" dirty="0" smtClean="0"/>
-              <a:t>Taiga</a:t>
-            </a:r>
-            <a:endParaRPr lang="en" dirty="0"/>
-          </a:p>
-        </p:txBody>
-      </p:sp>
+      <p:pic>
+        <p:nvPicPr>
+          <p:cNvPr id="3" name="Picture 2" descr="Taiga.png"/>
+          <p:cNvPicPr>
+            <a:picLocks noChangeAspect="1"/>
+          </p:cNvPicPr>
+          <p:nvPr/>
+        </p:nvPicPr>
+        <p:blipFill>
+          <a:blip r:embed="rId2">
+            <a:extLst>
+              <a:ext uri="{28A0092B-C50C-407E-A947-70E740481C1C}">
+                <a14:useLocalDpi xmlns:a14="http://schemas.microsoft.com/office/drawing/2010/main" val="0"/>
+              </a:ext>
+            </a:extLst>
+          </a:blip>
+          <a:stretch>
+            <a:fillRect/>
+          </a:stretch>
+        </p:blipFill>
+        <p:spPr>
+          <a:xfrm>
+            <a:off x="924926" y="1535580"/>
+            <a:ext cx="8219074" cy="4738810"/>
+          </a:xfrm>
+          <a:prstGeom prst="rect">
+            <a:avLst/>
+          </a:prstGeom>
+        </p:spPr>
+      </p:pic>
     </p:spTree>
     <p:extLst>
       <p:ext uri="{BB962C8B-B14F-4D97-AF65-F5344CB8AC3E}">
-        <p14:creationId xmlns:p14="http://schemas.microsoft.com/office/powerpoint/2010/main" val="999126706"/>
+        <p14:creationId xmlns:p14="http://schemas.microsoft.com/office/powerpoint/2010/main" val="3674938669"/>
       </p:ext>
     </p:extLst>
   </p:cSld>
@@ -6809,47 +6539,89 @@
           <a:lstStyle/>
           <a:p>
             <a:r>
-              <a:rPr lang="en" sz="2800" dirty="0" smtClean="0"/>
-              <a:t>Methodology &amp;Tools</a:t>
+              <a:rPr lang="de-CH" sz="2800" dirty="0" smtClean="0"/>
+              <a:t>Schedule</a:t>
             </a:r>
             <a:endParaRPr lang="en" sz="2800" dirty="0"/>
           </a:p>
         </p:txBody>
       </p:sp>
-      <p:pic>
-        <p:nvPicPr>
-          <p:cNvPr id="3" name="Picture 2" descr="Taiga.png"/>
-          <p:cNvPicPr>
-            <a:picLocks noChangeAspect="1"/>
-          </p:cNvPicPr>
-          <p:nvPr/>
-        </p:nvPicPr>
-        <p:blipFill>
-          <a:blip r:embed="rId2">
-            <a:extLst>
-              <a:ext uri="{28A0092B-C50C-407E-A947-70E740481C1C}">
-                <a14:useLocalDpi xmlns:a14="http://schemas.microsoft.com/office/drawing/2010/main" val="0"/>
-              </a:ext>
-            </a:extLst>
-          </a:blip>
-          <a:stretch>
-            <a:fillRect/>
-          </a:stretch>
-        </p:blipFill>
-        <p:spPr>
-          <a:xfrm>
-            <a:off x="924926" y="1535580"/>
-            <a:ext cx="8219074" cy="4738810"/>
-          </a:xfrm>
-          <a:prstGeom prst="rect">
-            <a:avLst/>
-          </a:prstGeom>
-        </p:spPr>
-      </p:pic>
+      <p:sp>
+        <p:nvSpPr>
+          <p:cNvPr id="3" name="Text Placeholder 2"/>
+          <p:cNvSpPr>
+            <a:spLocks noGrp="1"/>
+          </p:cNvSpPr>
+          <p:nvPr>
+            <p:ph type="body" idx="1"/>
+          </p:nvPr>
+        </p:nvSpPr>
+        <p:spPr/>
+        <p:txBody>
+          <a:bodyPr/>
+          <a:lstStyle/>
+          <a:p>
+            <a:r>
+              <a:rPr lang="en" dirty="0" smtClean="0"/>
+              <a:t> 6 Sprints, 2 weeks each</a:t>
+            </a:r>
+          </a:p>
+          <a:p>
+            <a:r>
+              <a:rPr lang="en" dirty="0" smtClean="0"/>
+              <a:t> Goal: </a:t>
+            </a:r>
+            <a:br>
+              <a:rPr lang="en" dirty="0" smtClean="0"/>
+            </a:br>
+            <a:r>
+              <a:rPr lang="en" dirty="0" smtClean="0"/>
+              <a:t>	</a:t>
+            </a:r>
+            <a:r>
+              <a:rPr lang="en" i="1" dirty="0" smtClean="0"/>
+              <a:t>Deliverable tool at the end of 	each sprint!</a:t>
+            </a:r>
+          </a:p>
+          <a:p>
+            <a:r>
+              <a:rPr lang="en" dirty="0" smtClean="0"/>
+              <a:t> Sprint 1: Minimum Requirements</a:t>
+            </a:r>
+          </a:p>
+          <a:p>
+            <a:r>
+              <a:rPr lang="en" dirty="0" smtClean="0"/>
+              <a:t> Subsequent sprints:</a:t>
+            </a:r>
+          </a:p>
+          <a:p>
+            <a:pPr marL="342900" lvl="1" indent="-342900"/>
+            <a:r>
+              <a:rPr lang="en" dirty="0" smtClean="0"/>
+              <a:t> Add new features</a:t>
+            </a:r>
+          </a:p>
+          <a:p>
+            <a:pPr marL="342900" lvl="1" indent="-342900"/>
+            <a:r>
+              <a:rPr lang="en" dirty="0" smtClean="0"/>
+              <a:t> Test alternative methods</a:t>
+            </a:r>
+          </a:p>
+          <a:p>
+            <a:pPr marL="342900" lvl="1" indent="-342900"/>
+            <a:r>
+              <a:rPr lang="en" dirty="0" smtClean="0"/>
+              <a:t> etc ...</a:t>
+            </a:r>
+          </a:p>
+        </p:txBody>
+      </p:sp>
     </p:spTree>
     <p:extLst>
       <p:ext uri="{BB962C8B-B14F-4D97-AF65-F5344CB8AC3E}">
-        <p14:creationId xmlns:p14="http://schemas.microsoft.com/office/powerpoint/2010/main" val="3674938669"/>
+        <p14:creationId xmlns:p14="http://schemas.microsoft.com/office/powerpoint/2010/main" val="3177910965"/>
       </p:ext>
     </p:extLst>
   </p:cSld>

</xml_diff>

<commit_message>
Updated the slides and initial plan with a sketched schedule
</commit_message>
<xml_diff>
--- a/doc/initial-plan.pptx
+++ b/doc/initial-plan.pptx
@@ -17,9 +17,9 @@
     <p:sldId id="286" r:id="rId8"/>
     <p:sldId id="285" r:id="rId9"/>
     <p:sldId id="287" r:id="rId10"/>
-    <p:sldId id="272" r:id="rId11"/>
-    <p:sldId id="263" r:id="rId12"/>
-    <p:sldId id="274" r:id="rId13"/>
+    <p:sldId id="292" r:id="rId11"/>
+    <p:sldId id="272" r:id="rId12"/>
+    <p:sldId id="263" r:id="rId13"/>
     <p:sldId id="288" r:id="rId14"/>
     <p:sldId id="279" r:id="rId15"/>
   </p:sldIdLst>
@@ -230,6 +230,327 @@
 </p:presentation>
 </file>
 
+<file path=ppt/charts/chart1.xml><?xml version="1.0" encoding="utf-8"?>
+<c:chartSpace xmlns:c="http://schemas.openxmlformats.org/drawingml/2006/chart" xmlns:a="http://schemas.openxmlformats.org/drawingml/2006/main" xmlns:r="http://schemas.openxmlformats.org/officeDocument/2006/relationships">
+  <c:date1904 val="0"/>
+  <c:lang val="en-US"/>
+  <c:roundedCorners val="0"/>
+  <mc:AlternateContent xmlns:mc="http://schemas.openxmlformats.org/markup-compatibility/2006">
+    <mc:Choice xmlns:c14="http://schemas.microsoft.com/office/drawing/2007/8/2/chart" Requires="c14">
+      <c14:style val="118"/>
+    </mc:Choice>
+    <mc:Fallback>
+      <c:style val="18"/>
+    </mc:Fallback>
+  </mc:AlternateContent>
+  <c:chart>
+    <c:autoTitleDeleted val="0"/>
+    <c:plotArea>
+      <c:layout/>
+      <c:barChart>
+        <c:barDir val="bar"/>
+        <c:grouping val="stacked"/>
+        <c:varyColors val="0"/>
+        <c:ser>
+          <c:idx val="2"/>
+          <c:order val="2"/>
+          <c:tx>
+            <c:v>Start Date</c:v>
+          </c:tx>
+          <c:spPr>
+            <a:noFill/>
+            <a:effectLst/>
+          </c:spPr>
+          <c:invertIfNegative val="0"/>
+          <c:cat>
+            <c:strRef>
+              <c:f>Sheet1!$A$2:$A$7</c:f>
+              <c:strCache>
+                <c:ptCount val="6"/>
+                <c:pt idx="0">
+                  <c:v>Sprint 1</c:v>
+                </c:pt>
+                <c:pt idx="1">
+                  <c:v>Sprint 2</c:v>
+                </c:pt>
+                <c:pt idx="2">
+                  <c:v>Sprint 3</c:v>
+                </c:pt>
+                <c:pt idx="3">
+                  <c:v>Sprint 4</c:v>
+                </c:pt>
+                <c:pt idx="4">
+                  <c:v>Sprint 5</c:v>
+                </c:pt>
+                <c:pt idx="5">
+                  <c:v>Sprint 6</c:v>
+                </c:pt>
+              </c:strCache>
+            </c:strRef>
+          </c:cat>
+          <c:val>
+            <c:numRef>
+              <c:f>Sheet1!$B$2:$B$7</c:f>
+              <c:numCache>
+                <c:formatCode>m/d/yy</c:formatCode>
+                <c:ptCount val="6"/>
+                <c:pt idx="0">
+                  <c:v>42449.0</c:v>
+                </c:pt>
+                <c:pt idx="1">
+                  <c:v>42463.0</c:v>
+                </c:pt>
+                <c:pt idx="2">
+                  <c:v>42477.0</c:v>
+                </c:pt>
+                <c:pt idx="3">
+                  <c:v>42491.0</c:v>
+                </c:pt>
+                <c:pt idx="4">
+                  <c:v>42505.0</c:v>
+                </c:pt>
+                <c:pt idx="5">
+                  <c:v>42519.0</c:v>
+                </c:pt>
+              </c:numCache>
+            </c:numRef>
+          </c:val>
+        </c:ser>
+        <c:ser>
+          <c:idx val="3"/>
+          <c:order val="3"/>
+          <c:tx>
+            <c:v>Duration</c:v>
+          </c:tx>
+          <c:spPr>
+            <a:solidFill>
+              <a:schemeClr val="accent6">
+                <a:lumMod val="60000"/>
+                <a:lumOff val="40000"/>
+                <a:alpha val="90000"/>
+              </a:schemeClr>
+            </a:solidFill>
+          </c:spPr>
+          <c:invertIfNegative val="0"/>
+          <c:val>
+            <c:numRef>
+              <c:f>Sheet1!$C$2:$C$7</c:f>
+              <c:numCache>
+                <c:formatCode>General</c:formatCode>
+                <c:ptCount val="6"/>
+                <c:pt idx="0">
+                  <c:v>14.0</c:v>
+                </c:pt>
+                <c:pt idx="1">
+                  <c:v>14.0</c:v>
+                </c:pt>
+                <c:pt idx="2">
+                  <c:v>14.0</c:v>
+                </c:pt>
+                <c:pt idx="3">
+                  <c:v>14.0</c:v>
+                </c:pt>
+                <c:pt idx="4">
+                  <c:v>14.0</c:v>
+                </c:pt>
+                <c:pt idx="5">
+                  <c:v>14.0</c:v>
+                </c:pt>
+              </c:numCache>
+            </c:numRef>
+          </c:val>
+        </c:ser>
+        <c:ser>
+          <c:idx val="0"/>
+          <c:order val="0"/>
+          <c:tx>
+            <c:v>Start Date</c:v>
+          </c:tx>
+          <c:spPr>
+            <a:noFill/>
+            <a:effectLst/>
+          </c:spPr>
+          <c:invertIfNegative val="0"/>
+          <c:cat>
+            <c:strRef>
+              <c:f>Sheet1!$A$2:$A$7</c:f>
+              <c:strCache>
+                <c:ptCount val="6"/>
+                <c:pt idx="0">
+                  <c:v>Sprint 1</c:v>
+                </c:pt>
+                <c:pt idx="1">
+                  <c:v>Sprint 2</c:v>
+                </c:pt>
+                <c:pt idx="2">
+                  <c:v>Sprint 3</c:v>
+                </c:pt>
+                <c:pt idx="3">
+                  <c:v>Sprint 4</c:v>
+                </c:pt>
+                <c:pt idx="4">
+                  <c:v>Sprint 5</c:v>
+                </c:pt>
+                <c:pt idx="5">
+                  <c:v>Sprint 6</c:v>
+                </c:pt>
+              </c:strCache>
+            </c:strRef>
+          </c:cat>
+          <c:val>
+            <c:numRef>
+              <c:f>Sheet1!$B$2:$B$7</c:f>
+              <c:numCache>
+                <c:formatCode>m/d/yy</c:formatCode>
+                <c:ptCount val="6"/>
+                <c:pt idx="0">
+                  <c:v>42449.0</c:v>
+                </c:pt>
+                <c:pt idx="1">
+                  <c:v>42463.0</c:v>
+                </c:pt>
+                <c:pt idx="2">
+                  <c:v>42477.0</c:v>
+                </c:pt>
+                <c:pt idx="3">
+                  <c:v>42491.0</c:v>
+                </c:pt>
+                <c:pt idx="4">
+                  <c:v>42505.0</c:v>
+                </c:pt>
+                <c:pt idx="5">
+                  <c:v>42519.0</c:v>
+                </c:pt>
+              </c:numCache>
+            </c:numRef>
+          </c:val>
+        </c:ser>
+        <c:ser>
+          <c:idx val="1"/>
+          <c:order val="1"/>
+          <c:tx>
+            <c:v>Duration</c:v>
+          </c:tx>
+          <c:spPr>
+            <a:solidFill>
+              <a:schemeClr val="tx2">
+                <a:lumMod val="60000"/>
+                <a:lumOff val="40000"/>
+              </a:schemeClr>
+            </a:solidFill>
+          </c:spPr>
+          <c:invertIfNegative val="0"/>
+          <c:val>
+            <c:numRef>
+              <c:f>Sheet1!$C$2:$C$7</c:f>
+              <c:numCache>
+                <c:formatCode>General</c:formatCode>
+                <c:ptCount val="6"/>
+                <c:pt idx="0">
+                  <c:v>14.0</c:v>
+                </c:pt>
+                <c:pt idx="1">
+                  <c:v>14.0</c:v>
+                </c:pt>
+                <c:pt idx="2">
+                  <c:v>14.0</c:v>
+                </c:pt>
+                <c:pt idx="3">
+                  <c:v>14.0</c:v>
+                </c:pt>
+                <c:pt idx="4">
+                  <c:v>14.0</c:v>
+                </c:pt>
+                <c:pt idx="5">
+                  <c:v>14.0</c:v>
+                </c:pt>
+              </c:numCache>
+            </c:numRef>
+          </c:val>
+        </c:ser>
+        <c:dLbls>
+          <c:showLegendKey val="0"/>
+          <c:showVal val="0"/>
+          <c:showCatName val="0"/>
+          <c:showSerName val="0"/>
+          <c:showPercent val="0"/>
+          <c:showBubbleSize val="0"/>
+        </c:dLbls>
+        <c:gapWidth val="150"/>
+        <c:overlap val="100"/>
+        <c:axId val="2087091384"/>
+        <c:axId val="2085600664"/>
+      </c:barChart>
+      <c:catAx>
+        <c:axId val="2087091384"/>
+        <c:scaling>
+          <c:orientation val="maxMin"/>
+        </c:scaling>
+        <c:delete val="0"/>
+        <c:axPos val="l"/>
+        <c:majorTickMark val="out"/>
+        <c:minorTickMark val="none"/>
+        <c:tickLblPos val="nextTo"/>
+        <c:crossAx val="2085600664"/>
+        <c:crosses val="autoZero"/>
+        <c:auto val="1"/>
+        <c:lblAlgn val="ctr"/>
+        <c:lblOffset val="100"/>
+        <c:noMultiLvlLbl val="0"/>
+      </c:catAx>
+      <c:valAx>
+        <c:axId val="2085600664"/>
+        <c:scaling>
+          <c:orientation val="minMax"/>
+          <c:max val="42535.0"/>
+          <c:min val="42445.0"/>
+        </c:scaling>
+        <c:delete val="0"/>
+        <c:axPos val="t"/>
+        <c:majorGridlines/>
+        <c:numFmt formatCode="m/d/yy" sourceLinked="1"/>
+        <c:majorTickMark val="out"/>
+        <c:minorTickMark val="in"/>
+        <c:tickLblPos val="nextTo"/>
+        <c:spPr>
+          <a:effectLst/>
+        </c:spPr>
+        <c:crossAx val="2087091384"/>
+        <c:crosses val="autoZero"/>
+        <c:crossBetween val="between"/>
+        <c:majorUnit val="15.0"/>
+      </c:valAx>
+      <c:spPr>
+        <a:noFill/>
+      </c:spPr>
+    </c:plotArea>
+    <c:plotVisOnly val="1"/>
+    <c:dispBlanksAs val="gap"/>
+    <c:showDLblsOverMax val="0"/>
+  </c:chart>
+  <c:spPr>
+    <a:noFill/>
+  </c:spPr>
+  <c:txPr>
+    <a:bodyPr/>
+    <a:lstStyle/>
+    <a:p>
+      <a:pPr>
+        <a:defRPr>
+          <a:solidFill>
+            <a:schemeClr val="bg1"/>
+          </a:solidFill>
+        </a:defRPr>
+      </a:pPr>
+      <a:endParaRPr lang="en-US"/>
+    </a:p>
+  </c:txPr>
+  <c:externalData r:id="rId1">
+    <c:autoUpdate val="0"/>
+  </c:externalData>
+</c:chartSpace>
+</file>
+
 <file path=ppt/notesMasters/notesMaster1.xml><?xml version="1.0" encoding="utf-8"?>
 <p:notesMaster xmlns:a="http://schemas.openxmlformats.org/drawingml/2006/main" xmlns:r="http://schemas.openxmlformats.org/officeDocument/2006/relationships" xmlns:p="http://schemas.openxmlformats.org/presentationml/2006/main">
   <p:cSld>
@@ -1002,6 +1323,107 @@
   <p:cSld>
     <p:spTree>
       <p:nvGrpSpPr>
+        <p:cNvPr id="1" name="Shape 109"/>
+        <p:cNvGrpSpPr/>
+        <p:nvPr/>
+      </p:nvGrpSpPr>
+      <p:grpSpPr>
+        <a:xfrm>
+          <a:off x="0" y="0"/>
+          <a:ext cx="0" cy="0"/>
+          <a:chOff x="0" y="0"/>
+          <a:chExt cx="0" cy="0"/>
+        </a:xfrm>
+      </p:grpSpPr>
+      <p:sp>
+        <p:nvSpPr>
+          <p:cNvPr id="110" name="Shape 110"/>
+          <p:cNvSpPr>
+            <a:spLocks noGrp="1" noRot="1" noChangeAspect="1"/>
+          </p:cNvSpPr>
+          <p:nvPr>
+            <p:ph type="sldImg" idx="2"/>
+          </p:nvPr>
+        </p:nvSpPr>
+        <p:spPr>
+          <a:xfrm>
+            <a:off x="1143000" y="685800"/>
+            <a:ext cx="4572000" cy="3429000"/>
+          </a:xfrm>
+          <a:custGeom>
+            <a:avLst/>
+            <a:gdLst/>
+            <a:ahLst/>
+            <a:cxnLst/>
+            <a:rect l="0" t="0" r="0" b="0"/>
+            <a:pathLst>
+              <a:path w="120000" h="120000" extrusionOk="0">
+                <a:moveTo>
+                  <a:pt x="0" y="0"/>
+                </a:moveTo>
+                <a:lnTo>
+                  <a:pt x="120000" y="0"/>
+                </a:lnTo>
+                <a:lnTo>
+                  <a:pt x="120000" y="120000"/>
+                </a:lnTo>
+                <a:lnTo>
+                  <a:pt x="0" y="120000"/>
+                </a:lnTo>
+                <a:close/>
+              </a:path>
+            </a:pathLst>
+          </a:custGeom>
+        </p:spPr>
+      </p:sp>
+      <p:sp>
+        <p:nvSpPr>
+          <p:cNvPr id="111" name="Shape 111"/>
+          <p:cNvSpPr txBox="1">
+            <a:spLocks noGrp="1"/>
+          </p:cNvSpPr>
+          <p:nvPr>
+            <p:ph type="body" idx="1"/>
+          </p:nvPr>
+        </p:nvSpPr>
+        <p:spPr>
+          <a:xfrm>
+            <a:off x="685800" y="4343400"/>
+            <a:ext cx="5486399" cy="4114800"/>
+          </a:xfrm>
+          <a:prstGeom prst="rect">
+            <a:avLst/>
+          </a:prstGeom>
+        </p:spPr>
+        <p:txBody>
+          <a:bodyPr lIns="91425" tIns="91425" rIns="91425" bIns="91425" anchor="t" anchorCtr="0">
+            <a:noAutofit/>
+          </a:bodyPr>
+          <a:lstStyle/>
+          <a:p>
+            <a:pPr lvl="0">
+              <a:spcBef>
+                <a:spcPts val="0"/>
+              </a:spcBef>
+              <a:buNone/>
+            </a:pPr>
+            <a:endParaRPr/>
+          </a:p>
+        </p:txBody>
+      </p:sp>
+    </p:spTree>
+  </p:cSld>
+  <p:clrMapOvr>
+    <a:masterClrMapping/>
+  </p:clrMapOvr>
+</p:notes>
+</file>
+
+<file path=ppt/notesSlides/notesSlide7.xml><?xml version="1.0" encoding="utf-8"?>
+<p:notes xmlns:a="http://schemas.openxmlformats.org/drawingml/2006/main" xmlns:r="http://schemas.openxmlformats.org/officeDocument/2006/relationships" xmlns:p="http://schemas.openxmlformats.org/presentationml/2006/main" showMasterSp="0" showMasterPhAnim="0">
+  <p:cSld>
+    <p:spTree>
+      <p:nvGrpSpPr>
         <p:cNvPr id="1" name="Shape 198"/>
         <p:cNvGrpSpPr/>
         <p:nvPr/>
@@ -1098,7 +1520,7 @@
 </p:notes>
 </file>
 
-<file path=ppt/notesSlides/notesSlide7.xml><?xml version="1.0" encoding="utf-8"?>
+<file path=ppt/notesSlides/notesSlide8.xml><?xml version="1.0" encoding="utf-8"?>
 <p:notes xmlns:a="http://schemas.openxmlformats.org/drawingml/2006/main" xmlns:r="http://schemas.openxmlformats.org/officeDocument/2006/relationships" xmlns:p="http://schemas.openxmlformats.org/presentationml/2006/main" showMasterSp="0" showMasterPhAnim="0">
   <p:cSld>
     <p:spTree>
@@ -1159,107 +1581,6 @@
       <p:sp>
         <p:nvSpPr>
           <p:cNvPr id="111" name="Shape 111"/>
-          <p:cNvSpPr txBox="1">
-            <a:spLocks noGrp="1"/>
-          </p:cNvSpPr>
-          <p:nvPr>
-            <p:ph type="body" idx="1"/>
-          </p:nvPr>
-        </p:nvSpPr>
-        <p:spPr>
-          <a:xfrm>
-            <a:off x="685800" y="4343400"/>
-            <a:ext cx="5486399" cy="4114800"/>
-          </a:xfrm>
-          <a:prstGeom prst="rect">
-            <a:avLst/>
-          </a:prstGeom>
-        </p:spPr>
-        <p:txBody>
-          <a:bodyPr lIns="91425" tIns="91425" rIns="91425" bIns="91425" anchor="t" anchorCtr="0">
-            <a:noAutofit/>
-          </a:bodyPr>
-          <a:lstStyle/>
-          <a:p>
-            <a:pPr lvl="0">
-              <a:spcBef>
-                <a:spcPts val="0"/>
-              </a:spcBef>
-              <a:buNone/>
-            </a:pPr>
-            <a:endParaRPr/>
-          </a:p>
-        </p:txBody>
-      </p:sp>
-    </p:spTree>
-  </p:cSld>
-  <p:clrMapOvr>
-    <a:masterClrMapping/>
-  </p:clrMapOvr>
-</p:notes>
-</file>
-
-<file path=ppt/notesSlides/notesSlide8.xml><?xml version="1.0" encoding="utf-8"?>
-<p:notes xmlns:a="http://schemas.openxmlformats.org/drawingml/2006/main" xmlns:r="http://schemas.openxmlformats.org/officeDocument/2006/relationships" xmlns:p="http://schemas.openxmlformats.org/presentationml/2006/main" showMasterSp="0" showMasterPhAnim="0">
-  <p:cSld>
-    <p:spTree>
-      <p:nvGrpSpPr>
-        <p:cNvPr id="1" name="Shape 250"/>
-        <p:cNvGrpSpPr/>
-        <p:nvPr/>
-      </p:nvGrpSpPr>
-      <p:grpSpPr>
-        <a:xfrm>
-          <a:off x="0" y="0"/>
-          <a:ext cx="0" cy="0"/>
-          <a:chOff x="0" y="0"/>
-          <a:chExt cx="0" cy="0"/>
-        </a:xfrm>
-      </p:grpSpPr>
-      <p:sp>
-        <p:nvSpPr>
-          <p:cNvPr id="251" name="Shape 251"/>
-          <p:cNvSpPr>
-            <a:spLocks noGrp="1" noRot="1" noChangeAspect="1"/>
-          </p:cNvSpPr>
-          <p:nvPr>
-            <p:ph type="sldImg" idx="2"/>
-          </p:nvPr>
-        </p:nvSpPr>
-        <p:spPr>
-          <a:xfrm>
-            <a:off x="1143000" y="685800"/>
-            <a:ext cx="4572000" cy="3429000"/>
-          </a:xfrm>
-          <a:custGeom>
-            <a:avLst/>
-            <a:gdLst/>
-            <a:ahLst/>
-            <a:cxnLst/>
-            <a:rect l="0" t="0" r="0" b="0"/>
-            <a:pathLst>
-              <a:path w="120000" h="120000" extrusionOk="0">
-                <a:moveTo>
-                  <a:pt x="0" y="0"/>
-                </a:moveTo>
-                <a:lnTo>
-                  <a:pt x="120000" y="0"/>
-                </a:lnTo>
-                <a:lnTo>
-                  <a:pt x="120000" y="120000"/>
-                </a:lnTo>
-                <a:lnTo>
-                  <a:pt x="0" y="120000"/>
-                </a:lnTo>
-                <a:close/>
-              </a:path>
-            </a:pathLst>
-          </a:custGeom>
-        </p:spPr>
-      </p:sp>
-      <p:sp>
-        <p:nvSpPr>
-          <p:cNvPr id="252" name="Shape 252"/>
           <p:cNvSpPr txBox="1">
             <a:spLocks noGrp="1"/>
           </p:cNvSpPr>
@@ -2992,136 +3313,6 @@
 
 <file path=ppt/slideLayouts/slideLayout6.xml><?xml version="1.0" encoding="utf-8"?>
 <p:sldLayout xmlns:a="http://schemas.openxmlformats.org/drawingml/2006/main" xmlns:r="http://schemas.openxmlformats.org/officeDocument/2006/relationships" xmlns:p="http://schemas.openxmlformats.org/presentationml/2006/main">
-  <p:cSld name="Caption">
-    <p:spTree>
-      <p:nvGrpSpPr>
-        <p:cNvPr id="1" name="Shape 47"/>
-        <p:cNvGrpSpPr/>
-        <p:nvPr/>
-      </p:nvGrpSpPr>
-      <p:grpSpPr>
-        <a:xfrm>
-          <a:off x="0" y="0"/>
-          <a:ext cx="0" cy="0"/>
-          <a:chOff x="0" y="0"/>
-          <a:chExt cx="0" cy="0"/>
-        </a:xfrm>
-      </p:grpSpPr>
-      <p:sp>
-        <p:nvSpPr>
-          <p:cNvPr id="48" name="Shape 48"/>
-          <p:cNvSpPr txBox="1">
-            <a:spLocks noGrp="1"/>
-          </p:cNvSpPr>
-          <p:nvPr>
-            <p:ph type="body" idx="1"/>
-          </p:nvPr>
-        </p:nvSpPr>
-        <p:spPr>
-          <a:xfrm>
-            <a:off x="1165475" y="5775090"/>
-            <a:ext cx="7521300" cy="578700"/>
-          </a:xfrm>
-          <a:prstGeom prst="rect">
-            <a:avLst/>
-          </a:prstGeom>
-        </p:spPr>
-        <p:txBody>
-          <a:bodyPr lIns="91425" tIns="91425" rIns="91425" bIns="91425" anchor="t" anchorCtr="0"/>
-          <a:lstStyle>
-            <a:lvl1pPr lvl="0">
-              <a:spcBef>
-                <a:spcPts val="360"/>
-              </a:spcBef>
-              <a:buSzPct val="100000"/>
-              <a:buNone/>
-              <a:defRPr sz="1800"/>
-            </a:lvl1pPr>
-          </a:lstStyle>
-          <a:p>
-            <a:endParaRPr/>
-          </a:p>
-        </p:txBody>
-      </p:sp>
-      <p:cxnSp>
-        <p:nvCxnSpPr>
-          <p:cNvPr id="49" name="Shape 49"/>
-          <p:cNvCxnSpPr/>
-          <p:nvPr/>
-        </p:nvCxnSpPr>
-        <p:spPr>
-          <a:xfrm>
-            <a:off x="903825" y="-7925"/>
-            <a:ext cx="0" cy="6866100"/>
-          </a:xfrm>
-          <a:prstGeom prst="straightConnector1">
-            <a:avLst/>
-          </a:prstGeom>
-          <a:noFill/>
-          <a:ln w="9525" cap="flat" cmpd="sng">
-            <a:solidFill>
-              <a:srgbClr val="999FA9"/>
-            </a:solidFill>
-            <a:prstDash val="solid"/>
-            <a:round/>
-            <a:headEnd type="none" w="lg" len="lg"/>
-            <a:tailEnd type="none" w="lg" len="lg"/>
-          </a:ln>
-        </p:spPr>
-      </p:cxnSp>
-      <p:sp>
-        <p:nvSpPr>
-          <p:cNvPr id="50" name="Shape 50"/>
-          <p:cNvSpPr/>
-          <p:nvPr/>
-        </p:nvSpPr>
-        <p:spPr>
-          <a:xfrm>
-            <a:off x="808650" y="5952851"/>
-            <a:ext cx="190200" cy="190200"/>
-          </a:xfrm>
-          <a:prstGeom prst="ellipse">
-            <a:avLst/>
-          </a:prstGeom>
-          <a:solidFill>
-            <a:srgbClr val="2E3037"/>
-          </a:solidFill>
-          <a:ln w="9525" cap="flat" cmpd="sng">
-            <a:solidFill>
-              <a:srgbClr val="999FA9"/>
-            </a:solidFill>
-            <a:prstDash val="solid"/>
-            <a:round/>
-            <a:headEnd type="none" w="med" len="med"/>
-            <a:tailEnd type="none" w="med" len="med"/>
-          </a:ln>
-        </p:spPr>
-        <p:txBody>
-          <a:bodyPr lIns="91425" tIns="91425" rIns="91425" bIns="91425" anchor="ctr" anchorCtr="0">
-            <a:noAutofit/>
-          </a:bodyPr>
-          <a:lstStyle/>
-          <a:p>
-            <a:pPr lvl="0">
-              <a:spcBef>
-                <a:spcPts val="0"/>
-              </a:spcBef>
-              <a:buNone/>
-            </a:pPr>
-            <a:endParaRPr/>
-          </a:p>
-        </p:txBody>
-      </p:sp>
-    </p:spTree>
-  </p:cSld>
-  <p:clrMapOvr>
-    <a:masterClrMapping/>
-  </p:clrMapOvr>
-</p:sldLayout>
-</file>
-
-<file path=ppt/slideLayouts/slideLayout7.xml><?xml version="1.0" encoding="utf-8"?>
-<p:sldLayout xmlns:a="http://schemas.openxmlformats.org/drawingml/2006/main" xmlns:r="http://schemas.openxmlformats.org/officeDocument/2006/relationships" xmlns:p="http://schemas.openxmlformats.org/presentationml/2006/main">
   <p:cSld name="Blank key color">
     <p:bg>
       <p:bgPr>
@@ -3673,8 +3864,7 @@
     <p:sldLayoutId id="2147483651" r:id="rId3"/>
     <p:sldLayoutId id="2147483652" r:id="rId4"/>
     <p:sldLayoutId id="2147483654" r:id="rId5"/>
-    <p:sldLayoutId id="2147483655" r:id="rId6"/>
-    <p:sldLayoutId id="2147483657" r:id="rId7"/>
+    <p:sldLayoutId id="2147483657" r:id="rId6"/>
   </p:sldLayoutIdLst>
   <p:hf sldNum="0" hdr="0" ftr="0" dt="0"/>
   <p:txStyles>
@@ -4209,6 +4399,903 @@
   <p:cSld>
     <p:spTree>
       <p:nvGrpSpPr>
+        <p:cNvPr id="1" name="Shape 112"/>
+        <p:cNvGrpSpPr/>
+        <p:nvPr/>
+      </p:nvGrpSpPr>
+      <p:grpSpPr>
+        <a:xfrm>
+          <a:off x="0" y="0"/>
+          <a:ext cx="0" cy="0"/>
+          <a:chOff x="0" y="0"/>
+          <a:chExt cx="0" cy="0"/>
+        </a:xfrm>
+      </p:grpSpPr>
+      <p:sp>
+        <p:nvSpPr>
+          <p:cNvPr id="114" name="Shape 114"/>
+          <p:cNvSpPr txBox="1">
+            <a:spLocks noGrp="1"/>
+          </p:cNvSpPr>
+          <p:nvPr>
+            <p:ph type="title"/>
+          </p:nvPr>
+        </p:nvSpPr>
+        <p:spPr>
+          <a:xfrm>
+            <a:off x="1165475" y="665975"/>
+            <a:ext cx="6858000" cy="459900"/>
+          </a:xfrm>
+          <a:prstGeom prst="rect">
+            <a:avLst/>
+          </a:prstGeom>
+        </p:spPr>
+        <p:txBody>
+          <a:bodyPr lIns="91425" tIns="91425" rIns="91425" bIns="91425" anchor="b" anchorCtr="0">
+            <a:noAutofit/>
+          </a:bodyPr>
+          <a:lstStyle/>
+          <a:p>
+            <a:pPr lvl="0">
+              <a:spcBef>
+                <a:spcPts val="0"/>
+              </a:spcBef>
+              <a:buNone/>
+            </a:pPr>
+            <a:r>
+              <a:rPr lang="en-US" sz="2800" smtClean="0"/>
+              <a:t>Schedule</a:t>
+            </a:r>
+            <a:endParaRPr lang="en-US" sz="2800"/>
+          </a:p>
+        </p:txBody>
+      </p:sp>
+      <p:graphicFrame>
+        <p:nvGraphicFramePr>
+          <p:cNvPr id="7" name="Chart 6"/>
+          <p:cNvGraphicFramePr>
+            <a:graphicFrameLocks/>
+          </p:cNvGraphicFramePr>
+          <p:nvPr>
+            <p:extLst>
+              <p:ext uri="{D42A27DB-BD31-4B8C-83A1-F6EECF244321}">
+                <p14:modId xmlns:p14="http://schemas.microsoft.com/office/powerpoint/2010/main" val="2252365123"/>
+              </p:ext>
+            </p:extLst>
+          </p:nvPr>
+        </p:nvGraphicFramePr>
+        <p:xfrm>
+          <a:off x="1165475" y="1352962"/>
+          <a:ext cx="7521300" cy="3713744"/>
+        </p:xfrm>
+        <a:graphic>
+          <a:graphicData uri="http://schemas.openxmlformats.org/drawingml/2006/chart">
+            <c:chart xmlns:c="http://schemas.openxmlformats.org/drawingml/2006/chart" xmlns:r="http://schemas.openxmlformats.org/officeDocument/2006/relationships" r:id="rId3"/>
+          </a:graphicData>
+        </a:graphic>
+      </p:graphicFrame>
+      <p:graphicFrame>
+        <p:nvGraphicFramePr>
+          <p:cNvPr id="5" name="Table 4"/>
+          <p:cNvGraphicFramePr>
+            <a:graphicFrameLocks noGrp="1"/>
+          </p:cNvGraphicFramePr>
+          <p:nvPr>
+            <p:extLst>
+              <p:ext uri="{D42A27DB-BD31-4B8C-83A1-F6EECF244321}">
+                <p14:modId xmlns:p14="http://schemas.microsoft.com/office/powerpoint/2010/main" val="1432210437"/>
+              </p:ext>
+            </p:extLst>
+          </p:nvPr>
+        </p:nvGraphicFramePr>
+        <p:xfrm>
+          <a:off x="1165475" y="5373050"/>
+          <a:ext cx="7521300" cy="1020759"/>
+        </p:xfrm>
+        <a:graphic>
+          <a:graphicData uri="http://schemas.openxmlformats.org/drawingml/2006/table">
+            <a:tbl>
+              <a:tblPr firstRow="1" bandRow="1">
+                <a:tableStyleId>{D7AC3CCA-C797-4891-BE02-D94E43425B78}</a:tableStyleId>
+              </a:tblPr>
+              <a:tblGrid>
+                <a:gridCol w="1253550"/>
+                <a:gridCol w="1253550"/>
+                <a:gridCol w="1253550"/>
+                <a:gridCol w="1253550"/>
+                <a:gridCol w="1253550"/>
+                <a:gridCol w="1253550"/>
+              </a:tblGrid>
+              <a:tr h="502600">
+                <a:tc>
+                  <a:txBody>
+                    <a:bodyPr/>
+                    <a:lstStyle/>
+                    <a:p>
+                      <a:r>
+                        <a:rPr lang="de-CH" sz="1800" dirty="0" smtClean="0">
+                          <a:solidFill>
+                            <a:srgbClr val="FDFEFE"/>
+                          </a:solidFill>
+                        </a:rPr>
+                        <a:t>Sprint 1</a:t>
+                      </a:r>
+                      <a:endParaRPr lang="en" sz="1800" dirty="0">
+                        <a:solidFill>
+                          <a:srgbClr val="FDFEFE"/>
+                        </a:solidFill>
+                      </a:endParaRPr>
+                    </a:p>
+                  </a:txBody>
+                  <a:tcPr>
+                    <a:lnL w="19050" cap="flat" cmpd="sng" algn="ctr">
+                      <a:solidFill>
+                        <a:srgbClr val="CCCCCC"/>
+                      </a:solidFill>
+                      <a:prstDash val="solid"/>
+                      <a:round/>
+                      <a:headEnd type="none" w="med" len="med"/>
+                      <a:tailEnd type="none" w="med" len="med"/>
+                    </a:lnL>
+                    <a:lnR w="19050" cap="flat" cmpd="sng" algn="ctr">
+                      <a:solidFill>
+                        <a:srgbClr val="CCCCCC"/>
+                      </a:solidFill>
+                      <a:prstDash val="solid"/>
+                      <a:round/>
+                      <a:headEnd type="none" w="med" len="med"/>
+                      <a:tailEnd type="none" w="med" len="med"/>
+                    </a:lnR>
+                    <a:lnT w="19050" cap="flat" cmpd="sng" algn="ctr">
+                      <a:solidFill>
+                        <a:srgbClr val="CCCCCC"/>
+                      </a:solidFill>
+                      <a:prstDash val="solid"/>
+                      <a:round/>
+                      <a:headEnd type="none" w="med" len="med"/>
+                      <a:tailEnd type="none" w="med" len="med"/>
+                    </a:lnT>
+                    <a:lnB w="19050" cap="flat" cmpd="sng" algn="ctr">
+                      <a:solidFill>
+                        <a:srgbClr val="CCCCCC"/>
+                      </a:solidFill>
+                      <a:prstDash val="solid"/>
+                      <a:round/>
+                      <a:headEnd type="none" w="med" len="med"/>
+                      <a:tailEnd type="none" w="med" len="med"/>
+                    </a:lnB>
+                    <a:noFill/>
+                  </a:tcPr>
+                </a:tc>
+                <a:tc>
+                  <a:txBody>
+                    <a:bodyPr/>
+                    <a:lstStyle/>
+                    <a:p>
+                      <a:r>
+                        <a:rPr lang="de-CH" sz="1800" dirty="0" smtClean="0">
+                          <a:solidFill>
+                            <a:srgbClr val="FDFEFE"/>
+                          </a:solidFill>
+                        </a:rPr>
+                        <a:t>Sprint 2</a:t>
+                      </a:r>
+                      <a:endParaRPr lang="en" sz="1800" dirty="0">
+                        <a:solidFill>
+                          <a:srgbClr val="FDFEFE"/>
+                        </a:solidFill>
+                      </a:endParaRPr>
+                    </a:p>
+                  </a:txBody>
+                  <a:tcPr>
+                    <a:lnL w="19050" cap="flat" cmpd="sng" algn="ctr">
+                      <a:solidFill>
+                        <a:srgbClr val="CCCCCC"/>
+                      </a:solidFill>
+                      <a:prstDash val="solid"/>
+                      <a:round/>
+                      <a:headEnd type="none" w="med" len="med"/>
+                      <a:tailEnd type="none" w="med" len="med"/>
+                    </a:lnL>
+                    <a:lnR w="19050" cap="flat" cmpd="sng" algn="ctr">
+                      <a:solidFill>
+                        <a:srgbClr val="CCCCCC"/>
+                      </a:solidFill>
+                      <a:prstDash val="solid"/>
+                      <a:round/>
+                      <a:headEnd type="none" w="med" len="med"/>
+                      <a:tailEnd type="none" w="med" len="med"/>
+                    </a:lnR>
+                    <a:lnT w="19050" cap="flat" cmpd="sng" algn="ctr">
+                      <a:solidFill>
+                        <a:srgbClr val="CCCCCC"/>
+                      </a:solidFill>
+                      <a:prstDash val="solid"/>
+                      <a:round/>
+                      <a:headEnd type="none" w="med" len="med"/>
+                      <a:tailEnd type="none" w="med" len="med"/>
+                    </a:lnT>
+                    <a:lnB w="19050" cap="flat" cmpd="sng" algn="ctr">
+                      <a:solidFill>
+                        <a:srgbClr val="CCCCCC"/>
+                      </a:solidFill>
+                      <a:prstDash val="solid"/>
+                      <a:round/>
+                      <a:headEnd type="none" w="med" len="med"/>
+                      <a:tailEnd type="none" w="med" len="med"/>
+                    </a:lnB>
+                    <a:noFill/>
+                  </a:tcPr>
+                </a:tc>
+                <a:tc>
+                  <a:txBody>
+                    <a:bodyPr/>
+                    <a:lstStyle/>
+                    <a:p>
+                      <a:r>
+                        <a:rPr lang="de-CH" sz="1800" dirty="0" smtClean="0">
+                          <a:solidFill>
+                            <a:srgbClr val="FDFEFE"/>
+                          </a:solidFill>
+                        </a:rPr>
+                        <a:t>Sprint 3</a:t>
+                      </a:r>
+                      <a:endParaRPr lang="en" sz="1800" dirty="0">
+                        <a:solidFill>
+                          <a:srgbClr val="FDFEFE"/>
+                        </a:solidFill>
+                      </a:endParaRPr>
+                    </a:p>
+                  </a:txBody>
+                  <a:tcPr>
+                    <a:lnL w="19050" cap="flat" cmpd="sng" algn="ctr">
+                      <a:solidFill>
+                        <a:srgbClr val="CCCCCC"/>
+                      </a:solidFill>
+                      <a:prstDash val="solid"/>
+                      <a:round/>
+                      <a:headEnd type="none" w="med" len="med"/>
+                      <a:tailEnd type="none" w="med" len="med"/>
+                    </a:lnL>
+                    <a:lnR w="19050" cap="flat" cmpd="sng" algn="ctr">
+                      <a:solidFill>
+                        <a:srgbClr val="CCCCCC"/>
+                      </a:solidFill>
+                      <a:prstDash val="solid"/>
+                      <a:round/>
+                      <a:headEnd type="none" w="med" len="med"/>
+                      <a:tailEnd type="none" w="med" len="med"/>
+                    </a:lnR>
+                    <a:lnT w="19050" cap="flat" cmpd="sng" algn="ctr">
+                      <a:solidFill>
+                        <a:srgbClr val="CCCCCC"/>
+                      </a:solidFill>
+                      <a:prstDash val="solid"/>
+                      <a:round/>
+                      <a:headEnd type="none" w="med" len="med"/>
+                      <a:tailEnd type="none" w="med" len="med"/>
+                    </a:lnT>
+                    <a:lnB w="19050" cap="flat" cmpd="sng" algn="ctr">
+                      <a:solidFill>
+                        <a:srgbClr val="CCCCCC"/>
+                      </a:solidFill>
+                      <a:prstDash val="solid"/>
+                      <a:round/>
+                      <a:headEnd type="none" w="med" len="med"/>
+                      <a:tailEnd type="none" w="med" len="med"/>
+                    </a:lnB>
+                    <a:noFill/>
+                  </a:tcPr>
+                </a:tc>
+                <a:tc>
+                  <a:txBody>
+                    <a:bodyPr/>
+                    <a:lstStyle/>
+                    <a:p>
+                      <a:r>
+                        <a:rPr lang="de-CH" sz="1800" dirty="0" smtClean="0">
+                          <a:solidFill>
+                            <a:srgbClr val="FDFEFE"/>
+                          </a:solidFill>
+                        </a:rPr>
+                        <a:t>Sprint 4</a:t>
+                      </a:r>
+                      <a:endParaRPr lang="en" sz="1800" dirty="0">
+                        <a:solidFill>
+                          <a:srgbClr val="FDFEFE"/>
+                        </a:solidFill>
+                      </a:endParaRPr>
+                    </a:p>
+                  </a:txBody>
+                  <a:tcPr>
+                    <a:lnL w="19050" cap="flat" cmpd="sng" algn="ctr">
+                      <a:solidFill>
+                        <a:srgbClr val="CCCCCC"/>
+                      </a:solidFill>
+                      <a:prstDash val="solid"/>
+                      <a:round/>
+                      <a:headEnd type="none" w="med" len="med"/>
+                      <a:tailEnd type="none" w="med" len="med"/>
+                    </a:lnL>
+                    <a:lnR w="19050" cap="flat" cmpd="sng" algn="ctr">
+                      <a:solidFill>
+                        <a:srgbClr val="CCCCCC"/>
+                      </a:solidFill>
+                      <a:prstDash val="solid"/>
+                      <a:round/>
+                      <a:headEnd type="none" w="med" len="med"/>
+                      <a:tailEnd type="none" w="med" len="med"/>
+                    </a:lnR>
+                    <a:lnT w="19050" cap="flat" cmpd="sng" algn="ctr">
+                      <a:solidFill>
+                        <a:srgbClr val="CCCCCC"/>
+                      </a:solidFill>
+                      <a:prstDash val="solid"/>
+                      <a:round/>
+                      <a:headEnd type="none" w="med" len="med"/>
+                      <a:tailEnd type="none" w="med" len="med"/>
+                    </a:lnT>
+                    <a:lnB w="19050" cap="flat" cmpd="sng" algn="ctr">
+                      <a:solidFill>
+                        <a:srgbClr val="CCCCCC"/>
+                      </a:solidFill>
+                      <a:prstDash val="solid"/>
+                      <a:round/>
+                      <a:headEnd type="none" w="med" len="med"/>
+                      <a:tailEnd type="none" w="med" len="med"/>
+                    </a:lnB>
+                    <a:noFill/>
+                  </a:tcPr>
+                </a:tc>
+                <a:tc>
+                  <a:txBody>
+                    <a:bodyPr/>
+                    <a:lstStyle/>
+                    <a:p>
+                      <a:r>
+                        <a:rPr lang="de-CH" sz="1800" dirty="0" smtClean="0">
+                          <a:solidFill>
+                            <a:srgbClr val="FDFEFE"/>
+                          </a:solidFill>
+                        </a:rPr>
+                        <a:t>Sprint 5</a:t>
+                      </a:r>
+                      <a:endParaRPr lang="en" sz="1800" dirty="0">
+                        <a:solidFill>
+                          <a:srgbClr val="FDFEFE"/>
+                        </a:solidFill>
+                      </a:endParaRPr>
+                    </a:p>
+                  </a:txBody>
+                  <a:tcPr>
+                    <a:lnL w="19050" cap="flat" cmpd="sng" algn="ctr">
+                      <a:solidFill>
+                        <a:srgbClr val="CCCCCC"/>
+                      </a:solidFill>
+                      <a:prstDash val="solid"/>
+                      <a:round/>
+                      <a:headEnd type="none" w="med" len="med"/>
+                      <a:tailEnd type="none" w="med" len="med"/>
+                    </a:lnL>
+                    <a:lnR w="19050" cap="flat" cmpd="sng" algn="ctr">
+                      <a:solidFill>
+                        <a:srgbClr val="CCCCCC"/>
+                      </a:solidFill>
+                      <a:prstDash val="solid"/>
+                      <a:round/>
+                      <a:headEnd type="none" w="med" len="med"/>
+                      <a:tailEnd type="none" w="med" len="med"/>
+                    </a:lnR>
+                    <a:lnT w="19050" cap="flat" cmpd="sng" algn="ctr">
+                      <a:solidFill>
+                        <a:srgbClr val="CCCCCC"/>
+                      </a:solidFill>
+                      <a:prstDash val="solid"/>
+                      <a:round/>
+                      <a:headEnd type="none" w="med" len="med"/>
+                      <a:tailEnd type="none" w="med" len="med"/>
+                    </a:lnT>
+                    <a:lnB w="19050" cap="flat" cmpd="sng" algn="ctr">
+                      <a:solidFill>
+                        <a:srgbClr val="CCCCCC"/>
+                      </a:solidFill>
+                      <a:prstDash val="solid"/>
+                      <a:round/>
+                      <a:headEnd type="none" w="med" len="med"/>
+                      <a:tailEnd type="none" w="med" len="med"/>
+                    </a:lnB>
+                    <a:noFill/>
+                  </a:tcPr>
+                </a:tc>
+                <a:tc>
+                  <a:txBody>
+                    <a:bodyPr/>
+                    <a:lstStyle/>
+                    <a:p>
+                      <a:r>
+                        <a:rPr lang="de-CH" sz="1800" dirty="0" smtClean="0">
+                          <a:solidFill>
+                            <a:srgbClr val="FDFEFE"/>
+                          </a:solidFill>
+                        </a:rPr>
+                        <a:t>Sprint 6</a:t>
+                      </a:r>
+                      <a:endParaRPr lang="en" sz="1800" dirty="0">
+                        <a:solidFill>
+                          <a:srgbClr val="FDFEFE"/>
+                        </a:solidFill>
+                      </a:endParaRPr>
+                    </a:p>
+                  </a:txBody>
+                  <a:tcPr>
+                    <a:lnL w="19050" cap="flat" cmpd="sng" algn="ctr">
+                      <a:solidFill>
+                        <a:srgbClr val="CCCCCC"/>
+                      </a:solidFill>
+                      <a:prstDash val="solid"/>
+                      <a:round/>
+                      <a:headEnd type="none" w="med" len="med"/>
+                      <a:tailEnd type="none" w="med" len="med"/>
+                    </a:lnL>
+                    <a:lnR w="19050" cap="flat" cmpd="sng" algn="ctr">
+                      <a:solidFill>
+                        <a:srgbClr val="CCCCCC"/>
+                      </a:solidFill>
+                      <a:prstDash val="solid"/>
+                      <a:round/>
+                      <a:headEnd type="none" w="med" len="med"/>
+                      <a:tailEnd type="none" w="med" len="med"/>
+                    </a:lnR>
+                    <a:lnT w="19050" cap="flat" cmpd="sng" algn="ctr">
+                      <a:solidFill>
+                        <a:srgbClr val="CCCCCC"/>
+                      </a:solidFill>
+                      <a:prstDash val="solid"/>
+                      <a:round/>
+                      <a:headEnd type="none" w="med" len="med"/>
+                      <a:tailEnd type="none" w="med" len="med"/>
+                    </a:lnT>
+                    <a:lnB w="19050" cap="flat" cmpd="sng" algn="ctr">
+                      <a:solidFill>
+                        <a:srgbClr val="CCCCCC"/>
+                      </a:solidFill>
+                      <a:prstDash val="solid"/>
+                      <a:round/>
+                      <a:headEnd type="none" w="med" len="med"/>
+                      <a:tailEnd type="none" w="med" len="med"/>
+                    </a:lnB>
+                    <a:noFill/>
+                  </a:tcPr>
+                </a:tc>
+              </a:tr>
+              <a:tr h="502600">
+                <a:tc>
+                  <a:txBody>
+                    <a:bodyPr/>
+                    <a:lstStyle/>
+                    <a:p>
+                      <a:r>
+                        <a:rPr lang="en-US" noProof="0" dirty="0" smtClean="0">
+                          <a:solidFill>
+                            <a:srgbClr val="FDFEFE"/>
+                          </a:solidFill>
+                        </a:rPr>
+                        <a:t>Minimal</a:t>
+                      </a:r>
+                      <a:r>
+                        <a:rPr lang="en-US" baseline="0" noProof="0" dirty="0" smtClean="0">
+                          <a:solidFill>
+                            <a:srgbClr val="FDFEFE"/>
+                          </a:solidFill>
+                        </a:rPr>
+                        <a:t> requirements</a:t>
+                      </a:r>
+                      <a:endParaRPr lang="en-US" noProof="0" dirty="0">
+                        <a:solidFill>
+                          <a:srgbClr val="FDFEFE"/>
+                        </a:solidFill>
+                      </a:endParaRPr>
+                    </a:p>
+                  </a:txBody>
+                  <a:tcPr>
+                    <a:lnL w="19050" cap="flat" cmpd="sng" algn="ctr">
+                      <a:solidFill>
+                        <a:srgbClr val="CCCCCC"/>
+                      </a:solidFill>
+                      <a:prstDash val="solid"/>
+                      <a:round/>
+                      <a:headEnd type="none" w="med" len="med"/>
+                      <a:tailEnd type="none" w="med" len="med"/>
+                    </a:lnL>
+                    <a:lnR w="19050" cap="flat" cmpd="sng" algn="ctr">
+                      <a:solidFill>
+                        <a:srgbClr val="CCCCCC"/>
+                      </a:solidFill>
+                      <a:prstDash val="solid"/>
+                      <a:round/>
+                      <a:headEnd type="none" w="med" len="med"/>
+                      <a:tailEnd type="none" w="med" len="med"/>
+                    </a:lnR>
+                    <a:lnT w="19050" cap="flat" cmpd="sng" algn="ctr">
+                      <a:solidFill>
+                        <a:srgbClr val="CCCCCC"/>
+                      </a:solidFill>
+                      <a:prstDash val="solid"/>
+                      <a:round/>
+                      <a:headEnd type="none" w="med" len="med"/>
+                      <a:tailEnd type="none" w="med" len="med"/>
+                    </a:lnT>
+                    <a:lnB w="19050" cap="flat" cmpd="sng" algn="ctr">
+                      <a:solidFill>
+                        <a:srgbClr val="CCCCCC"/>
+                      </a:solidFill>
+                      <a:prstDash val="solid"/>
+                      <a:round/>
+                      <a:headEnd type="none" w="med" len="med"/>
+                      <a:tailEnd type="none" w="med" len="med"/>
+                    </a:lnB>
+                    <a:noFill/>
+                  </a:tcPr>
+                </a:tc>
+                <a:tc>
+                  <a:txBody>
+                    <a:bodyPr/>
+                    <a:lstStyle/>
+                    <a:p>
+                      <a:r>
+                        <a:rPr lang="en-US" noProof="0" smtClean="0">
+                          <a:solidFill>
+                            <a:srgbClr val="FDFEFE"/>
+                          </a:solidFill>
+                        </a:rPr>
+                        <a:t>Noise-removal</a:t>
+                      </a:r>
+                      <a:endParaRPr lang="en-US" noProof="0">
+                        <a:solidFill>
+                          <a:srgbClr val="FDFEFE"/>
+                        </a:solidFill>
+                      </a:endParaRPr>
+                    </a:p>
+                  </a:txBody>
+                  <a:tcPr>
+                    <a:lnL w="19050" cap="flat" cmpd="sng" algn="ctr">
+                      <a:solidFill>
+                        <a:srgbClr val="CCCCCC"/>
+                      </a:solidFill>
+                      <a:prstDash val="solid"/>
+                      <a:round/>
+                      <a:headEnd type="none" w="med" len="med"/>
+                      <a:tailEnd type="none" w="med" len="med"/>
+                    </a:lnL>
+                    <a:lnR w="19050" cap="flat" cmpd="sng" algn="ctr">
+                      <a:solidFill>
+                        <a:srgbClr val="CCCCCC"/>
+                      </a:solidFill>
+                      <a:prstDash val="solid"/>
+                      <a:round/>
+                      <a:headEnd type="none" w="med" len="med"/>
+                      <a:tailEnd type="none" w="med" len="med"/>
+                    </a:lnR>
+                    <a:lnT w="19050" cap="flat" cmpd="sng" algn="ctr">
+                      <a:solidFill>
+                        <a:srgbClr val="CCCCCC"/>
+                      </a:solidFill>
+                      <a:prstDash val="solid"/>
+                      <a:round/>
+                      <a:headEnd type="none" w="med" len="med"/>
+                      <a:tailEnd type="none" w="med" len="med"/>
+                    </a:lnT>
+                    <a:lnB w="19050" cap="flat" cmpd="sng" algn="ctr">
+                      <a:solidFill>
+                        <a:srgbClr val="CCCCCC"/>
+                      </a:solidFill>
+                      <a:prstDash val="solid"/>
+                      <a:round/>
+                      <a:headEnd type="none" w="med" len="med"/>
+                      <a:tailEnd type="none" w="med" len="med"/>
+                    </a:lnB>
+                    <a:noFill/>
+                  </a:tcPr>
+                </a:tc>
+                <a:tc>
+                  <a:txBody>
+                    <a:bodyPr/>
+                    <a:lstStyle/>
+                    <a:p>
+                      <a:r>
+                        <a:rPr lang="en-US" noProof="0" smtClean="0">
+                          <a:solidFill>
+                            <a:srgbClr val="FDFEFE"/>
+                          </a:solidFill>
+                        </a:rPr>
+                        <a:t>Phase</a:t>
+                      </a:r>
+                      <a:r>
+                        <a:rPr lang="en-US" baseline="0" noProof="0" smtClean="0">
+                          <a:solidFill>
+                            <a:srgbClr val="FDFEFE"/>
+                          </a:solidFill>
+                        </a:rPr>
+                        <a:t> image</a:t>
+                      </a:r>
+                    </a:p>
+                    <a:p>
+                      <a:r>
+                        <a:rPr lang="en-US" baseline="0" noProof="0" smtClean="0">
+                          <a:solidFill>
+                            <a:srgbClr val="FDFEFE"/>
+                          </a:solidFill>
+                        </a:rPr>
+                        <a:t>WT</a:t>
+                      </a:r>
+                      <a:endParaRPr lang="en-US" noProof="0">
+                        <a:solidFill>
+                          <a:srgbClr val="FDFEFE"/>
+                        </a:solidFill>
+                      </a:endParaRPr>
+                    </a:p>
+                  </a:txBody>
+                  <a:tcPr>
+                    <a:lnL w="19050" cap="flat" cmpd="sng" algn="ctr">
+                      <a:solidFill>
+                        <a:srgbClr val="CCCCCC"/>
+                      </a:solidFill>
+                      <a:prstDash val="solid"/>
+                      <a:round/>
+                      <a:headEnd type="none" w="med" len="med"/>
+                      <a:tailEnd type="none" w="med" len="med"/>
+                    </a:lnL>
+                    <a:lnR w="19050" cap="flat" cmpd="sng" algn="ctr">
+                      <a:solidFill>
+                        <a:srgbClr val="CCCCCC"/>
+                      </a:solidFill>
+                      <a:prstDash val="solid"/>
+                      <a:round/>
+                      <a:headEnd type="none" w="med" len="med"/>
+                      <a:tailEnd type="none" w="med" len="med"/>
+                    </a:lnR>
+                    <a:lnT w="19050" cap="flat" cmpd="sng" algn="ctr">
+                      <a:solidFill>
+                        <a:srgbClr val="CCCCCC"/>
+                      </a:solidFill>
+                      <a:prstDash val="solid"/>
+                      <a:round/>
+                      <a:headEnd type="none" w="med" len="med"/>
+                      <a:tailEnd type="none" w="med" len="med"/>
+                    </a:lnT>
+                    <a:lnB w="19050" cap="flat" cmpd="sng" algn="ctr">
+                      <a:solidFill>
+                        <a:srgbClr val="CCCCCC"/>
+                      </a:solidFill>
+                      <a:prstDash val="solid"/>
+                      <a:round/>
+                      <a:headEnd type="none" w="med" len="med"/>
+                      <a:tailEnd type="none" w="med" len="med"/>
+                    </a:lnB>
+                    <a:noFill/>
+                  </a:tcPr>
+                </a:tc>
+                <a:tc>
+                  <a:txBody>
+                    <a:bodyPr/>
+                    <a:lstStyle/>
+                    <a:p>
+                      <a:r>
+                        <a:rPr lang="en-US" noProof="0" smtClean="0">
+                          <a:solidFill>
+                            <a:srgbClr val="FDFEFE"/>
+                          </a:solidFill>
+                        </a:rPr>
+                        <a:t>Explore</a:t>
+                      </a:r>
+                      <a:r>
+                        <a:rPr lang="en-US" baseline="0" noProof="0" smtClean="0">
+                          <a:solidFill>
+                            <a:srgbClr val="FDFEFE"/>
+                          </a:solidFill>
+                        </a:rPr>
+                        <a:t> alternatives</a:t>
+                      </a:r>
+                      <a:endParaRPr lang="en-US" noProof="0">
+                        <a:solidFill>
+                          <a:srgbClr val="FDFEFE"/>
+                        </a:solidFill>
+                      </a:endParaRPr>
+                    </a:p>
+                  </a:txBody>
+                  <a:tcPr>
+                    <a:lnL w="19050" cap="flat" cmpd="sng" algn="ctr">
+                      <a:solidFill>
+                        <a:srgbClr val="CCCCCC"/>
+                      </a:solidFill>
+                      <a:prstDash val="solid"/>
+                      <a:round/>
+                      <a:headEnd type="none" w="med" len="med"/>
+                      <a:tailEnd type="none" w="med" len="med"/>
+                    </a:lnL>
+                    <a:lnR w="19050" cap="flat" cmpd="sng" algn="ctr">
+                      <a:solidFill>
+                        <a:srgbClr val="CCCCCC"/>
+                      </a:solidFill>
+                      <a:prstDash val="solid"/>
+                      <a:round/>
+                      <a:headEnd type="none" w="med" len="med"/>
+                      <a:tailEnd type="none" w="med" len="med"/>
+                    </a:lnR>
+                    <a:lnT w="19050" cap="flat" cmpd="sng" algn="ctr">
+                      <a:solidFill>
+                        <a:srgbClr val="CCCCCC"/>
+                      </a:solidFill>
+                      <a:prstDash val="solid"/>
+                      <a:round/>
+                      <a:headEnd type="none" w="med" len="med"/>
+                      <a:tailEnd type="none" w="med" len="med"/>
+                    </a:lnT>
+                    <a:lnB w="19050" cap="flat" cmpd="sng" algn="ctr">
+                      <a:solidFill>
+                        <a:srgbClr val="CCCCCC"/>
+                      </a:solidFill>
+                      <a:prstDash val="solid"/>
+                      <a:round/>
+                      <a:headEnd type="none" w="med" len="med"/>
+                      <a:tailEnd type="none" w="med" len="med"/>
+                    </a:lnB>
+                    <a:noFill/>
+                  </a:tcPr>
+                </a:tc>
+                <a:tc>
+                  <a:txBody>
+                    <a:bodyPr/>
+                    <a:lstStyle/>
+                    <a:p>
+                      <a:r>
+                        <a:rPr lang="en-US" noProof="0" smtClean="0">
+                          <a:solidFill>
+                            <a:srgbClr val="FDFEFE"/>
+                          </a:solidFill>
+                        </a:rPr>
+                        <a:t>Evaluation</a:t>
+                      </a:r>
+                      <a:endParaRPr lang="en-US" noProof="0">
+                        <a:solidFill>
+                          <a:srgbClr val="FDFEFE"/>
+                        </a:solidFill>
+                      </a:endParaRPr>
+                    </a:p>
+                  </a:txBody>
+                  <a:tcPr>
+                    <a:lnL w="19050" cap="flat" cmpd="sng" algn="ctr">
+                      <a:solidFill>
+                        <a:srgbClr val="CCCCCC"/>
+                      </a:solidFill>
+                      <a:prstDash val="solid"/>
+                      <a:round/>
+                      <a:headEnd type="none" w="med" len="med"/>
+                      <a:tailEnd type="none" w="med" len="med"/>
+                    </a:lnL>
+                    <a:lnR w="19050" cap="flat" cmpd="sng" algn="ctr">
+                      <a:solidFill>
+                        <a:srgbClr val="CCCCCC"/>
+                      </a:solidFill>
+                      <a:prstDash val="solid"/>
+                      <a:round/>
+                      <a:headEnd type="none" w="med" len="med"/>
+                      <a:tailEnd type="none" w="med" len="med"/>
+                    </a:lnR>
+                    <a:lnT w="19050" cap="flat" cmpd="sng" algn="ctr">
+                      <a:solidFill>
+                        <a:srgbClr val="CCCCCC"/>
+                      </a:solidFill>
+                      <a:prstDash val="solid"/>
+                      <a:round/>
+                      <a:headEnd type="none" w="med" len="med"/>
+                      <a:tailEnd type="none" w="med" len="med"/>
+                    </a:lnT>
+                    <a:lnB w="19050" cap="flat" cmpd="sng" algn="ctr">
+                      <a:solidFill>
+                        <a:srgbClr val="CCCCCC"/>
+                      </a:solidFill>
+                      <a:prstDash val="solid"/>
+                      <a:round/>
+                      <a:headEnd type="none" w="med" len="med"/>
+                      <a:tailEnd type="none" w="med" len="med"/>
+                    </a:lnB>
+                    <a:noFill/>
+                  </a:tcPr>
+                </a:tc>
+                <a:tc>
+                  <a:txBody>
+                    <a:bodyPr/>
+                    <a:lstStyle/>
+                    <a:p>
+                      <a:r>
+                        <a:rPr lang="en-US" noProof="0" dirty="0" smtClean="0">
+                          <a:solidFill>
+                            <a:srgbClr val="FDFEFE"/>
+                          </a:solidFill>
+                        </a:rPr>
+                        <a:t>Reserved</a:t>
+                      </a:r>
+                      <a:endParaRPr lang="en-US" noProof="0" dirty="0">
+                        <a:solidFill>
+                          <a:srgbClr val="FDFEFE"/>
+                        </a:solidFill>
+                      </a:endParaRPr>
+                    </a:p>
+                  </a:txBody>
+                  <a:tcPr>
+                    <a:lnL w="19050" cap="flat" cmpd="sng" algn="ctr">
+                      <a:solidFill>
+                        <a:srgbClr val="CCCCCC"/>
+                      </a:solidFill>
+                      <a:prstDash val="solid"/>
+                      <a:round/>
+                      <a:headEnd type="none" w="med" len="med"/>
+                      <a:tailEnd type="none" w="med" len="med"/>
+                    </a:lnL>
+                    <a:lnR w="19050" cap="flat" cmpd="sng" algn="ctr">
+                      <a:solidFill>
+                        <a:srgbClr val="CCCCCC"/>
+                      </a:solidFill>
+                      <a:prstDash val="solid"/>
+                      <a:round/>
+                      <a:headEnd type="none" w="med" len="med"/>
+                      <a:tailEnd type="none" w="med" len="med"/>
+                    </a:lnR>
+                    <a:lnT w="19050" cap="flat" cmpd="sng" algn="ctr">
+                      <a:solidFill>
+                        <a:srgbClr val="CCCCCC"/>
+                      </a:solidFill>
+                      <a:prstDash val="solid"/>
+                      <a:round/>
+                      <a:headEnd type="none" w="med" len="med"/>
+                      <a:tailEnd type="none" w="med" len="med"/>
+                    </a:lnT>
+                    <a:lnB w="19050" cap="flat" cmpd="sng" algn="ctr">
+                      <a:solidFill>
+                        <a:srgbClr val="CCCCCC"/>
+                      </a:solidFill>
+                      <a:prstDash val="solid"/>
+                      <a:round/>
+                      <a:headEnd type="none" w="med" len="med"/>
+                      <a:tailEnd type="none" w="med" len="med"/>
+                    </a:lnB>
+                    <a:noFill/>
+                  </a:tcPr>
+                </a:tc>
+              </a:tr>
+            </a:tbl>
+          </a:graphicData>
+        </a:graphic>
+      </p:graphicFrame>
+    </p:spTree>
+    <p:extLst>
+      <p:ext uri="{BB962C8B-B14F-4D97-AF65-F5344CB8AC3E}">
+        <p14:creationId xmlns:p14="http://schemas.microsoft.com/office/powerpoint/2010/main" val="2762560159"/>
+      </p:ext>
+    </p:extLst>
+  </p:cSld>
+  <p:clrMapOvr>
+    <a:masterClrMapping/>
+  </p:clrMapOvr>
+  <p:transition xmlns:p14="http://schemas.microsoft.com/office/powerpoint/2010/main" spd="slow">
+    <p:cut/>
+  </p:transition>
+  <p:timing>
+    <p:tnLst>
+      <p:par>
+        <p:cTn xmlns:p14="http://schemas.microsoft.com/office/powerpoint/2010/main" id="1" dur="indefinite" restart="never" nodeType="tmRoot"/>
+      </p:par>
+    </p:tnLst>
+  </p:timing>
+</p:sld>
+</file>
+
+<file path=ppt/slides/slide11.xml><?xml version="1.0" encoding="utf-8"?>
+<p:sld xmlns:a="http://schemas.openxmlformats.org/drawingml/2006/main" xmlns:r="http://schemas.openxmlformats.org/officeDocument/2006/relationships" xmlns:p="http://schemas.openxmlformats.org/presentationml/2006/main">
+  <p:cSld>
+    <p:spTree>
+      <p:nvGrpSpPr>
         <p:cNvPr id="1" name="Shape 201"/>
         <p:cNvGrpSpPr/>
         <p:nvPr/>
@@ -4592,7 +5679,7 @@
 </p:sld>
 </file>
 
-<file path=ppt/slides/slide11.xml><?xml version="1.0" encoding="utf-8"?>
+<file path=ppt/slides/slide12.xml><?xml version="1.0" encoding="utf-8"?>
 <p:sld xmlns:a="http://schemas.openxmlformats.org/drawingml/2006/main" xmlns:r="http://schemas.openxmlformats.org/officeDocument/2006/relationships" xmlns:p="http://schemas.openxmlformats.org/presentationml/2006/main">
   <p:cSld>
     <p:spTree>
@@ -4621,7 +5708,7 @@
         </p:nvSpPr>
         <p:spPr>
           <a:xfrm>
-            <a:off x="1165474" y="1600201"/>
+            <a:off x="1165474" y="1179833"/>
             <a:ext cx="3306900" cy="4967700"/>
           </a:xfrm>
           <a:prstGeom prst="rect">
@@ -4641,7 +5728,7 @@
               <a:buNone/>
             </a:pPr>
             <a:r>
-              <a:rPr lang="en" b="1" smtClean="0"/>
+              <a:rPr lang="en-US" b="1" dirty="0" smtClean="0"/>
               <a:t>Simon</a:t>
             </a:r>
           </a:p>
@@ -4654,8 +5741,15 @@
               <a:buChar char="-"/>
             </a:pPr>
             <a:r>
-              <a:rPr lang="en" smtClean="0"/>
-              <a:t>Load all videos contained in folder and subfolder</a:t>
+              <a:rPr lang="en-US" sz="2400" dirty="0" smtClean="0">
+                <a:solidFill>
+                  <a:schemeClr val="accent4">
+                    <a:lumMod val="40000"/>
+                    <a:lumOff val="60000"/>
+                  </a:schemeClr>
+                </a:solidFill>
+              </a:rPr>
+              <a:t>Assigns unassigned task #1 to himself</a:t>
             </a:r>
           </a:p>
           <a:p>
@@ -4667,8 +5761,15 @@
               <a:buChar char="-"/>
             </a:pPr>
             <a:r>
-              <a:rPr lang="en" smtClean="0"/>
-              <a:t>Generation of synthetic video data for sanity checks</a:t>
+              <a:rPr lang="en-US" sz="2400" dirty="0" smtClean="0">
+                <a:solidFill>
+                  <a:schemeClr val="accent4">
+                    <a:lumMod val="40000"/>
+                    <a:lumOff val="60000"/>
+                  </a:schemeClr>
+                </a:solidFill>
+              </a:rPr>
+              <a:t>Commits solution</a:t>
             </a:r>
           </a:p>
           <a:p>
@@ -4679,7 +5780,17 @@
               <a:buFontTx/>
               <a:buChar char="-"/>
             </a:pPr>
-            <a:endParaRPr lang="en" smtClean="0"/>
+            <a:r>
+              <a:rPr lang="en-US" sz="2400" dirty="0" smtClean="0">
+                <a:solidFill>
+                  <a:schemeClr val="accent4">
+                    <a:lumMod val="40000"/>
+                    <a:lumOff val="60000"/>
+                  </a:schemeClr>
+                </a:solidFill>
+              </a:rPr>
+              <a:t>Requests review by assigning to Laurent</a:t>
+            </a:r>
           </a:p>
           <a:p>
             <a:pPr marL="457200" lvl="0" indent="-457200">
@@ -4689,7 +5800,95 @@
               <a:buFontTx/>
               <a:buChar char="-"/>
             </a:pPr>
-            <a:endParaRPr lang="en"/>
+            <a:r>
+              <a:rPr lang="en-US" sz="2400" dirty="0" smtClean="0">
+                <a:solidFill>
+                  <a:srgbClr val="E0A3A3"/>
+                </a:solidFill>
+              </a:rPr>
+              <a:t>Is happy with </a:t>
+            </a:r>
+            <a:r>
+              <a:rPr lang="en-US" sz="2400" dirty="0" err="1" smtClean="0">
+                <a:solidFill>
+                  <a:srgbClr val="E0A3A3"/>
+                </a:solidFill>
+              </a:rPr>
+              <a:t>Laurents</a:t>
+            </a:r>
+            <a:r>
+              <a:rPr lang="en-US" sz="2400" dirty="0" smtClean="0">
+                <a:solidFill>
+                  <a:srgbClr val="E0A3A3"/>
+                </a:solidFill>
+              </a:rPr>
+              <a:t> work</a:t>
+            </a:r>
+            <a:br>
+              <a:rPr lang="en-US" sz="2400" dirty="0" smtClean="0">
+                <a:solidFill>
+                  <a:srgbClr val="E0A3A3"/>
+                </a:solidFill>
+              </a:rPr>
+            </a:br>
+            <a:r>
+              <a:rPr lang="en-US" sz="2400" dirty="0" smtClean="0">
+                <a:solidFill>
+                  <a:srgbClr val="E0A3A3"/>
+                </a:solidFill>
+              </a:rPr>
+              <a:t>=&gt; </a:t>
+            </a:r>
+            <a:r>
+              <a:rPr lang="en-US" sz="2400" i="1" dirty="0" smtClean="0">
+                <a:solidFill>
+                  <a:srgbClr val="E0A3A3"/>
+                </a:solidFill>
+              </a:rPr>
+              <a:t>Closed</a:t>
+            </a:r>
+          </a:p>
+          <a:p>
+            <a:pPr marL="457200" lvl="0" indent="-457200">
+              <a:spcBef>
+                <a:spcPts val="0"/>
+              </a:spcBef>
+              <a:buFontTx/>
+              <a:buChar char="-"/>
+            </a:pPr>
+            <a:r>
+              <a:rPr lang="en-US" sz="2400" dirty="0" smtClean="0">
+                <a:solidFill>
+                  <a:srgbClr val="BCDCE1"/>
+                </a:solidFill>
+              </a:rPr>
+              <a:t>Solves bugs and closes task</a:t>
+            </a:r>
+            <a:endParaRPr lang="en-US" sz="2400" dirty="0" smtClean="0">
+              <a:solidFill>
+                <a:srgbClr val="BCDCE1"/>
+              </a:solidFill>
+            </a:endParaRPr>
+          </a:p>
+          <a:p>
+            <a:pPr marL="457200" lvl="0" indent="-457200">
+              <a:spcBef>
+                <a:spcPts val="0"/>
+              </a:spcBef>
+              <a:buFontTx/>
+              <a:buChar char="-"/>
+            </a:pPr>
+            <a:endParaRPr lang="en-US" dirty="0" smtClean="0"/>
+          </a:p>
+          <a:p>
+            <a:pPr marL="457200" lvl="0" indent="-457200">
+              <a:spcBef>
+                <a:spcPts val="0"/>
+              </a:spcBef>
+              <a:buFontTx/>
+              <a:buChar char="-"/>
+            </a:pPr>
+            <a:endParaRPr lang="en-US" dirty="0"/>
           </a:p>
         </p:txBody>
       </p:sp>
@@ -4725,10 +5924,10 @@
               <a:buNone/>
             </a:pPr>
             <a:r>
-              <a:rPr lang="en" sz="2800" smtClean="0"/>
-              <a:t>Organisation (example)</a:t>
-            </a:r>
-            <a:endParaRPr lang="en" sz="2800"/>
+              <a:rPr lang="en-US" sz="2800" dirty="0" smtClean="0"/>
+              <a:t>Workflow (example)</a:t>
+            </a:r>
+            <a:endParaRPr lang="en-US" sz="2800" dirty="0"/>
           </a:p>
         </p:txBody>
       </p:sp>
@@ -4744,7 +5943,7 @@
         </p:nvSpPr>
         <p:spPr>
           <a:xfrm>
-            <a:off x="4671569" y="1600201"/>
+            <a:off x="4671569" y="1179833"/>
             <a:ext cx="3306900" cy="4967700"/>
           </a:xfrm>
           <a:prstGeom prst="rect">
@@ -4764,268 +5963,119 @@
               <a:buNone/>
             </a:pPr>
             <a:r>
-              <a:rPr lang="en" b="1" smtClean="0"/>
+              <a:rPr lang="en-US" b="1" dirty="0" smtClean="0"/>
               <a:t>Laurent</a:t>
             </a:r>
           </a:p>
           <a:p>
             <a:pPr marL="457200" lvl="0" indent="-457200">
-              <a:spcBef>
-                <a:spcPts val="0"/>
-              </a:spcBef>
               <a:buFontTx/>
               <a:buChar char="-"/>
             </a:pPr>
             <a:r>
-              <a:rPr lang="en" smtClean="0"/>
-              <a:t>Extract video data to 3d-array</a:t>
+              <a:rPr lang="en-US" sz="2400" dirty="0" smtClean="0">
+                <a:solidFill>
+                  <a:schemeClr val="accent6">
+                    <a:lumMod val="40000"/>
+                    <a:lumOff val="60000"/>
+                  </a:schemeClr>
+                </a:solidFill>
+              </a:rPr>
+              <a:t>Grabs task #2 &amp; sets status to </a:t>
+            </a:r>
+            <a:br>
+              <a:rPr lang="en-US" sz="2400" dirty="0" smtClean="0">
+                <a:solidFill>
+                  <a:schemeClr val="accent6">
+                    <a:lumMod val="40000"/>
+                    <a:lumOff val="60000"/>
+                  </a:schemeClr>
+                </a:solidFill>
+              </a:rPr>
+            </a:br>
+            <a:r>
+              <a:rPr lang="en-US" sz="2400" i="1" dirty="0" smtClean="0">
+                <a:solidFill>
+                  <a:schemeClr val="accent6">
+                    <a:lumMod val="40000"/>
+                    <a:lumOff val="60000"/>
+                  </a:schemeClr>
+                </a:solidFill>
+              </a:rPr>
+              <a:t>In Progress</a:t>
             </a:r>
           </a:p>
           <a:p>
             <a:pPr marL="457200" lvl="0" indent="-457200">
-              <a:spcBef>
-                <a:spcPts val="0"/>
-              </a:spcBef>
               <a:buFontTx/>
               <a:buChar char="-"/>
             </a:pPr>
             <a:r>
-              <a:rPr lang="en" smtClean="0"/>
-              <a:t>Save extracted data for later reuse</a:t>
+              <a:rPr lang="en-US" sz="2400" dirty="0" smtClean="0">
+                <a:solidFill>
+                  <a:schemeClr val="accent6">
+                    <a:lumMod val="40000"/>
+                    <a:lumOff val="60000"/>
+                  </a:schemeClr>
+                </a:solidFill>
+              </a:rPr>
+              <a:t>Commits solution and sets status to </a:t>
+            </a:r>
+            <a:r>
+              <a:rPr lang="en-US" sz="2400" i="1" dirty="0" smtClean="0">
+                <a:solidFill>
+                  <a:schemeClr val="accent6">
+                    <a:lumMod val="40000"/>
+                    <a:lumOff val="60000"/>
+                  </a:schemeClr>
+                </a:solidFill>
+              </a:rPr>
+              <a:t>Ready to Review </a:t>
             </a:r>
           </a:p>
           <a:p>
             <a:pPr marL="457200" lvl="0" indent="-457200">
-              <a:spcBef>
-                <a:spcPts val="0"/>
-              </a:spcBef>
               <a:buFontTx/>
               <a:buChar char="-"/>
             </a:pPr>
             <a:r>
-              <a:rPr lang="en" smtClean="0"/>
-              <a:t>Add random noise to synthetic generated data</a:t>
+              <a:rPr lang="en-US" sz="2400" dirty="0" smtClean="0">
+                <a:solidFill>
+                  <a:schemeClr val="accent6">
+                    <a:lumMod val="40000"/>
+                    <a:lumOff val="60000"/>
+                  </a:schemeClr>
+                </a:solidFill>
+              </a:rPr>
+              <a:t>Assigns to Simon for review</a:t>
             </a:r>
           </a:p>
           <a:p>
             <a:pPr marL="457200" lvl="0" indent="-457200">
-              <a:spcBef>
-                <a:spcPts val="0"/>
-              </a:spcBef>
               <a:buFontTx/>
               <a:buChar char="-"/>
             </a:pPr>
-            <a:endParaRPr lang="en"/>
+            <a:r>
+              <a:rPr lang="en-US" sz="2400" dirty="0" smtClean="0">
+                <a:solidFill>
+                  <a:srgbClr val="BCDCE1"/>
+                </a:solidFill>
+              </a:rPr>
+              <a:t>Points out bugs to Simon and reassigns for fixing</a:t>
+            </a:r>
+          </a:p>
+          <a:p>
+            <a:pPr marL="457200" lvl="0" indent="-457200">
+              <a:spcBef>
+                <a:spcPts val="0"/>
+              </a:spcBef>
+              <a:buFontTx/>
+              <a:buChar char="-"/>
+            </a:pPr>
+            <a:endParaRPr lang="en-US" dirty="0"/>
           </a:p>
         </p:txBody>
       </p:sp>
-    </p:spTree>
-  </p:cSld>
-  <p:clrMapOvr>
-    <a:masterClrMapping/>
-  </p:clrMapOvr>
-  <p:transition xmlns:p14="http://schemas.microsoft.com/office/powerpoint/2010/main" spd="slow">
-    <p:cut/>
-  </p:transition>
-  <p:timing>
-    <p:tnLst>
-      <p:par>
-        <p:cTn xmlns:p14="http://schemas.microsoft.com/office/powerpoint/2010/main" id="1" dur="indefinite" restart="never" nodeType="tmRoot"/>
-      </p:par>
-    </p:tnLst>
-  </p:timing>
-</p:sld>
-</file>
-
-<file path=ppt/slides/slide12.xml><?xml version="1.0" encoding="utf-8"?>
-<p:sld xmlns:a="http://schemas.openxmlformats.org/drawingml/2006/main" xmlns:r="http://schemas.openxmlformats.org/officeDocument/2006/relationships" xmlns:p="http://schemas.openxmlformats.org/presentationml/2006/main">
-  <p:cSld>
-    <p:spTree>
-      <p:nvGrpSpPr>
-        <p:cNvPr id="1" name="Shape 253"/>
-        <p:cNvGrpSpPr/>
-        <p:nvPr/>
-      </p:nvGrpSpPr>
-      <p:grpSpPr>
-        <a:xfrm>
-          <a:off x="0" y="0"/>
-          <a:ext cx="0" cy="0"/>
-          <a:chOff x="0" y="0"/>
-          <a:chExt cx="0" cy="0"/>
-        </a:xfrm>
-      </p:grpSpPr>
-      <p:sp>
-        <p:nvSpPr>
-          <p:cNvPr id="254" name="Shape 254"/>
-          <p:cNvSpPr txBox="1">
-            <a:spLocks noGrp="1"/>
-          </p:cNvSpPr>
-          <p:nvPr>
-            <p:ph type="body" idx="1"/>
-          </p:nvPr>
-        </p:nvSpPr>
-        <p:spPr>
-          <a:xfrm>
-            <a:off x="1165475" y="5775090"/>
-            <a:ext cx="7521300" cy="578700"/>
-          </a:xfrm>
-          <a:prstGeom prst="rect">
-            <a:avLst/>
-          </a:prstGeom>
-        </p:spPr>
-        <p:txBody>
-          <a:bodyPr lIns="91425" tIns="91425" rIns="91425" bIns="91425" anchor="t" anchorCtr="0">
-            <a:noAutofit/>
-          </a:bodyPr>
-          <a:lstStyle/>
-          <a:p>
-            <a:pPr lvl="0">
-              <a:spcBef>
-                <a:spcPts val="0"/>
-              </a:spcBef>
-              <a:buNone/>
-            </a:pPr>
-            <a:r>
-              <a:rPr lang="de-CH" dirty="0" err="1" smtClean="0">
-                <a:solidFill>
-                  <a:srgbClr val="F3F3F3"/>
-                </a:solidFill>
-              </a:rPr>
-              <a:t>Mayb</a:t>
-            </a:r>
-            <a:r>
-              <a:rPr lang="de-CH" dirty="0" err="1" smtClean="0"/>
-              <a:t>e</a:t>
-            </a:r>
-            <a:r>
-              <a:rPr lang="de-CH" dirty="0" smtClean="0"/>
-              <a:t> a </a:t>
-            </a:r>
-            <a:r>
-              <a:rPr lang="de-CH" dirty="0" err="1" smtClean="0"/>
-              <a:t>graph</a:t>
-            </a:r>
-            <a:r>
-              <a:rPr lang="de-CH" dirty="0" smtClean="0"/>
-              <a:t> </a:t>
-            </a:r>
-            <a:r>
-              <a:rPr lang="de-CH" dirty="0" err="1" smtClean="0"/>
-              <a:t>to</a:t>
-            </a:r>
-            <a:r>
-              <a:rPr lang="de-CH" dirty="0" smtClean="0"/>
-              <a:t> </a:t>
-            </a:r>
-            <a:r>
-              <a:rPr lang="de-CH" dirty="0" err="1" smtClean="0"/>
-              <a:t>show</a:t>
-            </a:r>
-            <a:r>
-              <a:rPr lang="de-CH" dirty="0" smtClean="0"/>
-              <a:t> </a:t>
-            </a:r>
-            <a:r>
-              <a:rPr lang="de-CH" dirty="0" err="1" smtClean="0"/>
-              <a:t>estimated</a:t>
-            </a:r>
-            <a:r>
-              <a:rPr lang="de-CH" dirty="0" smtClean="0"/>
-              <a:t> </a:t>
-            </a:r>
-            <a:r>
-              <a:rPr lang="de-CH" dirty="0" err="1" smtClean="0"/>
-              <a:t>distribution</a:t>
-            </a:r>
-            <a:r>
-              <a:rPr lang="de-CH" dirty="0" smtClean="0"/>
-              <a:t> </a:t>
-            </a:r>
-            <a:r>
-              <a:rPr lang="de-CH" dirty="0" err="1" smtClean="0"/>
-              <a:t>of</a:t>
-            </a:r>
-            <a:r>
-              <a:rPr lang="de-CH" dirty="0" smtClean="0"/>
-              <a:t> time on </a:t>
-            </a:r>
-            <a:r>
-              <a:rPr lang="de-CH" dirty="0" err="1" smtClean="0"/>
-              <a:t>tasks</a:t>
-            </a:r>
-            <a:r>
-              <a:rPr lang="de-CH" dirty="0" smtClean="0"/>
-              <a:t>?</a:t>
-            </a:r>
-            <a:endParaRPr lang="de-CH" dirty="0" smtClean="0">
-              <a:solidFill>
-                <a:srgbClr val="F3F3F3"/>
-              </a:solidFill>
-            </a:endParaRPr>
-          </a:p>
-          <a:p>
-            <a:pPr lvl="0">
-              <a:spcBef>
-                <a:spcPts val="0"/>
-              </a:spcBef>
-              <a:buNone/>
-            </a:pPr>
-            <a:r>
-              <a:rPr lang="en" dirty="0" smtClean="0">
-                <a:solidFill>
-                  <a:srgbClr val="F3F3F3"/>
-                </a:solidFill>
-              </a:rPr>
-              <a:t>You </a:t>
-            </a:r>
-            <a:r>
-              <a:rPr lang="en" dirty="0">
-                <a:solidFill>
-                  <a:srgbClr val="F3F3F3"/>
-                </a:solidFill>
-              </a:rPr>
-              <a:t>can copy&amp;paste graphs from </a:t>
-            </a:r>
-            <a:r>
-              <a:rPr lang="en" u="sng" dirty="0">
-                <a:solidFill>
-                  <a:srgbClr val="F3F3F3"/>
-                </a:solidFill>
-                <a:hlinkClick r:id="rId3"/>
-              </a:rPr>
-              <a:t>Google Sheets</a:t>
-            </a:r>
-          </a:p>
-        </p:txBody>
-      </p:sp>
-      <p:pic>
-        <p:nvPicPr>
-          <p:cNvPr id="255" name="Shape 255"/>
-          <p:cNvPicPr preferRelativeResize="0"/>
-          <p:nvPr/>
-        </p:nvPicPr>
-        <p:blipFill>
-          <a:blip r:embed="rId4">
-            <a:alphaModFix/>
-          </a:blip>
-          <a:stretch>
-            <a:fillRect/>
-          </a:stretch>
-        </p:blipFill>
-        <p:spPr>
-          <a:xfrm>
-            <a:off x="1138239" y="152401"/>
-            <a:ext cx="6867525" cy="5695951"/>
-          </a:xfrm>
-          <a:prstGeom prst="rect">
-            <a:avLst/>
-          </a:prstGeom>
-          <a:noFill/>
-          <a:ln>
-            <a:noFill/>
-          </a:ln>
-        </p:spPr>
-      </p:pic>
     </p:spTree>
   </p:cSld>
   <p:clrMapOvr>
@@ -5106,11 +6156,7 @@
           <a:p>
             <a:r>
               <a:rPr lang="en-US" dirty="0" smtClean="0"/>
-              <a:t> </a:t>
-            </a:r>
-            <a:r>
-              <a:rPr lang="en-US" dirty="0" smtClean="0"/>
-              <a:t>Learning about video processing</a:t>
+              <a:t> Learning about video processing</a:t>
             </a:r>
           </a:p>
           <a:p>
@@ -5126,12 +6172,12 @@
               <a:t>Synthetic data </a:t>
             </a:r>
             <a:r>
-              <a:rPr lang="en-US" dirty="0" err="1" smtClean="0"/>
-              <a:t>vs</a:t>
-            </a:r>
-            <a:r>
               <a:rPr lang="en-US" dirty="0" smtClean="0"/>
-              <a:t> real-world data</a:t>
+              <a:t>vs. </a:t>
+            </a:r>
+            <a:r>
+              <a:rPr lang="en-US" dirty="0" smtClean="0"/>
+              <a:t>real-world data</a:t>
             </a:r>
           </a:p>
           <a:p>
@@ -5157,13 +6203,12 @@
             </a:r>
             <a:r>
               <a:rPr lang="en-US" dirty="0" smtClean="0"/>
-              <a:t>Evaluation of the performances can be time consuming</a:t>
-            </a:r>
-          </a:p>
-          <a:p>
-            <a:pPr>
-              <a:buNone/>
-            </a:pPr>
+              <a:t>Evaluation of the performances </a:t>
+            </a:r>
+            <a:r>
+              <a:rPr lang="en-US" dirty="0" smtClean="0"/>
+              <a:t>and parameter-tweaking</a:t>
+            </a:r>
             <a:endParaRPr lang="en-US" dirty="0" smtClean="0"/>
           </a:p>
         </p:txBody>
@@ -5349,15 +6394,66 @@
           </a:bodyPr>
           <a:lstStyle/>
           <a:p>
-            <a:pPr lvl="0" rtl="0">
-              <a:spcBef>
-                <a:spcPts val="0"/>
-              </a:spcBef>
-              <a:buNone/>
-            </a:pPr>
-            <a:r>
-              <a:rPr lang="de-CH" dirty="0" smtClean="0"/>
-              <a:t>Initial Plan</a:t>
+            <a:pPr lvl="0"/>
+            <a:r>
+              <a:rPr lang="en-US" b="1" dirty="0"/>
+              <a:t>Data </a:t>
+            </a:r>
+            <a:r>
+              <a:rPr lang="en-US" b="1" dirty="0" smtClean="0"/>
+              <a:t>Analysis </a:t>
+            </a:r>
+            <a:r>
+              <a:rPr lang="en-US" b="1" dirty="0"/>
+              <a:t>I</a:t>
+            </a:r>
+            <a:r>
+              <a:rPr lang="en-US" b="1" dirty="0" smtClean="0"/>
+              <a:t>mprovement </a:t>
+            </a:r>
+            <a:r>
+              <a:rPr lang="en-US" b="1" dirty="0"/>
+              <a:t>of </a:t>
+            </a:r>
+            <a:r>
+              <a:rPr lang="en-US" b="1" dirty="0" err="1"/>
+              <a:t>C</a:t>
+            </a:r>
+            <a:r>
+              <a:rPr lang="en-US" b="1" dirty="0" err="1" smtClean="0"/>
+              <a:t>iliary</a:t>
+            </a:r>
+            <a:r>
+              <a:rPr lang="en-US" b="1" dirty="0" smtClean="0"/>
+              <a:t> </a:t>
+            </a:r>
+            <a:r>
+              <a:rPr lang="en-US" b="1" dirty="0"/>
+              <a:t>B</a:t>
+            </a:r>
+            <a:r>
+              <a:rPr lang="en-US" b="1" dirty="0" smtClean="0"/>
+              <a:t>eating </a:t>
+            </a:r>
+            <a:r>
+              <a:rPr lang="en-US" b="1" dirty="0"/>
+              <a:t>of 3D </a:t>
+            </a:r>
+            <a:r>
+              <a:rPr lang="en-US" b="1" dirty="0" smtClean="0"/>
+              <a:t>Epithelial </a:t>
+            </a:r>
+            <a:r>
+              <a:rPr lang="en-US" b="1" dirty="0"/>
+              <a:t>T</a:t>
+            </a:r>
+            <a:r>
+              <a:rPr lang="en-US" b="1" dirty="0" smtClean="0"/>
+              <a:t>issue</a:t>
+            </a:r>
+            <a:r>
+              <a:rPr lang="en-US" dirty="0" smtClean="0"/>
+              <a:t> </a:t>
             </a:r>
             <a:endParaRPr lang="en" dirty="0"/>
           </a:p>
@@ -5375,7 +6471,7 @@
         </p:nvSpPr>
         <p:spPr>
           <a:xfrm>
-            <a:off x="1530177" y="3710551"/>
+            <a:off x="1530177" y="4181251"/>
             <a:ext cx="6927899" cy="470700"/>
           </a:xfrm>
           <a:prstGeom prst="rect">
@@ -5394,6 +6490,10 @@
               </a:spcBef>
               <a:buNone/>
             </a:pPr>
+            <a:r>
+              <a:rPr lang="de-CH" dirty="0" smtClean="0"/>
+              <a:t>Initial Plan</a:t>
+            </a:r>
             <a:endParaRPr lang="en" dirty="0"/>
           </a:p>
         </p:txBody>
@@ -5429,18 +6529,15 @@
               </a:spcBef>
               <a:buNone/>
             </a:pPr>
-            <a:r>
-              <a:rPr lang="en" sz="3000" dirty="0">
-                <a:solidFill>
-                  <a:srgbClr val="2E3037"/>
-                </a:solidFill>
-                <a:latin typeface="Quicksand"/>
-                <a:ea typeface="Quicksand"/>
-                <a:cs typeface="Quicksand"/>
-                <a:sym typeface="Quicksand"/>
-              </a:rPr>
-              <a:t>1</a:t>
-            </a:r>
+            <a:endParaRPr lang="en" sz="3000" dirty="0">
+              <a:solidFill>
+                <a:srgbClr val="2E3037"/>
+              </a:solidFill>
+              <a:latin typeface="Quicksand"/>
+              <a:ea typeface="Quicksand"/>
+              <a:cs typeface="Quicksand"/>
+              <a:sym typeface="Quicksand"/>
+            </a:endParaRPr>
           </a:p>
         </p:txBody>
       </p:sp>
@@ -5536,11 +6633,7 @@
             </a:r>
             <a:r>
               <a:rPr lang="en-US" dirty="0" smtClean="0"/>
-              <a:t> (development</a:t>
-            </a:r>
-            <a:r>
-              <a:rPr lang="en-US" dirty="0" smtClean="0"/>
-              <a:t> team)</a:t>
+              <a:t> (development team)</a:t>
             </a:r>
           </a:p>
           <a:p>
@@ -5557,8 +6650,13 @@
             </a:r>
             <a:r>
               <a:rPr lang="en-US" dirty="0" smtClean="0"/>
-              <a:t> (development team)</a:t>
-            </a:r>
+              <a:t> (development team</a:t>
+            </a:r>
+            <a:r>
+              <a:rPr lang="en-US" dirty="0" smtClean="0"/>
+              <a:t>)</a:t>
+            </a:r>
+            <a:endParaRPr lang="en-US" dirty="0" smtClean="0"/>
           </a:p>
           <a:p>
             <a:pPr>
@@ -5882,15 +6980,7 @@
                   <a:srgbClr val="39C0BA"/>
                 </a:solidFill>
               </a:rPr>
-              <a:t>Goals &amp; </a:t>
-            </a:r>
-            <a:r>
-              <a:rPr lang="en" sz="2800" dirty="0" smtClean="0">
-                <a:solidFill>
-                  <a:srgbClr val="39C0BA"/>
-                </a:solidFill>
-              </a:rPr>
-              <a:t>Objectives</a:t>
+              <a:t>Goals &amp; Objectives</a:t>
             </a:r>
             <a:r>
               <a:rPr lang="fr-CH" sz="2800" dirty="0" smtClean="0">
@@ -6124,15 +7214,7 @@
                   <a:srgbClr val="39C0BA"/>
                 </a:solidFill>
               </a:rPr>
-              <a:t>Goals &amp; </a:t>
-            </a:r>
-            <a:r>
-              <a:rPr lang="en" sz="2800" dirty="0" smtClean="0">
-                <a:solidFill>
-                  <a:srgbClr val="39C0BA"/>
-                </a:solidFill>
-              </a:rPr>
-              <a:t>Objectives</a:t>
+              <a:t>Goals &amp; Objectives</a:t>
             </a:r>
             <a:r>
               <a:rPr lang="fr-CH" sz="2800" dirty="0" smtClean="0">
@@ -6450,7 +7532,19 @@
           <a:p>
             <a:r>
               <a:rPr lang="en" sz="2800" dirty="0" smtClean="0"/>
-              <a:t>Methodology &amp;Tools</a:t>
+              <a:t>Methodology </a:t>
+            </a:r>
+            <a:r>
+              <a:rPr lang="en" sz="2800" dirty="0" smtClean="0"/>
+              <a:t>&amp;</a:t>
+            </a:r>
+            <a:r>
+              <a:rPr lang="de-CH" sz="2800" dirty="0" smtClean="0"/>
+              <a:t> </a:t>
+            </a:r>
+            <a:r>
+              <a:rPr lang="en" sz="2800" dirty="0" smtClean="0"/>
+              <a:t>Tools</a:t>
             </a:r>
             <a:endParaRPr lang="en" sz="2800" dirty="0"/>
           </a:p>

</xml_diff>

<commit_message>
Increased size of 'initial plan' and fixed a typo
</commit_message>
<xml_diff>
--- a/doc/initial-plan.pptx
+++ b/doc/initial-plan.pptx
@@ -233,7 +233,7 @@
 <file path=ppt/charts/chart1.xml><?xml version="1.0" encoding="utf-8"?>
 <c:chartSpace xmlns:c="http://schemas.openxmlformats.org/drawingml/2006/chart" xmlns:a="http://schemas.openxmlformats.org/drawingml/2006/main" xmlns:r="http://schemas.openxmlformats.org/officeDocument/2006/relationships">
   <c:date1904 val="0"/>
-  <c:lang val="en-US"/>
+  <c:lang val="fr-FR"/>
   <c:roundedCorners val="0"/>
   <mc:AlternateContent xmlns:mc="http://schemas.openxmlformats.org/markup-compatibility/2006">
     <mc:Choice xmlns:c14="http://schemas.microsoft.com/office/drawing/2007/8/2/chart" Requires="c14">
@@ -478,11 +478,11 @@
         </c:dLbls>
         <c:gapWidth val="150"/>
         <c:overlap val="100"/>
-        <c:axId val="2102930296"/>
-        <c:axId val="2102933416"/>
+        <c:axId val="-2134505592"/>
+        <c:axId val="-2134496312"/>
       </c:barChart>
       <c:catAx>
-        <c:axId val="2102930296"/>
+        <c:axId val="-2134505592"/>
         <c:scaling>
           <c:orientation val="maxMin"/>
         </c:scaling>
@@ -491,7 +491,7 @@
         <c:majorTickMark val="out"/>
         <c:minorTickMark val="none"/>
         <c:tickLblPos val="nextTo"/>
-        <c:crossAx val="2102933416"/>
+        <c:crossAx val="-2134496312"/>
         <c:crosses val="autoZero"/>
         <c:auto val="1"/>
         <c:lblAlgn val="ctr"/>
@@ -499,7 +499,7 @@
         <c:noMultiLvlLbl val="0"/>
       </c:catAx>
       <c:valAx>
-        <c:axId val="2102933416"/>
+        <c:axId val="-2134496312"/>
         <c:scaling>
           <c:orientation val="minMax"/>
           <c:max val="42535.0"/>
@@ -515,7 +515,7 @@
         <c:spPr>
           <a:effectLst/>
         </c:spPr>
-        <c:crossAx val="2102930296"/>
+        <c:crossAx val="-2134505592"/>
         <c:crosses val="autoZero"/>
         <c:crossBetween val="between"/>
         <c:majorUnit val="15.0"/>
@@ -542,7 +542,7 @@
           </a:solidFill>
         </a:defRPr>
       </a:pPr>
-      <a:endParaRPr lang="en-US"/>
+      <a:endParaRPr lang="fr-FR"/>
     </a:p>
   </c:txPr>
   <c:externalData r:id="rId1">
@@ -6473,10 +6473,10 @@
               <a:buNone/>
             </a:pPr>
             <a:r>
-              <a:rPr lang="de-CH" dirty="0" smtClean="0"/>
+              <a:rPr lang="de-CH" sz="2800" dirty="0" smtClean="0"/>
               <a:t>Initial Plan</a:t>
             </a:r>
-            <a:endParaRPr lang="en" dirty="0"/>
+            <a:endParaRPr lang="en" sz="2800" dirty="0"/>
           </a:p>
         </p:txBody>
       </p:sp>
@@ -7373,38 +7373,43 @@
               <a:buNone/>
             </a:pPr>
             <a:r>
-              <a:rPr lang="en" smtClean="0"/>
+              <a:rPr lang="en" dirty="0" smtClean="0"/>
               <a:t>Methodology:</a:t>
             </a:r>
           </a:p>
           <a:p>
             <a:pPr marL="457200" indent="-457200"/>
             <a:r>
-              <a:rPr lang="en" smtClean="0"/>
-              <a:t>Iterative &amp; Incremental Devolopement</a:t>
-            </a:r>
+              <a:rPr lang="en" dirty="0" smtClean="0"/>
+              <a:t>Iterative &amp; Incremental </a:t>
+            </a:r>
+            <a:r>
+              <a:rPr lang="fr-CH" dirty="0" smtClean="0"/>
+              <a:t>Developement</a:t>
+            </a:r>
+            <a:endParaRPr lang="en" dirty="0" smtClean="0"/>
           </a:p>
           <a:p>
             <a:pPr marL="457200" indent="-457200"/>
             <a:r>
-              <a:rPr lang="en" smtClean="0"/>
+              <a:rPr lang="en" dirty="0" smtClean="0"/>
               <a:t>Scrum</a:t>
             </a:r>
           </a:p>
           <a:p>
             <a:pPr marL="457200" indent="-457200"/>
             <a:r>
-              <a:rPr lang="en" smtClean="0"/>
+              <a:rPr lang="en" dirty="0" smtClean="0"/>
               <a:t>Testing</a:t>
             </a:r>
           </a:p>
           <a:p>
             <a:pPr marL="457200" indent="-457200"/>
             <a:r>
-              <a:rPr lang="en" smtClean="0"/>
+              <a:rPr lang="en" dirty="0" smtClean="0"/>
               <a:t>Code Reviews</a:t>
             </a:r>
-            <a:endParaRPr lang="en"/>
+            <a:endParaRPr lang="en" dirty="0"/>
           </a:p>
         </p:txBody>
       </p:sp>

</xml_diff>

<commit_message>
Added slide on deliverables, and updated log
</commit_message>
<xml_diff>
--- a/doc/initial-plan.pptx
+++ b/doc/initial-plan.pptx
@@ -5,7 +5,7 @@
     <p:sldMasterId id="2147483658" r:id="rId1"/>
   </p:sldMasterIdLst>
   <p:notesMasterIdLst>
-    <p:notesMasterId r:id="rId16"/>
+    <p:notesMasterId r:id="rId17"/>
   </p:notesMasterIdLst>
   <p:sldIdLst>
     <p:sldId id="256" r:id="rId2"/>
@@ -20,8 +20,9 @@
     <p:sldId id="292" r:id="rId11"/>
     <p:sldId id="272" r:id="rId12"/>
     <p:sldId id="263" r:id="rId13"/>
-    <p:sldId id="288" r:id="rId14"/>
-    <p:sldId id="279" r:id="rId15"/>
+    <p:sldId id="293" r:id="rId14"/>
+    <p:sldId id="288" r:id="rId15"/>
+    <p:sldId id="279" r:id="rId16"/>
   </p:sldIdLst>
   <p:sldSz cx="9144000" cy="6858000" type="screen4x3"/>
   <p:notesSz cx="6858000" cy="9144000"/>
@@ -478,11 +479,11 @@
         </c:dLbls>
         <c:gapWidth val="150"/>
         <c:overlap val="100"/>
-        <c:axId val="-2134505592"/>
-        <c:axId val="-2134496312"/>
+        <c:axId val="2122358776"/>
+        <c:axId val="2122355256"/>
       </c:barChart>
       <c:catAx>
-        <c:axId val="-2134505592"/>
+        <c:axId val="2122358776"/>
         <c:scaling>
           <c:orientation val="maxMin"/>
         </c:scaling>
@@ -491,7 +492,7 @@
         <c:majorTickMark val="out"/>
         <c:minorTickMark val="none"/>
         <c:tickLblPos val="nextTo"/>
-        <c:crossAx val="-2134496312"/>
+        <c:crossAx val="2122355256"/>
         <c:crosses val="autoZero"/>
         <c:auto val="1"/>
         <c:lblAlgn val="ctr"/>
@@ -499,7 +500,7 @@
         <c:noMultiLvlLbl val="0"/>
       </c:catAx>
       <c:valAx>
-        <c:axId val="-2134496312"/>
+        <c:axId val="2122355256"/>
         <c:scaling>
           <c:orientation val="minMax"/>
           <c:max val="42535.0"/>
@@ -515,7 +516,7 @@
         <c:spPr>
           <a:effectLst/>
         </c:spPr>
-        <c:crossAx val="-2134505592"/>
+        <c:crossAx val="2122358776"/>
         <c:crosses val="autoZero"/>
         <c:crossBetween val="between"/>
         <c:majorUnit val="15.0"/>
@@ -6116,6 +6117,120 @@
             <p:ph type="title"/>
           </p:nvPr>
         </p:nvSpPr>
+        <p:spPr/>
+        <p:txBody>
+          <a:bodyPr/>
+          <a:lstStyle/>
+          <a:p>
+            <a:r>
+              <a:rPr lang="en-US" sz="2800" dirty="0" smtClean="0"/>
+              <a:t>Deliverables</a:t>
+            </a:r>
+            <a:endParaRPr lang="en-US" sz="2800" dirty="0"/>
+          </a:p>
+        </p:txBody>
+      </p:sp>
+      <p:sp>
+        <p:nvSpPr>
+          <p:cNvPr id="3" name="Espace réservé du texte 2"/>
+          <p:cNvSpPr>
+            <a:spLocks noGrp="1"/>
+          </p:cNvSpPr>
+          <p:nvPr>
+            <p:ph type="body" idx="1"/>
+          </p:nvPr>
+        </p:nvSpPr>
+        <p:spPr/>
+        <p:txBody>
+          <a:bodyPr/>
+          <a:lstStyle/>
+          <a:p>
+            <a:r>
+              <a:rPr lang="en-US" dirty="0" smtClean="0"/>
+              <a:t> </a:t>
+            </a:r>
+            <a:r>
+              <a:rPr lang="en-US" dirty="0" err="1" smtClean="0"/>
+              <a:t>Matlab</a:t>
+            </a:r>
+            <a:r>
+              <a:rPr lang="en-US" dirty="0" smtClean="0"/>
+              <a:t> toolbox for batch analysis of 8bit grey scale .</a:t>
+            </a:r>
+            <a:r>
+              <a:rPr lang="en-US" dirty="0" err="1" smtClean="0"/>
+              <a:t>avi</a:t>
+            </a:r>
+            <a:r>
+              <a:rPr lang="en-US" dirty="0" smtClean="0"/>
+              <a:t> movies</a:t>
+            </a:r>
+            <a:endParaRPr lang="en-US" dirty="0"/>
+          </a:p>
+          <a:p>
+            <a:endParaRPr lang="en-US" dirty="0" smtClean="0"/>
+          </a:p>
+          <a:p>
+            <a:r>
+              <a:rPr lang="en-US" dirty="0"/>
+              <a:t> </a:t>
+            </a:r>
+            <a:r>
+              <a:rPr lang="en-US" dirty="0" smtClean="0"/>
+              <a:t>Documentation of the code</a:t>
+            </a:r>
+          </a:p>
+          <a:p>
+            <a:endParaRPr lang="en-US" dirty="0"/>
+          </a:p>
+          <a:p>
+            <a:r>
+              <a:rPr lang="en-US" dirty="0" smtClean="0"/>
+              <a:t> Final report with methods used and results from the research part</a:t>
+            </a:r>
+          </a:p>
+        </p:txBody>
+      </p:sp>
+    </p:spTree>
+    <p:extLst>
+      <p:ext uri="{BB962C8B-B14F-4D97-AF65-F5344CB8AC3E}">
+        <p14:creationId xmlns:p14="http://schemas.microsoft.com/office/powerpoint/2010/main" val="3926458309"/>
+      </p:ext>
+    </p:extLst>
+  </p:cSld>
+  <p:clrMapOvr>
+    <a:masterClrMapping/>
+  </p:clrMapOvr>
+</p:sld>
+</file>
+
+<file path=ppt/slides/slide14.xml><?xml version="1.0" encoding="utf-8"?>
+<p:sld xmlns:a="http://schemas.openxmlformats.org/drawingml/2006/main" xmlns:r="http://schemas.openxmlformats.org/officeDocument/2006/relationships" xmlns:p="http://schemas.openxmlformats.org/presentationml/2006/main">
+  <p:cSld>
+    <p:spTree>
+      <p:nvGrpSpPr>
+        <p:cNvPr id="1" name=""/>
+        <p:cNvGrpSpPr/>
+        <p:nvPr/>
+      </p:nvGrpSpPr>
+      <p:grpSpPr>
+        <a:xfrm>
+          <a:off x="0" y="0"/>
+          <a:ext cx="0" cy="0"/>
+          <a:chOff x="0" y="0"/>
+          <a:chExt cx="0" cy="0"/>
+        </a:xfrm>
+      </p:grpSpPr>
+      <p:sp>
+        <p:nvSpPr>
+          <p:cNvPr id="2" name="Titre 1"/>
+          <p:cNvSpPr>
+            <a:spLocks noGrp="1"/>
+          </p:cNvSpPr>
+          <p:nvPr>
+            <p:ph type="title"/>
+          </p:nvPr>
+        </p:nvSpPr>
         <p:spPr>
           <a:noFill/>
           <a:ln>
@@ -6215,7 +6330,7 @@
 </p:sld>
 </file>
 
-<file path=ppt/slides/slide14.xml><?xml version="1.0" encoding="utf-8"?>
+<file path=ppt/slides/slide15.xml><?xml version="1.0" encoding="utf-8"?>
 <p:sld xmlns:a="http://schemas.openxmlformats.org/drawingml/2006/main" xmlns:r="http://schemas.openxmlformats.org/officeDocument/2006/relationships" xmlns:p="http://schemas.openxmlformats.org/presentationml/2006/main">
   <p:cSld>
     <p:spTree>

</xml_diff>

<commit_message>
Fixed some typos in doc and added notes to ppt
</commit_message>
<xml_diff>
--- a/doc/initial-plan.pptx
+++ b/doc/initial-plan.pptx
@@ -234,7 +234,7 @@
 <file path=ppt/charts/chart1.xml><?xml version="1.0" encoding="utf-8"?>
 <c:chartSpace xmlns:c="http://schemas.openxmlformats.org/drawingml/2006/chart" xmlns:a="http://schemas.openxmlformats.org/drawingml/2006/main" xmlns:r="http://schemas.openxmlformats.org/officeDocument/2006/relationships">
   <c:date1904 val="0"/>
-  <c:lang val="fr-FR"/>
+  <c:lang val="en-US"/>
   <c:roundedCorners val="0"/>
   <mc:AlternateContent xmlns:mc="http://schemas.openxmlformats.org/markup-compatibility/2006">
     <mc:Choice xmlns:c14="http://schemas.microsoft.com/office/drawing/2007/8/2/chart" Requires="c14">
@@ -479,11 +479,11 @@
         </c:dLbls>
         <c:gapWidth val="150"/>
         <c:overlap val="100"/>
-        <c:axId val="2122358776"/>
-        <c:axId val="2122355256"/>
+        <c:axId val="2118363528"/>
+        <c:axId val="2118366328"/>
       </c:barChart>
       <c:catAx>
-        <c:axId val="2122358776"/>
+        <c:axId val="2118363528"/>
         <c:scaling>
           <c:orientation val="maxMin"/>
         </c:scaling>
@@ -492,7 +492,7 @@
         <c:majorTickMark val="out"/>
         <c:minorTickMark val="none"/>
         <c:tickLblPos val="nextTo"/>
-        <c:crossAx val="2122355256"/>
+        <c:crossAx val="2118366328"/>
         <c:crosses val="autoZero"/>
         <c:auto val="1"/>
         <c:lblAlgn val="ctr"/>
@@ -500,7 +500,7 @@
         <c:noMultiLvlLbl val="0"/>
       </c:catAx>
       <c:valAx>
-        <c:axId val="2122355256"/>
+        <c:axId val="2118366328"/>
         <c:scaling>
           <c:orientation val="minMax"/>
           <c:max val="42535.0"/>
@@ -516,7 +516,7 @@
         <c:spPr>
           <a:effectLst/>
         </c:spPr>
-        <c:crossAx val="2122358776"/>
+        <c:crossAx val="2118363528"/>
         <c:crosses val="autoZero"/>
         <c:crossBetween val="between"/>
         <c:majorUnit val="15.0"/>
@@ -543,7 +543,7 @@
           </a:solidFill>
         </a:defRPr>
       </a:pPr>
-      <a:endParaRPr lang="fr-FR"/>
+      <a:endParaRPr lang="en-US"/>
     </a:p>
   </c:txPr>
   <c:externalData r:id="rId1">
@@ -915,6 +915,227 @@
 </p:notes>
 </file>
 
+<file path=ppt/notesSlides/notesSlide10.xml><?xml version="1.0" encoding="utf-8"?>
+<p:notes xmlns:a="http://schemas.openxmlformats.org/drawingml/2006/main" xmlns:r="http://schemas.openxmlformats.org/officeDocument/2006/relationships" xmlns:p="http://schemas.openxmlformats.org/presentationml/2006/main">
+  <p:cSld>
+    <p:spTree>
+      <p:nvGrpSpPr>
+        <p:cNvPr id="1" name=""/>
+        <p:cNvGrpSpPr/>
+        <p:nvPr/>
+      </p:nvGrpSpPr>
+      <p:grpSpPr>
+        <a:xfrm>
+          <a:off x="0" y="0"/>
+          <a:ext cx="0" cy="0"/>
+          <a:chOff x="0" y="0"/>
+          <a:chExt cx="0" cy="0"/>
+        </a:xfrm>
+      </p:grpSpPr>
+      <p:sp>
+        <p:nvSpPr>
+          <p:cNvPr id="2" name="Slide Image Placeholder 1"/>
+          <p:cNvSpPr>
+            <a:spLocks noGrp="1" noRot="1" noChangeAspect="1"/>
+          </p:cNvSpPr>
+          <p:nvPr>
+            <p:ph type="sldImg"/>
+          </p:nvPr>
+        </p:nvSpPr>
+        <p:spPr/>
+      </p:sp>
+      <p:sp>
+        <p:nvSpPr>
+          <p:cNvPr id="3" name="Notes Placeholder 2"/>
+          <p:cNvSpPr>
+            <a:spLocks noGrp="1"/>
+          </p:cNvSpPr>
+          <p:nvPr>
+            <p:ph type="body" idx="1"/>
+          </p:nvPr>
+        </p:nvSpPr>
+        <p:spPr/>
+        <p:txBody>
+          <a:bodyPr/>
+          <a:lstStyle/>
+          <a:p>
+            <a:r>
+              <a:rPr lang="de-CH" dirty="0" smtClean="0"/>
+              <a:t>Minimal </a:t>
+            </a:r>
+            <a:r>
+              <a:rPr lang="de-CH" dirty="0" err="1" smtClean="0"/>
+              <a:t>documentation</a:t>
+            </a:r>
+            <a:r>
+              <a:rPr lang="de-CH" baseline="0" dirty="0" smtClean="0"/>
+              <a:t> </a:t>
+            </a:r>
+            <a:r>
+              <a:rPr lang="de-CH" baseline="0" dirty="0" err="1" smtClean="0"/>
+              <a:t>with</a:t>
+            </a:r>
+            <a:r>
+              <a:rPr lang="de-CH" baseline="0" dirty="0" smtClean="0"/>
+              <a:t> </a:t>
+            </a:r>
+            <a:r>
+              <a:rPr lang="de-CH" baseline="0" dirty="0" err="1" smtClean="0"/>
+              <a:t>emphasis</a:t>
+            </a:r>
+            <a:r>
+              <a:rPr lang="de-CH" baseline="0" dirty="0" smtClean="0"/>
+              <a:t> on </a:t>
+            </a:r>
+            <a:r>
+              <a:rPr lang="de-CH" baseline="0" dirty="0" err="1" smtClean="0"/>
+              <a:t>meaningful</a:t>
+            </a:r>
+            <a:r>
+              <a:rPr lang="de-CH" baseline="0" dirty="0" smtClean="0"/>
+              <a:t> variable </a:t>
+            </a:r>
+            <a:r>
+              <a:rPr lang="de-CH" baseline="0" dirty="0" err="1" smtClean="0"/>
+              <a:t>and</a:t>
+            </a:r>
+            <a:r>
+              <a:rPr lang="de-CH" baseline="0" dirty="0" smtClean="0"/>
+              <a:t> </a:t>
+            </a:r>
+            <a:r>
+              <a:rPr lang="de-CH" baseline="0" dirty="0" err="1" smtClean="0"/>
+              <a:t>function</a:t>
+            </a:r>
+            <a:r>
+              <a:rPr lang="de-CH" baseline="0" dirty="0" smtClean="0"/>
+              <a:t> </a:t>
+            </a:r>
+            <a:r>
+              <a:rPr lang="de-CH" baseline="0" dirty="0" err="1" smtClean="0"/>
+              <a:t>naming</a:t>
+            </a:r>
+            <a:endParaRPr lang="de-CH" baseline="0" dirty="0" smtClean="0"/>
+          </a:p>
+          <a:p>
+            <a:endParaRPr lang="en" dirty="0"/>
+          </a:p>
+        </p:txBody>
+      </p:sp>
+    </p:spTree>
+    <p:extLst>
+      <p:ext uri="{BB962C8B-B14F-4D97-AF65-F5344CB8AC3E}">
+        <p14:creationId xmlns:p14="http://schemas.microsoft.com/office/powerpoint/2010/main" val="3416052868"/>
+      </p:ext>
+    </p:extLst>
+  </p:cSld>
+  <p:clrMapOvr>
+    <a:masterClrMapping/>
+  </p:clrMapOvr>
+</p:notes>
+</file>
+
+<file path=ppt/notesSlides/notesSlide11.xml><?xml version="1.0" encoding="utf-8"?>
+<p:notes xmlns:a="http://schemas.openxmlformats.org/drawingml/2006/main" xmlns:r="http://schemas.openxmlformats.org/officeDocument/2006/relationships" xmlns:p="http://schemas.openxmlformats.org/presentationml/2006/main" showMasterSp="0" showMasterPhAnim="0">
+  <p:cSld>
+    <p:spTree>
+      <p:nvGrpSpPr>
+        <p:cNvPr id="1" name="Shape 284"/>
+        <p:cNvGrpSpPr/>
+        <p:nvPr/>
+      </p:nvGrpSpPr>
+      <p:grpSpPr>
+        <a:xfrm>
+          <a:off x="0" y="0"/>
+          <a:ext cx="0" cy="0"/>
+          <a:chOff x="0" y="0"/>
+          <a:chExt cx="0" cy="0"/>
+        </a:xfrm>
+      </p:grpSpPr>
+      <p:sp>
+        <p:nvSpPr>
+          <p:cNvPr id="285" name="Shape 285"/>
+          <p:cNvSpPr>
+            <a:spLocks noGrp="1" noRot="1" noChangeAspect="1"/>
+          </p:cNvSpPr>
+          <p:nvPr>
+            <p:ph type="sldImg" idx="2"/>
+          </p:nvPr>
+        </p:nvSpPr>
+        <p:spPr>
+          <a:xfrm>
+            <a:off x="1143000" y="685800"/>
+            <a:ext cx="4572000" cy="3429000"/>
+          </a:xfrm>
+          <a:custGeom>
+            <a:avLst/>
+            <a:gdLst/>
+            <a:ahLst/>
+            <a:cxnLst/>
+            <a:rect l="0" t="0" r="0" b="0"/>
+            <a:pathLst>
+              <a:path w="120000" h="120000" extrusionOk="0">
+                <a:moveTo>
+                  <a:pt x="0" y="0"/>
+                </a:moveTo>
+                <a:lnTo>
+                  <a:pt x="120000" y="0"/>
+                </a:lnTo>
+                <a:lnTo>
+                  <a:pt x="120000" y="120000"/>
+                </a:lnTo>
+                <a:lnTo>
+                  <a:pt x="0" y="120000"/>
+                </a:lnTo>
+                <a:close/>
+              </a:path>
+            </a:pathLst>
+          </a:custGeom>
+        </p:spPr>
+      </p:sp>
+      <p:sp>
+        <p:nvSpPr>
+          <p:cNvPr id="286" name="Shape 286"/>
+          <p:cNvSpPr txBox="1">
+            <a:spLocks noGrp="1"/>
+          </p:cNvSpPr>
+          <p:nvPr>
+            <p:ph type="body" idx="1"/>
+          </p:nvPr>
+        </p:nvSpPr>
+        <p:spPr>
+          <a:xfrm>
+            <a:off x="685800" y="4343400"/>
+            <a:ext cx="5486399" cy="4114800"/>
+          </a:xfrm>
+          <a:prstGeom prst="rect">
+            <a:avLst/>
+          </a:prstGeom>
+        </p:spPr>
+        <p:txBody>
+          <a:bodyPr lIns="91425" tIns="91425" rIns="91425" bIns="91425" anchor="t" anchorCtr="0">
+            <a:noAutofit/>
+          </a:bodyPr>
+          <a:lstStyle/>
+          <a:p>
+            <a:pPr lvl="0">
+              <a:spcBef>
+                <a:spcPts val="0"/>
+              </a:spcBef>
+              <a:buNone/>
+            </a:pPr>
+            <a:endParaRPr/>
+          </a:p>
+        </p:txBody>
+      </p:sp>
+    </p:spTree>
+  </p:cSld>
+  <p:clrMapOvr>
+    <a:masterClrMapping/>
+  </p:clrMapOvr>
+</p:notes>
+</file>
+
 <file path=ppt/notesSlides/notesSlide2.xml><?xml version="1.0" encoding="utf-8"?>
 <p:notes xmlns:a="http://schemas.openxmlformats.org/drawingml/2006/main" xmlns:r="http://schemas.openxmlformats.org/officeDocument/2006/relationships" xmlns:p="http://schemas.openxmlformats.org/presentationml/2006/main" showMasterSp="0" showMasterPhAnim="0">
   <p:cSld>
@@ -1105,7 +1326,199 @@
               </a:spcBef>
               <a:buNone/>
             </a:pPr>
-            <a:endParaRPr/>
+            <a:r>
+              <a:rPr lang="de-CH" dirty="0" smtClean="0"/>
+              <a:t>R&amp;D</a:t>
+            </a:r>
+            <a:r>
+              <a:rPr lang="de-CH" baseline="0" dirty="0" smtClean="0"/>
+              <a:t> </a:t>
+            </a:r>
+            <a:r>
+              <a:rPr lang="de-CH" baseline="0" dirty="0" err="1" smtClean="0"/>
+              <a:t>program</a:t>
+            </a:r>
+            <a:r>
+              <a:rPr lang="de-CH" baseline="0" dirty="0" smtClean="0"/>
+              <a:t> </a:t>
+            </a:r>
+            <a:r>
+              <a:rPr lang="de-CH" baseline="0" dirty="0" err="1" smtClean="0"/>
+              <a:t>of</a:t>
+            </a:r>
+            <a:r>
+              <a:rPr lang="de-CH" baseline="0" dirty="0" smtClean="0"/>
+              <a:t> PMI: New </a:t>
+            </a:r>
+            <a:r>
+              <a:rPr lang="de-CH" baseline="0" dirty="0" err="1" smtClean="0"/>
+              <a:t>products</a:t>
+            </a:r>
+            <a:r>
+              <a:rPr lang="de-CH" baseline="0" dirty="0" smtClean="0"/>
+              <a:t> ...</a:t>
+            </a:r>
+          </a:p>
+          <a:p>
+            <a:pPr lvl="0">
+              <a:spcBef>
+                <a:spcPts val="0"/>
+              </a:spcBef>
+              <a:buNone/>
+            </a:pPr>
+            <a:r>
+              <a:rPr lang="de-CH" baseline="0" dirty="0" smtClean="0"/>
+              <a:t>PMI </a:t>
+            </a:r>
+            <a:r>
+              <a:rPr lang="de-CH" baseline="0" dirty="0" err="1" smtClean="0"/>
+              <a:t>has</a:t>
+            </a:r>
+            <a:r>
+              <a:rPr lang="de-CH" baseline="0" dirty="0" smtClean="0"/>
+              <a:t> </a:t>
+            </a:r>
+            <a:r>
+              <a:rPr lang="de-CH" baseline="0" dirty="0" err="1" smtClean="0"/>
+              <a:t>facilities</a:t>
+            </a:r>
+            <a:r>
+              <a:rPr lang="de-CH" baseline="0" dirty="0" smtClean="0"/>
+              <a:t> </a:t>
+            </a:r>
+            <a:r>
+              <a:rPr lang="de-CH" baseline="0" dirty="0" err="1" smtClean="0"/>
+              <a:t>where</a:t>
+            </a:r>
+            <a:r>
+              <a:rPr lang="de-CH" baseline="0" dirty="0" smtClean="0"/>
+              <a:t> human </a:t>
+            </a:r>
+            <a:r>
+              <a:rPr lang="de-CH" baseline="0" dirty="0" err="1" smtClean="0"/>
+              <a:t>tissue</a:t>
+            </a:r>
+            <a:r>
+              <a:rPr lang="de-CH" baseline="0" dirty="0" smtClean="0"/>
+              <a:t> </a:t>
+            </a:r>
+            <a:r>
+              <a:rPr lang="de-CH" baseline="0" dirty="0" err="1" smtClean="0"/>
+              <a:t>samples</a:t>
+            </a:r>
+            <a:r>
+              <a:rPr lang="de-CH" baseline="0" dirty="0" smtClean="0"/>
+              <a:t> </a:t>
+            </a:r>
+            <a:r>
+              <a:rPr lang="de-CH" baseline="0" dirty="0" err="1" smtClean="0"/>
+              <a:t>are</a:t>
+            </a:r>
+            <a:r>
+              <a:rPr lang="de-CH" baseline="0" dirty="0" smtClean="0"/>
+              <a:t> </a:t>
+            </a:r>
+            <a:r>
+              <a:rPr lang="de-CH" baseline="0" dirty="0" err="1" smtClean="0"/>
+              <a:t>exposed</a:t>
+            </a:r>
+            <a:r>
+              <a:rPr lang="de-CH" baseline="0" dirty="0" smtClean="0"/>
+              <a:t> </a:t>
+            </a:r>
+            <a:r>
+              <a:rPr lang="de-CH" baseline="0" dirty="0" err="1" smtClean="0"/>
+              <a:t>to</a:t>
+            </a:r>
+            <a:r>
+              <a:rPr lang="de-CH" baseline="0" dirty="0" smtClean="0"/>
+              <a:t> </a:t>
+            </a:r>
+            <a:r>
+              <a:rPr lang="de-CH" baseline="0" dirty="0" err="1" smtClean="0"/>
+              <a:t>both</a:t>
+            </a:r>
+            <a:r>
+              <a:rPr lang="de-CH" baseline="0" dirty="0" smtClean="0"/>
+              <a:t> </a:t>
+            </a:r>
+            <a:r>
+              <a:rPr lang="de-CH" baseline="0" dirty="0" err="1" smtClean="0"/>
+              <a:t>products</a:t>
+            </a:r>
+            <a:r>
+              <a:rPr lang="de-CH" baseline="0" dirty="0" smtClean="0"/>
+              <a:t>.</a:t>
+            </a:r>
+          </a:p>
+          <a:p>
+            <a:pPr lvl="0">
+              <a:spcBef>
+                <a:spcPts val="0"/>
+              </a:spcBef>
+              <a:buNone/>
+            </a:pPr>
+            <a:r>
+              <a:rPr lang="de-CH" baseline="0" dirty="0" smtClean="0"/>
+              <a:t>-&gt; Analyse </a:t>
+            </a:r>
+            <a:r>
+              <a:rPr lang="de-CH" baseline="0" dirty="0" err="1" smtClean="0"/>
+              <a:t>videos</a:t>
+            </a:r>
+            <a:r>
+              <a:rPr lang="de-CH" baseline="0" dirty="0" smtClean="0"/>
+              <a:t> </a:t>
+            </a:r>
+            <a:r>
+              <a:rPr lang="de-CH" baseline="0" dirty="0" err="1" smtClean="0"/>
+              <a:t>of</a:t>
+            </a:r>
+            <a:r>
+              <a:rPr lang="de-CH" baseline="0" dirty="0" smtClean="0"/>
+              <a:t> </a:t>
+            </a:r>
+            <a:r>
+              <a:rPr lang="de-CH" baseline="0" dirty="0" err="1" smtClean="0"/>
+              <a:t>tissues</a:t>
+            </a:r>
+            <a:r>
+              <a:rPr lang="de-CH" baseline="0" dirty="0" smtClean="0"/>
+              <a:t> after </a:t>
+            </a:r>
+            <a:r>
+              <a:rPr lang="de-CH" baseline="0" dirty="0" err="1" smtClean="0"/>
+              <a:t>exposure</a:t>
+            </a:r>
+            <a:r>
+              <a:rPr lang="de-CH" baseline="0" dirty="0" smtClean="0"/>
+              <a:t> </a:t>
+            </a:r>
+            <a:r>
+              <a:rPr lang="de-CH" baseline="0" dirty="0" err="1" smtClean="0"/>
+              <a:t>wrt</a:t>
+            </a:r>
+            <a:r>
+              <a:rPr lang="de-CH" baseline="0" dirty="0" smtClean="0"/>
+              <a:t> </a:t>
+            </a:r>
+            <a:r>
+              <a:rPr lang="de-CH" baseline="0" dirty="0" err="1" smtClean="0"/>
+              <a:t>several</a:t>
+            </a:r>
+            <a:r>
+              <a:rPr lang="de-CH" baseline="0" dirty="0" smtClean="0"/>
+              <a:t> </a:t>
+            </a:r>
+            <a:r>
+              <a:rPr lang="de-CH" baseline="0" dirty="0" err="1" smtClean="0"/>
+              <a:t>features</a:t>
+            </a:r>
+            <a:r>
+              <a:rPr lang="de-CH" baseline="0" dirty="0" smtClean="0"/>
+              <a:t>.</a:t>
+            </a:r>
+            <a:endParaRPr dirty="0"/>
           </a:p>
         </p:txBody>
       </p:sp>
@@ -1307,7 +1720,47 @@
               </a:spcBef>
               <a:buNone/>
             </a:pPr>
-            <a:endParaRPr/>
+            <a:r>
+              <a:rPr lang="de-CH" dirty="0" smtClean="0"/>
+              <a:t>Project</a:t>
+            </a:r>
+            <a:r>
+              <a:rPr lang="de-CH" baseline="0" dirty="0" smtClean="0"/>
+              <a:t> also </a:t>
+            </a:r>
+            <a:r>
+              <a:rPr lang="de-CH" baseline="0" dirty="0" err="1" smtClean="0"/>
+              <a:t>contains</a:t>
+            </a:r>
+            <a:r>
+              <a:rPr lang="de-CH" baseline="0" dirty="0" smtClean="0"/>
+              <a:t> </a:t>
+            </a:r>
+            <a:r>
+              <a:rPr lang="de-CH" baseline="0" dirty="0" err="1" smtClean="0"/>
+              <a:t>research</a:t>
+            </a:r>
+            <a:r>
+              <a:rPr lang="de-CH" baseline="0" dirty="0" smtClean="0"/>
+              <a:t> </a:t>
+            </a:r>
+            <a:r>
+              <a:rPr lang="de-CH" baseline="0" dirty="0" err="1" smtClean="0"/>
+              <a:t>related</a:t>
+            </a:r>
+            <a:r>
+              <a:rPr lang="de-CH" baseline="0" dirty="0" smtClean="0"/>
+              <a:t> </a:t>
+            </a:r>
+            <a:r>
+              <a:rPr lang="de-CH" baseline="0" dirty="0" err="1" smtClean="0"/>
+              <a:t>tasks</a:t>
+            </a:r>
+            <a:r>
+              <a:rPr lang="de-CH" baseline="0" dirty="0" smtClean="0"/>
+              <a:t>...</a:t>
+            </a:r>
+            <a:endParaRPr dirty="0"/>
           </a:p>
         </p:txBody>
       </p:sp>
@@ -1320,6 +1773,176 @@
 </file>
 
 <file path=ppt/notesSlides/notesSlide6.xml><?xml version="1.0" encoding="utf-8"?>
+<p:notes xmlns:a="http://schemas.openxmlformats.org/drawingml/2006/main" xmlns:r="http://schemas.openxmlformats.org/officeDocument/2006/relationships" xmlns:p="http://schemas.openxmlformats.org/presentationml/2006/main">
+  <p:cSld>
+    <p:spTree>
+      <p:nvGrpSpPr>
+        <p:cNvPr id="1" name=""/>
+        <p:cNvGrpSpPr/>
+        <p:nvPr/>
+      </p:nvGrpSpPr>
+      <p:grpSpPr>
+        <a:xfrm>
+          <a:off x="0" y="0"/>
+          <a:ext cx="0" cy="0"/>
+          <a:chOff x="0" y="0"/>
+          <a:chExt cx="0" cy="0"/>
+        </a:xfrm>
+      </p:grpSpPr>
+      <p:sp>
+        <p:nvSpPr>
+          <p:cNvPr id="2" name="Slide Image Placeholder 1"/>
+          <p:cNvSpPr>
+            <a:spLocks noGrp="1" noRot="1" noChangeAspect="1"/>
+          </p:cNvSpPr>
+          <p:nvPr>
+            <p:ph type="sldImg"/>
+          </p:nvPr>
+        </p:nvSpPr>
+        <p:spPr/>
+      </p:sp>
+      <p:sp>
+        <p:nvSpPr>
+          <p:cNvPr id="3" name="Notes Placeholder 2"/>
+          <p:cNvSpPr>
+            <a:spLocks noGrp="1"/>
+          </p:cNvSpPr>
+          <p:nvPr>
+            <p:ph type="body" idx="1"/>
+          </p:nvPr>
+        </p:nvSpPr>
+        <p:spPr/>
+        <p:txBody>
+          <a:bodyPr/>
+          <a:lstStyle/>
+          <a:p>
+            <a:r>
+              <a:rPr lang="de-CH" dirty="0" err="1" smtClean="0"/>
+              <a:t>Scrum</a:t>
+            </a:r>
+            <a:r>
+              <a:rPr lang="de-CH" dirty="0" smtClean="0"/>
+              <a:t> </a:t>
+            </a:r>
+            <a:r>
+              <a:rPr lang="de-CH" dirty="0" err="1" smtClean="0"/>
+              <a:t>as</a:t>
+            </a:r>
+            <a:r>
+              <a:rPr lang="de-CH" dirty="0" smtClean="0"/>
+              <a:t> </a:t>
+            </a:r>
+            <a:r>
+              <a:rPr lang="de-CH" dirty="0" err="1" smtClean="0"/>
+              <a:t>mentioned</a:t>
+            </a:r>
+            <a:r>
+              <a:rPr lang="de-CH" dirty="0" smtClean="0"/>
+              <a:t>...</a:t>
+            </a:r>
+          </a:p>
+          <a:p>
+            <a:r>
+              <a:rPr lang="de-CH" dirty="0" smtClean="0"/>
+              <a:t>Details</a:t>
+            </a:r>
+            <a:r>
+              <a:rPr lang="de-CH" baseline="0" dirty="0" smtClean="0"/>
+              <a:t> </a:t>
+            </a:r>
+            <a:r>
+              <a:rPr lang="de-CH" baseline="0" dirty="0" err="1" smtClean="0"/>
+              <a:t>of</a:t>
+            </a:r>
+            <a:r>
+              <a:rPr lang="de-CH" baseline="0" dirty="0" smtClean="0"/>
+              <a:t> </a:t>
+            </a:r>
+            <a:r>
+              <a:rPr lang="de-CH" baseline="0" dirty="0" err="1" smtClean="0"/>
+              <a:t>sprint</a:t>
+            </a:r>
+            <a:r>
+              <a:rPr lang="de-CH" baseline="0" dirty="0" smtClean="0"/>
+              <a:t> 1 </a:t>
+            </a:r>
+            <a:r>
+              <a:rPr lang="de-CH" baseline="0" dirty="0" err="1" smtClean="0"/>
+              <a:t>follow</a:t>
+            </a:r>
+            <a:r>
+              <a:rPr lang="is-IS" baseline="0" dirty="0" smtClean="0"/>
+              <a:t>…</a:t>
+            </a:r>
+            <a:endParaRPr lang="de-CH" baseline="0" dirty="0" smtClean="0"/>
+          </a:p>
+          <a:p>
+            <a:r>
+              <a:rPr lang="de-CH" baseline="0" dirty="0" smtClean="0"/>
+              <a:t>Sprint </a:t>
+            </a:r>
+            <a:r>
+              <a:rPr lang="de-CH" baseline="0" dirty="0" err="1" smtClean="0"/>
+              <a:t>planning</a:t>
+            </a:r>
+            <a:r>
+              <a:rPr lang="de-CH" baseline="0" dirty="0" smtClean="0"/>
+              <a:t> </a:t>
+            </a:r>
+            <a:r>
+              <a:rPr lang="de-CH" baseline="0" dirty="0" err="1" smtClean="0"/>
+              <a:t>at</a:t>
+            </a:r>
+            <a:r>
+              <a:rPr lang="de-CH" baseline="0" dirty="0" smtClean="0"/>
+              <a:t> </a:t>
+            </a:r>
+            <a:r>
+              <a:rPr lang="de-CH" baseline="0" dirty="0" err="1" smtClean="0"/>
+              <a:t>the</a:t>
+            </a:r>
+            <a:r>
+              <a:rPr lang="de-CH" baseline="0" dirty="0" smtClean="0"/>
+              <a:t> end </a:t>
+            </a:r>
+            <a:r>
+              <a:rPr lang="de-CH" baseline="0" dirty="0" err="1" smtClean="0"/>
+              <a:t>of</a:t>
+            </a:r>
+            <a:r>
+              <a:rPr lang="de-CH" baseline="0" dirty="0" smtClean="0"/>
+              <a:t> </a:t>
+            </a:r>
+            <a:r>
+              <a:rPr lang="de-CH" baseline="0" dirty="0" err="1" smtClean="0"/>
+              <a:t>each</a:t>
+            </a:r>
+            <a:r>
+              <a:rPr lang="de-CH" baseline="0" dirty="0" smtClean="0"/>
+              <a:t> </a:t>
+            </a:r>
+            <a:r>
+              <a:rPr lang="de-CH" baseline="0" dirty="0" err="1" smtClean="0"/>
+              <a:t>sprint</a:t>
+            </a:r>
+            <a:endParaRPr lang="de-CH" baseline="0" dirty="0" smtClean="0"/>
+          </a:p>
+        </p:txBody>
+      </p:sp>
+    </p:spTree>
+    <p:extLst>
+      <p:ext uri="{BB962C8B-B14F-4D97-AF65-F5344CB8AC3E}">
+        <p14:creationId xmlns:p14="http://schemas.microsoft.com/office/powerpoint/2010/main" val="2414168169"/>
+      </p:ext>
+    </p:extLst>
+  </p:cSld>
+  <p:clrMapOvr>
+    <a:masterClrMapping/>
+  </p:clrMapOvr>
+</p:notes>
+</file>
+
+<file path=ppt/notesSlides/notesSlide7.xml><?xml version="1.0" encoding="utf-8"?>
 <p:notes xmlns:a="http://schemas.openxmlformats.org/drawingml/2006/main" xmlns:r="http://schemas.openxmlformats.org/officeDocument/2006/relationships" xmlns:p="http://schemas.openxmlformats.org/presentationml/2006/main" showMasterSp="0" showMasterPhAnim="0">
   <p:cSld>
     <p:spTree>
@@ -1408,7 +2031,77 @@
               </a:spcBef>
               <a:buNone/>
             </a:pPr>
-            <a:endParaRPr/>
+            <a:r>
+              <a:rPr lang="de-CH" dirty="0" smtClean="0"/>
+              <a:t>Sprint 1 </a:t>
+            </a:r>
+            <a:r>
+              <a:rPr lang="de-CH" dirty="0" err="1" smtClean="0"/>
+              <a:t>already</a:t>
+            </a:r>
+            <a:r>
+              <a:rPr lang="de-CH" dirty="0" smtClean="0"/>
+              <a:t> in</a:t>
+            </a:r>
+            <a:r>
+              <a:rPr lang="de-CH" baseline="0" dirty="0" smtClean="0"/>
+              <a:t> </a:t>
+            </a:r>
+            <a:r>
+              <a:rPr lang="de-CH" baseline="0" dirty="0" err="1" smtClean="0"/>
+              <a:t>progress</a:t>
+            </a:r>
+            <a:r>
+              <a:rPr lang="de-CH" baseline="0" dirty="0" smtClean="0"/>
+              <a:t> (on </a:t>
+            </a:r>
+            <a:r>
+              <a:rPr lang="de-CH" baseline="0" dirty="0" err="1" smtClean="0"/>
+              <a:t>track</a:t>
+            </a:r>
+            <a:r>
+              <a:rPr lang="de-CH" baseline="0" dirty="0" smtClean="0"/>
+              <a:t>!)</a:t>
+            </a:r>
+            <a:endParaRPr lang="de-CH" dirty="0" smtClean="0"/>
+          </a:p>
+          <a:p>
+            <a:pPr lvl="0">
+              <a:spcBef>
+                <a:spcPts val="0"/>
+              </a:spcBef>
+              <a:buNone/>
+            </a:pPr>
+            <a:r>
+              <a:rPr lang="de-CH" dirty="0" smtClean="0"/>
+              <a:t>Sprint 6 also </a:t>
+            </a:r>
+            <a:r>
+              <a:rPr lang="de-CH" dirty="0" err="1" smtClean="0"/>
+              <a:t>for</a:t>
+            </a:r>
+            <a:r>
+              <a:rPr lang="de-CH" dirty="0" smtClean="0"/>
+              <a:t> final</a:t>
+            </a:r>
+            <a:r>
+              <a:rPr lang="de-CH" baseline="0" dirty="0" smtClean="0"/>
+              <a:t> </a:t>
+            </a:r>
+            <a:r>
+              <a:rPr lang="de-CH" baseline="0" dirty="0" err="1" smtClean="0"/>
+              <a:t>report</a:t>
+            </a:r>
+            <a:endParaRPr lang="de-CH" baseline="0" dirty="0" smtClean="0"/>
+          </a:p>
+          <a:p>
+            <a:pPr lvl="0">
+              <a:spcBef>
+                <a:spcPts val="0"/>
+              </a:spcBef>
+              <a:buNone/>
+            </a:pPr>
+            <a:endParaRPr dirty="0"/>
           </a:p>
         </p:txBody>
       </p:sp>
@@ -1420,7 +2113,7 @@
 </p:notes>
 </file>
 
-<file path=ppt/notesSlides/notesSlide7.xml><?xml version="1.0" encoding="utf-8"?>
+<file path=ppt/notesSlides/notesSlide8.xml><?xml version="1.0" encoding="utf-8"?>
 <p:notes xmlns:a="http://schemas.openxmlformats.org/drawingml/2006/main" xmlns:r="http://schemas.openxmlformats.org/officeDocument/2006/relationships" xmlns:p="http://schemas.openxmlformats.org/presentationml/2006/main" showMasterSp="0" showMasterPhAnim="0">
   <p:cSld>
     <p:spTree>
@@ -1509,7 +2202,7 @@
               </a:spcBef>
               <a:buNone/>
             </a:pPr>
-            <a:endParaRPr/>
+            <a:endParaRPr dirty="0"/>
           </a:p>
         </p:txBody>
       </p:sp>
@@ -1521,7 +2214,7 @@
 </p:notes>
 </file>
 
-<file path=ppt/notesSlides/notesSlide8.xml><?xml version="1.0" encoding="utf-8"?>
+<file path=ppt/notesSlides/notesSlide9.xml><?xml version="1.0" encoding="utf-8"?>
 <p:notes xmlns:a="http://schemas.openxmlformats.org/drawingml/2006/main" xmlns:r="http://schemas.openxmlformats.org/officeDocument/2006/relationships" xmlns:p="http://schemas.openxmlformats.org/presentationml/2006/main" showMasterSp="0" showMasterPhAnim="0">
   <p:cSld>
     <p:spTree>
@@ -1610,100 +2303,28 @@
               </a:spcBef>
               <a:buNone/>
             </a:pPr>
-            <a:endParaRPr/>
-          </a:p>
-        </p:txBody>
-      </p:sp>
-    </p:spTree>
-  </p:cSld>
-  <p:clrMapOvr>
-    <a:masterClrMapping/>
-  </p:clrMapOvr>
-</p:notes>
-</file>
-
-<file path=ppt/notesSlides/notesSlide9.xml><?xml version="1.0" encoding="utf-8"?>
-<p:notes xmlns:a="http://schemas.openxmlformats.org/drawingml/2006/main" xmlns:r="http://schemas.openxmlformats.org/officeDocument/2006/relationships" xmlns:p="http://schemas.openxmlformats.org/presentationml/2006/main" showMasterSp="0" showMasterPhAnim="0">
-  <p:cSld>
-    <p:spTree>
-      <p:nvGrpSpPr>
-        <p:cNvPr id="1" name="Shape 284"/>
-        <p:cNvGrpSpPr/>
-        <p:nvPr/>
-      </p:nvGrpSpPr>
-      <p:grpSpPr>
-        <a:xfrm>
-          <a:off x="0" y="0"/>
-          <a:ext cx="0" cy="0"/>
-          <a:chOff x="0" y="0"/>
-          <a:chExt cx="0" cy="0"/>
-        </a:xfrm>
-      </p:grpSpPr>
-      <p:sp>
-        <p:nvSpPr>
-          <p:cNvPr id="285" name="Shape 285"/>
-          <p:cNvSpPr>
-            <a:spLocks noGrp="1" noRot="1" noChangeAspect="1"/>
-          </p:cNvSpPr>
-          <p:nvPr>
-            <p:ph type="sldImg" idx="2"/>
-          </p:nvPr>
-        </p:nvSpPr>
-        <p:spPr>
-          <a:xfrm>
-            <a:off x="1143000" y="685800"/>
-            <a:ext cx="4572000" cy="3429000"/>
-          </a:xfrm>
-          <a:custGeom>
-            <a:avLst/>
-            <a:gdLst/>
-            <a:ahLst/>
-            <a:cxnLst/>
-            <a:rect l="0" t="0" r="0" b="0"/>
-            <a:pathLst>
-              <a:path w="120000" h="120000" extrusionOk="0">
-                <a:moveTo>
-                  <a:pt x="0" y="0"/>
-                </a:moveTo>
-                <a:lnTo>
-                  <a:pt x="120000" y="0"/>
-                </a:lnTo>
-                <a:lnTo>
-                  <a:pt x="120000" y="120000"/>
-                </a:lnTo>
-                <a:lnTo>
-                  <a:pt x="0" y="120000"/>
-                </a:lnTo>
-                <a:close/>
-              </a:path>
-            </a:pathLst>
-          </a:custGeom>
-        </p:spPr>
-      </p:sp>
-      <p:sp>
-        <p:nvSpPr>
-          <p:cNvPr id="286" name="Shape 286"/>
-          <p:cNvSpPr txBox="1">
-            <a:spLocks noGrp="1"/>
-          </p:cNvSpPr>
-          <p:nvPr>
-            <p:ph type="body" idx="1"/>
-          </p:nvPr>
-        </p:nvSpPr>
-        <p:spPr>
-          <a:xfrm>
-            <a:off x="685800" y="4343400"/>
-            <a:ext cx="5486399" cy="4114800"/>
-          </a:xfrm>
-          <a:prstGeom prst="rect">
-            <a:avLst/>
-          </a:prstGeom>
-        </p:spPr>
-        <p:txBody>
-          <a:bodyPr lIns="91425" tIns="91425" rIns="91425" bIns="91425" anchor="t" anchorCtr="0">
-            <a:noAutofit/>
-          </a:bodyPr>
-          <a:lstStyle/>
+            <a:r>
+              <a:rPr lang="de-CH" dirty="0" smtClean="0"/>
+              <a:t>Illustration</a:t>
+            </a:r>
+            <a:r>
+              <a:rPr lang="de-CH" baseline="0" dirty="0" smtClean="0"/>
+              <a:t> </a:t>
+            </a:r>
+            <a:r>
+              <a:rPr lang="de-CH" baseline="0" dirty="0" err="1" smtClean="0"/>
+              <a:t>of</a:t>
+            </a:r>
+            <a:r>
+              <a:rPr lang="de-CH" baseline="0" dirty="0" smtClean="0"/>
+              <a:t> </a:t>
+            </a:r>
+            <a:r>
+              <a:rPr lang="de-CH" baseline="0" dirty="0" err="1" smtClean="0"/>
+              <a:t>workflow</a:t>
+            </a:r>
+            <a:endParaRPr lang="de-CH" baseline="0" dirty="0" smtClean="0"/>
+          </a:p>
           <a:p>
             <a:pPr lvl="0">
               <a:spcBef>
@@ -1711,7 +2332,32 @@
               </a:spcBef>
               <a:buNone/>
             </a:pPr>
-            <a:endParaRPr/>
+            <a:r>
+              <a:rPr lang="de-CH" baseline="0" dirty="0" smtClean="0"/>
+              <a:t>Task 1 </a:t>
+            </a:r>
+            <a:r>
+              <a:rPr lang="de-CH" baseline="0" dirty="0" err="1" smtClean="0"/>
+              <a:t>blue</a:t>
+            </a:r>
+            <a:endParaRPr lang="de-CH" baseline="0" dirty="0" smtClean="0"/>
+          </a:p>
+          <a:p>
+            <a:pPr lvl="0">
+              <a:spcBef>
+                <a:spcPts val="0"/>
+              </a:spcBef>
+              <a:buNone/>
+            </a:pPr>
+            <a:r>
+              <a:rPr lang="de-CH" baseline="0" dirty="0" smtClean="0"/>
+              <a:t>Task 2 </a:t>
+            </a:r>
+            <a:r>
+              <a:rPr lang="de-CH" baseline="0" dirty="0" err="1" smtClean="0"/>
+              <a:t>red</a:t>
+            </a:r>
+            <a:endParaRPr dirty="0"/>
           </a:p>
         </p:txBody>
       </p:sp>
@@ -5810,20 +6456,20 @@
               <a:t>Is happy with </a:t>
             </a:r>
             <a:r>
-              <a:rPr lang="en-US" sz="2400" dirty="0" err="1" smtClean="0">
-                <a:solidFill>
-                  <a:srgbClr val="E0A3A3"/>
-                </a:solidFill>
-              </a:rPr>
-              <a:t>Laurents</a:t>
-            </a:r>
-            <a:r>
               <a:rPr lang="en-US" sz="2400" dirty="0" smtClean="0">
                 <a:solidFill>
                   <a:srgbClr val="E0A3A3"/>
                 </a:solidFill>
               </a:rPr>
-              <a:t> work</a:t>
+              <a:t>Laurent’s </a:t>
+            </a:r>
+            <a:r>
+              <a:rPr lang="en-US" sz="2400" dirty="0" smtClean="0">
+                <a:solidFill>
+                  <a:srgbClr val="E0A3A3"/>
+                </a:solidFill>
+              </a:rPr>
+              <a:t>work</a:t>
             </a:r>
             <a:br>
               <a:rPr lang="en-US" sz="2400" dirty="0" smtClean="0">

</xml_diff>

<commit_message>
Added documentation to generation of sythetic data. Added demo on how to use FFT on generated data. Added comments to slides.
</commit_message>
<xml_diff>
--- a/doc/initial-plan.pptx
+++ b/doc/initial-plan.pptx
@@ -479,11 +479,11 @@
         </c:dLbls>
         <c:gapWidth val="150"/>
         <c:overlap val="100"/>
-        <c:axId val="2118363528"/>
-        <c:axId val="2118366328"/>
+        <c:axId val="2120132664"/>
+        <c:axId val="2082613832"/>
       </c:barChart>
       <c:catAx>
-        <c:axId val="2118363528"/>
+        <c:axId val="2120132664"/>
         <c:scaling>
           <c:orientation val="maxMin"/>
         </c:scaling>
@@ -492,7 +492,7 @@
         <c:majorTickMark val="out"/>
         <c:minorTickMark val="none"/>
         <c:tickLblPos val="nextTo"/>
-        <c:crossAx val="2118366328"/>
+        <c:crossAx val="2082613832"/>
         <c:crosses val="autoZero"/>
         <c:auto val="1"/>
         <c:lblAlgn val="ctr"/>
@@ -500,7 +500,7 @@
         <c:noMultiLvlLbl val="0"/>
       </c:catAx>
       <c:valAx>
-        <c:axId val="2118366328"/>
+        <c:axId val="2082613832"/>
         <c:scaling>
           <c:orientation val="minMax"/>
           <c:max val="42535.0"/>
@@ -516,7 +516,7 @@
         <c:spPr>
           <a:effectLst/>
         </c:spPr>
-        <c:crossAx val="2118363528"/>
+        <c:crossAx val="2120132664"/>
         <c:crosses val="autoZero"/>
         <c:crossBetween val="between"/>
         <c:majorUnit val="15.0"/>
@@ -1448,7 +1448,7 @@
             </a:r>
             <a:r>
               <a:rPr lang="de-CH" baseline="0" dirty="0" smtClean="0"/>
-              <a:t>.</a:t>
+              <a:t>. </a:t>
             </a:r>
           </a:p>
           <a:p>
@@ -1760,6 +1760,59 @@
               <a:rPr lang="de-CH" baseline="0" dirty="0" smtClean="0"/>
               <a:t>...</a:t>
             </a:r>
+          </a:p>
+          <a:p>
+            <a:pPr lvl="0">
+              <a:spcBef>
+                <a:spcPts val="0"/>
+              </a:spcBef>
+              <a:buNone/>
+            </a:pPr>
+            <a:r>
+              <a:rPr lang="de-CH" baseline="0" dirty="0" err="1" smtClean="0"/>
+              <a:t>Evaluate</a:t>
+            </a:r>
+            <a:r>
+              <a:rPr lang="de-CH" baseline="0" dirty="0" smtClean="0"/>
+              <a:t> </a:t>
+            </a:r>
+            <a:r>
+              <a:rPr lang="de-CH" baseline="0" dirty="0" err="1" smtClean="0"/>
+              <a:t>and</a:t>
+            </a:r>
+            <a:r>
+              <a:rPr lang="de-CH" baseline="0" dirty="0" smtClean="0"/>
+              <a:t> </a:t>
+            </a:r>
+            <a:r>
+              <a:rPr lang="de-CH" baseline="0" dirty="0" err="1" smtClean="0"/>
+              <a:t>compare</a:t>
+            </a:r>
+            <a:r>
+              <a:rPr lang="de-CH" baseline="0" dirty="0" smtClean="0"/>
+              <a:t> different </a:t>
+            </a:r>
+            <a:r>
+              <a:rPr lang="de-CH" baseline="0" dirty="0" err="1" smtClean="0"/>
+              <a:t>techniques</a:t>
+            </a:r>
+            <a:r>
+              <a:rPr lang="de-CH" baseline="0" dirty="0" smtClean="0"/>
+              <a:t> </a:t>
+            </a:r>
+            <a:r>
+              <a:rPr lang="de-CH" baseline="0" dirty="0" err="1" smtClean="0"/>
+              <a:t>implemented</a:t>
+            </a:r>
+            <a:endParaRPr lang="de-CH" baseline="0" dirty="0" smtClean="0"/>
+          </a:p>
+          <a:p>
+            <a:pPr lvl="0">
+              <a:spcBef>
+                <a:spcPts val="0"/>
+              </a:spcBef>
+              <a:buNone/>
+            </a:pPr>
             <a:endParaRPr dirty="0"/>
           </a:p>
         </p:txBody>
@@ -1838,8 +1891,91 @@
             </a:r>
             <a:r>
               <a:rPr lang="de-CH" dirty="0" smtClean="0"/>
-              <a:t>...</a:t>
-            </a:r>
+              <a:t>..</a:t>
+            </a:r>
+            <a:r>
+              <a:rPr lang="de-CH" dirty="0" smtClean="0"/>
+              <a:t>.</a:t>
+            </a:r>
+          </a:p>
+          <a:p>
+            <a:r>
+              <a:rPr lang="de-CH" dirty="0" err="1" smtClean="0"/>
+              <a:t>Allows</a:t>
+            </a:r>
+            <a:r>
+              <a:rPr lang="de-CH" baseline="0" dirty="0" smtClean="0"/>
+              <a:t> </a:t>
+            </a:r>
+            <a:r>
+              <a:rPr lang="de-CH" baseline="0" dirty="0" err="1" smtClean="0"/>
+              <a:t>to</a:t>
+            </a:r>
+            <a:r>
+              <a:rPr lang="de-CH" baseline="0" dirty="0" smtClean="0"/>
+              <a:t> </a:t>
+            </a:r>
+            <a:r>
+              <a:rPr lang="de-CH" baseline="0" dirty="0" err="1" smtClean="0"/>
+              <a:t>get</a:t>
+            </a:r>
+            <a:r>
+              <a:rPr lang="de-CH" baseline="0" dirty="0" smtClean="0"/>
+              <a:t> </a:t>
+            </a:r>
+            <a:r>
+              <a:rPr lang="de-CH" baseline="0" dirty="0" err="1" smtClean="0"/>
+              <a:t>and</a:t>
+            </a:r>
+            <a:r>
+              <a:rPr lang="de-CH" baseline="0" dirty="0" smtClean="0"/>
+              <a:t> </a:t>
+            </a:r>
+            <a:r>
+              <a:rPr lang="de-CH" baseline="0" dirty="0" err="1" smtClean="0"/>
+              <a:t>incorparate</a:t>
+            </a:r>
+            <a:r>
+              <a:rPr lang="de-CH" baseline="0" dirty="0" smtClean="0"/>
+              <a:t> </a:t>
+            </a:r>
+            <a:r>
+              <a:rPr lang="de-CH" baseline="0" dirty="0" err="1" smtClean="0"/>
+              <a:t>feedback</a:t>
+            </a:r>
+            <a:r>
+              <a:rPr lang="de-CH" baseline="0" dirty="0" smtClean="0"/>
+              <a:t> on </a:t>
+            </a:r>
+            <a:r>
+              <a:rPr lang="de-CH" baseline="0" dirty="0" err="1" smtClean="0"/>
+              <a:t>the</a:t>
+            </a:r>
+            <a:r>
+              <a:rPr lang="de-CH" baseline="0" dirty="0" smtClean="0"/>
+              <a:t> </a:t>
+            </a:r>
+            <a:r>
+              <a:rPr lang="de-CH" baseline="0" dirty="0" err="1" smtClean="0"/>
+              <a:t>tool</a:t>
+            </a:r>
+            <a:r>
+              <a:rPr lang="de-CH" baseline="0" dirty="0" smtClean="0"/>
+              <a:t> in </a:t>
+            </a:r>
+            <a:r>
+              <a:rPr lang="de-CH" baseline="0" dirty="0" err="1" smtClean="0"/>
+              <a:t>each</a:t>
+            </a:r>
+            <a:r>
+              <a:rPr lang="de-CH" baseline="0" dirty="0" smtClean="0"/>
+              <a:t> </a:t>
+            </a:r>
+            <a:r>
+              <a:rPr lang="de-CH" baseline="0" dirty="0" err="1" smtClean="0"/>
+              <a:t>sprint</a:t>
+            </a:r>
+            <a:endParaRPr lang="de-CH" dirty="0" smtClean="0"/>
           </a:p>
           <a:p>
             <a:r>
@@ -6453,23 +6589,7 @@
                   <a:srgbClr val="E0A3A3"/>
                 </a:solidFill>
               </a:rPr>
-              <a:t>Is happy with </a:t>
-            </a:r>
-            <a:r>
-              <a:rPr lang="en-US" sz="2400" dirty="0" smtClean="0">
-                <a:solidFill>
-                  <a:srgbClr val="E0A3A3"/>
-                </a:solidFill>
-              </a:rPr>
-              <a:t>Laurent’s </a:t>
-            </a:r>
-            <a:r>
-              <a:rPr lang="en-US" sz="2400" dirty="0" smtClean="0">
-                <a:solidFill>
-                  <a:srgbClr val="E0A3A3"/>
-                </a:solidFill>
-              </a:rPr>
-              <a:t>work</a:t>
+              <a:t>Is happy with Laurent’s work</a:t>
             </a:r>
             <a:br>
               <a:rPr lang="en-US" sz="2400" dirty="0" smtClean="0">

</xml_diff>